<commit_message>
Add section 3 first draft
</commit_message>
<xml_diff>
--- a/Information Retrieval - Poster Session/presentation_template.pptx
+++ b/Information Retrieval - Poster Session/presentation_template.pptx
@@ -8,13 +8,14 @@
     <p:sldMasterId id="2147483665" r:id="rId4"/>
   </p:sldMasterIdLst>
   <p:notesMasterIdLst>
-    <p:notesMasterId r:id="rId6"/>
+    <p:notesMasterId r:id="rId7"/>
   </p:notesMasterIdLst>
   <p:handoutMasterIdLst>
-    <p:handoutMasterId r:id="rId7"/>
+    <p:handoutMasterId r:id="rId8"/>
   </p:handoutMasterIdLst>
   <p:sldIdLst>
     <p:sldId id="259" r:id="rId5"/>
+    <p:sldId id="260" r:id="rId6"/>
   </p:sldIdLst>
   <p:sldSz cx="30279975" cy="21386800"/>
   <p:notesSz cx="6858000" cy="9144000"/>
@@ -678,6 +679,182 @@
     </a:lvl9pPr>
   </p:notesStyle>
 </p:notesMaster>
+</file>
+
+<file path=ppt/notesSlides/notesSlide1.xml><?xml version="1.0" encoding="utf-8"?>
+<p:notes xmlns:a="http://schemas.openxmlformats.org/drawingml/2006/main" xmlns:r="http://schemas.openxmlformats.org/officeDocument/2006/relationships" xmlns:p="http://schemas.openxmlformats.org/presentationml/2006/main">
+  <p:cSld>
+    <p:spTree>
+      <p:nvGrpSpPr>
+        <p:cNvPr id="1" name=""/>
+        <p:cNvGrpSpPr/>
+        <p:nvPr/>
+      </p:nvGrpSpPr>
+      <p:grpSpPr>
+        <a:xfrm>
+          <a:off x="0" y="0"/>
+          <a:ext cx="0" cy="0"/>
+          <a:chOff x="0" y="0"/>
+          <a:chExt cx="0" cy="0"/>
+        </a:xfrm>
+      </p:grpSpPr>
+      <p:sp>
+        <p:nvSpPr>
+          <p:cNvPr id="2" name="Slide Image Placeholder 1"/>
+          <p:cNvSpPr>
+            <a:spLocks noGrp="1" noRot="1" noChangeAspect="1"/>
+          </p:cNvSpPr>
+          <p:nvPr>
+            <p:ph type="sldImg"/>
+          </p:nvPr>
+        </p:nvSpPr>
+        <p:spPr/>
+      </p:sp>
+      <p:sp>
+        <p:nvSpPr>
+          <p:cNvPr id="3" name="Notes Placeholder 2"/>
+          <p:cNvSpPr>
+            <a:spLocks noGrp="1"/>
+          </p:cNvSpPr>
+          <p:nvPr>
+            <p:ph type="body" idx="1"/>
+          </p:nvPr>
+        </p:nvSpPr>
+        <p:spPr/>
+        <p:txBody>
+          <a:bodyPr/>
+          <a:lstStyle/>
+          <a:p>
+            <a:r>
+              <a:rPr lang="en-GB" dirty="0"/>
+              <a:t>Layout 1.</a:t>
+            </a:r>
+          </a:p>
+        </p:txBody>
+      </p:sp>
+      <p:sp>
+        <p:nvSpPr>
+          <p:cNvPr id="4" name="Slide Number Placeholder 3"/>
+          <p:cNvSpPr>
+            <a:spLocks noGrp="1"/>
+          </p:cNvSpPr>
+          <p:nvPr>
+            <p:ph type="sldNum" sz="quarter" idx="10"/>
+          </p:nvPr>
+        </p:nvSpPr>
+        <p:spPr/>
+        <p:txBody>
+          <a:bodyPr/>
+          <a:lstStyle/>
+          <a:p>
+            <a:fld id="{0800A50D-30E1-41BB-BFC2-D3D818AB8EF9}" type="slidenum">
+              <a:rPr lang="de-DE" smtClean="0"/>
+              <a:pPr/>
+              <a:t>1</a:t>
+            </a:fld>
+            <a:endParaRPr lang="de-DE"/>
+          </a:p>
+        </p:txBody>
+      </p:sp>
+    </p:spTree>
+    <p:extLst>
+      <p:ext uri="{BB962C8B-B14F-4D97-AF65-F5344CB8AC3E}">
+        <p14:creationId xmlns:p14="http://schemas.microsoft.com/office/powerpoint/2010/main" val="1601293749"/>
+      </p:ext>
+    </p:extLst>
+  </p:cSld>
+  <p:clrMapOvr>
+    <a:masterClrMapping/>
+  </p:clrMapOvr>
+</p:notes>
+</file>
+
+<file path=ppt/notesSlides/notesSlide2.xml><?xml version="1.0" encoding="utf-8"?>
+<p:notes xmlns:a="http://schemas.openxmlformats.org/drawingml/2006/main" xmlns:r="http://schemas.openxmlformats.org/officeDocument/2006/relationships" xmlns:p="http://schemas.openxmlformats.org/presentationml/2006/main">
+  <p:cSld>
+    <p:spTree>
+      <p:nvGrpSpPr>
+        <p:cNvPr id="1" name=""/>
+        <p:cNvGrpSpPr/>
+        <p:nvPr/>
+      </p:nvGrpSpPr>
+      <p:grpSpPr>
+        <a:xfrm>
+          <a:off x="0" y="0"/>
+          <a:ext cx="0" cy="0"/>
+          <a:chOff x="0" y="0"/>
+          <a:chExt cx="0" cy="0"/>
+        </a:xfrm>
+      </p:grpSpPr>
+      <p:sp>
+        <p:nvSpPr>
+          <p:cNvPr id="2" name="Slide Image Placeholder 1"/>
+          <p:cNvSpPr>
+            <a:spLocks noGrp="1" noRot="1" noChangeAspect="1"/>
+          </p:cNvSpPr>
+          <p:nvPr>
+            <p:ph type="sldImg"/>
+          </p:nvPr>
+        </p:nvSpPr>
+        <p:spPr/>
+      </p:sp>
+      <p:sp>
+        <p:nvSpPr>
+          <p:cNvPr id="3" name="Notes Placeholder 2"/>
+          <p:cNvSpPr>
+            <a:spLocks noGrp="1"/>
+          </p:cNvSpPr>
+          <p:nvPr>
+            <p:ph type="body" idx="1"/>
+          </p:nvPr>
+        </p:nvSpPr>
+        <p:spPr/>
+        <p:txBody>
+          <a:bodyPr/>
+          <a:lstStyle/>
+          <a:p>
+            <a:r>
+              <a:rPr lang="en-GB" dirty="0"/>
+              <a:t>Layout 2. Has a bit more space.</a:t>
+            </a:r>
+          </a:p>
+        </p:txBody>
+      </p:sp>
+      <p:sp>
+        <p:nvSpPr>
+          <p:cNvPr id="4" name="Slide Number Placeholder 3"/>
+          <p:cNvSpPr>
+            <a:spLocks noGrp="1"/>
+          </p:cNvSpPr>
+          <p:nvPr>
+            <p:ph type="sldNum" sz="quarter" idx="10"/>
+          </p:nvPr>
+        </p:nvSpPr>
+        <p:spPr/>
+        <p:txBody>
+          <a:bodyPr/>
+          <a:lstStyle/>
+          <a:p>
+            <a:fld id="{0800A50D-30E1-41BB-BFC2-D3D818AB8EF9}" type="slidenum">
+              <a:rPr lang="de-DE" smtClean="0"/>
+              <a:pPr/>
+              <a:t>2</a:t>
+            </a:fld>
+            <a:endParaRPr lang="de-DE"/>
+          </a:p>
+        </p:txBody>
+      </p:sp>
+    </p:spTree>
+    <p:extLst>
+      <p:ext uri="{BB962C8B-B14F-4D97-AF65-F5344CB8AC3E}">
+        <p14:creationId xmlns:p14="http://schemas.microsoft.com/office/powerpoint/2010/main" val="2921413543"/>
+      </p:ext>
+    </p:extLst>
+  </p:cSld>
+  <p:clrMapOvr>
+    <a:masterClrMapping/>
+  </p:clrMapOvr>
+</p:notes>
 </file>
 
 <file path=ppt/slideLayouts/slideLayout1.xml><?xml version="1.0" encoding="utf-8"?>
@@ -27437,7 +27614,1556 @@
           </p:nvPr>
         </p:nvPicPr>
         <p:blipFill>
-          <a:blip r:embed="rId2" cstate="print">
+          <a:blip r:embed="rId3" cstate="print">
+            <a:extLst>
+              <a:ext uri="{28A0092B-C50C-407E-A947-70E740481C1C}">
+                <a14:useLocalDpi xmlns:a14="http://schemas.microsoft.com/office/drawing/2010/main" val="0"/>
+              </a:ext>
+            </a:extLst>
+          </a:blip>
+          <a:stretch>
+            <a:fillRect/>
+          </a:stretch>
+        </p:blipFill>
+        <p:spPr>
+          <a:xfrm>
+            <a:off x="1225298" y="14039166"/>
+            <a:ext cx="8043314" cy="3854728"/>
+          </a:xfrm>
+        </p:spPr>
+      </p:pic>
+      <p:sp>
+        <p:nvSpPr>
+          <p:cNvPr id="3" name="Text Placeholder 2">
+            <a:extLst>
+              <a:ext uri="{FF2B5EF4-FFF2-40B4-BE49-F238E27FC236}">
+                <a16:creationId xmlns:a16="http://schemas.microsoft.com/office/drawing/2014/main" id="{FD26F003-5257-4ECA-8455-918D2D479F9D}"/>
+              </a:ext>
+            </a:extLst>
+          </p:cNvPr>
+          <p:cNvSpPr>
+            <a:spLocks noGrp="1"/>
+          </p:cNvSpPr>
+          <p:nvPr>
+            <p:ph type="body" sz="quarter" idx="19"/>
+          </p:nvPr>
+        </p:nvSpPr>
+        <p:spPr>
+          <a:xfrm>
+            <a:off x="1264024" y="18109918"/>
+            <a:ext cx="8043314" cy="216024"/>
+          </a:xfrm>
+        </p:spPr>
+        <p:txBody>
+          <a:bodyPr/>
+          <a:lstStyle/>
+          <a:p>
+            <a:r>
+              <a:rPr lang="de-DE" dirty="0"/>
+              <a:t>Bildunterschrift, Autor</a:t>
+            </a:r>
+          </a:p>
+        </p:txBody>
+      </p:sp>
+      <mc:AlternateContent xmlns:mc="http://schemas.openxmlformats.org/markup-compatibility/2006">
+        <mc:Choice xmlns:a14="http://schemas.microsoft.com/office/drawing/2010/main" Requires="a14">
+          <p:sp>
+            <p:nvSpPr>
+              <p:cNvPr id="5" name="Text Placeholder 4">
+                <a:extLst>
+                  <a:ext uri="{FF2B5EF4-FFF2-40B4-BE49-F238E27FC236}">
+                    <a16:creationId xmlns:a16="http://schemas.microsoft.com/office/drawing/2014/main" id="{B07FC288-A910-47DA-80A7-1A8E6450AF2D}"/>
+                  </a:ext>
+                </a:extLst>
+              </p:cNvPr>
+              <p:cNvSpPr>
+                <a:spLocks noGrp="1"/>
+              </p:cNvSpPr>
+              <p:nvPr>
+                <p:ph type="body" sz="quarter" idx="33"/>
+              </p:nvPr>
+            </p:nvSpPr>
+            <p:spPr>
+              <a:xfrm>
+                <a:off x="1260000" y="3564608"/>
+                <a:ext cx="8047339" cy="10440854"/>
+              </a:xfrm>
+            </p:spPr>
+            <p:txBody>
+              <a:bodyPr/>
+              <a:lstStyle/>
+              <a:p>
+                <a:pPr lvl="1" algn="just"/>
+                <a:r>
+                  <a:rPr lang="de-DE" sz="2800" dirty="0"/>
+                  <a:t>Abstract</a:t>
+                </a:r>
+              </a:p>
+              <a:p>
+                <a:pPr algn="just"/>
+                <a:r>
+                  <a:rPr lang="de-DE" dirty="0"/>
+                  <a:t>By learning from real-world data, machine learning is doomed to adopt social bias such as sexism. This paper analyzes gender bias in the context of the natrual language processing technique word embedding. The paper proposes a method to determine the underlying bias in a dataset and an algorithm to eliminate this bias while preserving the ability to cluster words. This is shown using a public dataset of news articles to reduce gender stereotypes in analogy tasks.</a:t>
+                </a:r>
+              </a:p>
+              <a:p>
+                <a:pPr lvl="1" algn="just"/>
+                <a:r>
+                  <a:rPr lang="de-DE" sz="2800" dirty="0"/>
+                  <a:t>Introduction and Preliminary</a:t>
+                </a:r>
+              </a:p>
+              <a:p>
+                <a:pPr algn="just"/>
+                <a:r>
+                  <a:rPr lang="de-DE" dirty="0"/>
+                  <a:t>A word embedding represents each word </a:t>
+                </a:r>
+                <a14:m>
+                  <m:oMath xmlns:m="http://schemas.openxmlformats.org/officeDocument/2006/math">
+                    <m:r>
+                      <a:rPr lang="de-DE" i="1" dirty="0" smtClean="0">
+                        <a:latin typeface="Cambria Math" panose="02040503050406030204" pitchFamily="18" charset="0"/>
+                      </a:rPr>
+                      <m:t>𝑤</m:t>
+                    </m:r>
+                  </m:oMath>
+                </a14:m>
+                <a:r>
+                  <a:rPr lang="de-DE" dirty="0"/>
+                  <a:t> as a d-dimensional </a:t>
+                </a:r>
+                <a14:m>
+                  <m:oMath xmlns:m="http://schemas.openxmlformats.org/officeDocument/2006/math">
+                    <m:r>
+                      <a:rPr lang="de-DE" i="1" dirty="0" smtClean="0">
+                        <a:latin typeface="Cambria Math" panose="02040503050406030204" pitchFamily="18" charset="0"/>
+                      </a:rPr>
+                      <m:t>𝑤𝑜𝑟𝑑</m:t>
+                    </m:r>
+                    <m:r>
+                      <a:rPr lang="de-DE" i="1" dirty="0" smtClean="0">
+                        <a:latin typeface="Cambria Math" panose="02040503050406030204" pitchFamily="18" charset="0"/>
+                      </a:rPr>
+                      <m:t> </m:t>
+                    </m:r>
+                    <m:r>
+                      <a:rPr lang="de-DE" i="1" dirty="0" smtClean="0">
+                        <a:latin typeface="Cambria Math" panose="02040503050406030204" pitchFamily="18" charset="0"/>
+                      </a:rPr>
+                      <m:t>𝑣𝑒𝑐𝑡𝑜𝑟</m:t>
+                    </m:r>
+                  </m:oMath>
+                </a14:m>
+                <a:r>
+                  <a:rPr lang="de-DE" dirty="0"/>
+                  <a:t> </a:t>
+                </a:r>
+                <a14:m>
+                  <m:oMath xmlns:m="http://schemas.openxmlformats.org/officeDocument/2006/math">
+                    <m:r>
+                      <a:rPr lang="de-DE" i="1">
+                        <a:latin typeface="Cambria Math" panose="02040503050406030204" pitchFamily="18" charset="0"/>
+                      </a:rPr>
+                      <m:t>𝑤</m:t>
+                    </m:r>
+                    <m:r>
+                      <a:rPr lang="de-DE" i="1">
+                        <a:latin typeface="Cambria Math" panose="02040503050406030204" pitchFamily="18" charset="0"/>
+                      </a:rPr>
+                      <m:t> ∈</m:t>
+                    </m:r>
+                    <m:sSup>
+                      <m:sSupPr>
+                        <m:ctrlPr>
+                          <a:rPr lang="de-DE" i="1">
+                            <a:latin typeface="Cambria Math" panose="02040503050406030204" pitchFamily="18" charset="0"/>
+                            <a:ea typeface="Cambria Math" panose="02040503050406030204" pitchFamily="18" charset="0"/>
+                          </a:rPr>
+                        </m:ctrlPr>
+                      </m:sSupPr>
+                      <m:e>
+                        <m:r>
+                          <a:rPr lang="de-DE" i="1">
+                            <a:latin typeface="Cambria Math" panose="02040503050406030204" pitchFamily="18" charset="0"/>
+                            <a:ea typeface="Cambria Math" panose="02040503050406030204" pitchFamily="18" charset="0"/>
+                          </a:rPr>
+                          <m:t>ℝ</m:t>
+                        </m:r>
+                      </m:e>
+                      <m:sup>
+                        <m:r>
+                          <a:rPr lang="de-DE" i="1">
+                            <a:latin typeface="Cambria Math" panose="02040503050406030204" pitchFamily="18" charset="0"/>
+                            <a:ea typeface="Cambria Math" panose="02040503050406030204" pitchFamily="18" charset="0"/>
+                          </a:rPr>
+                          <m:t>𝑑</m:t>
+                        </m:r>
+                      </m:sup>
+                    </m:sSup>
+                  </m:oMath>
+                </a14:m>
+                <a:r>
+                  <a:rPr lang="de-DE" dirty="0"/>
+                  <a:t> with two imortant properties: similar words have similar vectors, and the difference between two word vectors has been shown to represent the difference between the corresponding words. This arithmetic properties can be used to solve analogy tasks, like ‚man is to brother as woman is to X?‘. The difference between the word vectors of ‚man‘ and ‚woman‘ should be similar to ‚brother‘ and X (e.g. ‚sister‘):                 </a:t>
+                </a:r>
+                <a14:m>
+                  <m:oMath xmlns:m="http://schemas.openxmlformats.org/officeDocument/2006/math">
+                    <m:sSub>
+                      <m:sSubPr>
+                        <m:ctrlPr>
+                          <a:rPr lang="de-DE" i="1" smtClean="0">
+                            <a:latin typeface="Cambria Math" panose="02040503050406030204" pitchFamily="18" charset="0"/>
+                          </a:rPr>
+                        </m:ctrlPr>
+                      </m:sSubPr>
+                      <m:e>
+                        <m:r>
+                          <a:rPr lang="de-DE" b="0" i="1" smtClean="0">
+                            <a:latin typeface="Cambria Math" panose="02040503050406030204" pitchFamily="18" charset="0"/>
+                          </a:rPr>
+                          <m:t>𝑤</m:t>
+                        </m:r>
+                      </m:e>
+                      <m:sub>
+                        <m:r>
+                          <a:rPr lang="de-DE" b="0" i="1" smtClean="0">
+                            <a:latin typeface="Cambria Math" panose="02040503050406030204" pitchFamily="18" charset="0"/>
+                          </a:rPr>
+                          <m:t>𝑚𝑎𝑛</m:t>
+                        </m:r>
+                      </m:sub>
+                    </m:sSub>
+                    <m:r>
+                      <a:rPr lang="de-DE" b="0" i="1" smtClean="0">
+                        <a:latin typeface="Cambria Math" panose="02040503050406030204" pitchFamily="18" charset="0"/>
+                      </a:rPr>
+                      <m:t>−</m:t>
+                    </m:r>
+                    <m:sSub>
+                      <m:sSubPr>
+                        <m:ctrlPr>
+                          <a:rPr lang="de-DE" i="1">
+                            <a:latin typeface="Cambria Math" panose="02040503050406030204" pitchFamily="18" charset="0"/>
+                          </a:rPr>
+                        </m:ctrlPr>
+                      </m:sSubPr>
+                      <m:e>
+                        <m:r>
+                          <a:rPr lang="de-DE" i="1">
+                            <a:latin typeface="Cambria Math" panose="02040503050406030204" pitchFamily="18" charset="0"/>
+                          </a:rPr>
+                          <m:t>𝑤</m:t>
+                        </m:r>
+                      </m:e>
+                      <m:sub>
+                        <m:r>
+                          <a:rPr lang="de-DE" b="0" i="1" smtClean="0">
+                            <a:latin typeface="Cambria Math" panose="02040503050406030204" pitchFamily="18" charset="0"/>
+                          </a:rPr>
+                          <m:t>𝑤𝑜</m:t>
+                        </m:r>
+                        <m:r>
+                          <a:rPr lang="de-DE" i="1">
+                            <a:latin typeface="Cambria Math" panose="02040503050406030204" pitchFamily="18" charset="0"/>
+                          </a:rPr>
+                          <m:t>𝑚𝑎𝑛</m:t>
+                        </m:r>
+                        <m:r>
+                          <a:rPr lang="de-DE" b="0" i="1" smtClean="0">
+                            <a:latin typeface="Cambria Math" panose="02040503050406030204" pitchFamily="18" charset="0"/>
+                          </a:rPr>
+                          <m:t> </m:t>
+                        </m:r>
+                      </m:sub>
+                    </m:sSub>
+                    <m:r>
+                      <a:rPr lang="de-DE" i="1" smtClean="0">
+                        <a:latin typeface="Cambria Math" panose="02040503050406030204" pitchFamily="18" charset="0"/>
+                        <a:ea typeface="Cambria Math" panose="02040503050406030204" pitchFamily="18" charset="0"/>
+                      </a:rPr>
+                      <m:t>≈</m:t>
+                    </m:r>
+                    <m:sSub>
+                      <m:sSubPr>
+                        <m:ctrlPr>
+                          <a:rPr lang="de-DE" i="1">
+                            <a:latin typeface="Cambria Math" panose="02040503050406030204" pitchFamily="18" charset="0"/>
+                          </a:rPr>
+                        </m:ctrlPr>
+                      </m:sSubPr>
+                      <m:e>
+                        <m:r>
+                          <a:rPr lang="de-DE" i="1">
+                            <a:latin typeface="Cambria Math" panose="02040503050406030204" pitchFamily="18" charset="0"/>
+                          </a:rPr>
+                          <m:t>𝑤</m:t>
+                        </m:r>
+                      </m:e>
+                      <m:sub>
+                        <m:r>
+                          <a:rPr lang="de-DE" b="0" i="1" smtClean="0">
+                            <a:latin typeface="Cambria Math" panose="02040503050406030204" pitchFamily="18" charset="0"/>
+                          </a:rPr>
+                          <m:t>𝑏𝑟𝑜𝑡h𝑒𝑟</m:t>
+                        </m:r>
+                      </m:sub>
+                    </m:sSub>
+                    <m:r>
+                      <a:rPr lang="de-DE" b="0" i="1" smtClean="0">
+                        <a:latin typeface="Cambria Math" panose="02040503050406030204" pitchFamily="18" charset="0"/>
+                      </a:rPr>
+                      <m:t> −</m:t>
+                    </m:r>
+                    <m:sSub>
+                      <m:sSubPr>
+                        <m:ctrlPr>
+                          <a:rPr lang="de-DE" i="1">
+                            <a:latin typeface="Cambria Math" panose="02040503050406030204" pitchFamily="18" charset="0"/>
+                          </a:rPr>
+                        </m:ctrlPr>
+                      </m:sSubPr>
+                      <m:e>
+                        <m:r>
+                          <a:rPr lang="de-DE" i="1">
+                            <a:latin typeface="Cambria Math" panose="02040503050406030204" pitchFamily="18" charset="0"/>
+                          </a:rPr>
+                          <m:t>𝑤</m:t>
+                        </m:r>
+                      </m:e>
+                      <m:sub>
+                        <m:r>
+                          <a:rPr lang="de-DE" b="0" i="1" smtClean="0">
+                            <a:latin typeface="Cambria Math" panose="02040503050406030204" pitchFamily="18" charset="0"/>
+                          </a:rPr>
+                          <m:t>𝑠𝑖𝑠𝑡𝑒𝑟</m:t>
+                        </m:r>
+                      </m:sub>
+                    </m:sSub>
+                  </m:oMath>
+                </a14:m>
+                <a:r>
+                  <a:rPr lang="de-DE" dirty="0"/>
+                  <a:t>. </a:t>
+                </a:r>
+              </a:p>
+              <a:p>
+                <a:pPr algn="just"/>
+                <a:r>
+                  <a:rPr lang="de-DE" dirty="0"/>
+                  <a:t>To measure bias, a gender-neutral word like ‚nurse‘ is compared to two gender-specific words like ‚man‘ and ‚woman‘. If the distance between the neutral word and one specific word is smaller than between the other, this suggests bias. Figure 1 shows a sample of words ordered by their distance to ‚he‘ and ‚she‘ (x-Axis) and their bias (y-Axis). For this paper, the public word2vec embedding is used, trained on a set of Google News Articles, cosisting of 3 million english words.</a:t>
+                </a:r>
+              </a:p>
+            </p:txBody>
+          </p:sp>
+        </mc:Choice>
+        <mc:Fallback>
+          <p:sp>
+            <p:nvSpPr>
+              <p:cNvPr id="5" name="Text Placeholder 4">
+                <a:extLst>
+                  <a:ext uri="{FF2B5EF4-FFF2-40B4-BE49-F238E27FC236}">
+                    <a16:creationId xmlns:a16="http://schemas.microsoft.com/office/drawing/2014/main" id="{B07FC288-A910-47DA-80A7-1A8E6450AF2D}"/>
+                  </a:ext>
+                </a:extLst>
+              </p:cNvPr>
+              <p:cNvSpPr>
+                <a:spLocks noGrp="1" noRot="1" noChangeAspect="1" noMove="1" noResize="1" noEditPoints="1" noAdjustHandles="1" noChangeArrowheads="1" noChangeShapeType="1" noTextEdit="1"/>
+              </p:cNvSpPr>
+              <p:nvPr>
+                <p:ph type="body" sz="quarter" idx="33"/>
+              </p:nvPr>
+            </p:nvSpPr>
+            <p:spPr>
+              <a:xfrm>
+                <a:off x="1260000" y="3564608"/>
+                <a:ext cx="8047339" cy="10440854"/>
+              </a:xfrm>
+              <a:blipFill>
+                <a:blip r:embed="rId4"/>
+                <a:stretch>
+                  <a:fillRect l="-2727" t="-1752" r="-2121" b="-234"/>
+                </a:stretch>
+              </a:blipFill>
+            </p:spPr>
+            <p:txBody>
+              <a:bodyPr/>
+              <a:lstStyle/>
+              <a:p>
+                <a:r>
+                  <a:rPr lang="en-GB">
+                    <a:noFill/>
+                  </a:rPr>
+                  <a:t> </a:t>
+                </a:r>
+              </a:p>
+            </p:txBody>
+          </p:sp>
+        </mc:Fallback>
+      </mc:AlternateContent>
+      <p:sp>
+        <p:nvSpPr>
+          <p:cNvPr id="13" name="Textplatzhalter 17">
+            <a:extLst>
+              <a:ext uri="{FF2B5EF4-FFF2-40B4-BE49-F238E27FC236}">
+                <a16:creationId xmlns:a16="http://schemas.microsoft.com/office/drawing/2014/main" id="{FAF7E36C-DB8C-452F-A38D-6A90462C07EF}"/>
+              </a:ext>
+            </a:extLst>
+          </p:cNvPr>
+          <p:cNvSpPr>
+            <a:spLocks noGrp="1"/>
+          </p:cNvSpPr>
+          <p:nvPr>
+            <p:ph type="body" sz="quarter" idx="20"/>
+          </p:nvPr>
+        </p:nvSpPr>
+        <p:spPr>
+          <a:xfrm>
+            <a:off x="1259999" y="2661902"/>
+            <a:ext cx="27756000" cy="470658"/>
+          </a:xfrm>
+        </p:spPr>
+        <p:txBody>
+          <a:bodyPr/>
+          <a:lstStyle/>
+          <a:p>
+            <a:r>
+              <a:rPr lang="de-DE" sz="3200" dirty="0"/>
+              <a:t>Nico Hertel, Seth Siriya, Thomas Decker, Uzair Akbar, Zhenchen Liao</a:t>
+            </a:r>
+          </a:p>
+        </p:txBody>
+      </p:sp>
+      <p:sp>
+        <p:nvSpPr>
+          <p:cNvPr id="16" name="Text Placeholder 4">
+            <a:extLst>
+              <a:ext uri="{FF2B5EF4-FFF2-40B4-BE49-F238E27FC236}">
+                <a16:creationId xmlns:a16="http://schemas.microsoft.com/office/drawing/2014/main" id="{88DD5B5C-4F29-4C4C-B4F8-171086B1C3FE}"/>
+              </a:ext>
+            </a:extLst>
+          </p:cNvPr>
+          <p:cNvSpPr txBox="1">
+            <a:spLocks/>
+          </p:cNvSpPr>
+          <p:nvPr/>
+        </p:nvSpPr>
+        <p:spPr>
+          <a:xfrm>
+            <a:off x="11114329" y="10117030"/>
+            <a:ext cx="8047339" cy="8208912"/>
+          </a:xfrm>
+          <a:prstGeom prst="rect">
+            <a:avLst/>
+          </a:prstGeom>
+        </p:spPr>
+        <p:txBody>
+          <a:bodyPr lIns="0" tIns="0" rIns="0" bIns="0"/>
+          <a:lstStyle>
+            <a:lvl1pPr marL="0" indent="0" algn="l" defTabSz="2952319" rtl="0" eaLnBrk="1" latinLnBrk="0" hangingPunct="1">
+              <a:lnSpc>
+                <a:spcPts val="2800"/>
+              </a:lnSpc>
+              <a:spcBef>
+                <a:spcPts val="0"/>
+              </a:spcBef>
+              <a:spcAft>
+                <a:spcPts val="2800"/>
+              </a:spcAft>
+              <a:buFont typeface="Arial" pitchFamily="34" charset="0"/>
+              <a:buNone/>
+              <a:defRPr sz="2200" kern="1200">
+                <a:solidFill>
+                  <a:schemeClr val="tx1"/>
+                </a:solidFill>
+                <a:latin typeface="Arial" pitchFamily="34" charset="0"/>
+                <a:ea typeface="+mn-ea"/>
+                <a:cs typeface="Arial" pitchFamily="34" charset="0"/>
+              </a:defRPr>
+            </a:lvl1pPr>
+            <a:lvl2pPr marL="0" indent="0" algn="l" defTabSz="2952319" rtl="0" eaLnBrk="1" latinLnBrk="0" hangingPunct="1">
+              <a:lnSpc>
+                <a:spcPts val="2800"/>
+              </a:lnSpc>
+              <a:spcBef>
+                <a:spcPts val="0"/>
+              </a:spcBef>
+              <a:spcAft>
+                <a:spcPts val="0"/>
+              </a:spcAft>
+              <a:buFont typeface="Arial" pitchFamily="34" charset="0"/>
+              <a:buNone/>
+              <a:defRPr sz="2200" b="1" i="0" kern="1200" baseline="0">
+                <a:solidFill>
+                  <a:schemeClr val="tx1"/>
+                </a:solidFill>
+                <a:latin typeface="Arial" pitchFamily="34" charset="0"/>
+                <a:ea typeface="+mn-ea"/>
+                <a:cs typeface="Arial" pitchFamily="34" charset="0"/>
+              </a:defRPr>
+            </a:lvl2pPr>
+            <a:lvl3pPr marL="180000" indent="-180000" algn="l" defTabSz="2952319" rtl="0" eaLnBrk="1" latinLnBrk="0" hangingPunct="1">
+              <a:lnSpc>
+                <a:spcPts val="2800"/>
+              </a:lnSpc>
+              <a:spcBef>
+                <a:spcPts val="0"/>
+              </a:spcBef>
+              <a:spcAft>
+                <a:spcPts val="2800"/>
+              </a:spcAft>
+              <a:buFont typeface="Arial" panose="020B0604020202020204" pitchFamily="34" charset="0"/>
+              <a:buChar char="•"/>
+              <a:defRPr sz="2200" kern="1200">
+                <a:solidFill>
+                  <a:schemeClr val="tx1"/>
+                </a:solidFill>
+                <a:latin typeface="Arial" pitchFamily="34" charset="0"/>
+                <a:ea typeface="+mn-ea"/>
+                <a:cs typeface="Arial" pitchFamily="34" charset="0"/>
+              </a:defRPr>
+            </a:lvl3pPr>
+            <a:lvl4pPr marL="5166557" indent="-738080" algn="l" defTabSz="2952319" rtl="0" eaLnBrk="1" latinLnBrk="0" hangingPunct="1">
+              <a:spcBef>
+                <a:spcPct val="20000"/>
+              </a:spcBef>
+              <a:buFont typeface="Arial" pitchFamily="34" charset="0"/>
+              <a:buChar char="–"/>
+              <a:defRPr sz="1800" kern="1200">
+                <a:solidFill>
+                  <a:schemeClr val="tx1"/>
+                </a:solidFill>
+                <a:latin typeface="Arial" pitchFamily="34" charset="0"/>
+                <a:ea typeface="+mn-ea"/>
+                <a:cs typeface="Arial" pitchFamily="34" charset="0"/>
+              </a:defRPr>
+            </a:lvl4pPr>
+            <a:lvl5pPr marL="6642717" indent="-738080" algn="l" defTabSz="2952319" rtl="0" eaLnBrk="1" latinLnBrk="0" hangingPunct="1">
+              <a:spcBef>
+                <a:spcPct val="20000"/>
+              </a:spcBef>
+              <a:buFont typeface="Arial" pitchFamily="34" charset="0"/>
+              <a:buChar char="»"/>
+              <a:defRPr sz="1800" kern="1200">
+                <a:solidFill>
+                  <a:schemeClr val="tx1"/>
+                </a:solidFill>
+                <a:latin typeface="Arial" pitchFamily="34" charset="0"/>
+                <a:ea typeface="+mn-ea"/>
+                <a:cs typeface="Arial" pitchFamily="34" charset="0"/>
+              </a:defRPr>
+            </a:lvl5pPr>
+            <a:lvl6pPr marL="8118877" indent="-738080" algn="l" defTabSz="2952319" rtl="0" eaLnBrk="1" latinLnBrk="0" hangingPunct="1">
+              <a:spcBef>
+                <a:spcPct val="20000"/>
+              </a:spcBef>
+              <a:buFont typeface="Arial" pitchFamily="34" charset="0"/>
+              <a:buChar char="•"/>
+              <a:defRPr sz="6400" kern="1200">
+                <a:solidFill>
+                  <a:schemeClr val="tx1"/>
+                </a:solidFill>
+                <a:latin typeface="+mn-lt"/>
+                <a:ea typeface="+mn-ea"/>
+                <a:cs typeface="+mn-cs"/>
+              </a:defRPr>
+            </a:lvl6pPr>
+            <a:lvl7pPr marL="9595036" indent="-738080" algn="l" defTabSz="2952319" rtl="0" eaLnBrk="1" latinLnBrk="0" hangingPunct="1">
+              <a:spcBef>
+                <a:spcPct val="20000"/>
+              </a:spcBef>
+              <a:buFont typeface="Arial" pitchFamily="34" charset="0"/>
+              <a:buChar char="•"/>
+              <a:defRPr sz="6400" kern="1200">
+                <a:solidFill>
+                  <a:schemeClr val="tx1"/>
+                </a:solidFill>
+                <a:latin typeface="+mn-lt"/>
+                <a:ea typeface="+mn-ea"/>
+                <a:cs typeface="+mn-cs"/>
+              </a:defRPr>
+            </a:lvl7pPr>
+            <a:lvl8pPr marL="11071196" indent="-738080" algn="l" defTabSz="2952319" rtl="0" eaLnBrk="1" latinLnBrk="0" hangingPunct="1">
+              <a:spcBef>
+                <a:spcPct val="20000"/>
+              </a:spcBef>
+              <a:buFont typeface="Arial" pitchFamily="34" charset="0"/>
+              <a:buChar char="•"/>
+              <a:defRPr sz="6400" kern="1200">
+                <a:solidFill>
+                  <a:schemeClr val="tx1"/>
+                </a:solidFill>
+                <a:latin typeface="+mn-lt"/>
+                <a:ea typeface="+mn-ea"/>
+                <a:cs typeface="+mn-cs"/>
+              </a:defRPr>
+            </a:lvl8pPr>
+            <a:lvl9pPr marL="12547355" indent="-738080" algn="l" defTabSz="2952319" rtl="0" eaLnBrk="1" latinLnBrk="0" hangingPunct="1">
+              <a:spcBef>
+                <a:spcPct val="20000"/>
+              </a:spcBef>
+              <a:buFont typeface="Arial" pitchFamily="34" charset="0"/>
+              <a:buChar char="•"/>
+              <a:defRPr sz="6400" kern="1200">
+                <a:solidFill>
+                  <a:schemeClr val="tx1"/>
+                </a:solidFill>
+                <a:latin typeface="+mn-lt"/>
+                <a:ea typeface="+mn-ea"/>
+                <a:cs typeface="+mn-cs"/>
+              </a:defRPr>
+            </a:lvl9pPr>
+          </a:lstStyle>
+          <a:p>
+            <a:pPr lvl="1" algn="just"/>
+            <a:r>
+              <a:rPr lang="de-DE" sz="2800" dirty="0"/>
+              <a:t>Bias in Word Embeddings</a:t>
+            </a:r>
+          </a:p>
+          <a:p>
+            <a:pPr algn="just"/>
+            <a:r>
+              <a:rPr lang="de-DE" dirty="0"/>
+              <a:t>Lorem ipsum dolor sit amet, consetetur sadipscing elitr, sed diam nonumy eirmod tempor invidunt ut labore et dolore magna aliquyam erat, sed diam voluptua. At vero eos et accusam et justo duo dolores et ea rebum. Stet clita kasd gubergren, no sea takimata sanctus est Lorem ipsum dolor sit amet. Lorem ipsum dolor sit amet, consetetur sadipscing elitr, sed diam nonumy eirmod tempor invidunt ut labore et dolore magna aliquyam erat, sed diam voluptua. At vero eos et accusam et justo duo dolores et ea rebum. Stet clita kasd gubergren, no sea takimata sanctus est Lorem ipsum dolor sit amet.</a:t>
+            </a:r>
+          </a:p>
+          <a:p>
+            <a:pPr lvl="1" algn="just"/>
+            <a:r>
+              <a:rPr lang="de-DE" sz="2800" dirty="0"/>
+              <a:t>Debiasing Algorithm</a:t>
+            </a:r>
+          </a:p>
+          <a:p>
+            <a:pPr algn="just"/>
+            <a:r>
+              <a:rPr lang="de-DE" dirty="0"/>
+              <a:t>Lorem ipsum dolor sit amet, consetetur sadipscing elitr, sed diam nonumy eirmod tempor invidunt ut labore et dolore magna aliquyam erat, sed diam voluptua. At vero eos et accusam et justo duo dolores et ea rebum. Stet clita kasd gubergren, no sea takimata sanctus est Lorem ipsum dolor sit amet. Lorem ipsum dolor sit amet, consetetur sadipscing elitr, sed diam nonumy eirmod tempor invidunt ut labore et dolore magna aliquyam erat, sed diam voluptua. At vero eos et accusam et justo duo dolores et ea rebum. Stet clita kasd gubergren, no sea takimata sanctus est Lorem ipsum dolor sit amet.</a:t>
+            </a:r>
+          </a:p>
+          <a:p>
+            <a:pPr algn="just"/>
+            <a:endParaRPr lang="de-DE" dirty="0"/>
+          </a:p>
+        </p:txBody>
+      </p:sp>
+      <p:sp>
+        <p:nvSpPr>
+          <p:cNvPr id="17" name="Text Placeholder 4">
+            <a:extLst>
+              <a:ext uri="{FF2B5EF4-FFF2-40B4-BE49-F238E27FC236}">
+                <a16:creationId xmlns:a16="http://schemas.microsoft.com/office/drawing/2014/main" id="{80208A8B-70FF-4729-AA3D-10A2E92A566C}"/>
+              </a:ext>
+            </a:extLst>
+          </p:cNvPr>
+          <p:cNvSpPr txBox="1">
+            <a:spLocks/>
+          </p:cNvSpPr>
+          <p:nvPr/>
+        </p:nvSpPr>
+        <p:spPr>
+          <a:xfrm>
+            <a:off x="20968660" y="3564608"/>
+            <a:ext cx="8047339" cy="14761334"/>
+          </a:xfrm>
+          <a:prstGeom prst="rect">
+            <a:avLst/>
+          </a:prstGeom>
+        </p:spPr>
+        <p:txBody>
+          <a:bodyPr lIns="0" tIns="0" rIns="0" bIns="0"/>
+          <a:lstStyle>
+            <a:lvl1pPr marL="0" indent="0" algn="l" defTabSz="2952319" rtl="0" eaLnBrk="1" latinLnBrk="0" hangingPunct="1">
+              <a:lnSpc>
+                <a:spcPts val="2800"/>
+              </a:lnSpc>
+              <a:spcBef>
+                <a:spcPts val="0"/>
+              </a:spcBef>
+              <a:spcAft>
+                <a:spcPts val="2800"/>
+              </a:spcAft>
+              <a:buFont typeface="Arial" pitchFamily="34" charset="0"/>
+              <a:buNone/>
+              <a:defRPr sz="2200" kern="1200">
+                <a:solidFill>
+                  <a:schemeClr val="tx1"/>
+                </a:solidFill>
+                <a:latin typeface="Arial" pitchFamily="34" charset="0"/>
+                <a:ea typeface="+mn-ea"/>
+                <a:cs typeface="Arial" pitchFamily="34" charset="0"/>
+              </a:defRPr>
+            </a:lvl1pPr>
+            <a:lvl2pPr marL="0" indent="0" algn="l" defTabSz="2952319" rtl="0" eaLnBrk="1" latinLnBrk="0" hangingPunct="1">
+              <a:lnSpc>
+                <a:spcPts val="2800"/>
+              </a:lnSpc>
+              <a:spcBef>
+                <a:spcPts val="0"/>
+              </a:spcBef>
+              <a:spcAft>
+                <a:spcPts val="0"/>
+              </a:spcAft>
+              <a:buFont typeface="Arial" pitchFamily="34" charset="0"/>
+              <a:buNone/>
+              <a:defRPr sz="2200" b="1" i="0" kern="1200" baseline="0">
+                <a:solidFill>
+                  <a:schemeClr val="tx1"/>
+                </a:solidFill>
+                <a:latin typeface="Arial" pitchFamily="34" charset="0"/>
+                <a:ea typeface="+mn-ea"/>
+                <a:cs typeface="Arial" pitchFamily="34" charset="0"/>
+              </a:defRPr>
+            </a:lvl2pPr>
+            <a:lvl3pPr marL="180000" indent="-180000" algn="l" defTabSz="2952319" rtl="0" eaLnBrk="1" latinLnBrk="0" hangingPunct="1">
+              <a:lnSpc>
+                <a:spcPts val="2800"/>
+              </a:lnSpc>
+              <a:spcBef>
+                <a:spcPts val="0"/>
+              </a:spcBef>
+              <a:spcAft>
+                <a:spcPts val="2800"/>
+              </a:spcAft>
+              <a:buFont typeface="Arial" panose="020B0604020202020204" pitchFamily="34" charset="0"/>
+              <a:buChar char="•"/>
+              <a:defRPr sz="2200" kern="1200">
+                <a:solidFill>
+                  <a:schemeClr val="tx1"/>
+                </a:solidFill>
+                <a:latin typeface="Arial" pitchFamily="34" charset="0"/>
+                <a:ea typeface="+mn-ea"/>
+                <a:cs typeface="Arial" pitchFamily="34" charset="0"/>
+              </a:defRPr>
+            </a:lvl3pPr>
+            <a:lvl4pPr marL="5166557" indent="-738080" algn="l" defTabSz="2952319" rtl="0" eaLnBrk="1" latinLnBrk="0" hangingPunct="1">
+              <a:spcBef>
+                <a:spcPct val="20000"/>
+              </a:spcBef>
+              <a:buFont typeface="Arial" pitchFamily="34" charset="0"/>
+              <a:buChar char="–"/>
+              <a:defRPr sz="1800" kern="1200">
+                <a:solidFill>
+                  <a:schemeClr val="tx1"/>
+                </a:solidFill>
+                <a:latin typeface="Arial" pitchFamily="34" charset="0"/>
+                <a:ea typeface="+mn-ea"/>
+                <a:cs typeface="Arial" pitchFamily="34" charset="0"/>
+              </a:defRPr>
+            </a:lvl4pPr>
+            <a:lvl5pPr marL="6642717" indent="-738080" algn="l" defTabSz="2952319" rtl="0" eaLnBrk="1" latinLnBrk="0" hangingPunct="1">
+              <a:spcBef>
+                <a:spcPct val="20000"/>
+              </a:spcBef>
+              <a:buFont typeface="Arial" pitchFamily="34" charset="0"/>
+              <a:buChar char="»"/>
+              <a:defRPr sz="1800" kern="1200">
+                <a:solidFill>
+                  <a:schemeClr val="tx1"/>
+                </a:solidFill>
+                <a:latin typeface="Arial" pitchFamily="34" charset="0"/>
+                <a:ea typeface="+mn-ea"/>
+                <a:cs typeface="Arial" pitchFamily="34" charset="0"/>
+              </a:defRPr>
+            </a:lvl5pPr>
+            <a:lvl6pPr marL="8118877" indent="-738080" algn="l" defTabSz="2952319" rtl="0" eaLnBrk="1" latinLnBrk="0" hangingPunct="1">
+              <a:spcBef>
+                <a:spcPct val="20000"/>
+              </a:spcBef>
+              <a:buFont typeface="Arial" pitchFamily="34" charset="0"/>
+              <a:buChar char="•"/>
+              <a:defRPr sz="6400" kern="1200">
+                <a:solidFill>
+                  <a:schemeClr val="tx1"/>
+                </a:solidFill>
+                <a:latin typeface="+mn-lt"/>
+                <a:ea typeface="+mn-ea"/>
+                <a:cs typeface="+mn-cs"/>
+              </a:defRPr>
+            </a:lvl6pPr>
+            <a:lvl7pPr marL="9595036" indent="-738080" algn="l" defTabSz="2952319" rtl="0" eaLnBrk="1" latinLnBrk="0" hangingPunct="1">
+              <a:spcBef>
+                <a:spcPct val="20000"/>
+              </a:spcBef>
+              <a:buFont typeface="Arial" pitchFamily="34" charset="0"/>
+              <a:buChar char="•"/>
+              <a:defRPr sz="6400" kern="1200">
+                <a:solidFill>
+                  <a:schemeClr val="tx1"/>
+                </a:solidFill>
+                <a:latin typeface="+mn-lt"/>
+                <a:ea typeface="+mn-ea"/>
+                <a:cs typeface="+mn-cs"/>
+              </a:defRPr>
+            </a:lvl7pPr>
+            <a:lvl8pPr marL="11071196" indent="-738080" algn="l" defTabSz="2952319" rtl="0" eaLnBrk="1" latinLnBrk="0" hangingPunct="1">
+              <a:spcBef>
+                <a:spcPct val="20000"/>
+              </a:spcBef>
+              <a:buFont typeface="Arial" pitchFamily="34" charset="0"/>
+              <a:buChar char="•"/>
+              <a:defRPr sz="6400" kern="1200">
+                <a:solidFill>
+                  <a:schemeClr val="tx1"/>
+                </a:solidFill>
+                <a:latin typeface="+mn-lt"/>
+                <a:ea typeface="+mn-ea"/>
+                <a:cs typeface="+mn-cs"/>
+              </a:defRPr>
+            </a:lvl8pPr>
+            <a:lvl9pPr marL="12547355" indent="-738080" algn="l" defTabSz="2952319" rtl="0" eaLnBrk="1" latinLnBrk="0" hangingPunct="1">
+              <a:spcBef>
+                <a:spcPct val="20000"/>
+              </a:spcBef>
+              <a:buFont typeface="Arial" pitchFamily="34" charset="0"/>
+              <a:buChar char="•"/>
+              <a:defRPr sz="6400" kern="1200">
+                <a:solidFill>
+                  <a:schemeClr val="tx1"/>
+                </a:solidFill>
+                <a:latin typeface="+mn-lt"/>
+                <a:ea typeface="+mn-ea"/>
+                <a:cs typeface="+mn-cs"/>
+              </a:defRPr>
+            </a:lvl9pPr>
+          </a:lstStyle>
+          <a:p>
+            <a:pPr lvl="1" algn="just"/>
+            <a:r>
+              <a:rPr lang="de-DE" sz="2800" dirty="0"/>
+              <a:t>Debiasing Results</a:t>
+            </a:r>
+          </a:p>
+          <a:p>
+            <a:pPr algn="just"/>
+            <a:r>
+              <a:rPr lang="de-DE" dirty="0"/>
+              <a:t>Lorem ipsum dolor sit amet, consetetur sadipscing elitr, sed diam nonumy eirmod tempor invidunt ut labore et dolore magna aliquyam erat, sed diam voluptua. At vero eos et accusam et justo duo dolores et ea rebum. Stet clita kasd gubergren, no sea takimata sanctus est Lorem ipsum dolor sit amet. Lorem ipsum dolor sit amet, consetetur sadipscing elitr, sed diam nonumy eirmod tempor invidunt ut labore et dolore magna aliquyam erat, sed diam voluptua. At vero eos et accusam et justo duo dolores et ea rebum. Stet clita kasd gubergren, no sea takimata sanctus est Lorem ipsum dolor sit amet.</a:t>
+            </a:r>
+          </a:p>
+          <a:p>
+            <a:pPr lvl="1" algn="just"/>
+            <a:r>
+              <a:rPr lang="de-DE" sz="2800" dirty="0"/>
+              <a:t>Discussion</a:t>
+            </a:r>
+          </a:p>
+          <a:p>
+            <a:pPr algn="just"/>
+            <a:r>
+              <a:rPr lang="de-DE" dirty="0"/>
+              <a:t>Lorem ipsum dolor sit amet, consetetur sadipscing elitr, sed diam nonumy eirmod tempor invidunt ut labore et dolore magna aliquyam erat, sed diam voluptua. At vero eos et accusam et justo duo dolores et ea rebum. Stet clita kasd gubergren, no sea takimata sanctus est Lorem ipsum dolor sit amet. Lorem ipsum dolor sit amet, consetetur sadipscing elitr, sed diam nonumy eirmod tempor invidunt ut labore et dolore magna aliquyam erat, sed diam voluptua. At vero eos et accusam et justo duo dolores et ea rebum. Stet clita kasd gubergren, no sea takimata sanctus est Lorem ipsum dolor sit amet.</a:t>
+            </a:r>
+          </a:p>
+          <a:p>
+            <a:pPr algn="just"/>
+            <a:endParaRPr lang="de-DE" dirty="0"/>
+          </a:p>
+        </p:txBody>
+      </p:sp>
+      <p:pic>
+        <p:nvPicPr>
+          <p:cNvPr id="18" name="Picture Placeholder 14">
+            <a:extLst>
+              <a:ext uri="{FF2B5EF4-FFF2-40B4-BE49-F238E27FC236}">
+                <a16:creationId xmlns:a16="http://schemas.microsoft.com/office/drawing/2014/main" id="{CC39981D-C2AD-4AD8-A3FA-3CFC6755E04F}"/>
+              </a:ext>
+            </a:extLst>
+          </p:cNvPr>
+          <p:cNvPicPr>
+            <a:picLocks noChangeAspect="1"/>
+          </p:cNvPicPr>
+          <p:nvPr/>
+        </p:nvPicPr>
+        <p:blipFill>
+          <a:blip r:embed="rId5">
+            <a:extLst>
+              <a:ext uri="{28A0092B-C50C-407E-A947-70E740481C1C}">
+                <a14:useLocalDpi xmlns:a14="http://schemas.microsoft.com/office/drawing/2010/main" val="0"/>
+              </a:ext>
+            </a:extLst>
+          </a:blip>
+          <a:srcRect l="19756" r="19756"/>
+          <a:stretch>
+            <a:fillRect/>
+          </a:stretch>
+        </p:blipFill>
+        <p:spPr>
+          <a:xfrm>
+            <a:off x="11093592" y="3579516"/>
+            <a:ext cx="8043314" cy="5764293"/>
+          </a:xfrm>
+          <a:prstGeom prst="rect">
+            <a:avLst/>
+          </a:prstGeom>
+        </p:spPr>
+      </p:pic>
+      <p:sp>
+        <p:nvSpPr>
+          <p:cNvPr id="19" name="Text Placeholder 2">
+            <a:extLst>
+              <a:ext uri="{FF2B5EF4-FFF2-40B4-BE49-F238E27FC236}">
+                <a16:creationId xmlns:a16="http://schemas.microsoft.com/office/drawing/2014/main" id="{58B6007F-8D83-41D3-909A-DB86A692F092}"/>
+              </a:ext>
+            </a:extLst>
+          </p:cNvPr>
+          <p:cNvSpPr txBox="1">
+            <a:spLocks/>
+          </p:cNvSpPr>
+          <p:nvPr/>
+        </p:nvSpPr>
+        <p:spPr>
+          <a:xfrm>
+            <a:off x="11114330" y="9684982"/>
+            <a:ext cx="8043314" cy="216024"/>
+          </a:xfrm>
+          <a:prstGeom prst="rect">
+            <a:avLst/>
+          </a:prstGeom>
+        </p:spPr>
+        <p:txBody>
+          <a:bodyPr lIns="0" tIns="0" rIns="0" bIns="0" anchor="b" anchorCtr="0"/>
+          <a:lstStyle>
+            <a:lvl1pPr marL="1107119" indent="-1107119" algn="l" defTabSz="2952319" rtl="0" eaLnBrk="1" latinLnBrk="0" hangingPunct="1">
+              <a:spcBef>
+                <a:spcPct val="20000"/>
+              </a:spcBef>
+              <a:buFont typeface="Arial" pitchFamily="34" charset="0"/>
+              <a:buNone/>
+              <a:defRPr sz="1200" kern="1200">
+                <a:solidFill>
+                  <a:schemeClr val="tx1"/>
+                </a:solidFill>
+                <a:latin typeface="Arial" pitchFamily="34" charset="0"/>
+                <a:ea typeface="+mn-ea"/>
+                <a:cs typeface="Arial" pitchFamily="34" charset="0"/>
+              </a:defRPr>
+            </a:lvl1pPr>
+            <a:lvl2pPr marL="2398759" indent="-922600" algn="l" defTabSz="2952319" rtl="0" eaLnBrk="1" latinLnBrk="0" hangingPunct="1">
+              <a:spcBef>
+                <a:spcPct val="20000"/>
+              </a:spcBef>
+              <a:buFont typeface="Arial" pitchFamily="34" charset="0"/>
+              <a:buChar char="–"/>
+              <a:defRPr sz="1800" kern="1200">
+                <a:solidFill>
+                  <a:schemeClr val="tx1"/>
+                </a:solidFill>
+                <a:latin typeface="Arial" pitchFamily="34" charset="0"/>
+                <a:ea typeface="+mn-ea"/>
+                <a:cs typeface="Arial" pitchFamily="34" charset="0"/>
+              </a:defRPr>
+            </a:lvl2pPr>
+            <a:lvl3pPr marL="3690398" indent="-738080" algn="l" defTabSz="2952319" rtl="0" eaLnBrk="1" latinLnBrk="0" hangingPunct="1">
+              <a:spcBef>
+                <a:spcPct val="20000"/>
+              </a:spcBef>
+              <a:buFont typeface="Arial" pitchFamily="34" charset="0"/>
+              <a:buChar char="•"/>
+              <a:defRPr sz="1800" kern="1200">
+                <a:solidFill>
+                  <a:schemeClr val="tx1"/>
+                </a:solidFill>
+                <a:latin typeface="Arial" pitchFamily="34" charset="0"/>
+                <a:ea typeface="+mn-ea"/>
+                <a:cs typeface="Arial" pitchFamily="34" charset="0"/>
+              </a:defRPr>
+            </a:lvl3pPr>
+            <a:lvl4pPr marL="5166557" indent="-738080" algn="l" defTabSz="2952319" rtl="0" eaLnBrk="1" latinLnBrk="0" hangingPunct="1">
+              <a:spcBef>
+                <a:spcPct val="20000"/>
+              </a:spcBef>
+              <a:buFont typeface="Arial" pitchFamily="34" charset="0"/>
+              <a:buChar char="–"/>
+              <a:defRPr sz="1800" kern="1200">
+                <a:solidFill>
+                  <a:schemeClr val="tx1"/>
+                </a:solidFill>
+                <a:latin typeface="Arial" pitchFamily="34" charset="0"/>
+                <a:ea typeface="+mn-ea"/>
+                <a:cs typeface="Arial" pitchFamily="34" charset="0"/>
+              </a:defRPr>
+            </a:lvl4pPr>
+            <a:lvl5pPr marL="6642717" indent="-738080" algn="l" defTabSz="2952319" rtl="0" eaLnBrk="1" latinLnBrk="0" hangingPunct="1">
+              <a:spcBef>
+                <a:spcPct val="20000"/>
+              </a:spcBef>
+              <a:buFont typeface="Arial" pitchFamily="34" charset="0"/>
+              <a:buChar char="»"/>
+              <a:defRPr sz="1800" kern="1200">
+                <a:solidFill>
+                  <a:schemeClr val="tx1"/>
+                </a:solidFill>
+                <a:latin typeface="Arial" pitchFamily="34" charset="0"/>
+                <a:ea typeface="+mn-ea"/>
+                <a:cs typeface="Arial" pitchFamily="34" charset="0"/>
+              </a:defRPr>
+            </a:lvl5pPr>
+            <a:lvl6pPr marL="8118877" indent="-738080" algn="l" defTabSz="2952319" rtl="0" eaLnBrk="1" latinLnBrk="0" hangingPunct="1">
+              <a:spcBef>
+                <a:spcPct val="20000"/>
+              </a:spcBef>
+              <a:buFont typeface="Arial" pitchFamily="34" charset="0"/>
+              <a:buChar char="•"/>
+              <a:defRPr sz="6400" kern="1200">
+                <a:solidFill>
+                  <a:schemeClr val="tx1"/>
+                </a:solidFill>
+                <a:latin typeface="+mn-lt"/>
+                <a:ea typeface="+mn-ea"/>
+                <a:cs typeface="+mn-cs"/>
+              </a:defRPr>
+            </a:lvl6pPr>
+            <a:lvl7pPr marL="9595036" indent="-738080" algn="l" defTabSz="2952319" rtl="0" eaLnBrk="1" latinLnBrk="0" hangingPunct="1">
+              <a:spcBef>
+                <a:spcPct val="20000"/>
+              </a:spcBef>
+              <a:buFont typeface="Arial" pitchFamily="34" charset="0"/>
+              <a:buChar char="•"/>
+              <a:defRPr sz="6400" kern="1200">
+                <a:solidFill>
+                  <a:schemeClr val="tx1"/>
+                </a:solidFill>
+                <a:latin typeface="+mn-lt"/>
+                <a:ea typeface="+mn-ea"/>
+                <a:cs typeface="+mn-cs"/>
+              </a:defRPr>
+            </a:lvl7pPr>
+            <a:lvl8pPr marL="11071196" indent="-738080" algn="l" defTabSz="2952319" rtl="0" eaLnBrk="1" latinLnBrk="0" hangingPunct="1">
+              <a:spcBef>
+                <a:spcPct val="20000"/>
+              </a:spcBef>
+              <a:buFont typeface="Arial" pitchFamily="34" charset="0"/>
+              <a:buChar char="•"/>
+              <a:defRPr sz="6400" kern="1200">
+                <a:solidFill>
+                  <a:schemeClr val="tx1"/>
+                </a:solidFill>
+                <a:latin typeface="+mn-lt"/>
+                <a:ea typeface="+mn-ea"/>
+                <a:cs typeface="+mn-cs"/>
+              </a:defRPr>
+            </a:lvl8pPr>
+            <a:lvl9pPr marL="12547355" indent="-738080" algn="l" defTabSz="2952319" rtl="0" eaLnBrk="1" latinLnBrk="0" hangingPunct="1">
+              <a:spcBef>
+                <a:spcPct val="20000"/>
+              </a:spcBef>
+              <a:buFont typeface="Arial" pitchFamily="34" charset="0"/>
+              <a:buChar char="•"/>
+              <a:defRPr sz="6400" kern="1200">
+                <a:solidFill>
+                  <a:schemeClr val="tx1"/>
+                </a:solidFill>
+                <a:latin typeface="+mn-lt"/>
+                <a:ea typeface="+mn-ea"/>
+                <a:cs typeface="+mn-cs"/>
+              </a:defRPr>
+            </a:lvl9pPr>
+          </a:lstStyle>
+          <a:p>
+            <a:r>
+              <a:rPr lang="de-DE"/>
+              <a:t>Bildunterschrift, Autor</a:t>
+            </a:r>
+            <a:endParaRPr lang="de-DE" dirty="0"/>
+          </a:p>
+        </p:txBody>
+      </p:sp>
+      <p:pic>
+        <p:nvPicPr>
+          <p:cNvPr id="20" name="Picture Placeholder 14">
+            <a:extLst>
+              <a:ext uri="{FF2B5EF4-FFF2-40B4-BE49-F238E27FC236}">
+                <a16:creationId xmlns:a16="http://schemas.microsoft.com/office/drawing/2014/main" id="{C41D14D7-BF40-4931-96BF-D8875EE9F8C9}"/>
+              </a:ext>
+            </a:extLst>
+          </p:cNvPr>
+          <p:cNvPicPr>
+            <a:picLocks noChangeAspect="1"/>
+          </p:cNvPicPr>
+          <p:nvPr/>
+        </p:nvPicPr>
+        <p:blipFill>
+          <a:blip r:embed="rId5">
+            <a:extLst>
+              <a:ext uri="{28A0092B-C50C-407E-A947-70E740481C1C}">
+                <a14:useLocalDpi xmlns:a14="http://schemas.microsoft.com/office/drawing/2010/main" val="0"/>
+              </a:ext>
+            </a:extLst>
+          </a:blip>
+          <a:srcRect l="19756" r="19756"/>
+          <a:stretch>
+            <a:fillRect/>
+          </a:stretch>
+        </p:blipFill>
+        <p:spPr>
+          <a:xfrm>
+            <a:off x="20968658" y="12258445"/>
+            <a:ext cx="8043314" cy="5764293"/>
+          </a:xfrm>
+          <a:prstGeom prst="rect">
+            <a:avLst/>
+          </a:prstGeom>
+        </p:spPr>
+      </p:pic>
+      <p:sp>
+        <p:nvSpPr>
+          <p:cNvPr id="21" name="Text Placeholder 2">
+            <a:extLst>
+              <a:ext uri="{FF2B5EF4-FFF2-40B4-BE49-F238E27FC236}">
+                <a16:creationId xmlns:a16="http://schemas.microsoft.com/office/drawing/2014/main" id="{38724F83-DFE1-4A8A-8AD7-81D87529E100}"/>
+              </a:ext>
+            </a:extLst>
+          </p:cNvPr>
+          <p:cNvSpPr txBox="1">
+            <a:spLocks/>
+          </p:cNvSpPr>
+          <p:nvPr/>
+        </p:nvSpPr>
+        <p:spPr>
+          <a:xfrm>
+            <a:off x="20968659" y="18091093"/>
+            <a:ext cx="8043314" cy="216024"/>
+          </a:xfrm>
+          <a:prstGeom prst="rect">
+            <a:avLst/>
+          </a:prstGeom>
+        </p:spPr>
+        <p:txBody>
+          <a:bodyPr lIns="0" tIns="0" rIns="0" bIns="0" anchor="b" anchorCtr="0"/>
+          <a:lstStyle>
+            <a:lvl1pPr marL="1107119" indent="-1107119" algn="l" defTabSz="2952319" rtl="0" eaLnBrk="1" latinLnBrk="0" hangingPunct="1">
+              <a:spcBef>
+                <a:spcPct val="20000"/>
+              </a:spcBef>
+              <a:buFont typeface="Arial" pitchFamily="34" charset="0"/>
+              <a:buNone/>
+              <a:defRPr sz="1200" kern="1200">
+                <a:solidFill>
+                  <a:schemeClr val="tx1"/>
+                </a:solidFill>
+                <a:latin typeface="Arial" pitchFamily="34" charset="0"/>
+                <a:ea typeface="+mn-ea"/>
+                <a:cs typeface="Arial" pitchFamily="34" charset="0"/>
+              </a:defRPr>
+            </a:lvl1pPr>
+            <a:lvl2pPr marL="2398759" indent="-922600" algn="l" defTabSz="2952319" rtl="0" eaLnBrk="1" latinLnBrk="0" hangingPunct="1">
+              <a:spcBef>
+                <a:spcPct val="20000"/>
+              </a:spcBef>
+              <a:buFont typeface="Arial" pitchFamily="34" charset="0"/>
+              <a:buChar char="–"/>
+              <a:defRPr sz="1800" kern="1200">
+                <a:solidFill>
+                  <a:schemeClr val="tx1"/>
+                </a:solidFill>
+                <a:latin typeface="Arial" pitchFamily="34" charset="0"/>
+                <a:ea typeface="+mn-ea"/>
+                <a:cs typeface="Arial" pitchFamily="34" charset="0"/>
+              </a:defRPr>
+            </a:lvl2pPr>
+            <a:lvl3pPr marL="3690398" indent="-738080" algn="l" defTabSz="2952319" rtl="0" eaLnBrk="1" latinLnBrk="0" hangingPunct="1">
+              <a:spcBef>
+                <a:spcPct val="20000"/>
+              </a:spcBef>
+              <a:buFont typeface="Arial" pitchFamily="34" charset="0"/>
+              <a:buChar char="•"/>
+              <a:defRPr sz="1800" kern="1200">
+                <a:solidFill>
+                  <a:schemeClr val="tx1"/>
+                </a:solidFill>
+                <a:latin typeface="Arial" pitchFamily="34" charset="0"/>
+                <a:ea typeface="+mn-ea"/>
+                <a:cs typeface="Arial" pitchFamily="34" charset="0"/>
+              </a:defRPr>
+            </a:lvl3pPr>
+            <a:lvl4pPr marL="5166557" indent="-738080" algn="l" defTabSz="2952319" rtl="0" eaLnBrk="1" latinLnBrk="0" hangingPunct="1">
+              <a:spcBef>
+                <a:spcPct val="20000"/>
+              </a:spcBef>
+              <a:buFont typeface="Arial" pitchFamily="34" charset="0"/>
+              <a:buChar char="–"/>
+              <a:defRPr sz="1800" kern="1200">
+                <a:solidFill>
+                  <a:schemeClr val="tx1"/>
+                </a:solidFill>
+                <a:latin typeface="Arial" pitchFamily="34" charset="0"/>
+                <a:ea typeface="+mn-ea"/>
+                <a:cs typeface="Arial" pitchFamily="34" charset="0"/>
+              </a:defRPr>
+            </a:lvl4pPr>
+            <a:lvl5pPr marL="6642717" indent="-738080" algn="l" defTabSz="2952319" rtl="0" eaLnBrk="1" latinLnBrk="0" hangingPunct="1">
+              <a:spcBef>
+                <a:spcPct val="20000"/>
+              </a:spcBef>
+              <a:buFont typeface="Arial" pitchFamily="34" charset="0"/>
+              <a:buChar char="»"/>
+              <a:defRPr sz="1800" kern="1200">
+                <a:solidFill>
+                  <a:schemeClr val="tx1"/>
+                </a:solidFill>
+                <a:latin typeface="Arial" pitchFamily="34" charset="0"/>
+                <a:ea typeface="+mn-ea"/>
+                <a:cs typeface="Arial" pitchFamily="34" charset="0"/>
+              </a:defRPr>
+            </a:lvl5pPr>
+            <a:lvl6pPr marL="8118877" indent="-738080" algn="l" defTabSz="2952319" rtl="0" eaLnBrk="1" latinLnBrk="0" hangingPunct="1">
+              <a:spcBef>
+                <a:spcPct val="20000"/>
+              </a:spcBef>
+              <a:buFont typeface="Arial" pitchFamily="34" charset="0"/>
+              <a:buChar char="•"/>
+              <a:defRPr sz="6400" kern="1200">
+                <a:solidFill>
+                  <a:schemeClr val="tx1"/>
+                </a:solidFill>
+                <a:latin typeface="+mn-lt"/>
+                <a:ea typeface="+mn-ea"/>
+                <a:cs typeface="+mn-cs"/>
+              </a:defRPr>
+            </a:lvl6pPr>
+            <a:lvl7pPr marL="9595036" indent="-738080" algn="l" defTabSz="2952319" rtl="0" eaLnBrk="1" latinLnBrk="0" hangingPunct="1">
+              <a:spcBef>
+                <a:spcPct val="20000"/>
+              </a:spcBef>
+              <a:buFont typeface="Arial" pitchFamily="34" charset="0"/>
+              <a:buChar char="•"/>
+              <a:defRPr sz="6400" kern="1200">
+                <a:solidFill>
+                  <a:schemeClr val="tx1"/>
+                </a:solidFill>
+                <a:latin typeface="+mn-lt"/>
+                <a:ea typeface="+mn-ea"/>
+                <a:cs typeface="+mn-cs"/>
+              </a:defRPr>
+            </a:lvl7pPr>
+            <a:lvl8pPr marL="11071196" indent="-738080" algn="l" defTabSz="2952319" rtl="0" eaLnBrk="1" latinLnBrk="0" hangingPunct="1">
+              <a:spcBef>
+                <a:spcPct val="20000"/>
+              </a:spcBef>
+              <a:buFont typeface="Arial" pitchFamily="34" charset="0"/>
+              <a:buChar char="•"/>
+              <a:defRPr sz="6400" kern="1200">
+                <a:solidFill>
+                  <a:schemeClr val="tx1"/>
+                </a:solidFill>
+                <a:latin typeface="+mn-lt"/>
+                <a:ea typeface="+mn-ea"/>
+                <a:cs typeface="+mn-cs"/>
+              </a:defRPr>
+            </a:lvl8pPr>
+            <a:lvl9pPr marL="12547355" indent="-738080" algn="l" defTabSz="2952319" rtl="0" eaLnBrk="1" latinLnBrk="0" hangingPunct="1">
+              <a:spcBef>
+                <a:spcPct val="20000"/>
+              </a:spcBef>
+              <a:buFont typeface="Arial" pitchFamily="34" charset="0"/>
+              <a:buChar char="•"/>
+              <a:defRPr sz="6400" kern="1200">
+                <a:solidFill>
+                  <a:schemeClr val="tx1"/>
+                </a:solidFill>
+                <a:latin typeface="+mn-lt"/>
+                <a:ea typeface="+mn-ea"/>
+                <a:cs typeface="+mn-cs"/>
+              </a:defRPr>
+            </a:lvl9pPr>
+          </a:lstStyle>
+          <a:p>
+            <a:r>
+              <a:rPr lang="de-DE"/>
+              <a:t>Bildunterschrift, Autor</a:t>
+            </a:r>
+            <a:endParaRPr lang="de-DE" dirty="0"/>
+          </a:p>
+        </p:txBody>
+      </p:sp>
+      <p:grpSp>
+        <p:nvGrpSpPr>
+          <p:cNvPr id="6" name="Group 5">
+            <a:extLst>
+              <a:ext uri="{FF2B5EF4-FFF2-40B4-BE49-F238E27FC236}">
+                <a16:creationId xmlns:a16="http://schemas.microsoft.com/office/drawing/2014/main" id="{D9680433-D2DC-4D30-B1F9-C0CB0704B2CD}"/>
+              </a:ext>
+            </a:extLst>
+          </p:cNvPr>
+          <p:cNvGrpSpPr/>
+          <p:nvPr/>
+        </p:nvGrpSpPr>
+        <p:grpSpPr>
+          <a:xfrm>
+            <a:off x="1259999" y="1174956"/>
+            <a:ext cx="25317495" cy="1477328"/>
+            <a:chOff x="1259999" y="1174956"/>
+            <a:chExt cx="25317495" cy="1477328"/>
+          </a:xfrm>
+        </p:grpSpPr>
+        <p:sp>
+          <p:nvSpPr>
+            <p:cNvPr id="9" name="Rectangle 8">
+              <a:extLst>
+                <a:ext uri="{FF2B5EF4-FFF2-40B4-BE49-F238E27FC236}">
+                  <a16:creationId xmlns:a16="http://schemas.microsoft.com/office/drawing/2014/main" id="{05A74B1F-AE8D-4ACC-A375-D881310BF1AB}"/>
+                </a:ext>
+              </a:extLst>
+            </p:cNvPr>
+            <p:cNvSpPr/>
+            <p:nvPr/>
+          </p:nvSpPr>
+          <p:spPr>
+            <a:xfrm>
+              <a:off x="1259999" y="1174956"/>
+              <a:ext cx="8946137" cy="1477328"/>
+            </a:xfrm>
+            <a:prstGeom prst="rect">
+              <a:avLst/>
+            </a:prstGeom>
+            <a:solidFill>
+              <a:schemeClr val="bg1"/>
+            </a:solidFill>
+            <a:ln>
+              <a:solidFill>
+                <a:schemeClr val="bg1"/>
+              </a:solidFill>
+            </a:ln>
+          </p:spPr>
+          <p:style>
+            <a:lnRef idx="2">
+              <a:schemeClr val="accent1">
+                <a:shade val="50000"/>
+              </a:schemeClr>
+            </a:lnRef>
+            <a:fillRef idx="1">
+              <a:schemeClr val="accent1"/>
+            </a:fillRef>
+            <a:effectRef idx="0">
+              <a:schemeClr val="accent1"/>
+            </a:effectRef>
+            <a:fontRef idx="minor">
+              <a:schemeClr val="lt1"/>
+            </a:fontRef>
+          </p:style>
+          <p:txBody>
+            <a:bodyPr rtlCol="0" anchor="ctr"/>
+            <a:lstStyle/>
+            <a:p>
+              <a:pPr algn="ctr"/>
+              <a:endParaRPr lang="en-GB"/>
+            </a:p>
+          </p:txBody>
+        </p:sp>
+        <p:sp>
+          <p:nvSpPr>
+            <p:cNvPr id="2" name="TextBox 1">
+              <a:extLst>
+                <a:ext uri="{FF2B5EF4-FFF2-40B4-BE49-F238E27FC236}">
+                  <a16:creationId xmlns:a16="http://schemas.microsoft.com/office/drawing/2014/main" id="{5BE3EAC0-2BB2-4C07-B69D-9C8C5C1EBE7F}"/>
+                </a:ext>
+              </a:extLst>
+            </p:cNvPr>
+            <p:cNvSpPr txBox="1"/>
+            <p:nvPr/>
+          </p:nvSpPr>
+          <p:spPr>
+            <a:xfrm>
+              <a:off x="18351204" y="1174956"/>
+              <a:ext cx="8226290" cy="1477328"/>
+            </a:xfrm>
+            <a:prstGeom prst="rect">
+              <a:avLst/>
+            </a:prstGeom>
+            <a:noFill/>
+          </p:spPr>
+          <p:txBody>
+            <a:bodyPr wrap="none" rtlCol="0">
+              <a:spAutoFit/>
+            </a:bodyPr>
+            <a:lstStyle/>
+            <a:p>
+              <a:pPr algn="r"/>
+              <a:r>
+                <a:rPr lang="en-GB" sz="3000" spc="-120" dirty="0">
+                  <a:solidFill>
+                    <a:srgbClr val="0065BD"/>
+                  </a:solidFill>
+                  <a:latin typeface="Arial" panose="020B0604020202020204" pitchFamily="34" charset="0"/>
+                  <a:cs typeface="Arial" panose="020B0604020202020204" pitchFamily="34" charset="0"/>
+                </a:rPr>
+                <a:t>Chair for Data Processing</a:t>
+              </a:r>
+              <a:br>
+                <a:rPr lang="en-GB" sz="3000" spc="-120" dirty="0">
+                  <a:solidFill>
+                    <a:srgbClr val="0065BD"/>
+                  </a:solidFill>
+                  <a:latin typeface="Arial" panose="020B0604020202020204" pitchFamily="34" charset="0"/>
+                  <a:cs typeface="Arial" panose="020B0604020202020204" pitchFamily="34" charset="0"/>
+                </a:rPr>
+              </a:br>
+              <a:r>
+                <a:rPr lang="en-GB" sz="3000" spc="-120" dirty="0">
+                  <a:solidFill>
+                    <a:srgbClr val="0065BD"/>
+                  </a:solidFill>
+                  <a:latin typeface="Arial" panose="020B0604020202020204" pitchFamily="34" charset="0"/>
+                  <a:cs typeface="Arial" panose="020B0604020202020204" pitchFamily="34" charset="0"/>
+                </a:rPr>
+                <a:t>Department of Electrical and Computer Engineering</a:t>
+              </a:r>
+              <a:br>
+                <a:rPr lang="en-GB" sz="3000" spc="-120" dirty="0">
+                  <a:solidFill>
+                    <a:srgbClr val="0065BD"/>
+                  </a:solidFill>
+                  <a:latin typeface="Arial" panose="020B0604020202020204" pitchFamily="34" charset="0"/>
+                  <a:cs typeface="Arial" panose="020B0604020202020204" pitchFamily="34" charset="0"/>
+                </a:rPr>
+              </a:br>
+              <a:r>
+                <a:rPr lang="en-GB" sz="3000" spc="-120" dirty="0">
+                  <a:solidFill>
+                    <a:srgbClr val="0065BD"/>
+                  </a:solidFill>
+                  <a:latin typeface="Arial" panose="020B0604020202020204" pitchFamily="34" charset="0"/>
+                  <a:cs typeface="Arial" panose="020B0604020202020204" pitchFamily="34" charset="0"/>
+                </a:rPr>
+                <a:t>Technical University of Munich</a:t>
+              </a:r>
+            </a:p>
+          </p:txBody>
+        </p:sp>
+      </p:grpSp>
+      <p:sp>
+        <p:nvSpPr>
+          <p:cNvPr id="11" name="Titel 9">
+            <a:extLst>
+              <a:ext uri="{FF2B5EF4-FFF2-40B4-BE49-F238E27FC236}">
+                <a16:creationId xmlns:a16="http://schemas.microsoft.com/office/drawing/2014/main" id="{36158228-E09F-44AE-B286-3C772B4183AE}"/>
+              </a:ext>
+            </a:extLst>
+          </p:cNvPr>
+          <p:cNvSpPr>
+            <a:spLocks noGrp="1"/>
+          </p:cNvSpPr>
+          <p:nvPr>
+            <p:ph type="title"/>
+          </p:nvPr>
+        </p:nvSpPr>
+        <p:spPr>
+          <a:xfrm>
+            <a:off x="1225299" y="628587"/>
+            <a:ext cx="27786673" cy="2504751"/>
+          </a:xfrm>
+        </p:spPr>
+        <p:txBody>
+          <a:bodyPr/>
+          <a:lstStyle/>
+          <a:p>
+            <a:r>
+              <a:rPr lang="de-DE" sz="4800" dirty="0"/>
+              <a:t>Man is to Computer Programmer as Woman</a:t>
+            </a:r>
+            <a:br>
+              <a:rPr lang="de-DE" sz="4800" dirty="0"/>
+            </a:br>
+            <a:r>
+              <a:rPr lang="de-DE" sz="4800" dirty="0"/>
+              <a:t>is to Homemaker? Debiasing Word Embeddings</a:t>
+            </a:r>
+          </a:p>
+        </p:txBody>
+      </p:sp>
+    </p:spTree>
+    <p:extLst>
+      <p:ext uri="{BB962C8B-B14F-4D97-AF65-F5344CB8AC3E}">
+        <p14:creationId xmlns:p14="http://schemas.microsoft.com/office/powerpoint/2010/main" val="3843448928"/>
+      </p:ext>
+    </p:extLst>
+  </p:cSld>
+  <p:clrMapOvr>
+    <a:masterClrMapping/>
+  </p:clrMapOvr>
+</p:sld>
+</file>
+
+<file path=ppt/slides/slide2.xml><?xml version="1.0" encoding="utf-8"?>
+<p:sld xmlns:a="http://schemas.openxmlformats.org/drawingml/2006/main" xmlns:r="http://schemas.openxmlformats.org/officeDocument/2006/relationships" xmlns:p="http://schemas.openxmlformats.org/presentationml/2006/main">
+  <p:cSld>
+    <p:bg>
+      <p:bgPr>
+        <a:solidFill>
+          <a:schemeClr val="bg1"/>
+        </a:solidFill>
+        <a:effectLst/>
+      </p:bgPr>
+    </p:bg>
+    <p:spTree>
+      <p:nvGrpSpPr>
+        <p:cNvPr id="1" name=""/>
+        <p:cNvGrpSpPr/>
+        <p:nvPr/>
+      </p:nvGrpSpPr>
+      <p:grpSpPr>
+        <a:xfrm>
+          <a:off x="0" y="0"/>
+          <a:ext cx="0" cy="0"/>
+          <a:chOff x="0" y="0"/>
+          <a:chExt cx="0" cy="0"/>
+        </a:xfrm>
+      </p:grpSpPr>
+      <p:pic>
+        <p:nvPicPr>
+          <p:cNvPr id="22" name="Picture Placeholder 14">
+            <a:extLst>
+              <a:ext uri="{FF2B5EF4-FFF2-40B4-BE49-F238E27FC236}">
+                <a16:creationId xmlns:a16="http://schemas.microsoft.com/office/drawing/2014/main" id="{D0739A54-1709-4E3F-A594-6D548088FAB1}"/>
+              </a:ext>
+            </a:extLst>
+          </p:cNvPr>
+          <p:cNvPicPr>
+            <a:picLocks noChangeAspect="1"/>
+          </p:cNvPicPr>
+          <p:nvPr/>
+        </p:nvPicPr>
+        <p:blipFill rotWithShape="1">
+          <a:blip r:embed="rId3">
+            <a:extLst>
+              <a:ext uri="{28A0092B-C50C-407E-A947-70E740481C1C}">
+                <a14:useLocalDpi xmlns:a14="http://schemas.microsoft.com/office/drawing/2010/main" val="0"/>
+              </a:ext>
+            </a:extLst>
+          </a:blip>
+          <a:srcRect t="2107"/>
+          <a:stretch/>
+        </p:blipFill>
+        <p:spPr>
+          <a:xfrm>
+            <a:off x="11093592" y="4444029"/>
+            <a:ext cx="8043314" cy="4008766"/>
+          </a:xfrm>
+          <a:prstGeom prst="rect">
+            <a:avLst/>
+          </a:prstGeom>
+        </p:spPr>
+      </p:pic>
+      <p:pic>
+        <p:nvPicPr>
+          <p:cNvPr id="15" name="Picture Placeholder 14">
+            <a:extLst>
+              <a:ext uri="{FF2B5EF4-FFF2-40B4-BE49-F238E27FC236}">
+                <a16:creationId xmlns:a16="http://schemas.microsoft.com/office/drawing/2014/main" id="{086B20DB-6A34-4875-83C9-D70060009CDE}"/>
+              </a:ext>
+            </a:extLst>
+          </p:cNvPr>
+          <p:cNvPicPr>
+            <a:picLocks noGrp="1" noChangeAspect="1"/>
+          </p:cNvPicPr>
+          <p:nvPr>
+            <p:ph type="pic" sz="quarter" idx="18"/>
+          </p:nvPr>
+        </p:nvPicPr>
+        <p:blipFill>
+          <a:blip r:embed="rId4" cstate="print">
             <a:extLst>
               <a:ext uri="{28A0092B-C50C-407E-A947-70E740481C1C}">
                 <a14:useLocalDpi xmlns:a14="http://schemas.microsoft.com/office/drawing/2010/main" val="0"/>
@@ -27488,8 +29214,8 @@
           </a:p>
         </p:txBody>
       </p:sp>
-      <mc:AlternateContent xmlns:mc="http://schemas.openxmlformats.org/markup-compatibility/2006">
-        <mc:Choice xmlns:a14="http://schemas.microsoft.com/office/drawing/2010/main" Requires="a14">
+      <mc:AlternateContent xmlns:mc="http://schemas.openxmlformats.org/markup-compatibility/2006" xmlns:a14="http://schemas.microsoft.com/office/drawing/2010/main">
+        <mc:Choice Requires="a14">
           <p:sp>
             <p:nvSpPr>
               <p:cNvPr id="5" name="Text Placeholder 4">
@@ -27780,7 +29506,7 @@
             </p:txBody>
           </p:sp>
         </mc:Choice>
-        <mc:Fallback>
+        <mc:Fallback xmlns="">
           <p:sp>
             <p:nvSpPr>
               <p:cNvPr id="5" name="Text Placeholder 4">
@@ -27803,7 +29529,7 @@
                 <a:ext cx="8047339" cy="10440854"/>
               </a:xfrm>
               <a:blipFill>
-                <a:blip r:embed="rId3"/>
+                <a:blip r:embed="rId5"/>
                 <a:stretch>
                   <a:fillRect l="-2727" t="-1752" r="-2121" b="-234"/>
                 </a:stretch>
@@ -27857,220 +29583,797 @@
           </a:p>
         </p:txBody>
       </p:sp>
-      <p:sp>
-        <p:nvSpPr>
-          <p:cNvPr id="16" name="Text Placeholder 4">
-            <a:extLst>
-              <a:ext uri="{FF2B5EF4-FFF2-40B4-BE49-F238E27FC236}">
-                <a16:creationId xmlns:a16="http://schemas.microsoft.com/office/drawing/2014/main" id="{88DD5B5C-4F29-4C4C-B4F8-171086B1C3FE}"/>
-              </a:ext>
-            </a:extLst>
-          </p:cNvPr>
-          <p:cNvSpPr txBox="1">
-            <a:spLocks/>
-          </p:cNvSpPr>
-          <p:nvPr/>
-        </p:nvSpPr>
-        <p:spPr>
-          <a:xfrm>
-            <a:off x="11114329" y="10981432"/>
-            <a:ext cx="8047339" cy="8208912"/>
-          </a:xfrm>
-          <a:prstGeom prst="rect">
-            <a:avLst/>
-          </a:prstGeom>
-        </p:spPr>
-        <p:txBody>
-          <a:bodyPr lIns="0" tIns="0" rIns="0" bIns="0"/>
-          <a:lstStyle>
-            <a:lvl1pPr marL="0" indent="0" algn="l" defTabSz="2952319" rtl="0" eaLnBrk="1" latinLnBrk="0" hangingPunct="1">
-              <a:lnSpc>
-                <a:spcPts val="2800"/>
-              </a:lnSpc>
-              <a:spcBef>
-                <a:spcPts val="0"/>
-              </a:spcBef>
-              <a:spcAft>
-                <a:spcPts val="2800"/>
-              </a:spcAft>
-              <a:buFont typeface="Arial" pitchFamily="34" charset="0"/>
-              <a:buNone/>
-              <a:defRPr sz="2200" kern="1200">
-                <a:solidFill>
-                  <a:schemeClr val="tx1"/>
-                </a:solidFill>
-                <a:latin typeface="Arial" pitchFamily="34" charset="0"/>
-                <a:ea typeface="+mn-ea"/>
-                <a:cs typeface="Arial" pitchFamily="34" charset="0"/>
-              </a:defRPr>
-            </a:lvl1pPr>
-            <a:lvl2pPr marL="0" indent="0" algn="l" defTabSz="2952319" rtl="0" eaLnBrk="1" latinLnBrk="0" hangingPunct="1">
-              <a:lnSpc>
-                <a:spcPts val="2800"/>
-              </a:lnSpc>
-              <a:spcBef>
-                <a:spcPts val="0"/>
-              </a:spcBef>
-              <a:spcAft>
-                <a:spcPts val="0"/>
-              </a:spcAft>
-              <a:buFont typeface="Arial" pitchFamily="34" charset="0"/>
-              <a:buNone/>
-              <a:defRPr sz="2200" b="1" i="0" kern="1200" baseline="0">
-                <a:solidFill>
-                  <a:schemeClr val="tx1"/>
-                </a:solidFill>
-                <a:latin typeface="Arial" pitchFamily="34" charset="0"/>
-                <a:ea typeface="+mn-ea"/>
-                <a:cs typeface="Arial" pitchFamily="34" charset="0"/>
-              </a:defRPr>
-            </a:lvl2pPr>
-            <a:lvl3pPr marL="180000" indent="-180000" algn="l" defTabSz="2952319" rtl="0" eaLnBrk="1" latinLnBrk="0" hangingPunct="1">
-              <a:lnSpc>
-                <a:spcPts val="2800"/>
-              </a:lnSpc>
-              <a:spcBef>
-                <a:spcPts val="0"/>
-              </a:spcBef>
-              <a:spcAft>
-                <a:spcPts val="2800"/>
-              </a:spcAft>
-              <a:buFont typeface="Arial" panose="020B0604020202020204" pitchFamily="34" charset="0"/>
-              <a:buChar char="•"/>
-              <a:defRPr sz="2200" kern="1200">
-                <a:solidFill>
-                  <a:schemeClr val="tx1"/>
-                </a:solidFill>
-                <a:latin typeface="Arial" pitchFamily="34" charset="0"/>
-                <a:ea typeface="+mn-ea"/>
-                <a:cs typeface="Arial" pitchFamily="34" charset="0"/>
-              </a:defRPr>
-            </a:lvl3pPr>
-            <a:lvl4pPr marL="5166557" indent="-738080" algn="l" defTabSz="2952319" rtl="0" eaLnBrk="1" latinLnBrk="0" hangingPunct="1">
-              <a:spcBef>
-                <a:spcPct val="20000"/>
-              </a:spcBef>
-              <a:buFont typeface="Arial" pitchFamily="34" charset="0"/>
-              <a:buChar char="–"/>
-              <a:defRPr sz="1800" kern="1200">
-                <a:solidFill>
-                  <a:schemeClr val="tx1"/>
-                </a:solidFill>
-                <a:latin typeface="Arial" pitchFamily="34" charset="0"/>
-                <a:ea typeface="+mn-ea"/>
-                <a:cs typeface="Arial" pitchFamily="34" charset="0"/>
-              </a:defRPr>
-            </a:lvl4pPr>
-            <a:lvl5pPr marL="6642717" indent="-738080" algn="l" defTabSz="2952319" rtl="0" eaLnBrk="1" latinLnBrk="0" hangingPunct="1">
-              <a:spcBef>
-                <a:spcPct val="20000"/>
-              </a:spcBef>
-              <a:buFont typeface="Arial" pitchFamily="34" charset="0"/>
-              <a:buChar char="»"/>
-              <a:defRPr sz="1800" kern="1200">
-                <a:solidFill>
-                  <a:schemeClr val="tx1"/>
-                </a:solidFill>
-                <a:latin typeface="Arial" pitchFamily="34" charset="0"/>
-                <a:ea typeface="+mn-ea"/>
-                <a:cs typeface="Arial" pitchFamily="34" charset="0"/>
-              </a:defRPr>
-            </a:lvl5pPr>
-            <a:lvl6pPr marL="8118877" indent="-738080" algn="l" defTabSz="2952319" rtl="0" eaLnBrk="1" latinLnBrk="0" hangingPunct="1">
-              <a:spcBef>
-                <a:spcPct val="20000"/>
-              </a:spcBef>
-              <a:buFont typeface="Arial" pitchFamily="34" charset="0"/>
-              <a:buChar char="•"/>
-              <a:defRPr sz="6400" kern="1200">
-                <a:solidFill>
-                  <a:schemeClr val="tx1"/>
-                </a:solidFill>
-                <a:latin typeface="+mn-lt"/>
-                <a:ea typeface="+mn-ea"/>
-                <a:cs typeface="+mn-cs"/>
-              </a:defRPr>
-            </a:lvl6pPr>
-            <a:lvl7pPr marL="9595036" indent="-738080" algn="l" defTabSz="2952319" rtl="0" eaLnBrk="1" latinLnBrk="0" hangingPunct="1">
-              <a:spcBef>
-                <a:spcPct val="20000"/>
-              </a:spcBef>
-              <a:buFont typeface="Arial" pitchFamily="34" charset="0"/>
-              <a:buChar char="•"/>
-              <a:defRPr sz="6400" kern="1200">
-                <a:solidFill>
-                  <a:schemeClr val="tx1"/>
-                </a:solidFill>
-                <a:latin typeface="+mn-lt"/>
-                <a:ea typeface="+mn-ea"/>
-                <a:cs typeface="+mn-cs"/>
-              </a:defRPr>
-            </a:lvl7pPr>
-            <a:lvl8pPr marL="11071196" indent="-738080" algn="l" defTabSz="2952319" rtl="0" eaLnBrk="1" latinLnBrk="0" hangingPunct="1">
-              <a:spcBef>
-                <a:spcPct val="20000"/>
-              </a:spcBef>
-              <a:buFont typeface="Arial" pitchFamily="34" charset="0"/>
-              <a:buChar char="•"/>
-              <a:defRPr sz="6400" kern="1200">
-                <a:solidFill>
-                  <a:schemeClr val="tx1"/>
-                </a:solidFill>
-                <a:latin typeface="+mn-lt"/>
-                <a:ea typeface="+mn-ea"/>
-                <a:cs typeface="+mn-cs"/>
-              </a:defRPr>
-            </a:lvl8pPr>
-            <a:lvl9pPr marL="12547355" indent="-738080" algn="l" defTabSz="2952319" rtl="0" eaLnBrk="1" latinLnBrk="0" hangingPunct="1">
-              <a:spcBef>
-                <a:spcPct val="20000"/>
-              </a:spcBef>
-              <a:buFont typeface="Arial" pitchFamily="34" charset="0"/>
-              <a:buChar char="•"/>
-              <a:defRPr sz="6400" kern="1200">
-                <a:solidFill>
-                  <a:schemeClr val="tx1"/>
-                </a:solidFill>
-                <a:latin typeface="+mn-lt"/>
-                <a:ea typeface="+mn-ea"/>
-                <a:cs typeface="+mn-cs"/>
-              </a:defRPr>
-            </a:lvl9pPr>
-          </a:lstStyle>
-          <a:p>
-            <a:pPr lvl="1" algn="just"/>
-            <a:r>
-              <a:rPr lang="de-DE" sz="2800" dirty="0"/>
-              <a:t>Bias in Word Embeddings</a:t>
-            </a:r>
-          </a:p>
-          <a:p>
-            <a:pPr algn="just"/>
-            <a:r>
-              <a:rPr lang="de-DE" dirty="0"/>
-              <a:t>Lorem ipsum dolor sit amet, consetetur sadipscing elitr, sed diam nonumy eirmod tempor invidunt ut labore et dolore magna aliquyam erat, sed diam voluptua. At vero eos et accusam et justo duo dolores et ea rebum. Stet clita kasd gubergren, no sea takimata sanctus est Lorem ipsum dolor sit amet. Lorem ipsum dolor sit amet, consetetur sadipscing elitr, sed diam nonumy eirmod tempor invidunt ut labore et dolore magna aliquyam erat, sed diam voluptua. At vero eos et accusam et justo duo dolores et ea rebum. Stet clita kasd gubergren, no sea takimata sanctus est Lorem ipsum dolor sit amet.</a:t>
-            </a:r>
-          </a:p>
-          <a:p>
-            <a:pPr lvl="1" algn="just"/>
-            <a:r>
-              <a:rPr lang="de-DE" sz="2800" dirty="0"/>
-              <a:t>Debiasing Algorithm</a:t>
-            </a:r>
-          </a:p>
-          <a:p>
-            <a:pPr algn="just"/>
-            <a:r>
-              <a:rPr lang="de-DE" dirty="0"/>
-              <a:t>Lorem ipsum dolor sit amet, consetetur sadipscing elitr, sed diam nonumy eirmod tempor invidunt ut labore et dolore magna aliquyam erat, sed diam voluptua. At vero eos et accusam et justo duo dolores et ea rebum. Stet clita kasd gubergren, no sea takimata sanctus est Lorem ipsum dolor sit amet. Lorem ipsum dolor sit amet, consetetur sadipscing elitr, sed diam nonumy eirmod tempor invidunt ut labore et dolore magna aliquyam erat, sed diam voluptua. At vero eos et accusam et justo duo dolores et ea rebum. Stet clita kasd gubergren, no sea takimata sanctus est Lorem ipsum dolor sit amet.</a:t>
-            </a:r>
-          </a:p>
-          <a:p>
-            <a:pPr algn="just"/>
-            <a:endParaRPr lang="de-DE" dirty="0"/>
-          </a:p>
-        </p:txBody>
-      </p:sp>
+      <mc:AlternateContent xmlns:mc="http://schemas.openxmlformats.org/markup-compatibility/2006">
+        <mc:Choice xmlns:a14="http://schemas.microsoft.com/office/drawing/2010/main" Requires="a14">
+          <p:sp>
+            <p:nvSpPr>
+              <p:cNvPr id="16" name="Text Placeholder 4">
+                <a:extLst>
+                  <a:ext uri="{FF2B5EF4-FFF2-40B4-BE49-F238E27FC236}">
+                    <a16:creationId xmlns:a16="http://schemas.microsoft.com/office/drawing/2014/main" id="{88DD5B5C-4F29-4C4C-B4F8-171086B1C3FE}"/>
+                  </a:ext>
+                </a:extLst>
+              </p:cNvPr>
+              <p:cNvSpPr txBox="1">
+                <a:spLocks/>
+              </p:cNvSpPr>
+              <p:nvPr/>
+            </p:nvSpPr>
+            <p:spPr>
+              <a:xfrm>
+                <a:off x="11114329" y="9829304"/>
+                <a:ext cx="8047339" cy="8208912"/>
+              </a:xfrm>
+              <a:prstGeom prst="rect">
+                <a:avLst/>
+              </a:prstGeom>
+            </p:spPr>
+            <p:txBody>
+              <a:bodyPr lIns="0" tIns="0" rIns="0" bIns="0"/>
+              <a:lstStyle>
+                <a:lvl1pPr marL="0" indent="0" algn="l" defTabSz="2952319" rtl="0" eaLnBrk="1" latinLnBrk="0" hangingPunct="1">
+                  <a:lnSpc>
+                    <a:spcPts val="2800"/>
+                  </a:lnSpc>
+                  <a:spcBef>
+                    <a:spcPts val="0"/>
+                  </a:spcBef>
+                  <a:spcAft>
+                    <a:spcPts val="2800"/>
+                  </a:spcAft>
+                  <a:buFont typeface="Arial" pitchFamily="34" charset="0"/>
+                  <a:buNone/>
+                  <a:defRPr sz="2200" kern="1200">
+                    <a:solidFill>
+                      <a:schemeClr val="tx1"/>
+                    </a:solidFill>
+                    <a:latin typeface="Arial" pitchFamily="34" charset="0"/>
+                    <a:ea typeface="+mn-ea"/>
+                    <a:cs typeface="Arial" pitchFamily="34" charset="0"/>
+                  </a:defRPr>
+                </a:lvl1pPr>
+                <a:lvl2pPr marL="0" indent="0" algn="l" defTabSz="2952319" rtl="0" eaLnBrk="1" latinLnBrk="0" hangingPunct="1">
+                  <a:lnSpc>
+                    <a:spcPts val="2800"/>
+                  </a:lnSpc>
+                  <a:spcBef>
+                    <a:spcPts val="0"/>
+                  </a:spcBef>
+                  <a:spcAft>
+                    <a:spcPts val="0"/>
+                  </a:spcAft>
+                  <a:buFont typeface="Arial" pitchFamily="34" charset="0"/>
+                  <a:buNone/>
+                  <a:defRPr sz="2200" b="1" i="0" kern="1200" baseline="0">
+                    <a:solidFill>
+                      <a:schemeClr val="tx1"/>
+                    </a:solidFill>
+                    <a:latin typeface="Arial" pitchFamily="34" charset="0"/>
+                    <a:ea typeface="+mn-ea"/>
+                    <a:cs typeface="Arial" pitchFamily="34" charset="0"/>
+                  </a:defRPr>
+                </a:lvl2pPr>
+                <a:lvl3pPr marL="180000" indent="-180000" algn="l" defTabSz="2952319" rtl="0" eaLnBrk="1" latinLnBrk="0" hangingPunct="1">
+                  <a:lnSpc>
+                    <a:spcPts val="2800"/>
+                  </a:lnSpc>
+                  <a:spcBef>
+                    <a:spcPts val="0"/>
+                  </a:spcBef>
+                  <a:spcAft>
+                    <a:spcPts val="2800"/>
+                  </a:spcAft>
+                  <a:buFont typeface="Arial" panose="020B0604020202020204" pitchFamily="34" charset="0"/>
+                  <a:buChar char="•"/>
+                  <a:defRPr sz="2200" kern="1200">
+                    <a:solidFill>
+                      <a:schemeClr val="tx1"/>
+                    </a:solidFill>
+                    <a:latin typeface="Arial" pitchFamily="34" charset="0"/>
+                    <a:ea typeface="+mn-ea"/>
+                    <a:cs typeface="Arial" pitchFamily="34" charset="0"/>
+                  </a:defRPr>
+                </a:lvl3pPr>
+                <a:lvl4pPr marL="5166557" indent="-738080" algn="l" defTabSz="2952319" rtl="0" eaLnBrk="1" latinLnBrk="0" hangingPunct="1">
+                  <a:spcBef>
+                    <a:spcPct val="20000"/>
+                  </a:spcBef>
+                  <a:buFont typeface="Arial" pitchFamily="34" charset="0"/>
+                  <a:buChar char="–"/>
+                  <a:defRPr sz="1800" kern="1200">
+                    <a:solidFill>
+                      <a:schemeClr val="tx1"/>
+                    </a:solidFill>
+                    <a:latin typeface="Arial" pitchFamily="34" charset="0"/>
+                    <a:ea typeface="+mn-ea"/>
+                    <a:cs typeface="Arial" pitchFamily="34" charset="0"/>
+                  </a:defRPr>
+                </a:lvl4pPr>
+                <a:lvl5pPr marL="6642717" indent="-738080" algn="l" defTabSz="2952319" rtl="0" eaLnBrk="1" latinLnBrk="0" hangingPunct="1">
+                  <a:spcBef>
+                    <a:spcPct val="20000"/>
+                  </a:spcBef>
+                  <a:buFont typeface="Arial" pitchFamily="34" charset="0"/>
+                  <a:buChar char="»"/>
+                  <a:defRPr sz="1800" kern="1200">
+                    <a:solidFill>
+                      <a:schemeClr val="tx1"/>
+                    </a:solidFill>
+                    <a:latin typeface="Arial" pitchFamily="34" charset="0"/>
+                    <a:ea typeface="+mn-ea"/>
+                    <a:cs typeface="Arial" pitchFamily="34" charset="0"/>
+                  </a:defRPr>
+                </a:lvl5pPr>
+                <a:lvl6pPr marL="8118877" indent="-738080" algn="l" defTabSz="2952319" rtl="0" eaLnBrk="1" latinLnBrk="0" hangingPunct="1">
+                  <a:spcBef>
+                    <a:spcPct val="20000"/>
+                  </a:spcBef>
+                  <a:buFont typeface="Arial" pitchFamily="34" charset="0"/>
+                  <a:buChar char="•"/>
+                  <a:defRPr sz="6400" kern="1200">
+                    <a:solidFill>
+                      <a:schemeClr val="tx1"/>
+                    </a:solidFill>
+                    <a:latin typeface="+mn-lt"/>
+                    <a:ea typeface="+mn-ea"/>
+                    <a:cs typeface="+mn-cs"/>
+                  </a:defRPr>
+                </a:lvl6pPr>
+                <a:lvl7pPr marL="9595036" indent="-738080" algn="l" defTabSz="2952319" rtl="0" eaLnBrk="1" latinLnBrk="0" hangingPunct="1">
+                  <a:spcBef>
+                    <a:spcPct val="20000"/>
+                  </a:spcBef>
+                  <a:buFont typeface="Arial" pitchFamily="34" charset="0"/>
+                  <a:buChar char="•"/>
+                  <a:defRPr sz="6400" kern="1200">
+                    <a:solidFill>
+                      <a:schemeClr val="tx1"/>
+                    </a:solidFill>
+                    <a:latin typeface="+mn-lt"/>
+                    <a:ea typeface="+mn-ea"/>
+                    <a:cs typeface="+mn-cs"/>
+                  </a:defRPr>
+                </a:lvl7pPr>
+                <a:lvl8pPr marL="11071196" indent="-738080" algn="l" defTabSz="2952319" rtl="0" eaLnBrk="1" latinLnBrk="0" hangingPunct="1">
+                  <a:spcBef>
+                    <a:spcPct val="20000"/>
+                  </a:spcBef>
+                  <a:buFont typeface="Arial" pitchFamily="34" charset="0"/>
+                  <a:buChar char="•"/>
+                  <a:defRPr sz="6400" kern="1200">
+                    <a:solidFill>
+                      <a:schemeClr val="tx1"/>
+                    </a:solidFill>
+                    <a:latin typeface="+mn-lt"/>
+                    <a:ea typeface="+mn-ea"/>
+                    <a:cs typeface="+mn-cs"/>
+                  </a:defRPr>
+                </a:lvl8pPr>
+                <a:lvl9pPr marL="12547355" indent="-738080" algn="l" defTabSz="2952319" rtl="0" eaLnBrk="1" latinLnBrk="0" hangingPunct="1">
+                  <a:spcBef>
+                    <a:spcPct val="20000"/>
+                  </a:spcBef>
+                  <a:buFont typeface="Arial" pitchFamily="34" charset="0"/>
+                  <a:buChar char="•"/>
+                  <a:defRPr sz="6400" kern="1200">
+                    <a:solidFill>
+                      <a:schemeClr val="tx1"/>
+                    </a:solidFill>
+                    <a:latin typeface="+mn-lt"/>
+                    <a:ea typeface="+mn-ea"/>
+                    <a:cs typeface="+mn-cs"/>
+                  </a:defRPr>
+                </a:lvl9pPr>
+              </a:lstStyle>
+              <a:p>
+                <a:pPr lvl="1" algn="just"/>
+                <a:r>
+                  <a:rPr lang="de-DE" sz="2800" dirty="0"/>
+                  <a:t>Bias in Word Embeddings</a:t>
+                </a:r>
+              </a:p>
+              <a:p>
+                <a:pPr marL="342900" lvl="1" indent="-342900" algn="just">
+                  <a:spcAft>
+                    <a:spcPts val="100"/>
+                  </a:spcAft>
+                  <a:buFont typeface="Arial" panose="020B0604020202020204" pitchFamily="34" charset="0"/>
+                  <a:buChar char="•"/>
+                </a:pPr>
+                <a:r>
+                  <a:rPr lang="de-DE" dirty="0"/>
+                  <a:t>Occupational Stereotypes:</a:t>
+                </a:r>
+                <a:r>
+                  <a:rPr lang="de-DE" b="0" spc="-150" dirty="0"/>
+                  <a:t> Crowdwork evaluated occupational stereotypes strongly correlated with s</a:t>
+                </a:r>
+                <a:r>
+                  <a:rPr lang="de-DE" b="0" i="1" spc="-150" dirty="0"/>
+                  <a:t>he-he</a:t>
+                </a:r>
+                <a:r>
+                  <a:rPr lang="de-DE" b="0" spc="-150" dirty="0"/>
+                  <a:t> axis projections ( </a:t>
+                </a:r>
+                <a14:m>
+                  <m:oMath xmlns:m="http://schemas.openxmlformats.org/officeDocument/2006/math">
+                    <m:r>
+                      <a:rPr lang="de-DE" b="0" i="1" spc="-150" smtClean="0">
+                        <a:latin typeface="Cambria Math" panose="02040503050406030204" pitchFamily="18" charset="0"/>
+                        <a:ea typeface="Cambria Math" panose="02040503050406030204" pitchFamily="18" charset="0"/>
+                      </a:rPr>
+                      <m:t>𝜌</m:t>
+                    </m:r>
+                    <m:r>
+                      <a:rPr lang="en-GB" b="0" i="1" spc="-150" smtClean="0">
+                        <a:latin typeface="Cambria Math" panose="02040503050406030204" pitchFamily="18" charset="0"/>
+                        <a:ea typeface="Cambria Math" panose="02040503050406030204" pitchFamily="18" charset="0"/>
+                      </a:rPr>
+                      <m:t>=0.51</m:t>
+                    </m:r>
+                  </m:oMath>
+                </a14:m>
+                <a:r>
+                  <a:rPr lang="de-DE" b="0" spc="-150" dirty="0"/>
+                  <a:t> ).</a:t>
+                </a:r>
+                <a:endParaRPr lang="de-DE" b="0" dirty="0"/>
+              </a:p>
+              <a:p>
+                <a:pPr marL="342900" lvl="1" indent="-342900" algn="just">
+                  <a:spcAft>
+                    <a:spcPts val="100"/>
+                  </a:spcAft>
+                  <a:buFont typeface="Arial" panose="020B0604020202020204" pitchFamily="34" charset="0"/>
+                  <a:buChar char="•"/>
+                </a:pPr>
+                <a:r>
+                  <a:rPr lang="de-DE" dirty="0"/>
+                  <a:t>Stereotypical Anologies:</a:t>
+                </a:r>
+                <a:r>
+                  <a:rPr lang="de-DE" b="0" dirty="0"/>
+                  <a:t> Scored </a:t>
+                </a:r>
+                <a:r>
+                  <a:rPr lang="de-DE" b="0" i="1" dirty="0"/>
+                  <a:t>she-he</a:t>
+                </a:r>
+                <a:r>
+                  <a:rPr lang="de-DE" b="0" dirty="0"/>
+                  <a:t> anologies are rated via crowdwork as (a) gender-appropriate (b) stereotypic. Scoring metric: </a:t>
+                </a:r>
+                <a14:m>
+                  <m:oMath xmlns:m="http://schemas.openxmlformats.org/officeDocument/2006/math">
+                    <m:r>
+                      <a:rPr lang="en-GB" b="0" i="1" smtClean="0">
+                        <a:latin typeface="Cambria Math" panose="02040503050406030204" pitchFamily="18" charset="0"/>
+                      </a:rPr>
+                      <m:t>𝑆</m:t>
+                    </m:r>
+                    <m:d>
+                      <m:dPr>
+                        <m:ctrlPr>
+                          <a:rPr lang="en-GB" b="0" i="1" smtClean="0">
+                            <a:latin typeface="Cambria Math" panose="02040503050406030204" pitchFamily="18" charset="0"/>
+                          </a:rPr>
+                        </m:ctrlPr>
+                      </m:dPr>
+                      <m:e>
+                        <m:r>
+                          <a:rPr lang="en-GB" b="0" i="1" smtClean="0">
+                            <a:latin typeface="Cambria Math" panose="02040503050406030204" pitchFamily="18" charset="0"/>
+                          </a:rPr>
+                          <m:t>𝑥</m:t>
+                        </m:r>
+                        <m:r>
+                          <a:rPr lang="en-GB" b="0" i="1" smtClean="0">
+                            <a:latin typeface="Cambria Math" panose="02040503050406030204" pitchFamily="18" charset="0"/>
+                          </a:rPr>
+                          <m:t>, </m:t>
+                        </m:r>
+                        <m:r>
+                          <a:rPr lang="en-GB" b="0" i="1" smtClean="0">
+                            <a:latin typeface="Cambria Math" panose="02040503050406030204" pitchFamily="18" charset="0"/>
+                          </a:rPr>
+                          <m:t>𝑦</m:t>
+                        </m:r>
+                      </m:e>
+                    </m:d>
+                    <m:r>
+                      <a:rPr lang="en-GB" b="0" i="1" smtClean="0">
+                        <a:latin typeface="Cambria Math" panose="02040503050406030204" pitchFamily="18" charset="0"/>
+                      </a:rPr>
+                      <m:t>=</m:t>
+                    </m:r>
+                    <m:func>
+                      <m:funcPr>
+                        <m:ctrlPr>
+                          <a:rPr lang="en-GB" b="0" i="1" smtClean="0">
+                            <a:latin typeface="Cambria Math" panose="02040503050406030204" pitchFamily="18" charset="0"/>
+                          </a:rPr>
+                        </m:ctrlPr>
+                      </m:funcPr>
+                      <m:fName>
+                        <m:r>
+                          <m:rPr>
+                            <m:sty m:val="p"/>
+                          </m:rPr>
+                          <a:rPr lang="en-GB" b="0" i="0" smtClean="0">
+                            <a:latin typeface="Cambria Math" panose="02040503050406030204" pitchFamily="18" charset="0"/>
+                          </a:rPr>
+                          <m:t>cos</m:t>
+                        </m:r>
+                      </m:fName>
+                      <m:e>
+                        <m:d>
+                          <m:dPr>
+                            <m:ctrlPr>
+                              <a:rPr lang="en-GB" b="0" i="1" smtClean="0">
+                                <a:latin typeface="Cambria Math" panose="02040503050406030204" pitchFamily="18" charset="0"/>
+                              </a:rPr>
+                            </m:ctrlPr>
+                          </m:dPr>
+                          <m:e>
+                            <m:acc>
+                              <m:accPr>
+                                <m:chr m:val="⃗"/>
+                                <m:ctrlPr>
+                                  <a:rPr lang="en-GB" b="0" i="1" smtClean="0">
+                                    <a:latin typeface="Cambria Math" panose="02040503050406030204" pitchFamily="18" charset="0"/>
+                                  </a:rPr>
+                                </m:ctrlPr>
+                              </m:accPr>
+                              <m:e>
+                                <m:r>
+                                  <a:rPr lang="en-GB" b="0" i="1" smtClean="0">
+                                    <a:latin typeface="Cambria Math" panose="02040503050406030204" pitchFamily="18" charset="0"/>
+                                  </a:rPr>
+                                  <m:t>𝑠h𝑒</m:t>
+                                </m:r>
+                              </m:e>
+                            </m:acc>
+                            <m:r>
+                              <a:rPr lang="en-GB" b="0" i="1" smtClean="0">
+                                <a:latin typeface="Cambria Math" panose="02040503050406030204" pitchFamily="18" charset="0"/>
+                              </a:rPr>
+                              <m:t>−</m:t>
+                            </m:r>
+                            <m:acc>
+                              <m:accPr>
+                                <m:chr m:val="⃗"/>
+                                <m:ctrlPr>
+                                  <a:rPr lang="en-GB" b="0" i="1" smtClean="0">
+                                    <a:latin typeface="Cambria Math" panose="02040503050406030204" pitchFamily="18" charset="0"/>
+                                  </a:rPr>
+                                </m:ctrlPr>
+                              </m:accPr>
+                              <m:e>
+                                <m:r>
+                                  <a:rPr lang="en-GB" b="0" i="1" smtClean="0">
+                                    <a:latin typeface="Cambria Math" panose="02040503050406030204" pitchFamily="18" charset="0"/>
+                                  </a:rPr>
+                                  <m:t>h𝑒</m:t>
+                                </m:r>
+                              </m:e>
+                            </m:acc>
+                            <m:r>
+                              <a:rPr lang="en-GB" b="0" i="1" smtClean="0">
+                                <a:latin typeface="Cambria Math" panose="02040503050406030204" pitchFamily="18" charset="0"/>
+                              </a:rPr>
+                              <m:t>, </m:t>
+                            </m:r>
+                            <m:acc>
+                              <m:accPr>
+                                <m:chr m:val="⃗"/>
+                                <m:ctrlPr>
+                                  <a:rPr lang="en-GB" b="0" i="1" smtClean="0">
+                                    <a:latin typeface="Cambria Math" panose="02040503050406030204" pitchFamily="18" charset="0"/>
+                                  </a:rPr>
+                                </m:ctrlPr>
+                              </m:accPr>
+                              <m:e>
+                                <m:r>
+                                  <a:rPr lang="en-GB" b="0" i="1" smtClean="0">
+                                    <a:latin typeface="Cambria Math" panose="02040503050406030204" pitchFamily="18" charset="0"/>
+                                  </a:rPr>
+                                  <m:t>𝑥</m:t>
+                                </m:r>
+                              </m:e>
+                            </m:acc>
+                            <m:r>
+                              <a:rPr lang="en-GB" b="0" i="1" smtClean="0">
+                                <a:latin typeface="Cambria Math" panose="02040503050406030204" pitchFamily="18" charset="0"/>
+                              </a:rPr>
+                              <m:t>−</m:t>
+                            </m:r>
+                            <m:acc>
+                              <m:accPr>
+                                <m:chr m:val="⃗"/>
+                                <m:ctrlPr>
+                                  <a:rPr lang="en-GB" b="0" i="1" smtClean="0">
+                                    <a:latin typeface="Cambria Math" panose="02040503050406030204" pitchFamily="18" charset="0"/>
+                                  </a:rPr>
+                                </m:ctrlPr>
+                              </m:accPr>
+                              <m:e>
+                                <m:r>
+                                  <a:rPr lang="en-GB" b="0" i="1" smtClean="0">
+                                    <a:latin typeface="Cambria Math" panose="02040503050406030204" pitchFamily="18" charset="0"/>
+                                  </a:rPr>
+                                  <m:t>𝑦</m:t>
+                                </m:r>
+                              </m:e>
+                            </m:acc>
+                          </m:e>
+                        </m:d>
+                      </m:e>
+                    </m:func>
+                    <m:r>
+                      <a:rPr lang="en-GB" b="0" i="0" smtClean="0">
+                        <a:latin typeface="Cambria Math" panose="02040503050406030204" pitchFamily="18" charset="0"/>
+                      </a:rPr>
+                      <m:t>  ,  </m:t>
+                    </m:r>
+                    <m:d>
+                      <m:dPr>
+                        <m:begChr m:val="‖"/>
+                        <m:endChr m:val="‖"/>
+                        <m:ctrlPr>
+                          <a:rPr lang="en-GB" b="0" i="1" smtClean="0">
+                            <a:latin typeface="Cambria Math" panose="02040503050406030204" pitchFamily="18" charset="0"/>
+                          </a:rPr>
+                        </m:ctrlPr>
+                      </m:dPr>
+                      <m:e>
+                        <m:acc>
+                          <m:accPr>
+                            <m:chr m:val="⃗"/>
+                            <m:ctrlPr>
+                              <a:rPr lang="en-GB" b="0" i="1" smtClean="0">
+                                <a:latin typeface="Cambria Math" panose="02040503050406030204" pitchFamily="18" charset="0"/>
+                              </a:rPr>
+                            </m:ctrlPr>
+                          </m:accPr>
+                          <m:e>
+                            <m:r>
+                              <a:rPr lang="en-GB" b="0" i="1" smtClean="0">
+                                <a:latin typeface="Cambria Math" panose="02040503050406030204" pitchFamily="18" charset="0"/>
+                              </a:rPr>
+                              <m:t>𝑥</m:t>
+                            </m:r>
+                          </m:e>
+                        </m:acc>
+                        <m:r>
+                          <a:rPr lang="en-GB" b="0" i="1" smtClean="0">
+                            <a:latin typeface="Cambria Math" panose="02040503050406030204" pitchFamily="18" charset="0"/>
+                          </a:rPr>
+                          <m:t>−</m:t>
+                        </m:r>
+                        <m:acc>
+                          <m:accPr>
+                            <m:chr m:val="⃗"/>
+                            <m:ctrlPr>
+                              <a:rPr lang="en-GB" b="0" i="1" smtClean="0">
+                                <a:latin typeface="Cambria Math" panose="02040503050406030204" pitchFamily="18" charset="0"/>
+                              </a:rPr>
+                            </m:ctrlPr>
+                          </m:accPr>
+                          <m:e>
+                            <m:r>
+                              <a:rPr lang="en-GB" b="0" i="1" smtClean="0">
+                                <a:latin typeface="Cambria Math" panose="02040503050406030204" pitchFamily="18" charset="0"/>
+                              </a:rPr>
+                              <m:t>𝑦</m:t>
+                            </m:r>
+                          </m:e>
+                        </m:acc>
+                      </m:e>
+                    </m:d>
+                    <m:r>
+                      <a:rPr lang="en-GB" b="0" i="1" smtClean="0">
+                        <a:latin typeface="Cambria Math" panose="02040503050406030204" pitchFamily="18" charset="0"/>
+                        <a:ea typeface="Cambria Math" panose="02040503050406030204" pitchFamily="18" charset="0"/>
+                      </a:rPr>
+                      <m:t>≤</m:t>
+                    </m:r>
+                    <m:r>
+                      <a:rPr lang="en-GB" b="0" i="1" smtClean="0">
+                        <a:latin typeface="Cambria Math" panose="02040503050406030204" pitchFamily="18" charset="0"/>
+                        <a:ea typeface="Cambria Math" panose="02040503050406030204" pitchFamily="18" charset="0"/>
+                      </a:rPr>
+                      <m:t>𝛿</m:t>
+                    </m:r>
+                  </m:oMath>
+                </a14:m>
+                <a:r>
+                  <a:rPr lang="de-DE" b="0" dirty="0"/>
+                  <a:t>.</a:t>
+                </a:r>
+              </a:p>
+              <a:p>
+                <a:pPr marL="342900" lvl="1" indent="-342900" algn="just">
+                  <a:spcAft>
+                    <a:spcPts val="100"/>
+                  </a:spcAft>
+                  <a:buFont typeface="Arial" panose="020B0604020202020204" pitchFamily="34" charset="0"/>
+                  <a:buChar char="•"/>
+                </a:pPr>
+                <a:r>
+                  <a:rPr lang="de-DE" dirty="0"/>
+                  <a:t>Direct Bias:   </a:t>
+                </a:r>
+                <a14:m>
+                  <m:oMath xmlns:m="http://schemas.openxmlformats.org/officeDocument/2006/math">
+                    <m:f>
+                      <m:fPr>
+                        <m:ctrlPr>
+                          <a:rPr lang="de-DE" b="0" i="1" smtClean="0">
+                            <a:latin typeface="Cambria Math" panose="02040503050406030204" pitchFamily="18" charset="0"/>
+                          </a:rPr>
+                        </m:ctrlPr>
+                      </m:fPr>
+                      <m:num>
+                        <m:r>
+                          <a:rPr lang="en-GB" b="0" i="1" smtClean="0">
+                            <a:latin typeface="Cambria Math" panose="02040503050406030204" pitchFamily="18" charset="0"/>
+                          </a:rPr>
+                          <m:t>1</m:t>
+                        </m:r>
+                      </m:num>
+                      <m:den>
+                        <m:d>
+                          <m:dPr>
+                            <m:begChr m:val="|"/>
+                            <m:endChr m:val="|"/>
+                            <m:ctrlPr>
+                              <a:rPr lang="de-DE" b="0" i="1" smtClean="0">
+                                <a:latin typeface="Cambria Math" panose="02040503050406030204" pitchFamily="18" charset="0"/>
+                              </a:rPr>
+                            </m:ctrlPr>
+                          </m:dPr>
+                          <m:e>
+                            <m:r>
+                              <a:rPr lang="en-GB" b="0" i="1" smtClean="0">
+                                <a:latin typeface="Cambria Math" panose="02040503050406030204" pitchFamily="18" charset="0"/>
+                              </a:rPr>
+                              <m:t>𝑁</m:t>
+                            </m:r>
+                          </m:e>
+                        </m:d>
+                      </m:den>
+                    </m:f>
+                    <m:nary>
+                      <m:naryPr>
+                        <m:chr m:val="∑"/>
+                        <m:limLoc m:val="subSup"/>
+                        <m:supHide m:val="on"/>
+                        <m:ctrlPr>
+                          <a:rPr lang="de-DE" b="0" i="1" smtClean="0">
+                            <a:latin typeface="Cambria Math" panose="02040503050406030204" pitchFamily="18" charset="0"/>
+                          </a:rPr>
+                        </m:ctrlPr>
+                      </m:naryPr>
+                      <m:sub>
+                        <m:r>
+                          <m:rPr>
+                            <m:brk m:alnAt="9"/>
+                          </m:rPr>
+                          <a:rPr lang="en-GB" b="0" i="1" smtClean="0">
+                            <a:latin typeface="Cambria Math" panose="02040503050406030204" pitchFamily="18" charset="0"/>
+                          </a:rPr>
+                          <m:t>𝑤</m:t>
+                        </m:r>
+                        <m:r>
+                          <a:rPr lang="en-GB" b="0" i="1" smtClean="0">
+                            <a:latin typeface="Cambria Math" panose="02040503050406030204" pitchFamily="18" charset="0"/>
+                            <a:ea typeface="Cambria Math" panose="02040503050406030204" pitchFamily="18" charset="0"/>
+                          </a:rPr>
+                          <m:t>∈</m:t>
+                        </m:r>
+                        <m:r>
+                          <a:rPr lang="en-GB" b="0" i="1" smtClean="0">
+                            <a:latin typeface="Cambria Math" panose="02040503050406030204" pitchFamily="18" charset="0"/>
+                            <a:ea typeface="Cambria Math" panose="02040503050406030204" pitchFamily="18" charset="0"/>
+                          </a:rPr>
+                          <m:t>𝑁</m:t>
+                        </m:r>
+                      </m:sub>
+                      <m:sup/>
+                      <m:e>
+                        <m:sSup>
+                          <m:sSupPr>
+                            <m:ctrlPr>
+                              <a:rPr lang="de-DE" b="0" i="1" smtClean="0">
+                                <a:latin typeface="Cambria Math" panose="02040503050406030204" pitchFamily="18" charset="0"/>
+                              </a:rPr>
+                            </m:ctrlPr>
+                          </m:sSupPr>
+                          <m:e>
+                            <m:d>
+                              <m:dPr>
+                                <m:begChr m:val="|"/>
+                                <m:endChr m:val="|"/>
+                                <m:ctrlPr>
+                                  <a:rPr lang="de-DE" b="0" i="1" smtClean="0">
+                                    <a:latin typeface="Cambria Math" panose="02040503050406030204" pitchFamily="18" charset="0"/>
+                                  </a:rPr>
+                                </m:ctrlPr>
+                              </m:dPr>
+                              <m:e>
+                                <m:func>
+                                  <m:funcPr>
+                                    <m:ctrlPr>
+                                      <a:rPr lang="de-DE" b="0" i="1" smtClean="0">
+                                        <a:latin typeface="Cambria Math" panose="02040503050406030204" pitchFamily="18" charset="0"/>
+                                      </a:rPr>
+                                    </m:ctrlPr>
+                                  </m:funcPr>
+                                  <m:fName>
+                                    <m:r>
+                                      <m:rPr>
+                                        <m:sty m:val="p"/>
+                                      </m:rPr>
+                                      <a:rPr lang="de-DE" b="0" i="0" smtClean="0">
+                                        <a:latin typeface="Cambria Math" panose="02040503050406030204" pitchFamily="18" charset="0"/>
+                                      </a:rPr>
+                                      <m:t>cos</m:t>
+                                    </m:r>
+                                  </m:fName>
+                                  <m:e>
+                                    <m:d>
+                                      <m:dPr>
+                                        <m:ctrlPr>
+                                          <a:rPr lang="de-DE" b="0" i="1" smtClean="0">
+                                            <a:latin typeface="Cambria Math" panose="02040503050406030204" pitchFamily="18" charset="0"/>
+                                          </a:rPr>
+                                        </m:ctrlPr>
+                                      </m:dPr>
+                                      <m:e>
+                                        <m:acc>
+                                          <m:accPr>
+                                            <m:chr m:val="⃗"/>
+                                            <m:ctrlPr>
+                                              <a:rPr lang="de-DE" b="0" i="1" smtClean="0">
+                                                <a:latin typeface="Cambria Math" panose="02040503050406030204" pitchFamily="18" charset="0"/>
+                                              </a:rPr>
+                                            </m:ctrlPr>
+                                          </m:accPr>
+                                          <m:e>
+                                            <m:r>
+                                              <a:rPr lang="en-GB" b="0" i="1" smtClean="0">
+                                                <a:latin typeface="Cambria Math" panose="02040503050406030204" pitchFamily="18" charset="0"/>
+                                              </a:rPr>
+                                              <m:t>𝑤</m:t>
+                                            </m:r>
+                                          </m:e>
+                                        </m:acc>
+                                        <m:r>
+                                          <a:rPr lang="en-GB" b="0" i="1" smtClean="0">
+                                            <a:latin typeface="Cambria Math" panose="02040503050406030204" pitchFamily="18" charset="0"/>
+                                          </a:rPr>
+                                          <m:t>,</m:t>
+                                        </m:r>
+                                        <m:r>
+                                          <a:rPr lang="en-GB" b="0" i="1" smtClean="0">
+                                            <a:latin typeface="Cambria Math" panose="02040503050406030204" pitchFamily="18" charset="0"/>
+                                          </a:rPr>
+                                          <m:t>𝑔</m:t>
+                                        </m:r>
+                                      </m:e>
+                                    </m:d>
+                                  </m:e>
+                                </m:func>
+                              </m:e>
+                            </m:d>
+                          </m:e>
+                          <m:sup>
+                            <m:r>
+                              <a:rPr lang="en-GB" b="0" i="1" smtClean="0">
+                                <a:latin typeface="Cambria Math" panose="02040503050406030204" pitchFamily="18" charset="0"/>
+                              </a:rPr>
+                              <m:t>𝑐</m:t>
+                            </m:r>
+                          </m:sup>
+                        </m:sSup>
+                      </m:e>
+                    </m:nary>
+                  </m:oMath>
+                </a14:m>
+                <a:r>
+                  <a:rPr lang="de-DE" b="0" dirty="0"/>
+                  <a:t>  , </a:t>
+                </a:r>
+                <a:r>
+                  <a:rPr lang="de-DE" b="0" spc="-150" dirty="0"/>
+                  <a:t>for gender direction/ basis </a:t>
+                </a:r>
+                <a14:m>
+                  <m:oMath xmlns:m="http://schemas.openxmlformats.org/officeDocument/2006/math">
+                    <m:r>
+                      <a:rPr lang="en-GB" b="0" i="1" spc="-150" smtClean="0">
+                        <a:latin typeface="Cambria Math" panose="02040503050406030204" pitchFamily="18" charset="0"/>
+                      </a:rPr>
+                      <m:t>𝑔</m:t>
+                    </m:r>
+                  </m:oMath>
+                </a14:m>
+                <a:r>
+                  <a:rPr lang="de-DE" b="0" spc="-150" dirty="0"/>
+                  <a:t>.</a:t>
+                </a:r>
+              </a:p>
+              <a:p>
+                <a:pPr lvl="1" algn="just"/>
+                <a:endParaRPr lang="de-DE" dirty="0"/>
+              </a:p>
+              <a:p>
+                <a:pPr lvl="1" algn="just"/>
+                <a:r>
+                  <a:rPr lang="de-DE" sz="2800" dirty="0"/>
+                  <a:t>Debiasing Algorithm</a:t>
+                </a:r>
+              </a:p>
+              <a:p>
+                <a:pPr algn="just"/>
+                <a:r>
+                  <a:rPr lang="de-DE" dirty="0"/>
+                  <a:t>Lorem ipsum dolor sit amet, consetetur sadipscing elitr, sed diam nonumy eirmod tempor invidunt ut labore et dolore magna aliquyam erat, sed diam voluptua. At vero eos et accusam et justo duo dolores et ea rebum. Stet clita kasd gubergren, no sea takimata sanctus est Lorem ipsum dolor sit amet. Lorem ipsum dolor sit amet, consetetur sadipscing elitr, sed diam nonumy eirmod tempor invidunt ut labore et dolore magna aliquyam erat, sed diam voluptua. At vero eos et accusam et justo duo dolores et ea rebum. Stet clita kasd gubergren, no sea takimata sanctus est Lorem ipsum dolor sit amet.</a:t>
+                </a:r>
+              </a:p>
+              <a:p>
+                <a:pPr algn="just"/>
+                <a:endParaRPr lang="de-DE" dirty="0"/>
+              </a:p>
+            </p:txBody>
+          </p:sp>
+        </mc:Choice>
+        <mc:Fallback>
+          <p:sp>
+            <p:nvSpPr>
+              <p:cNvPr id="16" name="Text Placeholder 4">
+                <a:extLst>
+                  <a:ext uri="{FF2B5EF4-FFF2-40B4-BE49-F238E27FC236}">
+                    <a16:creationId xmlns:a16="http://schemas.microsoft.com/office/drawing/2014/main" id="{88DD5B5C-4F29-4C4C-B4F8-171086B1C3FE}"/>
+                  </a:ext>
+                </a:extLst>
+              </p:cNvPr>
+              <p:cNvSpPr txBox="1">
+                <a:spLocks noRot="1" noChangeAspect="1" noMove="1" noResize="1" noEditPoints="1" noAdjustHandles="1" noChangeArrowheads="1" noChangeShapeType="1" noTextEdit="1"/>
+              </p:cNvSpPr>
+              <p:nvPr/>
+            </p:nvSpPr>
+            <p:spPr>
+              <a:xfrm>
+                <a:off x="11114329" y="9829304"/>
+                <a:ext cx="8047339" cy="8208912"/>
+              </a:xfrm>
+              <a:prstGeom prst="rect">
+                <a:avLst/>
+              </a:prstGeom>
+              <a:blipFill>
+                <a:blip r:embed="rId6"/>
+                <a:stretch>
+                  <a:fillRect l="-2652" t="-2227" r="-2121"/>
+                </a:stretch>
+              </a:blipFill>
+            </p:spPr>
+            <p:txBody>
+              <a:bodyPr/>
+              <a:lstStyle/>
+              <a:p>
+                <a:r>
+                  <a:rPr lang="en-GB">
+                    <a:noFill/>
+                  </a:rPr>
+                  <a:t> </a:t>
+                </a:r>
+              </a:p>
+            </p:txBody>
+          </p:sp>
+        </mc:Fallback>
+      </mc:AlternateContent>
       <p:sp>
         <p:nvSpPr>
           <p:cNvPr id="17" name="Text Placeholder 4">
@@ -28285,43 +30588,6 @@
           </a:p>
         </p:txBody>
       </p:sp>
-      <p:pic>
-        <p:nvPicPr>
-          <p:cNvPr id="18" name="Picture Placeholder 14">
-            <a:extLst>
-              <a:ext uri="{FF2B5EF4-FFF2-40B4-BE49-F238E27FC236}">
-                <a16:creationId xmlns:a16="http://schemas.microsoft.com/office/drawing/2014/main" id="{CC39981D-C2AD-4AD8-A3FA-3CFC6755E04F}"/>
-              </a:ext>
-            </a:extLst>
-          </p:cNvPr>
-          <p:cNvPicPr>
-            <a:picLocks noChangeAspect="1"/>
-          </p:cNvPicPr>
-          <p:nvPr/>
-        </p:nvPicPr>
-        <p:blipFill>
-          <a:blip r:embed="rId4">
-            <a:extLst>
-              <a:ext uri="{28A0092B-C50C-407E-A947-70E740481C1C}">
-                <a14:useLocalDpi xmlns:a14="http://schemas.microsoft.com/office/drawing/2010/main" val="0"/>
-              </a:ext>
-            </a:extLst>
-          </a:blip>
-          <a:srcRect l="19756" r="19756"/>
-          <a:stretch>
-            <a:fillRect/>
-          </a:stretch>
-        </p:blipFill>
-        <p:spPr>
-          <a:xfrm>
-            <a:off x="11093592" y="4443918"/>
-            <a:ext cx="8043314" cy="5764293"/>
-          </a:xfrm>
-          <a:prstGeom prst="rect">
-            <a:avLst/>
-          </a:prstGeom>
-        </p:spPr>
-      </p:pic>
       <p:sp>
         <p:nvSpPr>
           <p:cNvPr id="19" name="Text Placeholder 2">
@@ -28338,7 +30604,7 @@
         </p:nvSpPr>
         <p:spPr>
           <a:xfrm>
-            <a:off x="11114330" y="10549384"/>
+            <a:off x="11114330" y="8793968"/>
             <a:ext cx="8043314" cy="216024"/>
           </a:xfrm>
           <a:prstGeom prst="rect">
@@ -28486,10 +30752,9 @@
           </a:lstStyle>
           <a:p>
             <a:r>
-              <a:rPr lang="de-DE"/>
+              <a:rPr lang="de-DE" dirty="0"/>
               <a:t>Bildunterschrift, Autor</a:t>
             </a:r>
-            <a:endParaRPr lang="de-DE" dirty="0"/>
           </a:p>
         </p:txBody>
       </p:sp>
@@ -28508,7 +30773,7 @@
           <p:nvPr/>
         </p:nvPicPr>
         <p:blipFill>
-          <a:blip r:embed="rId4">
+          <a:blip r:embed="rId7">
             <a:extLst>
               <a:ext uri="{28A0092B-C50C-407E-A947-70E740481C1C}">
                 <a14:useLocalDpi xmlns:a14="http://schemas.microsoft.com/office/drawing/2010/main" val="0"/>
@@ -28899,7 +31164,7 @@
     </p:spTree>
     <p:extLst>
       <p:ext uri="{BB962C8B-B14F-4D97-AF65-F5344CB8AC3E}">
-        <p14:creationId xmlns:p14="http://schemas.microsoft.com/office/powerpoint/2010/main" val="3843448928"/>
+        <p14:creationId xmlns:p14="http://schemas.microsoft.com/office/powerpoint/2010/main" val="4075462722"/>
       </p:ext>
     </p:extLst>
   </p:cSld>

</xml_diff>

<commit_message>
Add section 4 first draft
</commit_message>
<xml_diff>
--- a/Information Retrieval - Poster Session/presentation_template.pptx
+++ b/Information Retrieval - Poster Session/presentation_template.pptx
@@ -27665,8 +27665,8 @@
           </a:p>
         </p:txBody>
       </p:sp>
-      <mc:AlternateContent xmlns:mc="http://schemas.openxmlformats.org/markup-compatibility/2006">
-        <mc:Choice xmlns:a14="http://schemas.microsoft.com/office/drawing/2010/main" Requires="a14">
+      <mc:AlternateContent xmlns:mc="http://schemas.openxmlformats.org/markup-compatibility/2006" xmlns:a14="http://schemas.microsoft.com/office/drawing/2010/main">
+        <mc:Choice Requires="a14">
           <p:sp>
             <p:nvSpPr>
               <p:cNvPr id="5" name="Text Placeholder 4">
@@ -27957,7 +27957,7 @@
             </p:txBody>
           </p:sp>
         </mc:Choice>
-        <mc:Fallback>
+        <mc:Fallback xmlns="">
           <p:sp>
             <p:nvSpPr>
               <p:cNvPr id="5" name="Text Placeholder 4">
@@ -29773,40 +29773,37 @@
                 </a:r>
               </a:p>
               <a:p>
-                <a:pPr marL="342900" lvl="1" indent="-342900" algn="just">
-                  <a:spcAft>
-                    <a:spcPts val="100"/>
-                  </a:spcAft>
+                <a:pPr marL="342900" indent="-342900" algn="just">
                   <a:buFont typeface="Arial" panose="020B0604020202020204" pitchFamily="34" charset="0"/>
                   <a:buChar char="•"/>
                 </a:pPr>
                 <a:r>
-                  <a:rPr lang="de-DE" dirty="0"/>
+                  <a:rPr lang="de-DE" b="1" dirty="0"/>
                   <a:t>Occupational Stereotypes:</a:t>
                 </a:r>
                 <a:r>
-                  <a:rPr lang="de-DE" b="0" spc="-150" dirty="0"/>
+                  <a:rPr lang="de-DE" spc="-150" dirty="0"/>
                   <a:t> Crowdwork evaluated occupational stereotypes strongly correlated with s</a:t>
                 </a:r>
                 <a:r>
-                  <a:rPr lang="de-DE" b="0" i="1" spc="-150" dirty="0"/>
+                  <a:rPr lang="de-DE" i="1" spc="-150" dirty="0"/>
                   <a:t>he-he</a:t>
                 </a:r>
                 <a:r>
-                  <a:rPr lang="de-DE" b="0" spc="-150" dirty="0"/>
+                  <a:rPr lang="de-DE" spc="-150" dirty="0"/>
                   <a:t> axis projections ( </a:t>
                 </a:r>
                 <a14:m>
                   <m:oMath xmlns:m="http://schemas.openxmlformats.org/officeDocument/2006/math">
                     <m:r>
-                      <a:rPr lang="de-DE" b="0" i="1" spc="-150" smtClean="0">
+                      <a:rPr lang="de-DE" i="1" spc="-150">
                         <a:latin typeface="Cambria Math" panose="02040503050406030204" pitchFamily="18" charset="0"/>
                         <a:ea typeface="Cambria Math" panose="02040503050406030204" pitchFamily="18" charset="0"/>
                       </a:rPr>
                       <m:t>𝜌</m:t>
                     </m:r>
                     <m:r>
-                      <a:rPr lang="en-GB" b="0" i="1" spc="-150" smtClean="0">
+                      <a:rPr lang="en-GB" i="1" spc="-150">
                         <a:latin typeface="Cambria Math" panose="02040503050406030204" pitchFamily="18" charset="0"/>
                         <a:ea typeface="Cambria Math" panose="02040503050406030204" pitchFamily="18" charset="0"/>
                       </a:rPr>
@@ -29815,39 +29812,35 @@
                   </m:oMath>
                 </a14:m>
                 <a:r>
-                  <a:rPr lang="de-DE" b="0" spc="-150" dirty="0"/>
+                  <a:rPr lang="de-DE" spc="-150" dirty="0"/>
                   <a:t> ).</a:t>
                 </a:r>
-                <a:endParaRPr lang="de-DE" b="0" dirty="0"/>
               </a:p>
               <a:p>
-                <a:pPr marL="342900" lvl="1" indent="-342900" algn="just">
-                  <a:spcAft>
-                    <a:spcPts val="100"/>
-                  </a:spcAft>
+                <a:pPr marL="342900" indent="-342900" algn="just">
                   <a:buFont typeface="Arial" panose="020B0604020202020204" pitchFamily="34" charset="0"/>
                   <a:buChar char="•"/>
                 </a:pPr>
                 <a:r>
-                  <a:rPr lang="de-DE" dirty="0"/>
+                  <a:rPr lang="de-DE" b="1" dirty="0"/>
                   <a:t>Stereotypical Anologies:</a:t>
                 </a:r>
                 <a:r>
-                  <a:rPr lang="de-DE" b="0" dirty="0"/>
+                  <a:rPr lang="de-DE" dirty="0"/>
                   <a:t> Scored </a:t>
                 </a:r>
                 <a:r>
-                  <a:rPr lang="de-DE" b="0" i="1" dirty="0"/>
+                  <a:rPr lang="de-DE" i="1" dirty="0"/>
                   <a:t>she-he</a:t>
                 </a:r>
                 <a:r>
-                  <a:rPr lang="de-DE" b="0" dirty="0"/>
+                  <a:rPr lang="de-DE" dirty="0"/>
                   <a:t> anologies are rated via crowdwork as (a) gender-appropriate (b) stereotypic. Scoring metric: </a:t>
                 </a:r>
                 <a14:m>
                   <m:oMath xmlns:m="http://schemas.openxmlformats.org/officeDocument/2006/math">
                     <m:r>
-                      <a:rPr lang="en-GB" b="0" i="1" smtClean="0">
+                      <a:rPr lang="en-GB" i="1">
                         <a:latin typeface="Cambria Math" panose="02040503050406030204" pitchFamily="18" charset="0"/>
                       </a:rPr>
                       <m:t>𝑆</m:t>
@@ -29855,26 +29848,26 @@
                     <m:d>
                       <m:dPr>
                         <m:ctrlPr>
-                          <a:rPr lang="en-GB" b="0" i="1" smtClean="0">
+                          <a:rPr lang="en-GB" i="1">
                             <a:latin typeface="Cambria Math" panose="02040503050406030204" pitchFamily="18" charset="0"/>
                           </a:rPr>
                         </m:ctrlPr>
                       </m:dPr>
                       <m:e>
                         <m:r>
-                          <a:rPr lang="en-GB" b="0" i="1" smtClean="0">
+                          <a:rPr lang="en-GB" i="1">
                             <a:latin typeface="Cambria Math" panose="02040503050406030204" pitchFamily="18" charset="0"/>
                           </a:rPr>
                           <m:t>𝑥</m:t>
                         </m:r>
                         <m:r>
-                          <a:rPr lang="en-GB" b="0" i="1" smtClean="0">
+                          <a:rPr lang="en-GB" i="1">
                             <a:latin typeface="Cambria Math" panose="02040503050406030204" pitchFamily="18" charset="0"/>
                           </a:rPr>
                           <m:t>, </m:t>
                         </m:r>
                         <m:r>
-                          <a:rPr lang="en-GB" b="0" i="1" smtClean="0">
+                          <a:rPr lang="en-GB" i="1">
                             <a:latin typeface="Cambria Math" panose="02040503050406030204" pitchFamily="18" charset="0"/>
                           </a:rPr>
                           <m:t>𝑦</m:t>
@@ -29882,7 +29875,7 @@
                       </m:e>
                     </m:d>
                     <m:r>
-                      <a:rPr lang="en-GB" b="0" i="1" smtClean="0">
+                      <a:rPr lang="en-GB" i="1">
                         <a:latin typeface="Cambria Math" panose="02040503050406030204" pitchFamily="18" charset="0"/>
                       </a:rPr>
                       <m:t>=</m:t>
@@ -29890,7 +29883,7 @@
                     <m:func>
                       <m:funcPr>
                         <m:ctrlPr>
-                          <a:rPr lang="en-GB" b="0" i="1" smtClean="0">
+                          <a:rPr lang="en-GB" i="1">
                             <a:latin typeface="Cambria Math" panose="02040503050406030204" pitchFamily="18" charset="0"/>
                           </a:rPr>
                         </m:ctrlPr>
@@ -29900,7 +29893,7 @@
                           <m:rPr>
                             <m:sty m:val="p"/>
                           </m:rPr>
-                          <a:rPr lang="en-GB" b="0" i="0" smtClean="0">
+                          <a:rPr lang="en-GB">
                             <a:latin typeface="Cambria Math" panose="02040503050406030204" pitchFamily="18" charset="0"/>
                           </a:rPr>
                           <m:t>cos</m:t>
@@ -29910,7 +29903,7 @@
                         <m:d>
                           <m:dPr>
                             <m:ctrlPr>
-                              <a:rPr lang="en-GB" b="0" i="1" smtClean="0">
+                              <a:rPr lang="en-GB" i="1">
                                 <a:latin typeface="Cambria Math" panose="02040503050406030204" pitchFamily="18" charset="0"/>
                               </a:rPr>
                             </m:ctrlPr>
@@ -29920,14 +29913,14 @@
                               <m:accPr>
                                 <m:chr m:val="⃗"/>
                                 <m:ctrlPr>
-                                  <a:rPr lang="en-GB" b="0" i="1" smtClean="0">
+                                  <a:rPr lang="en-GB" b="1" i="1">
                                     <a:latin typeface="Cambria Math" panose="02040503050406030204" pitchFamily="18" charset="0"/>
                                   </a:rPr>
                                 </m:ctrlPr>
                               </m:accPr>
                               <m:e>
                                 <m:r>
-                                  <a:rPr lang="en-GB" b="0" i="1" smtClean="0">
+                                  <a:rPr lang="en-GB" b="0" i="1">
                                     <a:latin typeface="Cambria Math" panose="02040503050406030204" pitchFamily="18" charset="0"/>
                                   </a:rPr>
                                   <m:t>𝑠h𝑒</m:t>
@@ -29935,7 +29928,7 @@
                               </m:e>
                             </m:acc>
                             <m:r>
-                              <a:rPr lang="en-GB" b="0" i="1" smtClean="0">
+                              <a:rPr lang="en-GB" i="1">
                                 <a:latin typeface="Cambria Math" panose="02040503050406030204" pitchFamily="18" charset="0"/>
                               </a:rPr>
                               <m:t>−</m:t>
@@ -29944,14 +29937,14 @@
                               <m:accPr>
                                 <m:chr m:val="⃗"/>
                                 <m:ctrlPr>
-                                  <a:rPr lang="en-GB" b="0" i="1" smtClean="0">
+                                  <a:rPr lang="en-GB" b="1" i="1">
                                     <a:latin typeface="Cambria Math" panose="02040503050406030204" pitchFamily="18" charset="0"/>
                                   </a:rPr>
                                 </m:ctrlPr>
                               </m:accPr>
                               <m:e>
                                 <m:r>
-                                  <a:rPr lang="en-GB" b="0" i="1" smtClean="0">
+                                  <a:rPr lang="en-GB" b="0" i="1">
                                     <a:latin typeface="Cambria Math" panose="02040503050406030204" pitchFamily="18" charset="0"/>
                                   </a:rPr>
                                   <m:t>h𝑒</m:t>
@@ -29959,7 +29952,7 @@
                               </m:e>
                             </m:acc>
                             <m:r>
-                              <a:rPr lang="en-GB" b="0" i="1" smtClean="0">
+                              <a:rPr lang="en-GB" i="1">
                                 <a:latin typeface="Cambria Math" panose="02040503050406030204" pitchFamily="18" charset="0"/>
                               </a:rPr>
                               <m:t>, </m:t>
@@ -29968,14 +29961,14 @@
                               <m:accPr>
                                 <m:chr m:val="⃗"/>
                                 <m:ctrlPr>
-                                  <a:rPr lang="en-GB" b="0" i="1" smtClean="0">
+                                  <a:rPr lang="en-GB" i="1">
                                     <a:latin typeface="Cambria Math" panose="02040503050406030204" pitchFamily="18" charset="0"/>
                                   </a:rPr>
                                 </m:ctrlPr>
                               </m:accPr>
                               <m:e>
                                 <m:r>
-                                  <a:rPr lang="en-GB" b="0" i="1" smtClean="0">
+                                  <a:rPr lang="en-GB" i="1">
                                     <a:latin typeface="Cambria Math" panose="02040503050406030204" pitchFamily="18" charset="0"/>
                                   </a:rPr>
                                   <m:t>𝑥</m:t>
@@ -29983,7 +29976,7 @@
                               </m:e>
                             </m:acc>
                             <m:r>
-                              <a:rPr lang="en-GB" b="0" i="1" smtClean="0">
+                              <a:rPr lang="en-GB" i="1">
                                 <a:latin typeface="Cambria Math" panose="02040503050406030204" pitchFamily="18" charset="0"/>
                               </a:rPr>
                               <m:t>−</m:t>
@@ -29992,14 +29985,14 @@
                               <m:accPr>
                                 <m:chr m:val="⃗"/>
                                 <m:ctrlPr>
-                                  <a:rPr lang="en-GB" b="0" i="1" smtClean="0">
+                                  <a:rPr lang="en-GB" i="1">
                                     <a:latin typeface="Cambria Math" panose="02040503050406030204" pitchFamily="18" charset="0"/>
                                   </a:rPr>
                                 </m:ctrlPr>
                               </m:accPr>
                               <m:e>
                                 <m:r>
-                                  <a:rPr lang="en-GB" b="0" i="1" smtClean="0">
+                                  <a:rPr lang="en-GB" i="1">
                                     <a:latin typeface="Cambria Math" panose="02040503050406030204" pitchFamily="18" charset="0"/>
                                   </a:rPr>
                                   <m:t>𝑦</m:t>
@@ -30011,7 +30004,7 @@
                       </m:e>
                     </m:func>
                     <m:r>
-                      <a:rPr lang="en-GB" b="0" i="0" smtClean="0">
+                      <a:rPr lang="en-GB">
                         <a:latin typeface="Cambria Math" panose="02040503050406030204" pitchFamily="18" charset="0"/>
                       </a:rPr>
                       <m:t>  ,  </m:t>
@@ -30021,7 +30014,7 @@
                         <m:begChr m:val="‖"/>
                         <m:endChr m:val="‖"/>
                         <m:ctrlPr>
-                          <a:rPr lang="en-GB" b="0" i="1" smtClean="0">
+                          <a:rPr lang="en-GB" i="1">
                             <a:latin typeface="Cambria Math" panose="02040503050406030204" pitchFamily="18" charset="0"/>
                           </a:rPr>
                         </m:ctrlPr>
@@ -30031,14 +30024,14 @@
                           <m:accPr>
                             <m:chr m:val="⃗"/>
                             <m:ctrlPr>
-                              <a:rPr lang="en-GB" b="0" i="1" smtClean="0">
+                              <a:rPr lang="en-GB" i="1">
                                 <a:latin typeface="Cambria Math" panose="02040503050406030204" pitchFamily="18" charset="0"/>
                               </a:rPr>
                             </m:ctrlPr>
                           </m:accPr>
                           <m:e>
                             <m:r>
-                              <a:rPr lang="en-GB" b="0" i="1" smtClean="0">
+                              <a:rPr lang="en-GB" i="1">
                                 <a:latin typeface="Cambria Math" panose="02040503050406030204" pitchFamily="18" charset="0"/>
                               </a:rPr>
                               <m:t>𝑥</m:t>
@@ -30046,7 +30039,7 @@
                           </m:e>
                         </m:acc>
                         <m:r>
-                          <a:rPr lang="en-GB" b="0" i="1" smtClean="0">
+                          <a:rPr lang="en-GB" i="1">
                             <a:latin typeface="Cambria Math" panose="02040503050406030204" pitchFamily="18" charset="0"/>
                           </a:rPr>
                           <m:t>−</m:t>
@@ -30055,14 +30048,14 @@
                           <m:accPr>
                             <m:chr m:val="⃗"/>
                             <m:ctrlPr>
-                              <a:rPr lang="en-GB" b="0" i="1" smtClean="0">
+                              <a:rPr lang="en-GB" i="1">
                                 <a:latin typeface="Cambria Math" panose="02040503050406030204" pitchFamily="18" charset="0"/>
                               </a:rPr>
                             </m:ctrlPr>
                           </m:accPr>
                           <m:e>
                             <m:r>
-                              <a:rPr lang="en-GB" b="0" i="1" smtClean="0">
+                              <a:rPr lang="en-GB" i="1">
                                 <a:latin typeface="Cambria Math" panose="02040503050406030204" pitchFamily="18" charset="0"/>
                               </a:rPr>
                               <m:t>𝑦</m:t>
@@ -30072,14 +30065,14 @@
                       </m:e>
                     </m:d>
                     <m:r>
-                      <a:rPr lang="en-GB" b="0" i="1" smtClean="0">
+                      <a:rPr lang="en-GB" i="1">
                         <a:latin typeface="Cambria Math" panose="02040503050406030204" pitchFamily="18" charset="0"/>
                         <a:ea typeface="Cambria Math" panose="02040503050406030204" pitchFamily="18" charset="0"/>
                       </a:rPr>
                       <m:t>≤</m:t>
                     </m:r>
                     <m:r>
-                      <a:rPr lang="en-GB" b="0" i="1" smtClean="0">
+                      <a:rPr lang="en-GB" i="1">
                         <a:latin typeface="Cambria Math" panose="02040503050406030204" pitchFamily="18" charset="0"/>
                         <a:ea typeface="Cambria Math" panose="02040503050406030204" pitchFamily="18" charset="0"/>
                       </a:rPr>
@@ -30088,35 +30081,36 @@
                   </m:oMath>
                 </a14:m>
                 <a:r>
-                  <a:rPr lang="de-DE" b="0" dirty="0"/>
+                  <a:rPr lang="de-DE" dirty="0"/>
                   <a:t>.</a:t>
                 </a:r>
               </a:p>
               <a:p>
-                <a:pPr marL="342900" lvl="1" indent="-342900" algn="just">
-                  <a:spcAft>
-                    <a:spcPts val="100"/>
-                  </a:spcAft>
+                <a:pPr marL="342900" indent="-342900" algn="just">
                   <a:buFont typeface="Arial" panose="020B0604020202020204" pitchFamily="34" charset="0"/>
                   <a:buChar char="•"/>
                 </a:pPr>
                 <a:r>
+                  <a:rPr lang="de-DE" b="1" dirty="0"/>
+                  <a:t>Direct Bias:</a:t>
+                </a:r>
+                <a:r>
                   <a:rPr lang="de-DE" dirty="0"/>
-                  <a:t>Direct Bias:   </a:t>
+                  <a:t>   </a:t>
                 </a:r>
                 <a14:m>
                   <m:oMath xmlns:m="http://schemas.openxmlformats.org/officeDocument/2006/math">
                     <m:f>
                       <m:fPr>
                         <m:ctrlPr>
-                          <a:rPr lang="de-DE" b="0" i="1" smtClean="0">
+                          <a:rPr lang="de-DE" i="1">
                             <a:latin typeface="Cambria Math" panose="02040503050406030204" pitchFamily="18" charset="0"/>
                           </a:rPr>
                         </m:ctrlPr>
                       </m:fPr>
                       <m:num>
                         <m:r>
-                          <a:rPr lang="en-GB" b="0" i="1" smtClean="0">
+                          <a:rPr lang="en-GB" i="1">
                             <a:latin typeface="Cambria Math" panose="02040503050406030204" pitchFamily="18" charset="0"/>
                           </a:rPr>
                           <m:t>1</m:t>
@@ -30128,14 +30122,14 @@
                             <m:begChr m:val="|"/>
                             <m:endChr m:val="|"/>
                             <m:ctrlPr>
-                              <a:rPr lang="de-DE" b="0" i="1" smtClean="0">
+                              <a:rPr lang="de-DE" i="1">
                                 <a:latin typeface="Cambria Math" panose="02040503050406030204" pitchFamily="18" charset="0"/>
                               </a:rPr>
                             </m:ctrlPr>
                           </m:dPr>
                           <m:e>
                             <m:r>
-                              <a:rPr lang="en-GB" b="0" i="1" smtClean="0">
+                              <a:rPr lang="en-GB" i="1">
                                 <a:latin typeface="Cambria Math" panose="02040503050406030204" pitchFamily="18" charset="0"/>
                               </a:rPr>
                               <m:t>𝑁</m:t>
@@ -30150,7 +30144,7 @@
                         <m:limLoc m:val="subSup"/>
                         <m:supHide m:val="on"/>
                         <m:ctrlPr>
-                          <a:rPr lang="de-DE" b="0" i="1" smtClean="0">
+                          <a:rPr lang="de-DE" i="1">
                             <a:latin typeface="Cambria Math" panose="02040503050406030204" pitchFamily="18" charset="0"/>
                           </a:rPr>
                         </m:ctrlPr>
@@ -30160,20 +30154,20 @@
                           <m:rPr>
                             <m:brk m:alnAt="9"/>
                           </m:rPr>
-                          <a:rPr lang="en-GB" b="0" i="1" smtClean="0">
+                          <a:rPr lang="en-GB" i="1">
                             <a:latin typeface="Cambria Math" panose="02040503050406030204" pitchFamily="18" charset="0"/>
                           </a:rPr>
                           <m:t>𝑤</m:t>
                         </m:r>
                         <m:r>
-                          <a:rPr lang="en-GB" b="0" i="1" smtClean="0">
+                          <a:rPr lang="en-GB" i="1">
                             <a:latin typeface="Cambria Math" panose="02040503050406030204" pitchFamily="18" charset="0"/>
                             <a:ea typeface="Cambria Math" panose="02040503050406030204" pitchFamily="18" charset="0"/>
                           </a:rPr>
                           <m:t>∈</m:t>
                         </m:r>
                         <m:r>
-                          <a:rPr lang="en-GB" b="0" i="1" smtClean="0">
+                          <a:rPr lang="en-GB" i="1">
                             <a:latin typeface="Cambria Math" panose="02040503050406030204" pitchFamily="18" charset="0"/>
                             <a:ea typeface="Cambria Math" panose="02040503050406030204" pitchFamily="18" charset="0"/>
                           </a:rPr>
@@ -30185,7 +30179,7 @@
                         <m:sSup>
                           <m:sSupPr>
                             <m:ctrlPr>
-                              <a:rPr lang="de-DE" b="0" i="1" smtClean="0">
+                              <a:rPr lang="de-DE" i="1">
                                 <a:latin typeface="Cambria Math" panose="02040503050406030204" pitchFamily="18" charset="0"/>
                               </a:rPr>
                             </m:ctrlPr>
@@ -30196,7 +30190,7 @@
                                 <m:begChr m:val="|"/>
                                 <m:endChr m:val="|"/>
                                 <m:ctrlPr>
-                                  <a:rPr lang="de-DE" b="0" i="1" smtClean="0">
+                                  <a:rPr lang="de-DE" i="1">
                                     <a:latin typeface="Cambria Math" panose="02040503050406030204" pitchFamily="18" charset="0"/>
                                   </a:rPr>
                                 </m:ctrlPr>
@@ -30205,7 +30199,7 @@
                                 <m:func>
                                   <m:funcPr>
                                     <m:ctrlPr>
-                                      <a:rPr lang="de-DE" b="0" i="1" smtClean="0">
+                                      <a:rPr lang="de-DE" i="1">
                                         <a:latin typeface="Cambria Math" panose="02040503050406030204" pitchFamily="18" charset="0"/>
                                       </a:rPr>
                                     </m:ctrlPr>
@@ -30215,7 +30209,7 @@
                                       <m:rPr>
                                         <m:sty m:val="p"/>
                                       </m:rPr>
-                                      <a:rPr lang="de-DE" b="0" i="0" smtClean="0">
+                                      <a:rPr lang="de-DE">
                                         <a:latin typeface="Cambria Math" panose="02040503050406030204" pitchFamily="18" charset="0"/>
                                       </a:rPr>
                                       <m:t>cos</m:t>
@@ -30225,7 +30219,7 @@
                                     <m:d>
                                       <m:dPr>
                                         <m:ctrlPr>
-                                          <a:rPr lang="de-DE" b="0" i="1" smtClean="0">
+                                          <a:rPr lang="de-DE" i="1">
                                             <a:latin typeface="Cambria Math" panose="02040503050406030204" pitchFamily="18" charset="0"/>
                                           </a:rPr>
                                         </m:ctrlPr>
@@ -30235,14 +30229,14 @@
                                           <m:accPr>
                                             <m:chr m:val="⃗"/>
                                             <m:ctrlPr>
-                                              <a:rPr lang="de-DE" b="0" i="1" smtClean="0">
+                                              <a:rPr lang="de-DE" i="1">
                                                 <a:latin typeface="Cambria Math" panose="02040503050406030204" pitchFamily="18" charset="0"/>
                                               </a:rPr>
                                             </m:ctrlPr>
                                           </m:accPr>
                                           <m:e>
                                             <m:r>
-                                              <a:rPr lang="en-GB" b="0" i="1" smtClean="0">
+                                              <a:rPr lang="en-GB" b="0" i="1">
                                                 <a:latin typeface="Cambria Math" panose="02040503050406030204" pitchFamily="18" charset="0"/>
                                               </a:rPr>
                                               <m:t>𝑤</m:t>
@@ -30250,16 +30244,16 @@
                                           </m:e>
                                         </m:acc>
                                         <m:r>
-                                          <a:rPr lang="en-GB" b="0" i="1" smtClean="0">
+                                          <a:rPr lang="en-GB" i="1">
                                             <a:latin typeface="Cambria Math" panose="02040503050406030204" pitchFamily="18" charset="0"/>
                                           </a:rPr>
                                           <m:t>,</m:t>
                                         </m:r>
                                         <m:r>
-                                          <a:rPr lang="en-GB" b="0" i="1" smtClean="0">
+                                          <a:rPr lang="en-GB" b="1" i="1">
                                             <a:latin typeface="Cambria Math" panose="02040503050406030204" pitchFamily="18" charset="0"/>
                                           </a:rPr>
-                                          <m:t>𝑔</m:t>
+                                          <m:t>𝒈</m:t>
                                         </m:r>
                                       </m:e>
                                     </m:d>
@@ -30270,7 +30264,7 @@
                           </m:e>
                           <m:sup>
                             <m:r>
-                              <a:rPr lang="en-GB" b="0" i="1" smtClean="0">
+                              <a:rPr lang="en-GB" i="1">
                                 <a:latin typeface="Cambria Math" panose="02040503050406030204" pitchFamily="18" charset="0"/>
                               </a:rPr>
                               <m:t>𝑐</m:t>
@@ -30282,17 +30276,17 @@
                   </m:oMath>
                 </a14:m>
                 <a:r>
-                  <a:rPr lang="de-DE" b="0" dirty="0"/>
+                  <a:rPr lang="de-DE" dirty="0"/>
                   <a:t>  , </a:t>
                 </a:r>
                 <a:r>
-                  <a:rPr lang="de-DE" b="0" spc="-150" dirty="0"/>
+                  <a:rPr lang="de-DE" spc="-150" dirty="0"/>
                   <a:t>for gender direction/ basis </a:t>
                 </a:r>
                 <a14:m>
                   <m:oMath xmlns:m="http://schemas.openxmlformats.org/officeDocument/2006/math">
                     <m:r>
-                      <a:rPr lang="en-GB" b="0" i="1" spc="-150" smtClean="0">
+                      <a:rPr lang="en-GB" i="1" spc="-150">
                         <a:latin typeface="Cambria Math" panose="02040503050406030204" pitchFamily="18" charset="0"/>
                       </a:rPr>
                       <m:t>𝑔</m:t>
@@ -30300,7 +30294,7 @@
                   </m:oMath>
                 </a14:m>
                 <a:r>
-                  <a:rPr lang="de-DE" b="0" spc="-150" dirty="0"/>
+                  <a:rPr lang="de-DE" spc="-150" dirty="0"/>
                   <a:t>.</a:t>
                 </a:r>
               </a:p>
@@ -30313,13 +30307,6 @@
                 <a:r>
                   <a:rPr lang="de-DE" sz="2800" dirty="0"/>
                   <a:t>Debiasing Algorithm</a:t>
-                </a:r>
-              </a:p>
-              <a:p>
-                <a:pPr algn="just"/>
-                <a:r>
-                  <a:rPr lang="de-DE" dirty="0"/>
-                  <a:t>Lorem ipsum dolor sit amet, consetetur sadipscing elitr, sed diam nonumy eirmod tempor invidunt ut labore et dolore magna aliquyam erat, sed diam voluptua. At vero eos et accusam et justo duo dolores et ea rebum. Stet clita kasd gubergren, no sea takimata sanctus est Lorem ipsum dolor sit amet. Lorem ipsum dolor sit amet, consetetur sadipscing elitr, sed diam nonumy eirmod tempor invidunt ut labore et dolore magna aliquyam erat, sed diam voluptua. At vero eos et accusam et justo duo dolores et ea rebum. Stet clita kasd gubergren, no sea takimata sanctus est Lorem ipsum dolor sit amet.</a:t>
                 </a:r>
               </a:p>
               <a:p>
@@ -31161,6 +31148,3628 @@
           </a:p>
         </p:txBody>
       </p:sp>
+      <p:grpSp>
+        <p:nvGrpSpPr>
+          <p:cNvPr id="35" name="Group 34">
+            <a:extLst>
+              <a:ext uri="{FF2B5EF4-FFF2-40B4-BE49-F238E27FC236}">
+                <a16:creationId xmlns:a16="http://schemas.microsoft.com/office/drawing/2014/main" id="{DA86399B-069B-4B18-81DE-3DE670252329}"/>
+              </a:ext>
+            </a:extLst>
+          </p:cNvPr>
+          <p:cNvGrpSpPr/>
+          <p:nvPr/>
+        </p:nvGrpSpPr>
+        <p:grpSpPr>
+          <a:xfrm>
+            <a:off x="11087829" y="14184643"/>
+            <a:ext cx="8049076" cy="5581765"/>
+            <a:chOff x="11087829" y="14400667"/>
+            <a:chExt cx="8049076" cy="5581765"/>
+          </a:xfrm>
+        </p:grpSpPr>
+        <p:grpSp>
+          <p:nvGrpSpPr>
+            <p:cNvPr id="33" name="Group 32">
+              <a:extLst>
+                <a:ext uri="{FF2B5EF4-FFF2-40B4-BE49-F238E27FC236}">
+                  <a16:creationId xmlns:a16="http://schemas.microsoft.com/office/drawing/2014/main" id="{FA826E51-63D6-4F28-B786-D3412C5D6826}"/>
+                </a:ext>
+              </a:extLst>
+            </p:cNvPr>
+            <p:cNvGrpSpPr/>
+            <p:nvPr/>
+          </p:nvGrpSpPr>
+          <p:grpSpPr>
+            <a:xfrm>
+              <a:off x="11087829" y="14400667"/>
+              <a:ext cx="8049076" cy="5581765"/>
+              <a:chOff x="11087829" y="15301912"/>
+              <a:chExt cx="8049076" cy="5581765"/>
+            </a:xfrm>
+          </p:grpSpPr>
+          <mc:AlternateContent xmlns:mc="http://schemas.openxmlformats.org/markup-compatibility/2006">
+            <mc:Choice xmlns:a14="http://schemas.microsoft.com/office/drawing/2010/main" Requires="a14">
+              <p:sp>
+                <p:nvSpPr>
+                  <p:cNvPr id="7" name="TextBox 6">
+                    <a:extLst>
+                      <a:ext uri="{FF2B5EF4-FFF2-40B4-BE49-F238E27FC236}">
+                        <a16:creationId xmlns:a16="http://schemas.microsoft.com/office/drawing/2014/main" id="{0AACC856-B243-45CE-884D-7AC6E0144FF6}"/>
+                      </a:ext>
+                    </a:extLst>
+                  </p:cNvPr>
+                  <p:cNvSpPr txBox="1"/>
+                  <p:nvPr/>
+                </p:nvSpPr>
+                <p:spPr>
+                  <a:xfrm>
+                    <a:off x="12043642" y="15301912"/>
+                    <a:ext cx="7093263" cy="5548378"/>
+                  </a:xfrm>
+                  <a:prstGeom prst="rect">
+                    <a:avLst/>
+                  </a:prstGeom>
+                  <a:noFill/>
+                </p:spPr>
+                <p:txBody>
+                  <a:bodyPr wrap="square" rtlCol="0">
+                    <a:spAutoFit/>
+                  </a:bodyPr>
+                  <a:lstStyle/>
+                  <a:p>
+                    <a:pPr lvl="0" indent="-180000" algn="just">
+                      <a:spcAft>
+                        <a:spcPts val="300"/>
+                      </a:spcAft>
+                    </a:pPr>
+                    <a14:m>
+                      <m:oMathPara xmlns:m="http://schemas.openxmlformats.org/officeDocument/2006/math">
+                        <m:oMathParaPr>
+                          <m:jc m:val="left"/>
+                        </m:oMathParaPr>
+                        <m:oMath xmlns:m="http://schemas.openxmlformats.org/officeDocument/2006/math">
+                          <m:sSub>
+                            <m:sSubPr>
+                              <m:ctrlPr>
+                                <a:rPr lang="de-DE" sz="2200" i="1" smtClean="0">
+                                  <a:solidFill>
+                                    <a:prstClr val="black"/>
+                                  </a:solidFill>
+                                  <a:latin typeface="Cambria Math" panose="02040503050406030204" pitchFamily="18" charset="0"/>
+                                </a:rPr>
+                              </m:ctrlPr>
+                            </m:sSubPr>
+                            <m:e>
+                              <m:r>
+                                <a:rPr lang="de-DE" sz="2200" b="1" i="1">
+                                  <a:solidFill>
+                                    <a:prstClr val="black"/>
+                                  </a:solidFill>
+                                  <a:latin typeface="Cambria Math" panose="02040503050406030204" pitchFamily="18" charset="0"/>
+                                  <a:ea typeface="Cambria Math" panose="02040503050406030204" pitchFamily="18" charset="0"/>
+                                </a:rPr>
+                                <m:t>𝝁</m:t>
+                              </m:r>
+                            </m:e>
+                            <m:sub>
+                              <m:r>
+                                <a:rPr lang="en-GB" sz="2200" i="1">
+                                  <a:solidFill>
+                                    <a:prstClr val="black"/>
+                                  </a:solidFill>
+                                  <a:latin typeface="Cambria Math" panose="02040503050406030204" pitchFamily="18" charset="0"/>
+                                </a:rPr>
+                                <m:t>𝑖</m:t>
+                              </m:r>
+                            </m:sub>
+                          </m:sSub>
+                          <m:r>
+                            <a:rPr lang="en-GB" sz="2200" i="1">
+                              <a:solidFill>
+                                <a:prstClr val="black"/>
+                              </a:solidFill>
+                              <a:latin typeface="Cambria Math" panose="02040503050406030204" pitchFamily="18" charset="0"/>
+                            </a:rPr>
+                            <m:t>≔</m:t>
+                          </m:r>
+                          <m:nary>
+                            <m:naryPr>
+                              <m:chr m:val="∑"/>
+                              <m:limLoc m:val="subSup"/>
+                              <m:supHide m:val="on"/>
+                              <m:ctrlPr>
+                                <a:rPr lang="en-GB" sz="2200" i="1">
+                                  <a:solidFill>
+                                    <a:prstClr val="black"/>
+                                  </a:solidFill>
+                                  <a:latin typeface="Cambria Math" panose="02040503050406030204" pitchFamily="18" charset="0"/>
+                                </a:rPr>
+                              </m:ctrlPr>
+                            </m:naryPr>
+                            <m:sub>
+                              <m:r>
+                                <m:rPr>
+                                  <m:brk m:alnAt="9"/>
+                                </m:rPr>
+                                <a:rPr lang="en-GB" sz="2200" i="1">
+                                  <a:solidFill>
+                                    <a:prstClr val="black"/>
+                                  </a:solidFill>
+                                  <a:latin typeface="Cambria Math" panose="02040503050406030204" pitchFamily="18" charset="0"/>
+                                </a:rPr>
+                                <m:t>𝑤</m:t>
+                              </m:r>
+                              <m:r>
+                                <a:rPr lang="en-GB" sz="2200" i="1">
+                                  <a:solidFill>
+                                    <a:prstClr val="black"/>
+                                  </a:solidFill>
+                                  <a:latin typeface="Cambria Math" panose="02040503050406030204" pitchFamily="18" charset="0"/>
+                                  <a:ea typeface="Cambria Math" panose="02040503050406030204" pitchFamily="18" charset="0"/>
+                                </a:rPr>
+                                <m:t>∈</m:t>
+                              </m:r>
+                              <m:sSub>
+                                <m:sSubPr>
+                                  <m:ctrlPr>
+                                    <a:rPr lang="en-GB" sz="2200" i="1">
+                                      <a:solidFill>
+                                        <a:prstClr val="black"/>
+                                      </a:solidFill>
+                                      <a:latin typeface="Cambria Math" panose="02040503050406030204" pitchFamily="18" charset="0"/>
+                                      <a:ea typeface="Cambria Math" panose="02040503050406030204" pitchFamily="18" charset="0"/>
+                                    </a:rPr>
+                                  </m:ctrlPr>
+                                </m:sSubPr>
+                                <m:e>
+                                  <m:r>
+                                    <a:rPr lang="en-GB" sz="2200" i="1">
+                                      <a:solidFill>
+                                        <a:prstClr val="black"/>
+                                      </a:solidFill>
+                                      <a:latin typeface="Cambria Math" panose="02040503050406030204" pitchFamily="18" charset="0"/>
+                                      <a:ea typeface="Cambria Math" panose="02040503050406030204" pitchFamily="18" charset="0"/>
+                                    </a:rPr>
+                                    <m:t>𝐷</m:t>
+                                  </m:r>
+                                </m:e>
+                                <m:sub>
+                                  <m:r>
+                                    <a:rPr lang="en-GB" sz="2200" i="1">
+                                      <a:solidFill>
+                                        <a:prstClr val="black"/>
+                                      </a:solidFill>
+                                      <a:latin typeface="Cambria Math" panose="02040503050406030204" pitchFamily="18" charset="0"/>
+                                      <a:ea typeface="Cambria Math" panose="02040503050406030204" pitchFamily="18" charset="0"/>
+                                    </a:rPr>
+                                    <m:t>𝑖</m:t>
+                                  </m:r>
+                                </m:sub>
+                              </m:sSub>
+                            </m:sub>
+                            <m:sup/>
+                            <m:e>
+                              <m:f>
+                                <m:fPr>
+                                  <m:type m:val="lin"/>
+                                  <m:ctrlPr>
+                                    <a:rPr lang="en-GB" sz="2200" i="1">
+                                      <a:solidFill>
+                                        <a:prstClr val="black"/>
+                                      </a:solidFill>
+                                      <a:latin typeface="Cambria Math" panose="02040503050406030204" pitchFamily="18" charset="0"/>
+                                    </a:rPr>
+                                  </m:ctrlPr>
+                                </m:fPr>
+                                <m:num>
+                                  <m:acc>
+                                    <m:accPr>
+                                      <m:chr m:val="⃗"/>
+                                      <m:ctrlPr>
+                                        <a:rPr lang="en-GB" sz="2200" i="1">
+                                          <a:solidFill>
+                                            <a:prstClr val="black"/>
+                                          </a:solidFill>
+                                          <a:latin typeface="Cambria Math" panose="02040503050406030204" pitchFamily="18" charset="0"/>
+                                        </a:rPr>
+                                      </m:ctrlPr>
+                                    </m:accPr>
+                                    <m:e>
+                                      <m:r>
+                                        <a:rPr lang="en-GB" sz="2200" i="1">
+                                          <a:solidFill>
+                                            <a:prstClr val="black"/>
+                                          </a:solidFill>
+                                          <a:latin typeface="Cambria Math" panose="02040503050406030204" pitchFamily="18" charset="0"/>
+                                        </a:rPr>
+                                        <m:t>𝑤</m:t>
+                                      </m:r>
+                                    </m:e>
+                                  </m:acc>
+                                </m:num>
+                                <m:den>
+                                  <m:d>
+                                    <m:dPr>
+                                      <m:begChr m:val="|"/>
+                                      <m:endChr m:val="|"/>
+                                      <m:ctrlPr>
+                                        <a:rPr lang="en-GB" sz="2200" i="1">
+                                          <a:solidFill>
+                                            <a:prstClr val="black"/>
+                                          </a:solidFill>
+                                          <a:latin typeface="Cambria Math" panose="02040503050406030204" pitchFamily="18" charset="0"/>
+                                        </a:rPr>
+                                      </m:ctrlPr>
+                                    </m:dPr>
+                                    <m:e>
+                                      <m:sSub>
+                                        <m:sSubPr>
+                                          <m:ctrlPr>
+                                            <a:rPr lang="en-GB" sz="2200" i="1">
+                                              <a:solidFill>
+                                                <a:prstClr val="black"/>
+                                              </a:solidFill>
+                                              <a:latin typeface="Cambria Math" panose="02040503050406030204" pitchFamily="18" charset="0"/>
+                                            </a:rPr>
+                                          </m:ctrlPr>
+                                        </m:sSubPr>
+                                        <m:e>
+                                          <m:r>
+                                            <a:rPr lang="en-GB" sz="2200" i="1">
+                                              <a:solidFill>
+                                                <a:prstClr val="black"/>
+                                              </a:solidFill>
+                                              <a:latin typeface="Cambria Math" panose="02040503050406030204" pitchFamily="18" charset="0"/>
+                                            </a:rPr>
+                                            <m:t>𝐷</m:t>
+                                          </m:r>
+                                        </m:e>
+                                        <m:sub>
+                                          <m:r>
+                                            <a:rPr lang="en-GB" sz="2200" i="1">
+                                              <a:solidFill>
+                                                <a:prstClr val="black"/>
+                                              </a:solidFill>
+                                              <a:latin typeface="Cambria Math" panose="02040503050406030204" pitchFamily="18" charset="0"/>
+                                            </a:rPr>
+                                            <m:t>𝑖</m:t>
+                                          </m:r>
+                                        </m:sub>
+                                      </m:sSub>
+                                    </m:e>
+                                  </m:d>
+                                </m:den>
+                              </m:f>
+                              <m:r>
+                                <a:rPr lang="en-GB" sz="2200" i="1">
+                                  <a:solidFill>
+                                    <a:prstClr val="black"/>
+                                  </a:solidFill>
+                                  <a:latin typeface="Cambria Math" panose="02040503050406030204" pitchFamily="18" charset="0"/>
+                                </a:rPr>
+                                <m:t>    , </m:t>
+                              </m:r>
+                            </m:e>
+                          </m:nary>
+                          <m:r>
+                            <a:rPr lang="en-GB" sz="2200" i="1">
+                              <a:solidFill>
+                                <a:prstClr val="black"/>
+                              </a:solidFill>
+                              <a:latin typeface="Cambria Math" panose="02040503050406030204" pitchFamily="18" charset="0"/>
+                              <a:ea typeface="Cambria Math" panose="02040503050406030204" pitchFamily="18" charset="0"/>
+                            </a:rPr>
+                            <m:t>∀  </m:t>
+                          </m:r>
+                          <m:r>
+                            <a:rPr lang="en-GB" sz="2200" i="1">
+                              <a:solidFill>
+                                <a:prstClr val="black"/>
+                              </a:solidFill>
+                              <a:latin typeface="Cambria Math" panose="02040503050406030204" pitchFamily="18" charset="0"/>
+                              <a:ea typeface="Cambria Math" panose="02040503050406030204" pitchFamily="18" charset="0"/>
+                            </a:rPr>
+                            <m:t>𝑖</m:t>
+                          </m:r>
+                          <m:r>
+                            <a:rPr lang="en-GB" sz="2200" i="1">
+                              <a:solidFill>
+                                <a:prstClr val="black"/>
+                              </a:solidFill>
+                              <a:latin typeface="Cambria Math" panose="02040503050406030204" pitchFamily="18" charset="0"/>
+                              <a:ea typeface="Cambria Math" panose="02040503050406030204" pitchFamily="18" charset="0"/>
+                            </a:rPr>
+                            <m:t>∈[1, </m:t>
+                          </m:r>
+                          <m:r>
+                            <a:rPr lang="en-GB" sz="2200" i="1">
+                              <a:solidFill>
+                                <a:prstClr val="black"/>
+                              </a:solidFill>
+                              <a:latin typeface="Cambria Math" panose="02040503050406030204" pitchFamily="18" charset="0"/>
+                              <a:ea typeface="Cambria Math" panose="02040503050406030204" pitchFamily="18" charset="0"/>
+                            </a:rPr>
+                            <m:t>𝑛</m:t>
+                          </m:r>
+                          <m:r>
+                            <a:rPr lang="en-GB" sz="2200" i="1">
+                              <a:solidFill>
+                                <a:prstClr val="black"/>
+                              </a:solidFill>
+                              <a:latin typeface="Cambria Math" panose="02040503050406030204" pitchFamily="18" charset="0"/>
+                              <a:ea typeface="Cambria Math" panose="02040503050406030204" pitchFamily="18" charset="0"/>
+                            </a:rPr>
+                            <m:t>]</m:t>
+                          </m:r>
+                        </m:oMath>
+                      </m:oMathPara>
+                    </a14:m>
+                    <a:endParaRPr lang="en-GB" sz="2200" i="1" dirty="0">
+                      <a:solidFill>
+                        <a:prstClr val="black"/>
+                      </a:solidFill>
+                      <a:latin typeface="Cambria Math" panose="02040503050406030204" pitchFamily="18" charset="0"/>
+                    </a:endParaRPr>
+                  </a:p>
+                  <a:p>
+                    <a:pPr lvl="0" algn="just">
+                      <a:spcAft>
+                        <a:spcPts val="300"/>
+                      </a:spcAft>
+                    </a:pPr>
+                    <a14:m>
+                      <m:oMathPara xmlns:m="http://schemas.openxmlformats.org/officeDocument/2006/math">
+                        <m:oMathParaPr>
+                          <m:jc m:val="left"/>
+                        </m:oMathParaPr>
+                        <m:oMath xmlns:m="http://schemas.openxmlformats.org/officeDocument/2006/math">
+                          <m:r>
+                            <a:rPr lang="en-GB" sz="2200" b="1" i="1">
+                              <a:solidFill>
+                                <a:prstClr val="black"/>
+                              </a:solidFill>
+                              <a:latin typeface="Cambria Math" panose="02040503050406030204" pitchFamily="18" charset="0"/>
+                            </a:rPr>
+                            <m:t>𝑪</m:t>
+                          </m:r>
+                          <m:r>
+                            <a:rPr lang="en-GB" sz="2200" i="1">
+                              <a:solidFill>
+                                <a:prstClr val="black"/>
+                              </a:solidFill>
+                              <a:latin typeface="Cambria Math" panose="02040503050406030204" pitchFamily="18" charset="0"/>
+                            </a:rPr>
+                            <m:t>≔</m:t>
+                          </m:r>
+                          <m:nary>
+                            <m:naryPr>
+                              <m:chr m:val="∑"/>
+                              <m:limLoc m:val="subSup"/>
+                              <m:ctrlPr>
+                                <a:rPr lang="en-GB" sz="2200" i="1">
+                                  <a:solidFill>
+                                    <a:prstClr val="black"/>
+                                  </a:solidFill>
+                                  <a:latin typeface="Cambria Math" panose="02040503050406030204" pitchFamily="18" charset="0"/>
+                                </a:rPr>
+                              </m:ctrlPr>
+                            </m:naryPr>
+                            <m:sub>
+                              <m:r>
+                                <m:rPr>
+                                  <m:brk m:alnAt="25"/>
+                                </m:rPr>
+                                <a:rPr lang="en-GB" sz="2200" i="1">
+                                  <a:solidFill>
+                                    <a:prstClr val="black"/>
+                                  </a:solidFill>
+                                  <a:latin typeface="Cambria Math" panose="02040503050406030204" pitchFamily="18" charset="0"/>
+                                </a:rPr>
+                                <m:t>𝑖</m:t>
+                              </m:r>
+                              <m:r>
+                                <a:rPr lang="en-GB" sz="2200" i="1">
+                                  <a:solidFill>
+                                    <a:prstClr val="black"/>
+                                  </a:solidFill>
+                                  <a:latin typeface="Cambria Math" panose="02040503050406030204" pitchFamily="18" charset="0"/>
+                                </a:rPr>
+                                <m:t>=1</m:t>
+                              </m:r>
+                            </m:sub>
+                            <m:sup>
+                              <m:r>
+                                <a:rPr lang="en-GB" sz="2200" b="0" i="1" smtClean="0">
+                                  <a:solidFill>
+                                    <a:prstClr val="black"/>
+                                  </a:solidFill>
+                                  <a:latin typeface="Cambria Math" panose="02040503050406030204" pitchFamily="18" charset="0"/>
+                                </a:rPr>
+                                <m:t>𝑛</m:t>
+                              </m:r>
+                            </m:sup>
+                            <m:e>
+                              <m:nary>
+                                <m:naryPr>
+                                  <m:chr m:val="∑"/>
+                                  <m:limLoc m:val="subSup"/>
+                                  <m:supHide m:val="on"/>
+                                  <m:ctrlPr>
+                                    <a:rPr lang="en-GB" sz="2200" i="1">
+                                      <a:solidFill>
+                                        <a:prstClr val="black"/>
+                                      </a:solidFill>
+                                      <a:latin typeface="Cambria Math" panose="02040503050406030204" pitchFamily="18" charset="0"/>
+                                    </a:rPr>
+                                  </m:ctrlPr>
+                                </m:naryPr>
+                                <m:sub>
+                                  <m:r>
+                                    <m:rPr>
+                                      <m:brk m:alnAt="9"/>
+                                    </m:rPr>
+                                    <a:rPr lang="en-GB" sz="2200" i="1">
+                                      <a:solidFill>
+                                        <a:prstClr val="black"/>
+                                      </a:solidFill>
+                                      <a:latin typeface="Cambria Math" panose="02040503050406030204" pitchFamily="18" charset="0"/>
+                                    </a:rPr>
+                                    <m:t>𝑤</m:t>
+                                  </m:r>
+                                  <m:r>
+                                    <a:rPr lang="en-GB" sz="2200" i="1">
+                                      <a:solidFill>
+                                        <a:prstClr val="black"/>
+                                      </a:solidFill>
+                                      <a:latin typeface="Cambria Math" panose="02040503050406030204" pitchFamily="18" charset="0"/>
+                                      <a:ea typeface="Cambria Math" panose="02040503050406030204" pitchFamily="18" charset="0"/>
+                                    </a:rPr>
+                                    <m:t>∈</m:t>
+                                  </m:r>
+                                  <m:sSub>
+                                    <m:sSubPr>
+                                      <m:ctrlPr>
+                                        <a:rPr lang="en-GB" sz="2200" i="1">
+                                          <a:solidFill>
+                                            <a:prstClr val="black"/>
+                                          </a:solidFill>
+                                          <a:latin typeface="Cambria Math" panose="02040503050406030204" pitchFamily="18" charset="0"/>
+                                          <a:ea typeface="Cambria Math" panose="02040503050406030204" pitchFamily="18" charset="0"/>
+                                        </a:rPr>
+                                      </m:ctrlPr>
+                                    </m:sSubPr>
+                                    <m:e>
+                                      <m:r>
+                                        <a:rPr lang="en-GB" sz="2200" i="1">
+                                          <a:solidFill>
+                                            <a:prstClr val="black"/>
+                                          </a:solidFill>
+                                          <a:latin typeface="Cambria Math" panose="02040503050406030204" pitchFamily="18" charset="0"/>
+                                          <a:ea typeface="Cambria Math" panose="02040503050406030204" pitchFamily="18" charset="0"/>
+                                        </a:rPr>
+                                        <m:t>𝐷</m:t>
+                                      </m:r>
+                                    </m:e>
+                                    <m:sub>
+                                      <m:r>
+                                        <a:rPr lang="en-GB" sz="2200" i="1">
+                                          <a:solidFill>
+                                            <a:prstClr val="black"/>
+                                          </a:solidFill>
+                                          <a:latin typeface="Cambria Math" panose="02040503050406030204" pitchFamily="18" charset="0"/>
+                                          <a:ea typeface="Cambria Math" panose="02040503050406030204" pitchFamily="18" charset="0"/>
+                                        </a:rPr>
+                                        <m:t>𝑖</m:t>
+                                      </m:r>
+                                    </m:sub>
+                                  </m:sSub>
+                                </m:sub>
+                                <m:sup/>
+                                <m:e>
+                                  <m:f>
+                                    <m:fPr>
+                                      <m:type m:val="lin"/>
+                                      <m:ctrlPr>
+                                        <a:rPr lang="en-GB" sz="2200" i="1">
+                                          <a:solidFill>
+                                            <a:prstClr val="black"/>
+                                          </a:solidFill>
+                                          <a:latin typeface="Cambria Math" panose="02040503050406030204" pitchFamily="18" charset="0"/>
+                                        </a:rPr>
+                                      </m:ctrlPr>
+                                    </m:fPr>
+                                    <m:num>
+                                      <m:sSup>
+                                        <m:sSupPr>
+                                          <m:ctrlPr>
+                                            <a:rPr lang="en-GB" sz="2200" i="1">
+                                              <a:solidFill>
+                                                <a:prstClr val="black"/>
+                                              </a:solidFill>
+                                              <a:latin typeface="Cambria Math" panose="02040503050406030204" pitchFamily="18" charset="0"/>
+                                            </a:rPr>
+                                          </m:ctrlPr>
+                                        </m:sSupPr>
+                                        <m:e>
+                                          <m:d>
+                                            <m:dPr>
+                                              <m:ctrlPr>
+                                                <a:rPr lang="en-GB" sz="2200" i="1">
+                                                  <a:solidFill>
+                                                    <a:prstClr val="black"/>
+                                                  </a:solidFill>
+                                                  <a:latin typeface="Cambria Math" panose="02040503050406030204" pitchFamily="18" charset="0"/>
+                                                </a:rPr>
+                                              </m:ctrlPr>
+                                            </m:dPr>
+                                            <m:e>
+                                              <m:acc>
+                                                <m:accPr>
+                                                  <m:chr m:val="⃗"/>
+                                                  <m:ctrlPr>
+                                                    <a:rPr lang="en-GB" sz="2200" i="1">
+                                                      <a:solidFill>
+                                                        <a:prstClr val="black"/>
+                                                      </a:solidFill>
+                                                      <a:latin typeface="Cambria Math" panose="02040503050406030204" pitchFamily="18" charset="0"/>
+                                                    </a:rPr>
+                                                  </m:ctrlPr>
+                                                </m:accPr>
+                                                <m:e>
+                                                  <m:r>
+                                                    <a:rPr lang="en-GB" sz="2200" i="1">
+                                                      <a:solidFill>
+                                                        <a:prstClr val="black"/>
+                                                      </a:solidFill>
+                                                      <a:latin typeface="Cambria Math" panose="02040503050406030204" pitchFamily="18" charset="0"/>
+                                                    </a:rPr>
+                                                    <m:t>𝑤</m:t>
+                                                  </m:r>
+                                                </m:e>
+                                              </m:acc>
+                                              <m:r>
+                                                <a:rPr lang="en-GB" sz="2200" b="1" i="1">
+                                                  <a:solidFill>
+                                                    <a:prstClr val="black"/>
+                                                  </a:solidFill>
+                                                  <a:latin typeface="Cambria Math" panose="02040503050406030204" pitchFamily="18" charset="0"/>
+                                                </a:rPr>
+                                                <m:t>−</m:t>
+                                              </m:r>
+                                              <m:sSub>
+                                                <m:sSubPr>
+                                                  <m:ctrlPr>
+                                                    <a:rPr lang="en-GB" sz="2200" b="1" i="1">
+                                                      <a:solidFill>
+                                                        <a:prstClr val="black"/>
+                                                      </a:solidFill>
+                                                      <a:latin typeface="Cambria Math" panose="02040503050406030204" pitchFamily="18" charset="0"/>
+                                                    </a:rPr>
+                                                  </m:ctrlPr>
+                                                </m:sSubPr>
+                                                <m:e>
+                                                  <m:r>
+                                                    <a:rPr lang="en-GB" sz="2200" b="1" i="1">
+                                                      <a:solidFill>
+                                                        <a:prstClr val="black"/>
+                                                      </a:solidFill>
+                                                      <a:latin typeface="Cambria Math" panose="02040503050406030204" pitchFamily="18" charset="0"/>
+                                                      <a:ea typeface="Cambria Math" panose="02040503050406030204" pitchFamily="18" charset="0"/>
+                                                    </a:rPr>
+                                                    <m:t>𝝁</m:t>
+                                                  </m:r>
+                                                </m:e>
+                                                <m:sub>
+                                                  <m:r>
+                                                    <a:rPr lang="en-GB" sz="2200" i="1">
+                                                      <a:solidFill>
+                                                        <a:prstClr val="black"/>
+                                                      </a:solidFill>
+                                                      <a:latin typeface="Cambria Math" panose="02040503050406030204" pitchFamily="18" charset="0"/>
+                                                    </a:rPr>
+                                                    <m:t>𝑖</m:t>
+                                                  </m:r>
+                                                </m:sub>
+                                              </m:sSub>
+                                            </m:e>
+                                          </m:d>
+                                        </m:e>
+                                        <m:sup>
+                                          <m:r>
+                                            <a:rPr lang="en-GB" sz="2200" i="1">
+                                              <a:solidFill>
+                                                <a:prstClr val="black"/>
+                                              </a:solidFill>
+                                              <a:latin typeface="Cambria Math" panose="02040503050406030204" pitchFamily="18" charset="0"/>
+                                            </a:rPr>
+                                            <m:t>𝑇</m:t>
+                                          </m:r>
+                                        </m:sup>
+                                      </m:sSup>
+                                      <m:d>
+                                        <m:dPr>
+                                          <m:ctrlPr>
+                                            <a:rPr lang="en-GB" sz="2200" i="1">
+                                              <a:solidFill>
+                                                <a:prstClr val="black"/>
+                                              </a:solidFill>
+                                              <a:latin typeface="Cambria Math" panose="02040503050406030204" pitchFamily="18" charset="0"/>
+                                            </a:rPr>
+                                          </m:ctrlPr>
+                                        </m:dPr>
+                                        <m:e>
+                                          <m:acc>
+                                            <m:accPr>
+                                              <m:chr m:val="⃗"/>
+                                              <m:ctrlPr>
+                                                <a:rPr lang="en-GB" sz="2200" i="1">
+                                                  <a:solidFill>
+                                                    <a:prstClr val="black"/>
+                                                  </a:solidFill>
+                                                  <a:latin typeface="Cambria Math" panose="02040503050406030204" pitchFamily="18" charset="0"/>
+                                                </a:rPr>
+                                              </m:ctrlPr>
+                                            </m:accPr>
+                                            <m:e>
+                                              <m:r>
+                                                <a:rPr lang="en-GB" sz="2200" i="1">
+                                                  <a:solidFill>
+                                                    <a:prstClr val="black"/>
+                                                  </a:solidFill>
+                                                  <a:latin typeface="Cambria Math" panose="02040503050406030204" pitchFamily="18" charset="0"/>
+                                                </a:rPr>
+                                                <m:t>𝑤</m:t>
+                                              </m:r>
+                                            </m:e>
+                                          </m:acc>
+                                          <m:r>
+                                            <a:rPr lang="en-GB" sz="2200" b="1" i="1">
+                                              <a:solidFill>
+                                                <a:prstClr val="black"/>
+                                              </a:solidFill>
+                                              <a:latin typeface="Cambria Math" panose="02040503050406030204" pitchFamily="18" charset="0"/>
+                                            </a:rPr>
+                                            <m:t>−</m:t>
+                                          </m:r>
+                                          <m:sSub>
+                                            <m:sSubPr>
+                                              <m:ctrlPr>
+                                                <a:rPr lang="en-GB" sz="2200" b="1" i="1">
+                                                  <a:solidFill>
+                                                    <a:prstClr val="black"/>
+                                                  </a:solidFill>
+                                                  <a:latin typeface="Cambria Math" panose="02040503050406030204" pitchFamily="18" charset="0"/>
+                                                </a:rPr>
+                                              </m:ctrlPr>
+                                            </m:sSubPr>
+                                            <m:e>
+                                              <m:r>
+                                                <a:rPr lang="en-GB" sz="2200" b="1" i="1">
+                                                  <a:solidFill>
+                                                    <a:prstClr val="black"/>
+                                                  </a:solidFill>
+                                                  <a:latin typeface="Cambria Math" panose="02040503050406030204" pitchFamily="18" charset="0"/>
+                                                  <a:ea typeface="Cambria Math" panose="02040503050406030204" pitchFamily="18" charset="0"/>
+                                                </a:rPr>
+                                                <m:t>𝝁</m:t>
+                                              </m:r>
+                                            </m:e>
+                                            <m:sub>
+                                              <m:r>
+                                                <a:rPr lang="en-GB" sz="2200" i="1">
+                                                  <a:solidFill>
+                                                    <a:prstClr val="black"/>
+                                                  </a:solidFill>
+                                                  <a:latin typeface="Cambria Math" panose="02040503050406030204" pitchFamily="18" charset="0"/>
+                                                </a:rPr>
+                                                <m:t>𝑖</m:t>
+                                              </m:r>
+                                            </m:sub>
+                                          </m:sSub>
+                                        </m:e>
+                                      </m:d>
+                                    </m:num>
+                                    <m:den>
+                                      <m:d>
+                                        <m:dPr>
+                                          <m:begChr m:val="|"/>
+                                          <m:endChr m:val="|"/>
+                                          <m:ctrlPr>
+                                            <a:rPr lang="en-GB" sz="2200" i="1">
+                                              <a:solidFill>
+                                                <a:prstClr val="black"/>
+                                              </a:solidFill>
+                                              <a:latin typeface="Cambria Math" panose="02040503050406030204" pitchFamily="18" charset="0"/>
+                                            </a:rPr>
+                                          </m:ctrlPr>
+                                        </m:dPr>
+                                        <m:e>
+                                          <m:sSub>
+                                            <m:sSubPr>
+                                              <m:ctrlPr>
+                                                <a:rPr lang="en-GB" sz="2200" i="1">
+                                                  <a:solidFill>
+                                                    <a:prstClr val="black"/>
+                                                  </a:solidFill>
+                                                  <a:latin typeface="Cambria Math" panose="02040503050406030204" pitchFamily="18" charset="0"/>
+                                                </a:rPr>
+                                              </m:ctrlPr>
+                                            </m:sSubPr>
+                                            <m:e>
+                                              <m:r>
+                                                <a:rPr lang="en-GB" sz="2200" i="1">
+                                                  <a:solidFill>
+                                                    <a:prstClr val="black"/>
+                                                  </a:solidFill>
+                                                  <a:latin typeface="Cambria Math" panose="02040503050406030204" pitchFamily="18" charset="0"/>
+                                                </a:rPr>
+                                                <m:t>𝐷</m:t>
+                                              </m:r>
+                                            </m:e>
+                                            <m:sub>
+                                              <m:r>
+                                                <a:rPr lang="en-GB" sz="2200" i="1">
+                                                  <a:solidFill>
+                                                    <a:prstClr val="black"/>
+                                                  </a:solidFill>
+                                                  <a:latin typeface="Cambria Math" panose="02040503050406030204" pitchFamily="18" charset="0"/>
+                                                </a:rPr>
+                                                <m:t>𝑖</m:t>
+                                              </m:r>
+                                            </m:sub>
+                                          </m:sSub>
+                                        </m:e>
+                                      </m:d>
+                                    </m:den>
+                                  </m:f>
+                                </m:e>
+                              </m:nary>
+                            </m:e>
+                          </m:nary>
+                        </m:oMath>
+                      </m:oMathPara>
+                    </a14:m>
+                    <a:endParaRPr lang="en-GB" sz="2200" i="1" dirty="0">
+                      <a:solidFill>
+                        <a:prstClr val="black"/>
+                      </a:solidFill>
+                      <a:latin typeface="Cambria Math" panose="02040503050406030204" pitchFamily="18" charset="0"/>
+                    </a:endParaRPr>
+                  </a:p>
+                  <a:p>
+                    <a:pPr lvl="0" algn="just">
+                      <a:spcAft>
+                        <a:spcPts val="300"/>
+                      </a:spcAft>
+                    </a:pPr>
+                    <a14:m>
+                      <m:oMath xmlns:m="http://schemas.openxmlformats.org/officeDocument/2006/math">
+                        <m:r>
+                          <a:rPr lang="en-GB" sz="2200" i="1">
+                            <a:solidFill>
+                              <a:prstClr val="black"/>
+                            </a:solidFill>
+                            <a:latin typeface="Cambria Math" panose="02040503050406030204" pitchFamily="18" charset="0"/>
+                          </a:rPr>
+                          <m:t>𝐵</m:t>
+                        </m:r>
+                        <m:r>
+                          <a:rPr lang="en-GB" sz="2200" i="1">
+                            <a:solidFill>
+                              <a:prstClr val="black"/>
+                            </a:solidFill>
+                            <a:latin typeface="Cambria Math" panose="02040503050406030204" pitchFamily="18" charset="0"/>
+                          </a:rPr>
+                          <m:t>≔</m:t>
+                        </m:r>
+                      </m:oMath>
+                    </a14:m>
+                    <a:r>
+                      <a:rPr lang="de-DE" sz="2200" dirty="0">
+                        <a:solidFill>
+                          <a:prstClr val="black"/>
+                        </a:solidFill>
+                      </a:rPr>
+                      <a:t> first </a:t>
+                    </a:r>
+                    <a14:m>
+                      <m:oMath xmlns:m="http://schemas.openxmlformats.org/officeDocument/2006/math">
+                        <m:r>
+                          <a:rPr lang="de-DE" sz="2200" i="1" dirty="0">
+                            <a:solidFill>
+                              <a:prstClr val="black"/>
+                            </a:solidFill>
+                            <a:latin typeface="Cambria Math" panose="02040503050406030204" pitchFamily="18" charset="0"/>
+                          </a:rPr>
+                          <m:t>𝑘</m:t>
+                        </m:r>
+                      </m:oMath>
+                    </a14:m>
+                    <a:r>
+                      <a:rPr lang="de-DE" sz="2200" dirty="0">
+                        <a:solidFill>
+                          <a:prstClr val="black"/>
+                        </a:solidFill>
+                      </a:rPr>
+                      <a:t> rows of </a:t>
+                    </a:r>
+                    <a14:m>
+                      <m:oMath xmlns:m="http://schemas.openxmlformats.org/officeDocument/2006/math">
+                        <m:r>
+                          <a:rPr lang="en-GB" sz="2200" i="1">
+                            <a:solidFill>
+                              <a:prstClr val="black"/>
+                            </a:solidFill>
+                            <a:latin typeface="Cambria Math" panose="02040503050406030204" pitchFamily="18" charset="0"/>
+                            <a:ea typeface="Cambria Math" panose="02040503050406030204" pitchFamily="18" charset="0"/>
+                          </a:rPr>
+                          <m:t>𝕊𝕍𝔻</m:t>
+                        </m:r>
+                        <m:d>
+                          <m:dPr>
+                            <m:ctrlPr>
+                              <a:rPr lang="en-GB" sz="2200" i="1">
+                                <a:solidFill>
+                                  <a:prstClr val="black"/>
+                                </a:solidFill>
+                                <a:latin typeface="Cambria Math" panose="02040503050406030204" pitchFamily="18" charset="0"/>
+                                <a:ea typeface="Cambria Math" panose="02040503050406030204" pitchFamily="18" charset="0"/>
+                              </a:rPr>
+                            </m:ctrlPr>
+                          </m:dPr>
+                          <m:e>
+                            <m:r>
+                              <a:rPr lang="en-GB" sz="2200" b="1" i="1">
+                                <a:solidFill>
+                                  <a:prstClr val="black"/>
+                                </a:solidFill>
+                                <a:latin typeface="Cambria Math" panose="02040503050406030204" pitchFamily="18" charset="0"/>
+                              </a:rPr>
+                              <m:t>𝑪</m:t>
+                            </m:r>
+                          </m:e>
+                        </m:d>
+                      </m:oMath>
+                    </a14:m>
+                    <a:endParaRPr lang="en-GB" sz="2200" i="1" dirty="0">
+                      <a:solidFill>
+                        <a:prstClr val="black"/>
+                      </a:solidFill>
+                      <a:latin typeface="Cambria Math" panose="02040503050406030204" pitchFamily="18" charset="0"/>
+                    </a:endParaRPr>
+                  </a:p>
+                  <a:p>
+                    <a:pPr lvl="0" algn="just">
+                      <a:spcAft>
+                        <a:spcPts val="300"/>
+                      </a:spcAft>
+                    </a:pPr>
+                    <a:endParaRPr lang="en-GB" sz="2200" i="1" dirty="0">
+                      <a:solidFill>
+                        <a:prstClr val="black"/>
+                      </a:solidFill>
+                      <a:latin typeface="Cambria Math" panose="02040503050406030204" pitchFamily="18" charset="0"/>
+                    </a:endParaRPr>
+                  </a:p>
+                  <a:p>
+                    <a:pPr lvl="0" algn="just">
+                      <a:spcAft>
+                        <a:spcPts val="300"/>
+                      </a:spcAft>
+                    </a:pPr>
+                    <a14:m>
+                      <m:oMathPara xmlns:m="http://schemas.openxmlformats.org/officeDocument/2006/math">
+                        <m:oMathParaPr>
+                          <m:jc m:val="left"/>
+                        </m:oMathParaPr>
+                        <m:oMath xmlns:m="http://schemas.openxmlformats.org/officeDocument/2006/math">
+                          <m:acc>
+                            <m:accPr>
+                              <m:chr m:val="⃗"/>
+                              <m:ctrlPr>
+                                <a:rPr lang="de-DE" sz="2200" i="1">
+                                  <a:solidFill>
+                                    <a:prstClr val="black"/>
+                                  </a:solidFill>
+                                  <a:latin typeface="Cambria Math" panose="02040503050406030204" pitchFamily="18" charset="0"/>
+                                </a:rPr>
+                              </m:ctrlPr>
+                            </m:accPr>
+                            <m:e>
+                              <m:r>
+                                <a:rPr lang="en-GB" sz="2200" i="1">
+                                  <a:solidFill>
+                                    <a:prstClr val="black"/>
+                                  </a:solidFill>
+                                  <a:latin typeface="Cambria Math" panose="02040503050406030204" pitchFamily="18" charset="0"/>
+                                </a:rPr>
+                                <m:t>𝑤</m:t>
+                              </m:r>
+                            </m:e>
+                          </m:acc>
+                          <m:r>
+                            <a:rPr lang="en-GB" sz="2200" i="1">
+                              <a:solidFill>
+                                <a:prstClr val="black"/>
+                              </a:solidFill>
+                              <a:latin typeface="Cambria Math" panose="02040503050406030204" pitchFamily="18" charset="0"/>
+                            </a:rPr>
+                            <m:t>≔</m:t>
+                          </m:r>
+                          <m:f>
+                            <m:fPr>
+                              <m:type m:val="lin"/>
+                              <m:ctrlPr>
+                                <a:rPr lang="en-GB" sz="2200" i="1">
+                                  <a:solidFill>
+                                    <a:prstClr val="black"/>
+                                  </a:solidFill>
+                                  <a:latin typeface="Cambria Math" panose="02040503050406030204" pitchFamily="18" charset="0"/>
+                                </a:rPr>
+                              </m:ctrlPr>
+                            </m:fPr>
+                            <m:num>
+                              <m:d>
+                                <m:dPr>
+                                  <m:ctrlPr>
+                                    <a:rPr lang="en-GB" sz="2200" i="1">
+                                      <a:solidFill>
+                                        <a:prstClr val="black"/>
+                                      </a:solidFill>
+                                      <a:latin typeface="Cambria Math" panose="02040503050406030204" pitchFamily="18" charset="0"/>
+                                    </a:rPr>
+                                  </m:ctrlPr>
+                                </m:dPr>
+                                <m:e>
+                                  <m:acc>
+                                    <m:accPr>
+                                      <m:chr m:val="⃗"/>
+                                      <m:ctrlPr>
+                                        <a:rPr lang="en-GB" sz="2200" i="1">
+                                          <a:solidFill>
+                                            <a:prstClr val="black"/>
+                                          </a:solidFill>
+                                          <a:latin typeface="Cambria Math" panose="02040503050406030204" pitchFamily="18" charset="0"/>
+                                        </a:rPr>
+                                      </m:ctrlPr>
+                                    </m:accPr>
+                                    <m:e>
+                                      <m:r>
+                                        <a:rPr lang="en-GB" sz="2200" i="1">
+                                          <a:solidFill>
+                                            <a:prstClr val="black"/>
+                                          </a:solidFill>
+                                          <a:latin typeface="Cambria Math" panose="02040503050406030204" pitchFamily="18" charset="0"/>
+                                        </a:rPr>
+                                        <m:t>𝑤</m:t>
+                                      </m:r>
+                                    </m:e>
+                                  </m:acc>
+                                  <m:r>
+                                    <a:rPr lang="en-GB" sz="2200" i="1">
+                                      <a:solidFill>
+                                        <a:prstClr val="black"/>
+                                      </a:solidFill>
+                                      <a:latin typeface="Cambria Math" panose="02040503050406030204" pitchFamily="18" charset="0"/>
+                                    </a:rPr>
+                                    <m:t>−</m:t>
+                                  </m:r>
+                                  <m:sSub>
+                                    <m:sSubPr>
+                                      <m:ctrlPr>
+                                        <a:rPr lang="en-GB" sz="2200" i="1">
+                                          <a:solidFill>
+                                            <a:prstClr val="black"/>
+                                          </a:solidFill>
+                                          <a:latin typeface="Cambria Math" panose="02040503050406030204" pitchFamily="18" charset="0"/>
+                                        </a:rPr>
+                                      </m:ctrlPr>
+                                    </m:sSubPr>
+                                    <m:e>
+                                      <m:acc>
+                                        <m:accPr>
+                                          <m:chr m:val="⃗"/>
+                                          <m:ctrlPr>
+                                            <a:rPr lang="en-GB" sz="2200" i="1">
+                                              <a:solidFill>
+                                                <a:prstClr val="black"/>
+                                              </a:solidFill>
+                                              <a:latin typeface="Cambria Math" panose="02040503050406030204" pitchFamily="18" charset="0"/>
+                                            </a:rPr>
+                                          </m:ctrlPr>
+                                        </m:accPr>
+                                        <m:e>
+                                          <m:r>
+                                            <a:rPr lang="en-GB" sz="2200" i="1">
+                                              <a:solidFill>
+                                                <a:prstClr val="black"/>
+                                              </a:solidFill>
+                                              <a:latin typeface="Cambria Math" panose="02040503050406030204" pitchFamily="18" charset="0"/>
+                                            </a:rPr>
+                                            <m:t>𝑤</m:t>
+                                          </m:r>
+                                        </m:e>
+                                      </m:acc>
+                                    </m:e>
+                                    <m:sub>
+                                      <m:r>
+                                        <a:rPr lang="en-GB" sz="2200" i="1">
+                                          <a:solidFill>
+                                            <a:prstClr val="black"/>
+                                          </a:solidFill>
+                                          <a:latin typeface="Cambria Math" panose="02040503050406030204" pitchFamily="18" charset="0"/>
+                                        </a:rPr>
+                                        <m:t>𝐵</m:t>
+                                      </m:r>
+                                    </m:sub>
+                                  </m:sSub>
+                                </m:e>
+                              </m:d>
+                            </m:num>
+                            <m:den>
+                              <m:d>
+                                <m:dPr>
+                                  <m:begChr m:val="‖"/>
+                                  <m:endChr m:val="‖"/>
+                                  <m:ctrlPr>
+                                    <a:rPr lang="en-GB" sz="2200" i="1">
+                                      <a:solidFill>
+                                        <a:prstClr val="black"/>
+                                      </a:solidFill>
+                                      <a:latin typeface="Cambria Math" panose="02040503050406030204" pitchFamily="18" charset="0"/>
+                                    </a:rPr>
+                                  </m:ctrlPr>
+                                </m:dPr>
+                                <m:e>
+                                  <m:acc>
+                                    <m:accPr>
+                                      <m:chr m:val="⃗"/>
+                                      <m:ctrlPr>
+                                        <a:rPr lang="en-GB" sz="2200" i="1">
+                                          <a:solidFill>
+                                            <a:prstClr val="black"/>
+                                          </a:solidFill>
+                                          <a:latin typeface="Cambria Math" panose="02040503050406030204" pitchFamily="18" charset="0"/>
+                                        </a:rPr>
+                                      </m:ctrlPr>
+                                    </m:accPr>
+                                    <m:e>
+                                      <m:r>
+                                        <a:rPr lang="en-GB" sz="2200" i="1">
+                                          <a:solidFill>
+                                            <a:prstClr val="black"/>
+                                          </a:solidFill>
+                                          <a:latin typeface="Cambria Math" panose="02040503050406030204" pitchFamily="18" charset="0"/>
+                                        </a:rPr>
+                                        <m:t>𝑤</m:t>
+                                      </m:r>
+                                    </m:e>
+                                  </m:acc>
+                                  <m:r>
+                                    <a:rPr lang="en-GB" sz="2200" i="1">
+                                      <a:solidFill>
+                                        <a:prstClr val="black"/>
+                                      </a:solidFill>
+                                      <a:latin typeface="Cambria Math" panose="02040503050406030204" pitchFamily="18" charset="0"/>
+                                    </a:rPr>
+                                    <m:t>−</m:t>
+                                  </m:r>
+                                  <m:sSub>
+                                    <m:sSubPr>
+                                      <m:ctrlPr>
+                                        <a:rPr lang="en-GB" sz="2200" i="1">
+                                          <a:solidFill>
+                                            <a:prstClr val="black"/>
+                                          </a:solidFill>
+                                          <a:latin typeface="Cambria Math" panose="02040503050406030204" pitchFamily="18" charset="0"/>
+                                        </a:rPr>
+                                      </m:ctrlPr>
+                                    </m:sSubPr>
+                                    <m:e>
+                                      <m:acc>
+                                        <m:accPr>
+                                          <m:chr m:val="⃗"/>
+                                          <m:ctrlPr>
+                                            <a:rPr lang="en-GB" sz="2200" i="1">
+                                              <a:solidFill>
+                                                <a:prstClr val="black"/>
+                                              </a:solidFill>
+                                              <a:latin typeface="Cambria Math" panose="02040503050406030204" pitchFamily="18" charset="0"/>
+                                            </a:rPr>
+                                          </m:ctrlPr>
+                                        </m:accPr>
+                                        <m:e>
+                                          <m:r>
+                                            <a:rPr lang="en-GB" sz="2200" i="1">
+                                              <a:solidFill>
+                                                <a:prstClr val="black"/>
+                                              </a:solidFill>
+                                              <a:latin typeface="Cambria Math" panose="02040503050406030204" pitchFamily="18" charset="0"/>
+                                            </a:rPr>
+                                            <m:t>𝑤</m:t>
+                                          </m:r>
+                                        </m:e>
+                                      </m:acc>
+                                    </m:e>
+                                    <m:sub>
+                                      <m:r>
+                                        <a:rPr lang="en-GB" sz="2200" i="1">
+                                          <a:solidFill>
+                                            <a:prstClr val="black"/>
+                                          </a:solidFill>
+                                          <a:latin typeface="Cambria Math" panose="02040503050406030204" pitchFamily="18" charset="0"/>
+                                        </a:rPr>
+                                        <m:t>𝐵</m:t>
+                                      </m:r>
+                                    </m:sub>
+                                  </m:sSub>
+                                </m:e>
+                              </m:d>
+                              <m:r>
+                                <a:rPr lang="en-GB" sz="2200" i="1">
+                                  <a:solidFill>
+                                    <a:prstClr val="black"/>
+                                  </a:solidFill>
+                                  <a:latin typeface="Cambria Math" panose="02040503050406030204" pitchFamily="18" charset="0"/>
+                                </a:rPr>
+                                <m:t>    , </m:t>
+                              </m:r>
+                              <m:r>
+                                <a:rPr lang="en-GB" sz="2200" i="1">
+                                  <a:solidFill>
+                                    <a:prstClr val="black"/>
+                                  </a:solidFill>
+                                  <a:latin typeface="Cambria Math" panose="02040503050406030204" pitchFamily="18" charset="0"/>
+                                  <a:ea typeface="Cambria Math" panose="02040503050406030204" pitchFamily="18" charset="0"/>
+                                </a:rPr>
+                                <m:t>∀  </m:t>
+                              </m:r>
+                              <m:r>
+                                <a:rPr lang="en-GB" sz="2200" i="1">
+                                  <a:solidFill>
+                                    <a:prstClr val="black"/>
+                                  </a:solidFill>
+                                  <a:latin typeface="Cambria Math" panose="02040503050406030204" pitchFamily="18" charset="0"/>
+                                  <a:ea typeface="Cambria Math" panose="02040503050406030204" pitchFamily="18" charset="0"/>
+                                </a:rPr>
+                                <m:t>𝑤</m:t>
+                              </m:r>
+                              <m:r>
+                                <a:rPr lang="en-GB" sz="2200" i="1">
+                                  <a:solidFill>
+                                    <a:prstClr val="black"/>
+                                  </a:solidFill>
+                                  <a:latin typeface="Cambria Math" panose="02040503050406030204" pitchFamily="18" charset="0"/>
+                                  <a:ea typeface="Cambria Math" panose="02040503050406030204" pitchFamily="18" charset="0"/>
+                                </a:rPr>
+                                <m:t>∈</m:t>
+                              </m:r>
+                              <m:r>
+                                <a:rPr lang="en-GB" sz="2200" i="1">
+                                  <a:solidFill>
+                                    <a:prstClr val="black"/>
+                                  </a:solidFill>
+                                  <a:latin typeface="Cambria Math" panose="02040503050406030204" pitchFamily="18" charset="0"/>
+                                  <a:ea typeface="Cambria Math" panose="02040503050406030204" pitchFamily="18" charset="0"/>
+                                </a:rPr>
+                                <m:t>𝑁</m:t>
+                              </m:r>
+                            </m:den>
+                          </m:f>
+                        </m:oMath>
+                      </m:oMathPara>
+                    </a14:m>
+                    <a:endParaRPr lang="de-DE" sz="2200" dirty="0">
+                      <a:solidFill>
+                        <a:prstClr val="black"/>
+                      </a:solidFill>
+                    </a:endParaRPr>
+                  </a:p>
+                  <a:p>
+                    <a:pPr lvl="0" algn="just">
+                      <a:spcAft>
+                        <a:spcPts val="300"/>
+                      </a:spcAft>
+                    </a:pPr>
+                    <a14:m>
+                      <m:oMathPara xmlns:m="http://schemas.openxmlformats.org/officeDocument/2006/math">
+                        <m:oMathParaPr>
+                          <m:jc m:val="left"/>
+                        </m:oMathParaPr>
+                        <m:oMath xmlns:m="http://schemas.openxmlformats.org/officeDocument/2006/math">
+                          <m:sSub>
+                            <m:sSubPr>
+                              <m:ctrlPr>
+                                <a:rPr lang="de-DE" sz="2200" i="1">
+                                  <a:solidFill>
+                                    <a:prstClr val="black"/>
+                                  </a:solidFill>
+                                  <a:latin typeface="Cambria Math" panose="02040503050406030204" pitchFamily="18" charset="0"/>
+                                </a:rPr>
+                              </m:ctrlPr>
+                            </m:sSubPr>
+                            <m:e>
+                              <m:r>
+                                <a:rPr lang="de-DE" sz="2200" b="1" i="1">
+                                  <a:solidFill>
+                                    <a:prstClr val="black"/>
+                                  </a:solidFill>
+                                  <a:latin typeface="Cambria Math" panose="02040503050406030204" pitchFamily="18" charset="0"/>
+                                  <a:ea typeface="Cambria Math" panose="02040503050406030204" pitchFamily="18" charset="0"/>
+                                </a:rPr>
+                                <m:t>𝝁</m:t>
+                              </m:r>
+                            </m:e>
+                            <m:sub>
+                              <m:r>
+                                <a:rPr lang="en-GB" sz="2200" i="1">
+                                  <a:solidFill>
+                                    <a:prstClr val="black"/>
+                                  </a:solidFill>
+                                  <a:latin typeface="Cambria Math" panose="02040503050406030204" pitchFamily="18" charset="0"/>
+                                </a:rPr>
+                                <m:t>𝑖</m:t>
+                              </m:r>
+                            </m:sub>
+                          </m:sSub>
+                          <m:r>
+                            <a:rPr lang="en-GB" sz="2200" i="1">
+                              <a:solidFill>
+                                <a:prstClr val="black"/>
+                              </a:solidFill>
+                              <a:latin typeface="Cambria Math" panose="02040503050406030204" pitchFamily="18" charset="0"/>
+                            </a:rPr>
+                            <m:t>≔</m:t>
+                          </m:r>
+                          <m:nary>
+                            <m:naryPr>
+                              <m:chr m:val="∑"/>
+                              <m:limLoc m:val="subSup"/>
+                              <m:supHide m:val="on"/>
+                              <m:ctrlPr>
+                                <a:rPr lang="en-GB" sz="2200" i="1">
+                                  <a:solidFill>
+                                    <a:prstClr val="black"/>
+                                  </a:solidFill>
+                                  <a:latin typeface="Cambria Math" panose="02040503050406030204" pitchFamily="18" charset="0"/>
+                                </a:rPr>
+                              </m:ctrlPr>
+                            </m:naryPr>
+                            <m:sub>
+                              <m:r>
+                                <m:rPr>
+                                  <m:brk m:alnAt="9"/>
+                                </m:rPr>
+                                <a:rPr lang="en-GB" sz="2200" i="1">
+                                  <a:solidFill>
+                                    <a:prstClr val="black"/>
+                                  </a:solidFill>
+                                  <a:latin typeface="Cambria Math" panose="02040503050406030204" pitchFamily="18" charset="0"/>
+                                </a:rPr>
+                                <m:t>𝑤</m:t>
+                              </m:r>
+                              <m:r>
+                                <a:rPr lang="en-GB" sz="2200" i="1">
+                                  <a:solidFill>
+                                    <a:prstClr val="black"/>
+                                  </a:solidFill>
+                                  <a:latin typeface="Cambria Math" panose="02040503050406030204" pitchFamily="18" charset="0"/>
+                                  <a:ea typeface="Cambria Math" panose="02040503050406030204" pitchFamily="18" charset="0"/>
+                                </a:rPr>
+                                <m:t>∈</m:t>
+                              </m:r>
+                              <m:sSub>
+                                <m:sSubPr>
+                                  <m:ctrlPr>
+                                    <a:rPr lang="en-GB" sz="2200" i="1">
+                                      <a:solidFill>
+                                        <a:prstClr val="black"/>
+                                      </a:solidFill>
+                                      <a:latin typeface="Cambria Math" panose="02040503050406030204" pitchFamily="18" charset="0"/>
+                                      <a:ea typeface="Cambria Math" panose="02040503050406030204" pitchFamily="18" charset="0"/>
+                                    </a:rPr>
+                                  </m:ctrlPr>
+                                </m:sSubPr>
+                                <m:e>
+                                  <m:r>
+                                    <a:rPr lang="en-GB" sz="2200" i="1">
+                                      <a:solidFill>
+                                        <a:prstClr val="black"/>
+                                      </a:solidFill>
+                                      <a:latin typeface="Cambria Math" panose="02040503050406030204" pitchFamily="18" charset="0"/>
+                                      <a:ea typeface="Cambria Math" panose="02040503050406030204" pitchFamily="18" charset="0"/>
+                                    </a:rPr>
+                                    <m:t>𝐸</m:t>
+                                  </m:r>
+                                </m:e>
+                                <m:sub>
+                                  <m:r>
+                                    <a:rPr lang="en-GB" sz="2200" i="1">
+                                      <a:solidFill>
+                                        <a:prstClr val="black"/>
+                                      </a:solidFill>
+                                      <a:latin typeface="Cambria Math" panose="02040503050406030204" pitchFamily="18" charset="0"/>
+                                      <a:ea typeface="Cambria Math" panose="02040503050406030204" pitchFamily="18" charset="0"/>
+                                    </a:rPr>
+                                    <m:t>𝑖</m:t>
+                                  </m:r>
+                                </m:sub>
+                              </m:sSub>
+                            </m:sub>
+                            <m:sup/>
+                            <m:e>
+                              <m:f>
+                                <m:fPr>
+                                  <m:type m:val="lin"/>
+                                  <m:ctrlPr>
+                                    <a:rPr lang="en-GB" sz="2200" i="1">
+                                      <a:solidFill>
+                                        <a:prstClr val="black"/>
+                                      </a:solidFill>
+                                      <a:latin typeface="Cambria Math" panose="02040503050406030204" pitchFamily="18" charset="0"/>
+                                    </a:rPr>
+                                  </m:ctrlPr>
+                                </m:fPr>
+                                <m:num>
+                                  <m:acc>
+                                    <m:accPr>
+                                      <m:chr m:val="⃗"/>
+                                      <m:ctrlPr>
+                                        <a:rPr lang="en-GB" sz="2200" i="1">
+                                          <a:solidFill>
+                                            <a:prstClr val="black"/>
+                                          </a:solidFill>
+                                          <a:latin typeface="Cambria Math" panose="02040503050406030204" pitchFamily="18" charset="0"/>
+                                        </a:rPr>
+                                      </m:ctrlPr>
+                                    </m:accPr>
+                                    <m:e>
+                                      <m:r>
+                                        <a:rPr lang="en-GB" sz="2200" i="1">
+                                          <a:solidFill>
+                                            <a:prstClr val="black"/>
+                                          </a:solidFill>
+                                          <a:latin typeface="Cambria Math" panose="02040503050406030204" pitchFamily="18" charset="0"/>
+                                        </a:rPr>
+                                        <m:t>𝑤</m:t>
+                                      </m:r>
+                                    </m:e>
+                                  </m:acc>
+                                </m:num>
+                                <m:den>
+                                  <m:d>
+                                    <m:dPr>
+                                      <m:begChr m:val="|"/>
+                                      <m:endChr m:val="|"/>
+                                      <m:ctrlPr>
+                                        <a:rPr lang="en-GB" sz="2200" i="1">
+                                          <a:solidFill>
+                                            <a:prstClr val="black"/>
+                                          </a:solidFill>
+                                          <a:latin typeface="Cambria Math" panose="02040503050406030204" pitchFamily="18" charset="0"/>
+                                        </a:rPr>
+                                      </m:ctrlPr>
+                                    </m:dPr>
+                                    <m:e>
+                                      <m:sSub>
+                                        <m:sSubPr>
+                                          <m:ctrlPr>
+                                            <a:rPr lang="en-GB" sz="2200" i="1">
+                                              <a:solidFill>
+                                                <a:prstClr val="black"/>
+                                              </a:solidFill>
+                                              <a:latin typeface="Cambria Math" panose="02040503050406030204" pitchFamily="18" charset="0"/>
+                                            </a:rPr>
+                                          </m:ctrlPr>
+                                        </m:sSubPr>
+                                        <m:e>
+                                          <m:r>
+                                            <a:rPr lang="en-GB" sz="2200" i="1">
+                                              <a:solidFill>
+                                                <a:prstClr val="black"/>
+                                              </a:solidFill>
+                                              <a:latin typeface="Cambria Math" panose="02040503050406030204" pitchFamily="18" charset="0"/>
+                                            </a:rPr>
+                                            <m:t>𝐸</m:t>
+                                          </m:r>
+                                        </m:e>
+                                        <m:sub>
+                                          <m:r>
+                                            <a:rPr lang="en-GB" sz="2200" i="1">
+                                              <a:solidFill>
+                                                <a:prstClr val="black"/>
+                                              </a:solidFill>
+                                              <a:latin typeface="Cambria Math" panose="02040503050406030204" pitchFamily="18" charset="0"/>
+                                            </a:rPr>
+                                            <m:t>𝑖</m:t>
+                                          </m:r>
+                                        </m:sub>
+                                      </m:sSub>
+                                    </m:e>
+                                  </m:d>
+                                </m:den>
+                              </m:f>
+                              <m:r>
+                                <a:rPr lang="en-GB" sz="2200" i="1">
+                                  <a:solidFill>
+                                    <a:prstClr val="black"/>
+                                  </a:solidFill>
+                                  <a:latin typeface="Cambria Math" panose="02040503050406030204" pitchFamily="18" charset="0"/>
+                                </a:rPr>
+                                <m:t>    , </m:t>
+                              </m:r>
+                            </m:e>
+                          </m:nary>
+                          <m:sSub>
+                            <m:sSubPr>
+                              <m:ctrlPr>
+                                <a:rPr lang="en-GB" sz="2200" i="1">
+                                  <a:solidFill>
+                                    <a:prstClr val="black"/>
+                                  </a:solidFill>
+                                  <a:latin typeface="Cambria Math" panose="02040503050406030204" pitchFamily="18" charset="0"/>
+                                </a:rPr>
+                              </m:ctrlPr>
+                            </m:sSubPr>
+                            <m:e>
+                              <m:r>
+                                <a:rPr lang="en-GB" sz="2200" b="1" i="1">
+                                  <a:solidFill>
+                                    <a:prstClr val="black"/>
+                                  </a:solidFill>
+                                  <a:latin typeface="Cambria Math" panose="02040503050406030204" pitchFamily="18" charset="0"/>
+                                </a:rPr>
+                                <m:t>𝒗</m:t>
+                              </m:r>
+                            </m:e>
+                            <m:sub>
+                              <m:r>
+                                <a:rPr lang="en-GB" sz="2200" i="1">
+                                  <a:solidFill>
+                                    <a:prstClr val="black"/>
+                                  </a:solidFill>
+                                  <a:latin typeface="Cambria Math" panose="02040503050406030204" pitchFamily="18" charset="0"/>
+                                </a:rPr>
+                                <m:t>𝑖</m:t>
+                              </m:r>
+                            </m:sub>
+                          </m:sSub>
+                          <m:r>
+                            <a:rPr lang="en-GB" sz="2200" i="1">
+                              <a:solidFill>
+                                <a:prstClr val="black"/>
+                              </a:solidFill>
+                              <a:latin typeface="Cambria Math" panose="02040503050406030204" pitchFamily="18" charset="0"/>
+                            </a:rPr>
+                            <m:t>≔</m:t>
+                          </m:r>
+                          <m:sSub>
+                            <m:sSubPr>
+                              <m:ctrlPr>
+                                <a:rPr lang="en-GB" sz="2200" i="1">
+                                  <a:solidFill>
+                                    <a:prstClr val="black"/>
+                                  </a:solidFill>
+                                  <a:latin typeface="Cambria Math" panose="02040503050406030204" pitchFamily="18" charset="0"/>
+                                </a:rPr>
+                              </m:ctrlPr>
+                            </m:sSubPr>
+                            <m:e>
+                              <m:r>
+                                <a:rPr lang="en-GB" sz="2200" b="1" i="1">
+                                  <a:solidFill>
+                                    <a:prstClr val="black"/>
+                                  </a:solidFill>
+                                  <a:latin typeface="Cambria Math" panose="02040503050406030204" pitchFamily="18" charset="0"/>
+                                  <a:ea typeface="Cambria Math" panose="02040503050406030204" pitchFamily="18" charset="0"/>
+                                </a:rPr>
+                                <m:t>𝝁</m:t>
+                              </m:r>
+                            </m:e>
+                            <m:sub>
+                              <m:r>
+                                <a:rPr lang="en-GB" sz="2200" i="1">
+                                  <a:solidFill>
+                                    <a:prstClr val="black"/>
+                                  </a:solidFill>
+                                  <a:latin typeface="Cambria Math" panose="02040503050406030204" pitchFamily="18" charset="0"/>
+                                </a:rPr>
+                                <m:t>𝑖</m:t>
+                              </m:r>
+                            </m:sub>
+                          </m:sSub>
+                          <m:r>
+                            <a:rPr lang="en-GB" sz="2200" i="1">
+                              <a:solidFill>
+                                <a:prstClr val="black"/>
+                              </a:solidFill>
+                              <a:latin typeface="Cambria Math" panose="02040503050406030204" pitchFamily="18" charset="0"/>
+                            </a:rPr>
+                            <m:t>−</m:t>
+                          </m:r>
+                          <m:sSub>
+                            <m:sSubPr>
+                              <m:ctrlPr>
+                                <a:rPr lang="en-GB" sz="2200" i="1">
+                                  <a:solidFill>
+                                    <a:prstClr val="black"/>
+                                  </a:solidFill>
+                                  <a:latin typeface="Cambria Math" panose="02040503050406030204" pitchFamily="18" charset="0"/>
+                                </a:rPr>
+                              </m:ctrlPr>
+                            </m:sSubPr>
+                            <m:e>
+                              <m:sSub>
+                                <m:sSubPr>
+                                  <m:ctrlPr>
+                                    <a:rPr lang="en-GB" sz="2200" i="1">
+                                      <a:solidFill>
+                                        <a:prstClr val="black"/>
+                                      </a:solidFill>
+                                      <a:latin typeface="Cambria Math" panose="02040503050406030204" pitchFamily="18" charset="0"/>
+                                    </a:rPr>
+                                  </m:ctrlPr>
+                                </m:sSubPr>
+                                <m:e>
+                                  <m:r>
+                                    <a:rPr lang="en-GB" sz="2200" b="1" i="1">
+                                      <a:solidFill>
+                                        <a:prstClr val="black"/>
+                                      </a:solidFill>
+                                      <a:latin typeface="Cambria Math" panose="02040503050406030204" pitchFamily="18" charset="0"/>
+                                      <a:ea typeface="Cambria Math" panose="02040503050406030204" pitchFamily="18" charset="0"/>
+                                    </a:rPr>
+                                    <m:t>𝝁</m:t>
+                                  </m:r>
+                                </m:e>
+                                <m:sub>
+                                  <m:r>
+                                    <a:rPr lang="en-GB" sz="2200" i="1">
+                                      <a:solidFill>
+                                        <a:prstClr val="black"/>
+                                      </a:solidFill>
+                                      <a:latin typeface="Cambria Math" panose="02040503050406030204" pitchFamily="18" charset="0"/>
+                                    </a:rPr>
+                                    <m:t>𝑖</m:t>
+                                  </m:r>
+                                </m:sub>
+                              </m:sSub>
+                            </m:e>
+                            <m:sub>
+                              <m:r>
+                                <a:rPr lang="en-GB" sz="2200" i="1">
+                                  <a:solidFill>
+                                    <a:prstClr val="black"/>
+                                  </a:solidFill>
+                                  <a:latin typeface="Cambria Math" panose="02040503050406030204" pitchFamily="18" charset="0"/>
+                                </a:rPr>
+                                <m:t>𝐵</m:t>
+                              </m:r>
+                            </m:sub>
+                          </m:sSub>
+                          <m:r>
+                            <a:rPr lang="en-GB" sz="2200" i="1">
+                              <a:solidFill>
+                                <a:prstClr val="black"/>
+                              </a:solidFill>
+                              <a:latin typeface="Cambria Math" panose="02040503050406030204" pitchFamily="18" charset="0"/>
+                            </a:rPr>
+                            <m:t>    , </m:t>
+                          </m:r>
+                          <m:r>
+                            <a:rPr lang="en-GB" sz="2200" i="1">
+                              <a:solidFill>
+                                <a:prstClr val="black"/>
+                              </a:solidFill>
+                              <a:latin typeface="Cambria Math" panose="02040503050406030204" pitchFamily="18" charset="0"/>
+                              <a:ea typeface="Cambria Math" panose="02040503050406030204" pitchFamily="18" charset="0"/>
+                            </a:rPr>
+                            <m:t>∀  </m:t>
+                          </m:r>
+                          <m:r>
+                            <a:rPr lang="en-GB" sz="2200" i="1">
+                              <a:solidFill>
+                                <a:prstClr val="black"/>
+                              </a:solidFill>
+                              <a:latin typeface="Cambria Math" panose="02040503050406030204" pitchFamily="18" charset="0"/>
+                              <a:ea typeface="Cambria Math" panose="02040503050406030204" pitchFamily="18" charset="0"/>
+                            </a:rPr>
+                            <m:t>𝑖</m:t>
+                          </m:r>
+                          <m:r>
+                            <a:rPr lang="en-GB" sz="2200" i="1">
+                              <a:solidFill>
+                                <a:prstClr val="black"/>
+                              </a:solidFill>
+                              <a:latin typeface="Cambria Math" panose="02040503050406030204" pitchFamily="18" charset="0"/>
+                              <a:ea typeface="Cambria Math" panose="02040503050406030204" pitchFamily="18" charset="0"/>
+                            </a:rPr>
+                            <m:t>∈</m:t>
+                          </m:r>
+                          <m:d>
+                            <m:dPr>
+                              <m:begChr m:val="["/>
+                              <m:endChr m:val="]"/>
+                              <m:ctrlPr>
+                                <a:rPr lang="en-GB" sz="2200" i="1">
+                                  <a:solidFill>
+                                    <a:prstClr val="black"/>
+                                  </a:solidFill>
+                                  <a:latin typeface="Cambria Math" panose="02040503050406030204" pitchFamily="18" charset="0"/>
+                                  <a:ea typeface="Cambria Math" panose="02040503050406030204" pitchFamily="18" charset="0"/>
+                                </a:rPr>
+                              </m:ctrlPr>
+                            </m:dPr>
+                            <m:e>
+                              <m:r>
+                                <a:rPr lang="en-GB" sz="2200" i="1">
+                                  <a:solidFill>
+                                    <a:prstClr val="black"/>
+                                  </a:solidFill>
+                                  <a:latin typeface="Cambria Math" panose="02040503050406030204" pitchFamily="18" charset="0"/>
+                                  <a:ea typeface="Cambria Math" panose="02040503050406030204" pitchFamily="18" charset="0"/>
+                                </a:rPr>
+                                <m:t>1, </m:t>
+                              </m:r>
+                              <m:r>
+                                <a:rPr lang="en-GB" sz="2200" i="1">
+                                  <a:solidFill>
+                                    <a:prstClr val="black"/>
+                                  </a:solidFill>
+                                  <a:latin typeface="Cambria Math" panose="02040503050406030204" pitchFamily="18" charset="0"/>
+                                  <a:ea typeface="Cambria Math" panose="02040503050406030204" pitchFamily="18" charset="0"/>
+                                </a:rPr>
+                                <m:t>𝑚</m:t>
+                              </m:r>
+                            </m:e>
+                          </m:d>
+                        </m:oMath>
+                      </m:oMathPara>
+                    </a14:m>
+                    <a:endParaRPr lang="en-GB" sz="2200" i="1" dirty="0">
+                      <a:solidFill>
+                        <a:prstClr val="black"/>
+                      </a:solidFill>
+                      <a:latin typeface="Cambria Math" panose="02040503050406030204" pitchFamily="18" charset="0"/>
+                      <a:ea typeface="Cambria Math" panose="02040503050406030204" pitchFamily="18" charset="0"/>
+                    </a:endParaRPr>
+                  </a:p>
+                  <a:p>
+                    <a:pPr lvl="0" algn="just">
+                      <a:spcAft>
+                        <a:spcPts val="300"/>
+                      </a:spcAft>
+                    </a:pPr>
+                    <a14:m>
+                      <m:oMathPara xmlns:m="http://schemas.openxmlformats.org/officeDocument/2006/math">
+                        <m:oMathParaPr>
+                          <m:jc m:val="left"/>
+                        </m:oMathParaPr>
+                        <m:oMath xmlns:m="http://schemas.openxmlformats.org/officeDocument/2006/math">
+                          <m:acc>
+                            <m:accPr>
+                              <m:chr m:val="⃗"/>
+                              <m:ctrlPr>
+                                <a:rPr lang="en-GB" sz="2200" i="1">
+                                  <a:solidFill>
+                                    <a:prstClr val="black"/>
+                                  </a:solidFill>
+                                  <a:latin typeface="Cambria Math" panose="02040503050406030204" pitchFamily="18" charset="0"/>
+                                </a:rPr>
+                              </m:ctrlPr>
+                            </m:accPr>
+                            <m:e>
+                              <m:r>
+                                <a:rPr lang="en-GB" sz="2200" i="1">
+                                  <a:solidFill>
+                                    <a:prstClr val="black"/>
+                                  </a:solidFill>
+                                  <a:latin typeface="Cambria Math" panose="02040503050406030204" pitchFamily="18" charset="0"/>
+                                </a:rPr>
+                                <m:t>𝑤</m:t>
+                              </m:r>
+                            </m:e>
+                          </m:acc>
+                          <m:r>
+                            <a:rPr lang="en-GB" sz="2200" i="1">
+                              <a:solidFill>
+                                <a:prstClr val="black"/>
+                              </a:solidFill>
+                              <a:latin typeface="Cambria Math" panose="02040503050406030204" pitchFamily="18" charset="0"/>
+                            </a:rPr>
+                            <m:t>≔</m:t>
+                          </m:r>
+                          <m:sSub>
+                            <m:sSubPr>
+                              <m:ctrlPr>
+                                <a:rPr lang="en-GB" sz="2200" i="1">
+                                  <a:solidFill>
+                                    <a:prstClr val="black"/>
+                                  </a:solidFill>
+                                  <a:latin typeface="Cambria Math" panose="02040503050406030204" pitchFamily="18" charset="0"/>
+                                </a:rPr>
+                              </m:ctrlPr>
+                            </m:sSubPr>
+                            <m:e>
+                              <m:r>
+                                <a:rPr lang="en-GB" sz="2200" b="1" i="1">
+                                  <a:solidFill>
+                                    <a:prstClr val="black"/>
+                                  </a:solidFill>
+                                  <a:latin typeface="Cambria Math" panose="02040503050406030204" pitchFamily="18" charset="0"/>
+                                </a:rPr>
+                                <m:t>𝒗</m:t>
+                              </m:r>
+                            </m:e>
+                            <m:sub>
+                              <m:r>
+                                <a:rPr lang="en-GB" sz="2200" i="1">
+                                  <a:solidFill>
+                                    <a:prstClr val="black"/>
+                                  </a:solidFill>
+                                  <a:latin typeface="Cambria Math" panose="02040503050406030204" pitchFamily="18" charset="0"/>
+                                </a:rPr>
+                                <m:t>𝑖</m:t>
+                              </m:r>
+                            </m:sub>
+                          </m:sSub>
+                          <m:r>
+                            <a:rPr lang="en-GB" sz="2200" i="1">
+                              <a:solidFill>
+                                <a:prstClr val="black"/>
+                              </a:solidFill>
+                              <a:latin typeface="Cambria Math" panose="02040503050406030204" pitchFamily="18" charset="0"/>
+                            </a:rPr>
+                            <m:t>+</m:t>
+                          </m:r>
+                          <m:rad>
+                            <m:radPr>
+                              <m:degHide m:val="on"/>
+                              <m:ctrlPr>
+                                <a:rPr lang="en-GB" sz="2200" i="1">
+                                  <a:solidFill>
+                                    <a:prstClr val="black"/>
+                                  </a:solidFill>
+                                  <a:latin typeface="Cambria Math" panose="02040503050406030204" pitchFamily="18" charset="0"/>
+                                </a:rPr>
+                              </m:ctrlPr>
+                            </m:radPr>
+                            <m:deg/>
+                            <m:e>
+                              <m:r>
+                                <a:rPr lang="en-GB" sz="2200" i="1">
+                                  <a:solidFill>
+                                    <a:prstClr val="black"/>
+                                  </a:solidFill>
+                                  <a:latin typeface="Cambria Math" panose="02040503050406030204" pitchFamily="18" charset="0"/>
+                                </a:rPr>
+                                <m:t>1−</m:t>
+                              </m:r>
+                              <m:sSup>
+                                <m:sSupPr>
+                                  <m:ctrlPr>
+                                    <a:rPr lang="en-GB" sz="2200" i="1">
+                                      <a:solidFill>
+                                        <a:prstClr val="black"/>
+                                      </a:solidFill>
+                                      <a:latin typeface="Cambria Math" panose="02040503050406030204" pitchFamily="18" charset="0"/>
+                                    </a:rPr>
+                                  </m:ctrlPr>
+                                </m:sSupPr>
+                                <m:e>
+                                  <m:d>
+                                    <m:dPr>
+                                      <m:begChr m:val="‖"/>
+                                      <m:endChr m:val="‖"/>
+                                      <m:ctrlPr>
+                                        <a:rPr lang="en-GB" sz="2200" i="1">
+                                          <a:solidFill>
+                                            <a:prstClr val="black"/>
+                                          </a:solidFill>
+                                          <a:latin typeface="Cambria Math" panose="02040503050406030204" pitchFamily="18" charset="0"/>
+                                        </a:rPr>
+                                      </m:ctrlPr>
+                                    </m:dPr>
+                                    <m:e>
+                                      <m:sSub>
+                                        <m:sSubPr>
+                                          <m:ctrlPr>
+                                            <a:rPr lang="en-GB" sz="2200" i="1">
+                                              <a:solidFill>
+                                                <a:prstClr val="black"/>
+                                              </a:solidFill>
+                                              <a:latin typeface="Cambria Math" panose="02040503050406030204" pitchFamily="18" charset="0"/>
+                                            </a:rPr>
+                                          </m:ctrlPr>
+                                        </m:sSubPr>
+                                        <m:e>
+                                          <m:r>
+                                            <a:rPr lang="en-GB" sz="2200" b="1" i="1">
+                                              <a:solidFill>
+                                                <a:prstClr val="black"/>
+                                              </a:solidFill>
+                                              <a:latin typeface="Cambria Math" panose="02040503050406030204" pitchFamily="18" charset="0"/>
+                                            </a:rPr>
+                                            <m:t>𝒗</m:t>
+                                          </m:r>
+                                        </m:e>
+                                        <m:sub>
+                                          <m:r>
+                                            <a:rPr lang="en-GB" sz="2200" i="1">
+                                              <a:solidFill>
+                                                <a:prstClr val="black"/>
+                                              </a:solidFill>
+                                              <a:latin typeface="Cambria Math" panose="02040503050406030204" pitchFamily="18" charset="0"/>
+                                            </a:rPr>
+                                            <m:t>𝑖</m:t>
+                                          </m:r>
+                                        </m:sub>
+                                      </m:sSub>
+                                    </m:e>
+                                  </m:d>
+                                </m:e>
+                                <m:sup>
+                                  <m:r>
+                                    <a:rPr lang="en-GB" sz="2200" i="1">
+                                      <a:solidFill>
+                                        <a:prstClr val="black"/>
+                                      </a:solidFill>
+                                      <a:latin typeface="Cambria Math" panose="02040503050406030204" pitchFamily="18" charset="0"/>
+                                    </a:rPr>
+                                    <m:t>2</m:t>
+                                  </m:r>
+                                </m:sup>
+                              </m:sSup>
+                            </m:e>
+                          </m:rad>
+                          <m:f>
+                            <m:fPr>
+                              <m:ctrlPr>
+                                <a:rPr lang="en-GB" sz="2200" i="1">
+                                  <a:solidFill>
+                                    <a:prstClr val="black"/>
+                                  </a:solidFill>
+                                  <a:latin typeface="Cambria Math" panose="02040503050406030204" pitchFamily="18" charset="0"/>
+                                </a:rPr>
+                              </m:ctrlPr>
+                            </m:fPr>
+                            <m:num>
+                              <m:sSub>
+                                <m:sSubPr>
+                                  <m:ctrlPr>
+                                    <a:rPr lang="en-GB" sz="2200" i="1">
+                                      <a:solidFill>
+                                        <a:prstClr val="black"/>
+                                      </a:solidFill>
+                                      <a:latin typeface="Cambria Math" panose="02040503050406030204" pitchFamily="18" charset="0"/>
+                                    </a:rPr>
+                                  </m:ctrlPr>
+                                </m:sSubPr>
+                                <m:e>
+                                  <m:acc>
+                                    <m:accPr>
+                                      <m:chr m:val="⃗"/>
+                                      <m:ctrlPr>
+                                        <a:rPr lang="en-GB" sz="2200" i="1">
+                                          <a:solidFill>
+                                            <a:prstClr val="black"/>
+                                          </a:solidFill>
+                                          <a:latin typeface="Cambria Math" panose="02040503050406030204" pitchFamily="18" charset="0"/>
+                                        </a:rPr>
+                                      </m:ctrlPr>
+                                    </m:accPr>
+                                    <m:e>
+                                      <m:r>
+                                        <a:rPr lang="en-GB" sz="2200" i="1">
+                                          <a:solidFill>
+                                            <a:prstClr val="black"/>
+                                          </a:solidFill>
+                                          <a:latin typeface="Cambria Math" panose="02040503050406030204" pitchFamily="18" charset="0"/>
+                                        </a:rPr>
+                                        <m:t>𝑤</m:t>
+                                      </m:r>
+                                    </m:e>
+                                  </m:acc>
+                                </m:e>
+                                <m:sub>
+                                  <m:r>
+                                    <a:rPr lang="en-GB" sz="2200" i="1">
+                                      <a:solidFill>
+                                        <a:prstClr val="black"/>
+                                      </a:solidFill>
+                                      <a:latin typeface="Cambria Math" panose="02040503050406030204" pitchFamily="18" charset="0"/>
+                                    </a:rPr>
+                                    <m:t>𝐵</m:t>
+                                  </m:r>
+                                </m:sub>
+                              </m:sSub>
+                              <m:r>
+                                <a:rPr lang="en-GB" sz="2200" i="1">
+                                  <a:solidFill>
+                                    <a:prstClr val="black"/>
+                                  </a:solidFill>
+                                  <a:latin typeface="Cambria Math" panose="02040503050406030204" pitchFamily="18" charset="0"/>
+                                </a:rPr>
+                                <m:t>−</m:t>
+                              </m:r>
+                              <m:sSub>
+                                <m:sSubPr>
+                                  <m:ctrlPr>
+                                    <a:rPr lang="en-GB" sz="2200" i="1">
+                                      <a:solidFill>
+                                        <a:prstClr val="black"/>
+                                      </a:solidFill>
+                                      <a:latin typeface="Cambria Math" panose="02040503050406030204" pitchFamily="18" charset="0"/>
+                                    </a:rPr>
+                                  </m:ctrlPr>
+                                </m:sSubPr>
+                                <m:e>
+                                  <m:sSub>
+                                    <m:sSubPr>
+                                      <m:ctrlPr>
+                                        <a:rPr lang="en-GB" sz="2200" i="1">
+                                          <a:solidFill>
+                                            <a:prstClr val="black"/>
+                                          </a:solidFill>
+                                          <a:latin typeface="Cambria Math" panose="02040503050406030204" pitchFamily="18" charset="0"/>
+                                        </a:rPr>
+                                      </m:ctrlPr>
+                                    </m:sSubPr>
+                                    <m:e>
+                                      <m:r>
+                                        <a:rPr lang="en-GB" sz="2200" b="1" i="1">
+                                          <a:solidFill>
+                                            <a:prstClr val="black"/>
+                                          </a:solidFill>
+                                          <a:latin typeface="Cambria Math" panose="02040503050406030204" pitchFamily="18" charset="0"/>
+                                          <a:ea typeface="Cambria Math" panose="02040503050406030204" pitchFamily="18" charset="0"/>
+                                        </a:rPr>
+                                        <m:t>𝝁</m:t>
+                                      </m:r>
+                                    </m:e>
+                                    <m:sub>
+                                      <m:r>
+                                        <a:rPr lang="en-GB" sz="2200" i="1">
+                                          <a:solidFill>
+                                            <a:prstClr val="black"/>
+                                          </a:solidFill>
+                                          <a:latin typeface="Cambria Math" panose="02040503050406030204" pitchFamily="18" charset="0"/>
+                                        </a:rPr>
+                                        <m:t>𝑖</m:t>
+                                      </m:r>
+                                    </m:sub>
+                                  </m:sSub>
+                                </m:e>
+                                <m:sub>
+                                  <m:r>
+                                    <a:rPr lang="en-GB" sz="2200" i="1">
+                                      <a:solidFill>
+                                        <a:prstClr val="black"/>
+                                      </a:solidFill>
+                                      <a:latin typeface="Cambria Math" panose="02040503050406030204" pitchFamily="18" charset="0"/>
+                                    </a:rPr>
+                                    <m:t>𝐵</m:t>
+                                  </m:r>
+                                </m:sub>
+                              </m:sSub>
+                            </m:num>
+                            <m:den>
+                              <m:d>
+                                <m:dPr>
+                                  <m:begChr m:val="‖"/>
+                                  <m:endChr m:val="‖"/>
+                                  <m:ctrlPr>
+                                    <a:rPr lang="en-GB" sz="2200" i="1">
+                                      <a:solidFill>
+                                        <a:prstClr val="black"/>
+                                      </a:solidFill>
+                                      <a:latin typeface="Cambria Math" panose="02040503050406030204" pitchFamily="18" charset="0"/>
+                                    </a:rPr>
+                                  </m:ctrlPr>
+                                </m:dPr>
+                                <m:e>
+                                  <m:sSub>
+                                    <m:sSubPr>
+                                      <m:ctrlPr>
+                                        <a:rPr lang="en-GB" sz="2200" i="1">
+                                          <a:solidFill>
+                                            <a:prstClr val="black"/>
+                                          </a:solidFill>
+                                          <a:latin typeface="Cambria Math" panose="02040503050406030204" pitchFamily="18" charset="0"/>
+                                        </a:rPr>
+                                      </m:ctrlPr>
+                                    </m:sSubPr>
+                                    <m:e>
+                                      <m:acc>
+                                        <m:accPr>
+                                          <m:chr m:val="⃗"/>
+                                          <m:ctrlPr>
+                                            <a:rPr lang="en-GB" sz="2200" i="1">
+                                              <a:solidFill>
+                                                <a:prstClr val="black"/>
+                                              </a:solidFill>
+                                              <a:latin typeface="Cambria Math" panose="02040503050406030204" pitchFamily="18" charset="0"/>
+                                            </a:rPr>
+                                          </m:ctrlPr>
+                                        </m:accPr>
+                                        <m:e>
+                                          <m:r>
+                                            <a:rPr lang="en-GB" sz="2200" i="1">
+                                              <a:solidFill>
+                                                <a:prstClr val="black"/>
+                                              </a:solidFill>
+                                              <a:latin typeface="Cambria Math" panose="02040503050406030204" pitchFamily="18" charset="0"/>
+                                            </a:rPr>
+                                            <m:t>𝑤</m:t>
+                                          </m:r>
+                                        </m:e>
+                                      </m:acc>
+                                    </m:e>
+                                    <m:sub>
+                                      <m:r>
+                                        <a:rPr lang="en-GB" sz="2200" i="1">
+                                          <a:solidFill>
+                                            <a:prstClr val="black"/>
+                                          </a:solidFill>
+                                          <a:latin typeface="Cambria Math" panose="02040503050406030204" pitchFamily="18" charset="0"/>
+                                        </a:rPr>
+                                        <m:t>𝐵</m:t>
+                                      </m:r>
+                                    </m:sub>
+                                  </m:sSub>
+                                  <m:r>
+                                    <a:rPr lang="en-GB" sz="2200" i="1">
+                                      <a:solidFill>
+                                        <a:prstClr val="black"/>
+                                      </a:solidFill>
+                                      <a:latin typeface="Cambria Math" panose="02040503050406030204" pitchFamily="18" charset="0"/>
+                                    </a:rPr>
+                                    <m:t>−</m:t>
+                                  </m:r>
+                                  <m:sSub>
+                                    <m:sSubPr>
+                                      <m:ctrlPr>
+                                        <a:rPr lang="en-GB" sz="2200" i="1">
+                                          <a:solidFill>
+                                            <a:prstClr val="black"/>
+                                          </a:solidFill>
+                                          <a:latin typeface="Cambria Math" panose="02040503050406030204" pitchFamily="18" charset="0"/>
+                                        </a:rPr>
+                                      </m:ctrlPr>
+                                    </m:sSubPr>
+                                    <m:e>
+                                      <m:sSub>
+                                        <m:sSubPr>
+                                          <m:ctrlPr>
+                                            <a:rPr lang="en-GB" sz="2200" i="1">
+                                              <a:solidFill>
+                                                <a:prstClr val="black"/>
+                                              </a:solidFill>
+                                              <a:latin typeface="Cambria Math" panose="02040503050406030204" pitchFamily="18" charset="0"/>
+                                            </a:rPr>
+                                          </m:ctrlPr>
+                                        </m:sSubPr>
+                                        <m:e>
+                                          <m:r>
+                                            <a:rPr lang="en-GB" sz="2200" b="1" i="1">
+                                              <a:solidFill>
+                                                <a:prstClr val="black"/>
+                                              </a:solidFill>
+                                              <a:latin typeface="Cambria Math" panose="02040503050406030204" pitchFamily="18" charset="0"/>
+                                              <a:ea typeface="Cambria Math" panose="02040503050406030204" pitchFamily="18" charset="0"/>
+                                            </a:rPr>
+                                            <m:t>𝝁</m:t>
+                                          </m:r>
+                                        </m:e>
+                                        <m:sub>
+                                          <m:r>
+                                            <a:rPr lang="en-GB" sz="2200" i="1">
+                                              <a:solidFill>
+                                                <a:prstClr val="black"/>
+                                              </a:solidFill>
+                                              <a:latin typeface="Cambria Math" panose="02040503050406030204" pitchFamily="18" charset="0"/>
+                                            </a:rPr>
+                                            <m:t>𝑖</m:t>
+                                          </m:r>
+                                        </m:sub>
+                                      </m:sSub>
+                                    </m:e>
+                                    <m:sub>
+                                      <m:r>
+                                        <a:rPr lang="en-GB" sz="2200" i="1">
+                                          <a:solidFill>
+                                            <a:prstClr val="black"/>
+                                          </a:solidFill>
+                                          <a:latin typeface="Cambria Math" panose="02040503050406030204" pitchFamily="18" charset="0"/>
+                                        </a:rPr>
+                                        <m:t>𝐵</m:t>
+                                      </m:r>
+                                    </m:sub>
+                                  </m:sSub>
+                                </m:e>
+                              </m:d>
+                            </m:den>
+                          </m:f>
+                          <m:r>
+                            <a:rPr lang="en-GB" sz="2200" i="1">
+                              <a:solidFill>
+                                <a:prstClr val="black"/>
+                              </a:solidFill>
+                              <a:latin typeface="Cambria Math" panose="02040503050406030204" pitchFamily="18" charset="0"/>
+                            </a:rPr>
+                            <m:t>    , </m:t>
+                          </m:r>
+                          <m:r>
+                            <a:rPr lang="en-GB" sz="2200" i="1">
+                              <a:solidFill>
+                                <a:prstClr val="black"/>
+                              </a:solidFill>
+                              <a:latin typeface="Cambria Math" panose="02040503050406030204" pitchFamily="18" charset="0"/>
+                              <a:ea typeface="Cambria Math" panose="02040503050406030204" pitchFamily="18" charset="0"/>
+                            </a:rPr>
+                            <m:t>∀  </m:t>
+                          </m:r>
+                          <m:acc>
+                            <m:accPr>
+                              <m:chr m:val="⃗"/>
+                              <m:ctrlPr>
+                                <a:rPr lang="en-GB" sz="2200" i="1">
+                                  <a:solidFill>
+                                    <a:prstClr val="black"/>
+                                  </a:solidFill>
+                                  <a:latin typeface="Cambria Math" panose="02040503050406030204" pitchFamily="18" charset="0"/>
+                                  <a:ea typeface="Cambria Math" panose="02040503050406030204" pitchFamily="18" charset="0"/>
+                                </a:rPr>
+                              </m:ctrlPr>
+                            </m:accPr>
+                            <m:e>
+                              <m:r>
+                                <a:rPr lang="en-GB" sz="2200" i="1">
+                                  <a:solidFill>
+                                    <a:prstClr val="black"/>
+                                  </a:solidFill>
+                                  <a:latin typeface="Cambria Math" panose="02040503050406030204" pitchFamily="18" charset="0"/>
+                                  <a:ea typeface="Cambria Math" panose="02040503050406030204" pitchFamily="18" charset="0"/>
+                                </a:rPr>
+                                <m:t>𝑤</m:t>
+                              </m:r>
+                            </m:e>
+                          </m:acc>
+                          <m:r>
+                            <a:rPr lang="en-GB" sz="2200" i="1">
+                              <a:solidFill>
+                                <a:prstClr val="black"/>
+                              </a:solidFill>
+                              <a:latin typeface="Cambria Math" panose="02040503050406030204" pitchFamily="18" charset="0"/>
+                              <a:ea typeface="Cambria Math" panose="02040503050406030204" pitchFamily="18" charset="0"/>
+                            </a:rPr>
+                            <m:t>∈</m:t>
+                          </m:r>
+                          <m:sSub>
+                            <m:sSubPr>
+                              <m:ctrlPr>
+                                <a:rPr lang="en-GB" sz="2200" i="1">
+                                  <a:solidFill>
+                                    <a:prstClr val="black"/>
+                                  </a:solidFill>
+                                  <a:latin typeface="Cambria Math" panose="02040503050406030204" pitchFamily="18" charset="0"/>
+                                  <a:ea typeface="Cambria Math" panose="02040503050406030204" pitchFamily="18" charset="0"/>
+                                </a:rPr>
+                              </m:ctrlPr>
+                            </m:sSubPr>
+                            <m:e>
+                              <m:r>
+                                <a:rPr lang="en-GB" sz="2200" i="1">
+                                  <a:solidFill>
+                                    <a:prstClr val="black"/>
+                                  </a:solidFill>
+                                  <a:latin typeface="Cambria Math" panose="02040503050406030204" pitchFamily="18" charset="0"/>
+                                  <a:ea typeface="Cambria Math" panose="02040503050406030204" pitchFamily="18" charset="0"/>
+                                </a:rPr>
+                                <m:t>𝐸</m:t>
+                              </m:r>
+                            </m:e>
+                            <m:sub>
+                              <m:r>
+                                <a:rPr lang="en-GB" sz="2200" i="1">
+                                  <a:solidFill>
+                                    <a:prstClr val="black"/>
+                                  </a:solidFill>
+                                  <a:latin typeface="Cambria Math" panose="02040503050406030204" pitchFamily="18" charset="0"/>
+                                  <a:ea typeface="Cambria Math" panose="02040503050406030204" pitchFamily="18" charset="0"/>
+                                </a:rPr>
+                                <m:t>𝑖</m:t>
+                              </m:r>
+                            </m:sub>
+                          </m:sSub>
+                          <m:r>
+                            <a:rPr lang="en-GB" sz="2200" i="1">
+                              <a:solidFill>
+                                <a:prstClr val="black"/>
+                              </a:solidFill>
+                              <a:latin typeface="Cambria Math" panose="02040503050406030204" pitchFamily="18" charset="0"/>
+                              <a:ea typeface="Cambria Math" panose="02040503050406030204" pitchFamily="18" charset="0"/>
+                            </a:rPr>
+                            <m:t>  , </m:t>
+                          </m:r>
+                          <m:r>
+                            <a:rPr lang="en-GB" sz="2200" i="1">
+                              <a:solidFill>
+                                <a:prstClr val="black"/>
+                              </a:solidFill>
+                              <a:latin typeface="Cambria Math" panose="02040503050406030204" pitchFamily="18" charset="0"/>
+                              <a:ea typeface="Cambria Math" panose="02040503050406030204" pitchFamily="18" charset="0"/>
+                            </a:rPr>
+                            <m:t>𝑖</m:t>
+                          </m:r>
+                          <m:r>
+                            <a:rPr lang="en-GB" sz="2200" i="1">
+                              <a:solidFill>
+                                <a:prstClr val="black"/>
+                              </a:solidFill>
+                              <a:latin typeface="Cambria Math" panose="02040503050406030204" pitchFamily="18" charset="0"/>
+                              <a:ea typeface="Cambria Math" panose="02040503050406030204" pitchFamily="18" charset="0"/>
+                            </a:rPr>
+                            <m:t>∈[1,</m:t>
+                          </m:r>
+                          <m:r>
+                            <a:rPr lang="en-GB" sz="2200" i="1">
+                              <a:solidFill>
+                                <a:prstClr val="black"/>
+                              </a:solidFill>
+                              <a:latin typeface="Cambria Math" panose="02040503050406030204" pitchFamily="18" charset="0"/>
+                              <a:ea typeface="Cambria Math" panose="02040503050406030204" pitchFamily="18" charset="0"/>
+                            </a:rPr>
+                            <m:t>𝑚</m:t>
+                          </m:r>
+                          <m:r>
+                            <a:rPr lang="en-GB" sz="2200" i="1">
+                              <a:solidFill>
+                                <a:prstClr val="black"/>
+                              </a:solidFill>
+                              <a:latin typeface="Cambria Math" panose="02040503050406030204" pitchFamily="18" charset="0"/>
+                              <a:ea typeface="Cambria Math" panose="02040503050406030204" pitchFamily="18" charset="0"/>
+                            </a:rPr>
+                            <m:t>]</m:t>
+                          </m:r>
+                        </m:oMath>
+                      </m:oMathPara>
+                    </a14:m>
+                    <a:endParaRPr lang="de-DE" sz="2200" i="1" dirty="0">
+                      <a:solidFill>
+                        <a:prstClr val="black"/>
+                      </a:solidFill>
+                      <a:latin typeface="Cambria Math" panose="02040503050406030204" pitchFamily="18" charset="0"/>
+                    </a:endParaRPr>
+                  </a:p>
+                  <a:p>
+                    <a:pPr lvl="0" algn="just">
+                      <a:spcAft>
+                        <a:spcPts val="300"/>
+                      </a:spcAft>
+                    </a:pPr>
+                    <a:endParaRPr lang="en-GB" sz="2200" i="1" dirty="0">
+                      <a:solidFill>
+                        <a:prstClr val="black"/>
+                      </a:solidFill>
+                      <a:latin typeface="Cambria Math" panose="02040503050406030204" pitchFamily="18" charset="0"/>
+                    </a:endParaRPr>
+                  </a:p>
+                  <a:p>
+                    <a:pPr lvl="0" algn="just">
+                      <a:spcAft>
+                        <a:spcPts val="300"/>
+                      </a:spcAft>
+                    </a:pPr>
+                    <a14:m>
+                      <m:oMathPara xmlns:m="http://schemas.openxmlformats.org/officeDocument/2006/math">
+                        <m:oMathParaPr>
+                          <m:jc m:val="left"/>
+                        </m:oMathParaPr>
+                        <m:oMath xmlns:m="http://schemas.openxmlformats.org/officeDocument/2006/math">
+                          <m:sSup>
+                            <m:sSupPr>
+                              <m:ctrlPr>
+                                <a:rPr lang="en-GB" sz="2200" i="1">
+                                  <a:solidFill>
+                                    <a:prstClr val="black"/>
+                                  </a:solidFill>
+                                  <a:latin typeface="Cambria Math" panose="02040503050406030204" pitchFamily="18" charset="0"/>
+                                </a:rPr>
+                              </m:ctrlPr>
+                            </m:sSupPr>
+                            <m:e>
+                              <m:r>
+                                <a:rPr lang="en-GB" sz="2200" i="1">
+                                  <a:solidFill>
+                                    <a:prstClr val="black"/>
+                                  </a:solidFill>
+                                  <a:latin typeface="Cambria Math" panose="02040503050406030204" pitchFamily="18" charset="0"/>
+                                </a:rPr>
+                                <m:t>𝑇</m:t>
+                              </m:r>
+                            </m:e>
+                            <m:sup>
+                              <m:r>
+                                <a:rPr lang="en-GB" sz="2200" i="1">
+                                  <a:solidFill>
+                                    <a:prstClr val="black"/>
+                                  </a:solidFill>
+                                  <a:latin typeface="Cambria Math" panose="02040503050406030204" pitchFamily="18" charset="0"/>
+                                </a:rPr>
+                                <m:t>∗</m:t>
+                              </m:r>
+                            </m:sup>
+                          </m:sSup>
+                          <m:r>
+                            <a:rPr lang="en-GB" sz="2200" i="1">
+                              <a:solidFill>
+                                <a:prstClr val="black"/>
+                              </a:solidFill>
+                              <a:latin typeface="Cambria Math" panose="02040503050406030204" pitchFamily="18" charset="0"/>
+                            </a:rPr>
+                            <m:t>≔</m:t>
+                          </m:r>
+                          <m:r>
+                            <a:rPr lang="en-GB" sz="2200" i="1">
+                              <a:solidFill>
+                                <a:prstClr val="black"/>
+                              </a:solidFill>
+                              <a:latin typeface="Cambria Math" panose="02040503050406030204" pitchFamily="18" charset="0"/>
+                            </a:rPr>
+                            <m:t>𝑎𝑟𝑔</m:t>
+                          </m:r>
+                          <m:func>
+                            <m:funcPr>
+                              <m:ctrlPr>
+                                <a:rPr lang="en-GB" sz="2200" i="1">
+                                  <a:solidFill>
+                                    <a:prstClr val="black"/>
+                                  </a:solidFill>
+                                  <a:latin typeface="Cambria Math" panose="02040503050406030204" pitchFamily="18" charset="0"/>
+                                </a:rPr>
+                              </m:ctrlPr>
+                            </m:funcPr>
+                            <m:fName>
+                              <m:limLow>
+                                <m:limLowPr>
+                                  <m:ctrlPr>
+                                    <a:rPr lang="en-GB" sz="2200" i="1">
+                                      <a:solidFill>
+                                        <a:prstClr val="black"/>
+                                      </a:solidFill>
+                                      <a:latin typeface="Cambria Math" panose="02040503050406030204" pitchFamily="18" charset="0"/>
+                                    </a:rPr>
+                                  </m:ctrlPr>
+                                </m:limLowPr>
+                                <m:e>
+                                  <m:r>
+                                    <m:rPr>
+                                      <m:sty m:val="p"/>
+                                    </m:rPr>
+                                    <a:rPr lang="en-GB" sz="2200">
+                                      <a:solidFill>
+                                        <a:prstClr val="black"/>
+                                      </a:solidFill>
+                                      <a:latin typeface="Cambria Math" panose="02040503050406030204" pitchFamily="18" charset="0"/>
+                                    </a:rPr>
+                                    <m:t>min</m:t>
+                                  </m:r>
+                                </m:e>
+                                <m:lim>
+                                  <m:r>
+                                    <a:rPr lang="en-GB" sz="2200" i="1">
+                                      <a:solidFill>
+                                        <a:prstClr val="black"/>
+                                      </a:solidFill>
+                                      <a:latin typeface="Cambria Math" panose="02040503050406030204" pitchFamily="18" charset="0"/>
+                                    </a:rPr>
+                                    <m:t>𝑇</m:t>
+                                  </m:r>
+                                </m:lim>
+                              </m:limLow>
+                            </m:fName>
+                            <m:e>
+                              <m:sSubSup>
+                                <m:sSubSupPr>
+                                  <m:ctrlPr>
+                                    <a:rPr lang="en-GB" sz="2200" i="1">
+                                      <a:solidFill>
+                                        <a:prstClr val="black"/>
+                                      </a:solidFill>
+                                      <a:latin typeface="Cambria Math" panose="02040503050406030204" pitchFamily="18" charset="0"/>
+                                    </a:rPr>
+                                  </m:ctrlPr>
+                                </m:sSubSupPr>
+                                <m:e>
+                                  <m:d>
+                                    <m:dPr>
+                                      <m:begChr m:val="‖"/>
+                                      <m:endChr m:val="‖"/>
+                                      <m:ctrlPr>
+                                        <a:rPr lang="en-GB" sz="2200" i="1">
+                                          <a:solidFill>
+                                            <a:prstClr val="black"/>
+                                          </a:solidFill>
+                                          <a:latin typeface="Cambria Math" panose="02040503050406030204" pitchFamily="18" charset="0"/>
+                                        </a:rPr>
+                                      </m:ctrlPr>
+                                    </m:dPr>
+                                    <m:e>
+                                      <m:sSup>
+                                        <m:sSupPr>
+                                          <m:ctrlPr>
+                                            <a:rPr lang="en-GB" sz="2200" i="1">
+                                              <a:solidFill>
+                                                <a:prstClr val="black"/>
+                                              </a:solidFill>
+                                              <a:latin typeface="Cambria Math" panose="02040503050406030204" pitchFamily="18" charset="0"/>
+                                            </a:rPr>
+                                          </m:ctrlPr>
+                                        </m:sSupPr>
+                                        <m:e>
+                                          <m:d>
+                                            <m:dPr>
+                                              <m:ctrlPr>
+                                                <a:rPr lang="en-GB" sz="2200" i="1">
+                                                  <a:solidFill>
+                                                    <a:prstClr val="black"/>
+                                                  </a:solidFill>
+                                                  <a:latin typeface="Cambria Math" panose="02040503050406030204" pitchFamily="18" charset="0"/>
+                                                </a:rPr>
+                                              </m:ctrlPr>
+                                            </m:dPr>
+                                            <m:e>
+                                              <m:r>
+                                                <a:rPr lang="en-GB" sz="2200" i="1">
+                                                  <a:solidFill>
+                                                    <a:prstClr val="black"/>
+                                                  </a:solidFill>
+                                                  <a:latin typeface="Cambria Math" panose="02040503050406030204" pitchFamily="18" charset="0"/>
+                                                </a:rPr>
+                                                <m:t>𝑇𝑊</m:t>
+                                              </m:r>
+                                            </m:e>
+                                          </m:d>
+                                        </m:e>
+                                        <m:sup>
+                                          <m:r>
+                                            <a:rPr lang="en-GB" sz="2200" i="1">
+                                              <a:solidFill>
+                                                <a:prstClr val="black"/>
+                                              </a:solidFill>
+                                              <a:latin typeface="Cambria Math" panose="02040503050406030204" pitchFamily="18" charset="0"/>
+                                            </a:rPr>
+                                            <m:t>𝑇</m:t>
+                                          </m:r>
+                                        </m:sup>
+                                      </m:sSup>
+                                      <m:d>
+                                        <m:dPr>
+                                          <m:ctrlPr>
+                                            <a:rPr lang="en-GB" sz="2200" i="1">
+                                              <a:solidFill>
+                                                <a:prstClr val="black"/>
+                                              </a:solidFill>
+                                              <a:latin typeface="Cambria Math" panose="02040503050406030204" pitchFamily="18" charset="0"/>
+                                            </a:rPr>
+                                          </m:ctrlPr>
+                                        </m:dPr>
+                                        <m:e>
+                                          <m:r>
+                                            <a:rPr lang="en-GB" sz="2200" i="1">
+                                              <a:solidFill>
+                                                <a:prstClr val="black"/>
+                                              </a:solidFill>
+                                              <a:latin typeface="Cambria Math" panose="02040503050406030204" pitchFamily="18" charset="0"/>
+                                            </a:rPr>
+                                            <m:t>𝑇𝑊</m:t>
+                                          </m:r>
+                                        </m:e>
+                                      </m:d>
+                                      <m:r>
+                                        <a:rPr lang="en-GB" sz="2200" i="1">
+                                          <a:solidFill>
+                                            <a:prstClr val="black"/>
+                                          </a:solidFill>
+                                          <a:latin typeface="Cambria Math" panose="02040503050406030204" pitchFamily="18" charset="0"/>
+                                        </a:rPr>
+                                        <m:t>−</m:t>
+                                      </m:r>
+                                      <m:sSup>
+                                        <m:sSupPr>
+                                          <m:ctrlPr>
+                                            <a:rPr lang="en-GB" sz="2200" i="1">
+                                              <a:solidFill>
+                                                <a:prstClr val="black"/>
+                                              </a:solidFill>
+                                              <a:latin typeface="Cambria Math" panose="02040503050406030204" pitchFamily="18" charset="0"/>
+                                            </a:rPr>
+                                          </m:ctrlPr>
+                                        </m:sSupPr>
+                                        <m:e>
+                                          <m:r>
+                                            <a:rPr lang="en-GB" sz="2200" i="1">
+                                              <a:solidFill>
+                                                <a:prstClr val="black"/>
+                                              </a:solidFill>
+                                              <a:latin typeface="Cambria Math" panose="02040503050406030204" pitchFamily="18" charset="0"/>
+                                            </a:rPr>
+                                            <m:t>𝑊</m:t>
+                                          </m:r>
+                                        </m:e>
+                                        <m:sup>
+                                          <m:r>
+                                            <a:rPr lang="en-GB" sz="2200" i="1">
+                                              <a:solidFill>
+                                                <a:prstClr val="black"/>
+                                              </a:solidFill>
+                                              <a:latin typeface="Cambria Math" panose="02040503050406030204" pitchFamily="18" charset="0"/>
+                                            </a:rPr>
+                                            <m:t>𝑇</m:t>
+                                          </m:r>
+                                        </m:sup>
+                                      </m:sSup>
+                                      <m:r>
+                                        <a:rPr lang="en-GB" sz="2200" i="1">
+                                          <a:solidFill>
+                                            <a:prstClr val="black"/>
+                                          </a:solidFill>
+                                          <a:latin typeface="Cambria Math" panose="02040503050406030204" pitchFamily="18" charset="0"/>
+                                        </a:rPr>
+                                        <m:t>𝑊</m:t>
+                                      </m:r>
+                                    </m:e>
+                                  </m:d>
+                                </m:e>
+                                <m:sub>
+                                  <m:r>
+                                    <a:rPr lang="en-GB" sz="2200" i="1">
+                                      <a:solidFill>
+                                        <a:prstClr val="black"/>
+                                      </a:solidFill>
+                                      <a:latin typeface="Cambria Math" panose="02040503050406030204" pitchFamily="18" charset="0"/>
+                                    </a:rPr>
+                                    <m:t>𝐹</m:t>
+                                  </m:r>
+                                </m:sub>
+                                <m:sup>
+                                  <m:r>
+                                    <a:rPr lang="en-GB" sz="2200" i="1">
+                                      <a:solidFill>
+                                        <a:prstClr val="black"/>
+                                      </a:solidFill>
+                                      <a:latin typeface="Cambria Math" panose="02040503050406030204" pitchFamily="18" charset="0"/>
+                                    </a:rPr>
+                                    <m:t>2</m:t>
+                                  </m:r>
+                                </m:sup>
+                              </m:sSubSup>
+                              <m:r>
+                                <a:rPr lang="en-GB" sz="2200" i="1">
+                                  <a:solidFill>
+                                    <a:prstClr val="black"/>
+                                  </a:solidFill>
+                                  <a:latin typeface="Cambria Math" panose="02040503050406030204" pitchFamily="18" charset="0"/>
+                                </a:rPr>
+                                <m:t>+</m:t>
+                              </m:r>
+                              <m:r>
+                                <a:rPr lang="en-GB" sz="2200" i="1">
+                                  <a:solidFill>
+                                    <a:prstClr val="black"/>
+                                  </a:solidFill>
+                                  <a:latin typeface="Cambria Math" panose="02040503050406030204" pitchFamily="18" charset="0"/>
+                                  <a:ea typeface="Cambria Math" panose="02040503050406030204" pitchFamily="18" charset="0"/>
+                                </a:rPr>
+                                <m:t>𝜆</m:t>
+                              </m:r>
+                              <m:sSubSup>
+                                <m:sSubSupPr>
+                                  <m:ctrlPr>
+                                    <a:rPr lang="en-GB" sz="2200" i="1">
+                                      <a:solidFill>
+                                        <a:prstClr val="black"/>
+                                      </a:solidFill>
+                                      <a:latin typeface="Cambria Math" panose="02040503050406030204" pitchFamily="18" charset="0"/>
+                                      <a:ea typeface="Cambria Math" panose="02040503050406030204" pitchFamily="18" charset="0"/>
+                                    </a:rPr>
+                                  </m:ctrlPr>
+                                </m:sSubSupPr>
+                                <m:e>
+                                  <m:d>
+                                    <m:dPr>
+                                      <m:begChr m:val="‖"/>
+                                      <m:endChr m:val="‖"/>
+                                      <m:ctrlPr>
+                                        <a:rPr lang="en-GB" sz="2200" i="1">
+                                          <a:solidFill>
+                                            <a:prstClr val="black"/>
+                                          </a:solidFill>
+                                          <a:latin typeface="Cambria Math" panose="02040503050406030204" pitchFamily="18" charset="0"/>
+                                          <a:ea typeface="Cambria Math" panose="02040503050406030204" pitchFamily="18" charset="0"/>
+                                        </a:rPr>
+                                      </m:ctrlPr>
+                                    </m:dPr>
+                                    <m:e>
+                                      <m:sSup>
+                                        <m:sSupPr>
+                                          <m:ctrlPr>
+                                            <a:rPr lang="en-GB" sz="2200" i="1">
+                                              <a:solidFill>
+                                                <a:prstClr val="black"/>
+                                              </a:solidFill>
+                                              <a:latin typeface="Cambria Math" panose="02040503050406030204" pitchFamily="18" charset="0"/>
+                                              <a:ea typeface="Cambria Math" panose="02040503050406030204" pitchFamily="18" charset="0"/>
+                                            </a:rPr>
+                                          </m:ctrlPr>
+                                        </m:sSupPr>
+                                        <m:e>
+                                          <m:d>
+                                            <m:dPr>
+                                              <m:ctrlPr>
+                                                <a:rPr lang="en-GB" sz="2200" i="1">
+                                                  <a:solidFill>
+                                                    <a:prstClr val="black"/>
+                                                  </a:solidFill>
+                                                  <a:latin typeface="Cambria Math" panose="02040503050406030204" pitchFamily="18" charset="0"/>
+                                                  <a:ea typeface="Cambria Math" panose="02040503050406030204" pitchFamily="18" charset="0"/>
+                                                </a:rPr>
+                                              </m:ctrlPr>
+                                            </m:dPr>
+                                            <m:e>
+                                              <m:r>
+                                                <a:rPr lang="en-GB" sz="2200" i="1">
+                                                  <a:solidFill>
+                                                    <a:prstClr val="black"/>
+                                                  </a:solidFill>
+                                                  <a:latin typeface="Cambria Math" panose="02040503050406030204" pitchFamily="18" charset="0"/>
+                                                  <a:ea typeface="Cambria Math" panose="02040503050406030204" pitchFamily="18" charset="0"/>
+                                                </a:rPr>
+                                                <m:t>𝑇𝐵</m:t>
+                                              </m:r>
+                                            </m:e>
+                                          </m:d>
+                                        </m:e>
+                                        <m:sup>
+                                          <m:r>
+                                            <a:rPr lang="en-GB" sz="2200" i="1">
+                                              <a:solidFill>
+                                                <a:prstClr val="black"/>
+                                              </a:solidFill>
+                                              <a:latin typeface="Cambria Math" panose="02040503050406030204" pitchFamily="18" charset="0"/>
+                                              <a:ea typeface="Cambria Math" panose="02040503050406030204" pitchFamily="18" charset="0"/>
+                                            </a:rPr>
+                                            <m:t>𝑇</m:t>
+                                          </m:r>
+                                        </m:sup>
+                                      </m:sSup>
+                                      <m:d>
+                                        <m:dPr>
+                                          <m:ctrlPr>
+                                            <a:rPr lang="en-GB" sz="2200" i="1">
+                                              <a:solidFill>
+                                                <a:prstClr val="black"/>
+                                              </a:solidFill>
+                                              <a:latin typeface="Cambria Math" panose="02040503050406030204" pitchFamily="18" charset="0"/>
+                                              <a:ea typeface="Cambria Math" panose="02040503050406030204" pitchFamily="18" charset="0"/>
+                                            </a:rPr>
+                                          </m:ctrlPr>
+                                        </m:dPr>
+                                        <m:e>
+                                          <m:r>
+                                            <a:rPr lang="en-GB" sz="2200" i="1">
+                                              <a:solidFill>
+                                                <a:prstClr val="black"/>
+                                              </a:solidFill>
+                                              <a:latin typeface="Cambria Math" panose="02040503050406030204" pitchFamily="18" charset="0"/>
+                                              <a:ea typeface="Cambria Math" panose="02040503050406030204" pitchFamily="18" charset="0"/>
+                                            </a:rPr>
+                                            <m:t>𝑇𝐵</m:t>
+                                          </m:r>
+                                        </m:e>
+                                      </m:d>
+                                    </m:e>
+                                  </m:d>
+                                </m:e>
+                                <m:sub>
+                                  <m:r>
+                                    <a:rPr lang="en-GB" sz="2200" i="1">
+                                      <a:solidFill>
+                                        <a:prstClr val="black"/>
+                                      </a:solidFill>
+                                      <a:latin typeface="Cambria Math" panose="02040503050406030204" pitchFamily="18" charset="0"/>
+                                      <a:ea typeface="Cambria Math" panose="02040503050406030204" pitchFamily="18" charset="0"/>
+                                    </a:rPr>
+                                    <m:t>𝐹</m:t>
+                                  </m:r>
+                                </m:sub>
+                                <m:sup>
+                                  <m:r>
+                                    <a:rPr lang="en-GB" sz="2200" i="1">
+                                      <a:solidFill>
+                                        <a:prstClr val="black"/>
+                                      </a:solidFill>
+                                      <a:latin typeface="Cambria Math" panose="02040503050406030204" pitchFamily="18" charset="0"/>
+                                      <a:ea typeface="Cambria Math" panose="02040503050406030204" pitchFamily="18" charset="0"/>
+                                    </a:rPr>
+                                    <m:t>2</m:t>
+                                  </m:r>
+                                </m:sup>
+                              </m:sSubSup>
+                            </m:e>
+                          </m:func>
+                        </m:oMath>
+                      </m:oMathPara>
+                    </a14:m>
+                    <a:endParaRPr lang="en-GB" sz="2200" i="1" dirty="0">
+                      <a:solidFill>
+                        <a:prstClr val="black"/>
+                      </a:solidFill>
+                      <a:latin typeface="Cambria Math" panose="02040503050406030204" pitchFamily="18" charset="0"/>
+                    </a:endParaRPr>
+                  </a:p>
+                  <a:p>
+                    <a:pPr lvl="0" algn="just">
+                      <a:spcAft>
+                        <a:spcPts val="300"/>
+                      </a:spcAft>
+                    </a:pPr>
+                    <a14:m>
+                      <m:oMathPara xmlns:m="http://schemas.openxmlformats.org/officeDocument/2006/math">
+                        <m:oMathParaPr>
+                          <m:jc m:val="left"/>
+                        </m:oMathParaPr>
+                        <m:oMath xmlns:m="http://schemas.openxmlformats.org/officeDocument/2006/math">
+                          <m:acc>
+                            <m:accPr>
+                              <m:chr m:val="̂"/>
+                              <m:ctrlPr>
+                                <a:rPr lang="en-GB" sz="2200" i="1">
+                                  <a:solidFill>
+                                    <a:prstClr val="black"/>
+                                  </a:solidFill>
+                                  <a:latin typeface="Cambria Math" panose="02040503050406030204" pitchFamily="18" charset="0"/>
+                                </a:rPr>
+                              </m:ctrlPr>
+                            </m:accPr>
+                            <m:e>
+                              <m:r>
+                                <a:rPr lang="en-GB" sz="2200" i="1">
+                                  <a:solidFill>
+                                    <a:prstClr val="black"/>
+                                  </a:solidFill>
+                                  <a:latin typeface="Cambria Math" panose="02040503050406030204" pitchFamily="18" charset="0"/>
+                                </a:rPr>
+                                <m:t>𝑊</m:t>
+                              </m:r>
+                            </m:e>
+                          </m:acc>
+                          <m:r>
+                            <a:rPr lang="en-GB" sz="2200" i="1">
+                              <a:solidFill>
+                                <a:prstClr val="black"/>
+                              </a:solidFill>
+                              <a:latin typeface="Cambria Math" panose="02040503050406030204" pitchFamily="18" charset="0"/>
+                            </a:rPr>
+                            <m:t>≔</m:t>
+                          </m:r>
+                          <m:d>
+                            <m:dPr>
+                              <m:begChr m:val="{"/>
+                              <m:endChr m:val="}"/>
+                              <m:ctrlPr>
+                                <a:rPr lang="en-GB" sz="2200" i="1">
+                                  <a:solidFill>
+                                    <a:prstClr val="black"/>
+                                  </a:solidFill>
+                                  <a:latin typeface="Cambria Math" panose="02040503050406030204" pitchFamily="18" charset="0"/>
+                                </a:rPr>
+                              </m:ctrlPr>
+                            </m:dPr>
+                            <m:e>
+                              <m:f>
+                                <m:fPr>
+                                  <m:type m:val="lin"/>
+                                  <m:ctrlPr>
+                                    <a:rPr lang="en-GB" sz="2200" i="1">
+                                      <a:solidFill>
+                                        <a:prstClr val="black"/>
+                                      </a:solidFill>
+                                      <a:latin typeface="Cambria Math" panose="02040503050406030204" pitchFamily="18" charset="0"/>
+                                    </a:rPr>
+                                  </m:ctrlPr>
+                                </m:fPr>
+                                <m:num>
+                                  <m:sSup>
+                                    <m:sSupPr>
+                                      <m:ctrlPr>
+                                        <a:rPr lang="en-GB" sz="2200" i="1">
+                                          <a:solidFill>
+                                            <a:prstClr val="black"/>
+                                          </a:solidFill>
+                                          <a:latin typeface="Cambria Math" panose="02040503050406030204" pitchFamily="18" charset="0"/>
+                                        </a:rPr>
+                                      </m:ctrlPr>
+                                    </m:sSupPr>
+                                    <m:e>
+                                      <m:r>
+                                        <a:rPr lang="en-GB" sz="2200" i="1">
+                                          <a:solidFill>
+                                            <a:prstClr val="black"/>
+                                          </a:solidFill>
+                                          <a:latin typeface="Cambria Math" panose="02040503050406030204" pitchFamily="18" charset="0"/>
+                                        </a:rPr>
+                                        <m:t>𝑇</m:t>
+                                      </m:r>
+                                    </m:e>
+                                    <m:sup>
+                                      <m:r>
+                                        <a:rPr lang="en-GB" sz="2200" i="1">
+                                          <a:solidFill>
+                                            <a:prstClr val="black"/>
+                                          </a:solidFill>
+                                          <a:latin typeface="Cambria Math" panose="02040503050406030204" pitchFamily="18" charset="0"/>
+                                        </a:rPr>
+                                        <m:t>∗</m:t>
+                                      </m:r>
+                                    </m:sup>
+                                  </m:sSup>
+                                  <m:acc>
+                                    <m:accPr>
+                                      <m:chr m:val="⃗"/>
+                                      <m:ctrlPr>
+                                        <a:rPr lang="en-GB" sz="2200" i="1">
+                                          <a:solidFill>
+                                            <a:prstClr val="black"/>
+                                          </a:solidFill>
+                                          <a:latin typeface="Cambria Math" panose="02040503050406030204" pitchFamily="18" charset="0"/>
+                                        </a:rPr>
+                                      </m:ctrlPr>
+                                    </m:accPr>
+                                    <m:e>
+                                      <m:r>
+                                        <a:rPr lang="en-GB" sz="2200" i="1">
+                                          <a:solidFill>
+                                            <a:prstClr val="black"/>
+                                          </a:solidFill>
+                                          <a:latin typeface="Cambria Math" panose="02040503050406030204" pitchFamily="18" charset="0"/>
+                                        </a:rPr>
+                                        <m:t>𝑤</m:t>
+                                      </m:r>
+                                    </m:e>
+                                  </m:acc>
+                                </m:num>
+                                <m:den>
+                                  <m:sSub>
+                                    <m:sSubPr>
+                                      <m:ctrlPr>
+                                        <a:rPr lang="en-GB" sz="2200" i="1">
+                                          <a:solidFill>
+                                            <a:prstClr val="black"/>
+                                          </a:solidFill>
+                                          <a:latin typeface="Cambria Math" panose="02040503050406030204" pitchFamily="18" charset="0"/>
+                                        </a:rPr>
+                                      </m:ctrlPr>
+                                    </m:sSubPr>
+                                    <m:e>
+                                      <m:d>
+                                        <m:dPr>
+                                          <m:begChr m:val="‖"/>
+                                          <m:endChr m:val="‖"/>
+                                          <m:ctrlPr>
+                                            <a:rPr lang="en-GB" sz="2200" i="1">
+                                              <a:solidFill>
+                                                <a:prstClr val="black"/>
+                                              </a:solidFill>
+                                              <a:latin typeface="Cambria Math" panose="02040503050406030204" pitchFamily="18" charset="0"/>
+                                            </a:rPr>
+                                          </m:ctrlPr>
+                                        </m:dPr>
+                                        <m:e>
+                                          <m:sSup>
+                                            <m:sSupPr>
+                                              <m:ctrlPr>
+                                                <a:rPr lang="en-GB" sz="2200" i="1">
+                                                  <a:solidFill>
+                                                    <a:prstClr val="black"/>
+                                                  </a:solidFill>
+                                                  <a:latin typeface="Cambria Math" panose="02040503050406030204" pitchFamily="18" charset="0"/>
+                                                </a:rPr>
+                                              </m:ctrlPr>
+                                            </m:sSupPr>
+                                            <m:e>
+                                              <m:r>
+                                                <a:rPr lang="en-GB" sz="2200" i="1">
+                                                  <a:solidFill>
+                                                    <a:prstClr val="black"/>
+                                                  </a:solidFill>
+                                                  <a:latin typeface="Cambria Math" panose="02040503050406030204" pitchFamily="18" charset="0"/>
+                                                </a:rPr>
+                                                <m:t>𝑇</m:t>
+                                              </m:r>
+                                            </m:e>
+                                            <m:sup>
+                                              <m:r>
+                                                <a:rPr lang="en-GB" sz="2200" i="1">
+                                                  <a:solidFill>
+                                                    <a:prstClr val="black"/>
+                                                  </a:solidFill>
+                                                  <a:latin typeface="Cambria Math" panose="02040503050406030204" pitchFamily="18" charset="0"/>
+                                                </a:rPr>
+                                                <m:t>∗</m:t>
+                                              </m:r>
+                                            </m:sup>
+                                          </m:sSup>
+                                          <m:acc>
+                                            <m:accPr>
+                                              <m:chr m:val="⃗"/>
+                                              <m:ctrlPr>
+                                                <a:rPr lang="en-GB" sz="2200" i="1">
+                                                  <a:solidFill>
+                                                    <a:prstClr val="black"/>
+                                                  </a:solidFill>
+                                                  <a:latin typeface="Cambria Math" panose="02040503050406030204" pitchFamily="18" charset="0"/>
+                                                </a:rPr>
+                                              </m:ctrlPr>
+                                            </m:accPr>
+                                            <m:e>
+                                              <m:r>
+                                                <a:rPr lang="en-GB" sz="2200" i="1">
+                                                  <a:solidFill>
+                                                    <a:prstClr val="black"/>
+                                                  </a:solidFill>
+                                                  <a:latin typeface="Cambria Math" panose="02040503050406030204" pitchFamily="18" charset="0"/>
+                                                </a:rPr>
+                                                <m:t>𝑤</m:t>
+                                              </m:r>
+                                            </m:e>
+                                          </m:acc>
+                                        </m:e>
+                                      </m:d>
+                                    </m:e>
+                                    <m:sub>
+                                      <m:r>
+                                        <a:rPr lang="en-GB" sz="2200" i="1">
+                                          <a:solidFill>
+                                            <a:prstClr val="black"/>
+                                          </a:solidFill>
+                                          <a:latin typeface="Cambria Math" panose="02040503050406030204" pitchFamily="18" charset="0"/>
+                                        </a:rPr>
+                                        <m:t>2</m:t>
+                                      </m:r>
+                                    </m:sub>
+                                  </m:sSub>
+                                </m:den>
+                              </m:f>
+                              <m:r>
+                                <a:rPr lang="en-GB" sz="2200" i="1">
+                                  <a:solidFill>
+                                    <a:prstClr val="black"/>
+                                  </a:solidFill>
+                                  <a:latin typeface="Cambria Math" panose="02040503050406030204" pitchFamily="18" charset="0"/>
+                                </a:rPr>
+                                <m:t>, </m:t>
+                              </m:r>
+                              <m:r>
+                                <a:rPr lang="en-GB" sz="2200" i="1">
+                                  <a:solidFill>
+                                    <a:prstClr val="black"/>
+                                  </a:solidFill>
+                                  <a:latin typeface="Cambria Math" panose="02040503050406030204" pitchFamily="18" charset="0"/>
+                                </a:rPr>
+                                <m:t>𝑤</m:t>
+                              </m:r>
+                              <m:r>
+                                <a:rPr lang="en-GB" sz="2200" i="1">
+                                  <a:solidFill>
+                                    <a:prstClr val="black"/>
+                                  </a:solidFill>
+                                  <a:latin typeface="Cambria Math" panose="02040503050406030204" pitchFamily="18" charset="0"/>
+                                  <a:ea typeface="Cambria Math" panose="02040503050406030204" pitchFamily="18" charset="0"/>
+                                </a:rPr>
+                                <m:t>∈</m:t>
+                              </m:r>
+                              <m:r>
+                                <a:rPr lang="en-GB" sz="2200" i="1">
+                                  <a:solidFill>
+                                    <a:prstClr val="black"/>
+                                  </a:solidFill>
+                                  <a:latin typeface="Cambria Math" panose="02040503050406030204" pitchFamily="18" charset="0"/>
+                                  <a:ea typeface="Cambria Math" panose="02040503050406030204" pitchFamily="18" charset="0"/>
+                                </a:rPr>
+                                <m:t>𝑊</m:t>
+                              </m:r>
+                            </m:e>
+                          </m:d>
+                        </m:oMath>
+                      </m:oMathPara>
+                    </a14:m>
+                    <a:endParaRPr lang="en-GB" sz="2200" i="1" dirty="0">
+                      <a:solidFill>
+                        <a:prstClr val="black"/>
+                      </a:solidFill>
+                      <a:latin typeface="Cambria Math" panose="02040503050406030204" pitchFamily="18" charset="0"/>
+                    </a:endParaRPr>
+                  </a:p>
+                </p:txBody>
+              </p:sp>
+            </mc:Choice>
+            <mc:Fallback>
+              <p:sp>
+                <p:nvSpPr>
+                  <p:cNvPr id="7" name="TextBox 6">
+                    <a:extLst>
+                      <a:ext uri="{FF2B5EF4-FFF2-40B4-BE49-F238E27FC236}">
+                        <a16:creationId xmlns:a16="http://schemas.microsoft.com/office/drawing/2014/main" id="{0AACC856-B243-45CE-884D-7AC6E0144FF6}"/>
+                      </a:ext>
+                    </a:extLst>
+                  </p:cNvPr>
+                  <p:cNvSpPr txBox="1">
+                    <a:spLocks noRot="1" noChangeAspect="1" noMove="1" noResize="1" noEditPoints="1" noAdjustHandles="1" noChangeArrowheads="1" noChangeShapeType="1" noTextEdit="1"/>
+                  </p:cNvSpPr>
+                  <p:nvPr/>
+                </p:nvSpPr>
+                <p:spPr>
+                  <a:xfrm>
+                    <a:off x="12043642" y="15301912"/>
+                    <a:ext cx="7093263" cy="5548378"/>
+                  </a:xfrm>
+                  <a:prstGeom prst="rect">
+                    <a:avLst/>
+                  </a:prstGeom>
+                  <a:blipFill>
+                    <a:blip r:embed="rId8"/>
+                    <a:stretch>
+                      <a:fillRect l="-86"/>
+                    </a:stretch>
+                  </a:blipFill>
+                </p:spPr>
+                <p:txBody>
+                  <a:bodyPr/>
+                  <a:lstStyle/>
+                  <a:p>
+                    <a:r>
+                      <a:rPr lang="en-GB">
+                        <a:noFill/>
+                      </a:rPr>
+                      <a:t> </a:t>
+                    </a:r>
+                  </a:p>
+                </p:txBody>
+              </p:sp>
+            </mc:Fallback>
+          </mc:AlternateContent>
+          <p:grpSp>
+            <p:nvGrpSpPr>
+              <p:cNvPr id="32" name="Group 31">
+                <a:extLst>
+                  <a:ext uri="{FF2B5EF4-FFF2-40B4-BE49-F238E27FC236}">
+                    <a16:creationId xmlns:a16="http://schemas.microsoft.com/office/drawing/2014/main" id="{CC06454A-CD8F-4AD6-BE55-F4EB5FC5C15B}"/>
+                  </a:ext>
+                </a:extLst>
+              </p:cNvPr>
+              <p:cNvGrpSpPr/>
+              <p:nvPr/>
+            </p:nvGrpSpPr>
+            <p:grpSpPr>
+              <a:xfrm>
+                <a:off x="11087829" y="15517936"/>
+                <a:ext cx="883806" cy="5365741"/>
+                <a:chOff x="11087829" y="15517936"/>
+                <a:chExt cx="883806" cy="5365741"/>
+              </a:xfrm>
+            </p:grpSpPr>
+            <p:grpSp>
+              <p:nvGrpSpPr>
+                <p:cNvPr id="31" name="Group 30">
+                  <a:extLst>
+                    <a:ext uri="{FF2B5EF4-FFF2-40B4-BE49-F238E27FC236}">
+                      <a16:creationId xmlns:a16="http://schemas.microsoft.com/office/drawing/2014/main" id="{5788526D-7A21-4AE3-8F03-BB85BEFD7744}"/>
+                    </a:ext>
+                  </a:extLst>
+                </p:cNvPr>
+                <p:cNvGrpSpPr/>
+                <p:nvPr/>
+              </p:nvGrpSpPr>
+              <p:grpSpPr>
+                <a:xfrm>
+                  <a:off x="11676979" y="15517936"/>
+                  <a:ext cx="294656" cy="5284747"/>
+                  <a:chOff x="11676979" y="15517936"/>
+                  <a:chExt cx="294656" cy="5284747"/>
+                </a:xfrm>
+              </p:grpSpPr>
+              <p:sp>
+                <p:nvSpPr>
+                  <p:cNvPr id="6" name="Left Brace 5">
+                    <a:extLst>
+                      <a:ext uri="{FF2B5EF4-FFF2-40B4-BE49-F238E27FC236}">
+                        <a16:creationId xmlns:a16="http://schemas.microsoft.com/office/drawing/2014/main" id="{9CE2C7E2-6888-428B-A9D9-DAA2381B1314}"/>
+                      </a:ext>
+                    </a:extLst>
+                  </p:cNvPr>
+                  <p:cNvSpPr/>
+                  <p:nvPr/>
+                </p:nvSpPr>
+                <p:spPr>
+                  <a:xfrm>
+                    <a:off x="11676979" y="15517936"/>
+                    <a:ext cx="294656" cy="1656183"/>
+                  </a:xfrm>
+                  <a:prstGeom prst="leftBrace">
+                    <a:avLst/>
+                  </a:prstGeom>
+                </p:spPr>
+                <p:style>
+                  <a:lnRef idx="1">
+                    <a:schemeClr val="dk1"/>
+                  </a:lnRef>
+                  <a:fillRef idx="0">
+                    <a:schemeClr val="dk1"/>
+                  </a:fillRef>
+                  <a:effectRef idx="0">
+                    <a:schemeClr val="dk1"/>
+                  </a:effectRef>
+                  <a:fontRef idx="minor">
+                    <a:schemeClr val="tx1"/>
+                  </a:fontRef>
+                </p:style>
+                <p:txBody>
+                  <a:bodyPr rot="0" spcFirstLastPara="0" vertOverflow="overflow" horzOverflow="overflow" vert="horz" wrap="square" lIns="91440" tIns="45720" rIns="91440" bIns="45720" numCol="1" spcCol="0" rtlCol="0" fromWordArt="0" anchor="ctr" anchorCtr="0" forceAA="0" compatLnSpc="1">
+                    <a:prstTxWarp prst="textNoShape">
+                      <a:avLst/>
+                    </a:prstTxWarp>
+                    <a:noAutofit/>
+                  </a:bodyPr>
+                  <a:lstStyle/>
+                  <a:p>
+                    <a:pPr algn="ctr"/>
+                    <a:endParaRPr lang="en-GB">
+                      <a:ln w="0"/>
+                      <a:effectLst>
+                        <a:outerShdw blurRad="38100" dist="19050" dir="2700000" algn="tl" rotWithShape="0">
+                          <a:schemeClr val="dk1">
+                            <a:alpha val="40000"/>
+                          </a:schemeClr>
+                        </a:outerShdw>
+                      </a:effectLst>
+                    </a:endParaRPr>
+                  </a:p>
+                </p:txBody>
+              </p:sp>
+              <p:sp>
+                <p:nvSpPr>
+                  <p:cNvPr id="18" name="Left Brace 17">
+                    <a:extLst>
+                      <a:ext uri="{FF2B5EF4-FFF2-40B4-BE49-F238E27FC236}">
+                        <a16:creationId xmlns:a16="http://schemas.microsoft.com/office/drawing/2014/main" id="{C56E1506-EB40-4A7B-82AF-14A07534BB5F}"/>
+                      </a:ext>
+                    </a:extLst>
+                  </p:cNvPr>
+                  <p:cNvSpPr/>
+                  <p:nvPr/>
+                </p:nvSpPr>
+                <p:spPr>
+                  <a:xfrm>
+                    <a:off x="11676979" y="17630232"/>
+                    <a:ext cx="294656" cy="272207"/>
+                  </a:xfrm>
+                  <a:prstGeom prst="leftBrace">
+                    <a:avLst/>
+                  </a:prstGeom>
+                </p:spPr>
+                <p:style>
+                  <a:lnRef idx="1">
+                    <a:schemeClr val="dk1"/>
+                  </a:lnRef>
+                  <a:fillRef idx="0">
+                    <a:schemeClr val="dk1"/>
+                  </a:fillRef>
+                  <a:effectRef idx="0">
+                    <a:schemeClr val="dk1"/>
+                  </a:effectRef>
+                  <a:fontRef idx="minor">
+                    <a:schemeClr val="tx1"/>
+                  </a:fontRef>
+                </p:style>
+                <p:txBody>
+                  <a:bodyPr rot="0" spcFirstLastPara="0" vertOverflow="overflow" horzOverflow="overflow" vert="horz" wrap="square" lIns="91440" tIns="45720" rIns="91440" bIns="45720" numCol="1" spcCol="0" rtlCol="0" fromWordArt="0" anchor="ctr" anchorCtr="0" forceAA="0" compatLnSpc="1">
+                    <a:prstTxWarp prst="textNoShape">
+                      <a:avLst/>
+                    </a:prstTxWarp>
+                    <a:noAutofit/>
+                  </a:bodyPr>
+                  <a:lstStyle/>
+                  <a:p>
+                    <a:pPr algn="ctr"/>
+                    <a:endParaRPr lang="en-GB">
+                      <a:ln w="0"/>
+                      <a:effectLst>
+                        <a:outerShdw blurRad="38100" dist="19050" dir="2700000" algn="tl" rotWithShape="0">
+                          <a:schemeClr val="dk1">
+                            <a:alpha val="40000"/>
+                          </a:schemeClr>
+                        </a:outerShdw>
+                      </a:effectLst>
+                    </a:endParaRPr>
+                  </a:p>
+                </p:txBody>
+              </p:sp>
+              <p:sp>
+                <p:nvSpPr>
+                  <p:cNvPr id="23" name="Left Brace 22">
+                    <a:extLst>
+                      <a:ext uri="{FF2B5EF4-FFF2-40B4-BE49-F238E27FC236}">
+                        <a16:creationId xmlns:a16="http://schemas.microsoft.com/office/drawing/2014/main" id="{EF51D969-49E6-4463-9DF9-E2AA54FDB944}"/>
+                      </a:ext>
+                    </a:extLst>
+                  </p:cNvPr>
+                  <p:cNvSpPr/>
+                  <p:nvPr/>
+                </p:nvSpPr>
+                <p:spPr>
+                  <a:xfrm>
+                    <a:off x="11676979" y="18182232"/>
+                    <a:ext cx="294656" cy="989287"/>
+                  </a:xfrm>
+                  <a:prstGeom prst="leftBrace">
+                    <a:avLst/>
+                  </a:prstGeom>
+                </p:spPr>
+                <p:style>
+                  <a:lnRef idx="1">
+                    <a:schemeClr val="dk1"/>
+                  </a:lnRef>
+                  <a:fillRef idx="0">
+                    <a:schemeClr val="dk1"/>
+                  </a:fillRef>
+                  <a:effectRef idx="0">
+                    <a:schemeClr val="dk1"/>
+                  </a:effectRef>
+                  <a:fontRef idx="minor">
+                    <a:schemeClr val="tx1"/>
+                  </a:fontRef>
+                </p:style>
+                <p:txBody>
+                  <a:bodyPr rot="0" spcFirstLastPara="0" vertOverflow="overflow" horzOverflow="overflow" vert="horz" wrap="square" lIns="91440" tIns="45720" rIns="91440" bIns="45720" numCol="1" spcCol="0" rtlCol="0" fromWordArt="0" anchor="ctr" anchorCtr="0" forceAA="0" compatLnSpc="1">
+                    <a:prstTxWarp prst="textNoShape">
+                      <a:avLst/>
+                    </a:prstTxWarp>
+                    <a:noAutofit/>
+                  </a:bodyPr>
+                  <a:lstStyle/>
+                  <a:p>
+                    <a:pPr algn="ctr"/>
+                    <a:endParaRPr lang="en-GB">
+                      <a:ln w="0"/>
+                      <a:effectLst>
+                        <a:outerShdw blurRad="38100" dist="19050" dir="2700000" algn="tl" rotWithShape="0">
+                          <a:schemeClr val="dk1">
+                            <a:alpha val="40000"/>
+                          </a:schemeClr>
+                        </a:outerShdw>
+                      </a:effectLst>
+                    </a:endParaRPr>
+                  </a:p>
+                </p:txBody>
+              </p:sp>
+              <p:sp>
+                <p:nvSpPr>
+                  <p:cNvPr id="24" name="Left Brace 23">
+                    <a:extLst>
+                      <a:ext uri="{FF2B5EF4-FFF2-40B4-BE49-F238E27FC236}">
+                        <a16:creationId xmlns:a16="http://schemas.microsoft.com/office/drawing/2014/main" id="{960F8A7B-D68A-4AC9-8FEB-01C38A9D632E}"/>
+                      </a:ext>
+                    </a:extLst>
+                  </p:cNvPr>
+                  <p:cNvSpPr/>
+                  <p:nvPr/>
+                </p:nvSpPr>
+                <p:spPr>
+                  <a:xfrm>
+                    <a:off x="11676979" y="19813396"/>
+                    <a:ext cx="294656" cy="989287"/>
+                  </a:xfrm>
+                  <a:prstGeom prst="leftBrace">
+                    <a:avLst/>
+                  </a:prstGeom>
+                </p:spPr>
+                <p:style>
+                  <a:lnRef idx="1">
+                    <a:schemeClr val="dk1"/>
+                  </a:lnRef>
+                  <a:fillRef idx="0">
+                    <a:schemeClr val="dk1"/>
+                  </a:fillRef>
+                  <a:effectRef idx="0">
+                    <a:schemeClr val="dk1"/>
+                  </a:effectRef>
+                  <a:fontRef idx="minor">
+                    <a:schemeClr val="tx1"/>
+                  </a:fontRef>
+                </p:style>
+                <p:txBody>
+                  <a:bodyPr rot="0" spcFirstLastPara="0" vertOverflow="overflow" horzOverflow="overflow" vert="horz" wrap="square" lIns="91440" tIns="45720" rIns="91440" bIns="45720" numCol="1" spcCol="0" rtlCol="0" fromWordArt="0" anchor="ctr" anchorCtr="0" forceAA="0" compatLnSpc="1">
+                    <a:prstTxWarp prst="textNoShape">
+                      <a:avLst/>
+                    </a:prstTxWarp>
+                    <a:noAutofit/>
+                  </a:bodyPr>
+                  <a:lstStyle/>
+                  <a:p>
+                    <a:pPr algn="ctr"/>
+                    <a:endParaRPr lang="en-GB">
+                      <a:ln w="0"/>
+                      <a:effectLst>
+                        <a:outerShdw blurRad="38100" dist="19050" dir="2700000" algn="tl" rotWithShape="0">
+                          <a:schemeClr val="dk1">
+                            <a:alpha val="40000"/>
+                          </a:schemeClr>
+                        </a:outerShdw>
+                      </a:effectLst>
+                    </a:endParaRPr>
+                  </a:p>
+                </p:txBody>
+              </p:sp>
+            </p:grpSp>
+            <p:grpSp>
+              <p:nvGrpSpPr>
+                <p:cNvPr id="30" name="Group 29">
+                  <a:extLst>
+                    <a:ext uri="{FF2B5EF4-FFF2-40B4-BE49-F238E27FC236}">
+                      <a16:creationId xmlns:a16="http://schemas.microsoft.com/office/drawing/2014/main" id="{7164452A-E1D4-4709-A82C-B6D1384449DC}"/>
+                    </a:ext>
+                  </a:extLst>
+                </p:cNvPr>
+                <p:cNvGrpSpPr/>
+                <p:nvPr/>
+              </p:nvGrpSpPr>
+              <p:grpSpPr>
+                <a:xfrm>
+                  <a:off x="11087829" y="15677895"/>
+                  <a:ext cx="652094" cy="5205782"/>
+                  <a:chOff x="11087829" y="15677895"/>
+                  <a:chExt cx="652094" cy="5205782"/>
+                </a:xfrm>
+              </p:grpSpPr>
+              <p:sp>
+                <p:nvSpPr>
+                  <p:cNvPr id="27" name="TextBox 26">
+                    <a:extLst>
+                      <a:ext uri="{FF2B5EF4-FFF2-40B4-BE49-F238E27FC236}">
+                        <a16:creationId xmlns:a16="http://schemas.microsoft.com/office/drawing/2014/main" id="{06D99D83-5154-4511-AC95-E24E231C19A3}"/>
+                      </a:ext>
+                    </a:extLst>
+                  </p:cNvPr>
+                  <p:cNvSpPr txBox="1"/>
+                  <p:nvPr/>
+                </p:nvSpPr>
+                <p:spPr>
+                  <a:xfrm rot="16200000">
+                    <a:off x="10742863" y="16022861"/>
+                    <a:ext cx="1336263" cy="646331"/>
+                  </a:xfrm>
+                  <a:prstGeom prst="rect">
+                    <a:avLst/>
+                  </a:prstGeom>
+                  <a:noFill/>
+                </p:spPr>
+                <p:txBody>
+                  <a:bodyPr wrap="none" rtlCol="0">
+                    <a:spAutoFit/>
+                  </a:bodyPr>
+                  <a:lstStyle/>
+                  <a:p>
+                    <a:pPr algn="ctr"/>
+                    <a:r>
+                      <a:rPr lang="en-GB" sz="1800" dirty="0"/>
+                      <a:t>Identify Bias</a:t>
+                    </a:r>
+                    <a:br>
+                      <a:rPr lang="en-GB" sz="1800" dirty="0"/>
+                    </a:br>
+                    <a:r>
+                      <a:rPr lang="en-GB" sz="1800" dirty="0"/>
+                      <a:t>Subspace</a:t>
+                    </a:r>
+                  </a:p>
+                </p:txBody>
+              </p:sp>
+              <p:sp>
+                <p:nvSpPr>
+                  <p:cNvPr id="28" name="TextBox 27">
+                    <a:extLst>
+                      <a:ext uri="{FF2B5EF4-FFF2-40B4-BE49-F238E27FC236}">
+                        <a16:creationId xmlns:a16="http://schemas.microsoft.com/office/drawing/2014/main" id="{0F0CF80E-C14B-4BED-AAE3-6262D6539D22}"/>
+                      </a:ext>
+                    </a:extLst>
+                  </p:cNvPr>
+                  <p:cNvSpPr txBox="1"/>
+                  <p:nvPr/>
+                </p:nvSpPr>
+                <p:spPr>
+                  <a:xfrm rot="16200000">
+                    <a:off x="10841119" y="19984873"/>
+                    <a:ext cx="1151277" cy="646331"/>
+                  </a:xfrm>
+                  <a:prstGeom prst="rect">
+                    <a:avLst/>
+                  </a:prstGeom>
+                  <a:noFill/>
+                </p:spPr>
+                <p:txBody>
+                  <a:bodyPr wrap="none" rtlCol="0">
+                    <a:spAutoFit/>
+                  </a:bodyPr>
+                  <a:lstStyle/>
+                  <a:p>
+                    <a:pPr algn="ctr"/>
+                    <a:r>
+                      <a:rPr lang="en-GB" sz="1800" dirty="0"/>
+                      <a:t>Soft</a:t>
+                    </a:r>
+                    <a:br>
+                      <a:rPr lang="en-GB" sz="1800" dirty="0"/>
+                    </a:br>
+                    <a:r>
+                      <a:rPr lang="en-GB" sz="1800" dirty="0"/>
+                      <a:t>de-biasing</a:t>
+                    </a:r>
+                  </a:p>
+                </p:txBody>
+              </p:sp>
+              <p:sp>
+                <p:nvSpPr>
+                  <p:cNvPr id="29" name="TextBox 28">
+                    <a:extLst>
+                      <a:ext uri="{FF2B5EF4-FFF2-40B4-BE49-F238E27FC236}">
+                        <a16:creationId xmlns:a16="http://schemas.microsoft.com/office/drawing/2014/main" id="{455FF4B9-FC04-4E32-8399-7F437D870861}"/>
+                      </a:ext>
+                    </a:extLst>
+                  </p:cNvPr>
+                  <p:cNvSpPr txBox="1"/>
+                  <p:nvPr/>
+                </p:nvSpPr>
+                <p:spPr>
+                  <a:xfrm rot="16200000">
+                    <a:off x="10055358" y="18134588"/>
+                    <a:ext cx="2711284" cy="646331"/>
+                  </a:xfrm>
+                  <a:prstGeom prst="rect">
+                    <a:avLst/>
+                  </a:prstGeom>
+                  <a:noFill/>
+                </p:spPr>
+                <p:txBody>
+                  <a:bodyPr wrap="square" rtlCol="0">
+                    <a:spAutoFit/>
+                  </a:bodyPr>
+                  <a:lstStyle/>
+                  <a:p>
+                    <a:pPr algn="ctr"/>
+                    <a:r>
+                      <a:rPr lang="en-GB" sz="1800" dirty="0"/>
+                      <a:t>          Hard de-biasing</a:t>
+                    </a:r>
+                    <a:br>
+                      <a:rPr lang="en-GB" sz="1800" dirty="0"/>
+                    </a:br>
+                    <a:r>
+                      <a:rPr lang="en-GB" sz="1800" dirty="0"/>
+                      <a:t>           Equalize | Neutralize</a:t>
+                    </a:r>
+                  </a:p>
+                </p:txBody>
+              </p:sp>
+            </p:grpSp>
+          </p:grpSp>
+        </p:grpSp>
+        <p:grpSp>
+          <p:nvGrpSpPr>
+            <p:cNvPr id="34" name="Group 33">
+              <a:extLst>
+                <a:ext uri="{FF2B5EF4-FFF2-40B4-BE49-F238E27FC236}">
+                  <a16:creationId xmlns:a16="http://schemas.microsoft.com/office/drawing/2014/main" id="{85749573-69E7-4E33-A4FF-705928CB9B85}"/>
+                </a:ext>
+              </a:extLst>
+            </p:cNvPr>
+            <p:cNvGrpSpPr/>
+            <p:nvPr/>
+          </p:nvGrpSpPr>
+          <p:grpSpPr>
+            <a:xfrm>
+              <a:off x="12979747" y="16382032"/>
+              <a:ext cx="4680520" cy="2304256"/>
+              <a:chOff x="12979747" y="16382032"/>
+              <a:chExt cx="4680520" cy="2304256"/>
+            </a:xfrm>
+          </p:grpSpPr>
+          <p:cxnSp>
+            <p:nvCxnSpPr>
+              <p:cNvPr id="14" name="Straight Connector 13">
+                <a:extLst>
+                  <a:ext uri="{FF2B5EF4-FFF2-40B4-BE49-F238E27FC236}">
+                    <a16:creationId xmlns:a16="http://schemas.microsoft.com/office/drawing/2014/main" id="{2B177C5F-C6E0-436D-A03E-E09D6E9C1711}"/>
+                  </a:ext>
+                </a:extLst>
+              </p:cNvPr>
+              <p:cNvCxnSpPr>
+                <a:cxnSpLocks/>
+              </p:cNvCxnSpPr>
+              <p:nvPr/>
+            </p:nvCxnSpPr>
+            <p:spPr>
+              <a:xfrm>
+                <a:off x="12979747" y="18686288"/>
+                <a:ext cx="4680520" cy="0"/>
+              </a:xfrm>
+              <a:prstGeom prst="line">
+                <a:avLst/>
+              </a:prstGeom>
+              <a:ln w="12700">
+                <a:prstDash val="dash"/>
+              </a:ln>
+            </p:spPr>
+            <p:style>
+              <a:lnRef idx="1">
+                <a:schemeClr val="dk1"/>
+              </a:lnRef>
+              <a:fillRef idx="0">
+                <a:schemeClr val="dk1"/>
+              </a:fillRef>
+              <a:effectRef idx="0">
+                <a:schemeClr val="dk1"/>
+              </a:effectRef>
+              <a:fontRef idx="minor">
+                <a:schemeClr val="tx1"/>
+              </a:fontRef>
+            </p:style>
+          </p:cxnSp>
+          <p:cxnSp>
+            <p:nvCxnSpPr>
+              <p:cNvPr id="26" name="Straight Connector 25">
+                <a:extLst>
+                  <a:ext uri="{FF2B5EF4-FFF2-40B4-BE49-F238E27FC236}">
+                    <a16:creationId xmlns:a16="http://schemas.microsoft.com/office/drawing/2014/main" id="{8146D321-4331-4EEC-9130-B45E46EF2631}"/>
+                  </a:ext>
+                </a:extLst>
+              </p:cNvPr>
+              <p:cNvCxnSpPr>
+                <a:cxnSpLocks/>
+              </p:cNvCxnSpPr>
+              <p:nvPr/>
+            </p:nvCxnSpPr>
+            <p:spPr>
+              <a:xfrm>
+                <a:off x="12979747" y="16382032"/>
+                <a:ext cx="4680520" cy="0"/>
+              </a:xfrm>
+              <a:prstGeom prst="line">
+                <a:avLst/>
+              </a:prstGeom>
+              <a:ln w="12700">
+                <a:prstDash val="dash"/>
+              </a:ln>
+            </p:spPr>
+            <p:style>
+              <a:lnRef idx="1">
+                <a:schemeClr val="dk1"/>
+              </a:lnRef>
+              <a:fillRef idx="0">
+                <a:schemeClr val="dk1"/>
+              </a:fillRef>
+              <a:effectRef idx="0">
+                <a:schemeClr val="dk1"/>
+              </a:effectRef>
+              <a:fontRef idx="minor">
+                <a:schemeClr val="tx1"/>
+              </a:fontRef>
+            </p:style>
+          </p:cxnSp>
+        </p:grpSp>
+      </p:grpSp>
     </p:spTree>
     <p:extLst>
       <p:ext uri="{BB962C8B-B14F-4D97-AF65-F5344CB8AC3E}">

</xml_diff>

<commit_message>
Add section 5, 6, 7 first draft
</commit_message>
<xml_diff>
--- a/Information Retrieval - Poster Session/presentation_template.pptx
+++ b/Information Retrieval - Poster Session/presentation_template.pptx
@@ -29583,8 +29583,8 @@
           </a:p>
         </p:txBody>
       </p:sp>
-      <mc:AlternateContent xmlns:mc="http://schemas.openxmlformats.org/markup-compatibility/2006">
-        <mc:Choice xmlns:a14="http://schemas.microsoft.com/office/drawing/2010/main" Requires="a14">
+      <mc:AlternateContent xmlns:mc="http://schemas.openxmlformats.org/markup-compatibility/2006" xmlns:a14="http://schemas.microsoft.com/office/drawing/2010/main">
+        <mc:Choice Requires="a14">
           <p:sp>
             <p:nvSpPr>
               <p:cNvPr id="16" name="Text Placeholder 4">
@@ -30316,7 +30316,7 @@
             </p:txBody>
           </p:sp>
         </mc:Choice>
-        <mc:Fallback>
+        <mc:Fallback xmlns="">
           <p:sp>
             <p:nvSpPr>
               <p:cNvPr id="16" name="Text Placeholder 4">
@@ -30549,11 +30549,52 @@
             </a:r>
           </a:p>
           <a:p>
-            <a:pPr algn="just"/>
-            <a:r>
-              <a:rPr lang="de-DE" dirty="0"/>
-              <a:t>Lorem ipsum dolor sit amet, consetetur sadipscing elitr, sed diam nonumy eirmod tempor invidunt ut labore et dolore magna aliquyam erat, sed diam voluptua. At vero eos et accusam et justo duo dolores et ea rebum. Stet clita kasd gubergren, no sea takimata sanctus est Lorem ipsum dolor sit amet. Lorem ipsum dolor sit amet, consetetur sadipscing elitr, sed diam nonumy eirmod tempor invidunt ut labore et dolore magna aliquyam erat, sed diam voluptua. At vero eos et accusam et justo duo dolores et ea rebum. Stet clita kasd gubergren, no sea takimata sanctus est Lorem ipsum dolor sit amet.</a:t>
-            </a:r>
+            <a:r>
+              <a:rPr lang="en-AU" dirty="0"/>
+              <a:t>The ability for the embedding to capture gender-neutral information was measured by evaluating a classifier. An SVM classifier was trained on a subset of the Google News data called w2vNEWS to identify gender neutral words, then generalised to the rest of the dataset. Using 10-fold cross validation the algorithm was found to have an F-Score of 0.627, with gender-separation visualised in Figure 1.</a:t>
+            </a:r>
+          </a:p>
+          <a:p>
+            <a:r>
+              <a:rPr lang="en-AU" dirty="0"/>
+              <a:t>The success of the embedding in generating appropriate gender analogies was measured for both the hard and soft methods. Analogies for embeddings of each method are generated, and then the crowd evaluates whether the generated analogies are appropriate or reflect gender stereotypes. The results are visualised in Figure 4, which shows that hard debiasing had both the least number of stereotypical analogies as well as the most number of approved analogies.</a:t>
+            </a:r>
+          </a:p>
+          <a:p>
+            <a:pPr lvl="1" algn="just"/>
+            <a:endParaRPr lang="de-DE" sz="2800" dirty="0"/>
+          </a:p>
+          <a:p>
+            <a:pPr lvl="1" algn="just"/>
+            <a:endParaRPr lang="de-DE" sz="2800" dirty="0"/>
+          </a:p>
+          <a:p>
+            <a:pPr lvl="1" algn="just"/>
+            <a:endParaRPr lang="de-DE" sz="2800" dirty="0"/>
+          </a:p>
+          <a:p>
+            <a:pPr lvl="1" algn="just"/>
+            <a:endParaRPr lang="de-DE" sz="2800" dirty="0"/>
+          </a:p>
+          <a:p>
+            <a:pPr lvl="1" algn="just"/>
+            <a:endParaRPr lang="de-DE" sz="2800" dirty="0"/>
+          </a:p>
+          <a:p>
+            <a:pPr lvl="1" algn="just"/>
+            <a:endParaRPr lang="de-DE" sz="2800" dirty="0"/>
+          </a:p>
+          <a:p>
+            <a:pPr lvl="1" algn="just"/>
+            <a:endParaRPr lang="de-DE" sz="2800" dirty="0"/>
+          </a:p>
+          <a:p>
+            <a:pPr lvl="1" algn="just"/>
+            <a:endParaRPr lang="de-DE" sz="2800" dirty="0"/>
+          </a:p>
+          <a:p>
+            <a:pPr lvl="1" algn="just"/>
+            <a:endParaRPr lang="de-DE" sz="2800" dirty="0"/>
           </a:p>
           <a:p>
             <a:pPr lvl="1" algn="just"/>
@@ -30563,10 +30604,9 @@
             </a:r>
           </a:p>
           <a:p>
-            <a:pPr algn="just"/>
-            <a:r>
-              <a:rPr lang="de-DE" dirty="0"/>
-              <a:t>Lorem ipsum dolor sit amet, consetetur sadipscing elitr, sed diam nonumy eirmod tempor invidunt ut labore et dolore magna aliquyam erat, sed diam voluptua. At vero eos et accusam et justo duo dolores et ea rebum. Stet clita kasd gubergren, no sea takimata sanctus est Lorem ipsum dolor sit amet. Lorem ipsum dolor sit amet, consetetur sadipscing elitr, sed diam nonumy eirmod tempor invidunt ut labore et dolore magna aliquyam erat, sed diam voluptua. At vero eos et accusam et justo duo dolores et ea rebum. Stet clita kasd gubergren, no sea takimata sanctus est Lorem ipsum dolor sit amet.</a:t>
+            <a:r>
+              <a:rPr lang="en-AU" dirty="0"/>
+              <a:t>Overall, it was found that a single direction in the word embedding is able to capture gender information. Using the hard debiasing method, embeddings could be modified such that neutral words are orthogonal to the gender direction, and paired gender words maintain equal distance from neutralised words, which resulted in the reduction of gender bias while still capturing analogies. This debiasing algorithm seems to have potential in NLP, especially on topics where gender bias is considered a disrupting factor. However, embeddings without debiasing may still be useful in applications where the concern is on capturing useful statistics (e.g. amount of bias) about the data.</a:t>
             </a:r>
           </a:p>
           <a:p>
@@ -30745,43 +30785,6 @@
           </a:p>
         </p:txBody>
       </p:sp>
-      <p:pic>
-        <p:nvPicPr>
-          <p:cNvPr id="20" name="Picture Placeholder 14">
-            <a:extLst>
-              <a:ext uri="{FF2B5EF4-FFF2-40B4-BE49-F238E27FC236}">
-                <a16:creationId xmlns:a16="http://schemas.microsoft.com/office/drawing/2014/main" id="{C41D14D7-BF40-4931-96BF-D8875EE9F8C9}"/>
-              </a:ext>
-            </a:extLst>
-          </p:cNvPr>
-          <p:cNvPicPr>
-            <a:picLocks noChangeAspect="1"/>
-          </p:cNvPicPr>
-          <p:nvPr/>
-        </p:nvPicPr>
-        <p:blipFill>
-          <a:blip r:embed="rId7">
-            <a:extLst>
-              <a:ext uri="{28A0092B-C50C-407E-A947-70E740481C1C}">
-                <a14:useLocalDpi xmlns:a14="http://schemas.microsoft.com/office/drawing/2010/main" val="0"/>
-              </a:ext>
-            </a:extLst>
-          </a:blip>
-          <a:srcRect l="19756" r="19756"/>
-          <a:stretch>
-            <a:fillRect/>
-          </a:stretch>
-        </p:blipFill>
-        <p:spPr>
-          <a:xfrm>
-            <a:off x="20968658" y="13122847"/>
-            <a:ext cx="8043314" cy="5764293"/>
-          </a:xfrm>
-          <a:prstGeom prst="rect">
-            <a:avLst/>
-          </a:prstGeom>
-        </p:spPr>
-      </p:pic>
       <p:sp>
         <p:nvSpPr>
           <p:cNvPr id="21" name="Text Placeholder 2">
@@ -31525,13 +31528,13 @@
                         </m:oMathParaPr>
                         <m:oMath xmlns:m="http://schemas.openxmlformats.org/officeDocument/2006/math">
                           <m:r>
-                            <a:rPr lang="en-GB" sz="2200" b="1" i="1">
+                            <a:rPr lang="en-GB" sz="2200" b="0" i="1">
                               <a:solidFill>
                                 <a:prstClr val="black"/>
                               </a:solidFill>
                               <a:latin typeface="Cambria Math" panose="02040503050406030204" pitchFamily="18" charset="0"/>
                             </a:rPr>
-                            <m:t>𝑪</m:t>
+                            <m:t>𝐶</m:t>
                           </m:r>
                           <m:r>
                             <a:rPr lang="en-GB" sz="2200" i="1">
@@ -32020,13 +32023,13 @@
                           </m:dPr>
                           <m:e>
                             <m:r>
-                              <a:rPr lang="en-GB" sz="2200" b="1" i="1">
+                              <a:rPr lang="en-GB" sz="2200" b="0" i="1">
                                 <a:solidFill>
                                   <a:prstClr val="black"/>
                                 </a:solidFill>
                                 <a:latin typeface="Cambria Math" panose="02040503050406030204" pitchFamily="18" charset="0"/>
                               </a:rPr>
-                              <m:t>𝑪</m:t>
+                              <m:t>𝐶</m:t>
                             </m:r>
                           </m:e>
                         </m:d>
@@ -34220,7 +34223,7 @@
                     <a:avLst/>
                   </a:prstGeom>
                   <a:blipFill>
-                    <a:blip r:embed="rId8"/>
+                    <a:blip r:embed="rId7"/>
                     <a:stretch>
                       <a:fillRect l="-86"/>
                     </a:stretch>
@@ -34770,6 +34773,36 @@
           </p:cxnSp>
         </p:grpSp>
       </p:grpSp>
+      <p:pic>
+        <p:nvPicPr>
+          <p:cNvPr id="37" name="Picture 36">
+            <a:extLst>
+              <a:ext uri="{FF2B5EF4-FFF2-40B4-BE49-F238E27FC236}">
+                <a16:creationId xmlns:a16="http://schemas.microsoft.com/office/drawing/2014/main" id="{11195F3B-A65B-4B41-B883-46247C8BD264}"/>
+              </a:ext>
+            </a:extLst>
+          </p:cNvPr>
+          <p:cNvPicPr>
+            <a:picLocks noChangeAspect="1"/>
+          </p:cNvPicPr>
+          <p:nvPr/>
+        </p:nvPicPr>
+        <p:blipFill>
+          <a:blip r:embed="rId8"/>
+          <a:stretch>
+            <a:fillRect/>
+          </a:stretch>
+        </p:blipFill>
+        <p:spPr>
+          <a:xfrm>
+            <a:off x="20826249" y="10680903"/>
+            <a:ext cx="8328133" cy="3108479"/>
+          </a:xfrm>
+          <a:prstGeom prst="rect">
+            <a:avLst/>
+          </a:prstGeom>
+        </p:spPr>
+      </p:pic>
     </p:spTree>
     <p:extLst>
       <p:ext uri="{BB962C8B-B14F-4D97-AF65-F5344CB8AC3E}">

</xml_diff>

<commit_message>
Update sections 3, 4
</commit_message>
<xml_diff>
--- a/Information Retrieval - Poster Session/presentation_template.pptx
+++ b/Information Retrieval - Poster Session/presentation_template.pptx
@@ -29583,8 +29583,8 @@
           </a:p>
         </p:txBody>
       </p:sp>
-      <mc:AlternateContent xmlns:mc="http://schemas.openxmlformats.org/markup-compatibility/2006" xmlns:a14="http://schemas.microsoft.com/office/drawing/2010/main">
-        <mc:Choice Requires="a14">
+      <mc:AlternateContent xmlns:mc="http://schemas.openxmlformats.org/markup-compatibility/2006">
+        <mc:Choice xmlns:a14="http://schemas.microsoft.com/office/drawing/2010/main" Requires="a14">
           <p:sp>
             <p:nvSpPr>
               <p:cNvPr id="16" name="Text Placeholder 4">
@@ -30286,10 +30286,10 @@
                 <a14:m>
                   <m:oMath xmlns:m="http://schemas.openxmlformats.org/officeDocument/2006/math">
                     <m:r>
-                      <a:rPr lang="en-GB" i="1" spc="-150">
+                      <a:rPr lang="en-GB" b="1" i="1" spc="-150">
                         <a:latin typeface="Cambria Math" panose="02040503050406030204" pitchFamily="18" charset="0"/>
                       </a:rPr>
-                      <m:t>𝑔</m:t>
+                      <m:t>𝒈</m:t>
                     </m:r>
                   </m:oMath>
                 </a14:m>
@@ -30316,7 +30316,7 @@
             </p:txBody>
           </p:sp>
         </mc:Choice>
-        <mc:Fallback xmlns="">
+        <mc:Fallback>
           <p:sp>
             <p:nvSpPr>
               <p:cNvPr id="16" name="Text Placeholder 4">
@@ -31151,12 +31151,42 @@
           </a:p>
         </p:txBody>
       </p:sp>
+      <p:pic>
+        <p:nvPicPr>
+          <p:cNvPr id="37" name="Picture 36">
+            <a:extLst>
+              <a:ext uri="{FF2B5EF4-FFF2-40B4-BE49-F238E27FC236}">
+                <a16:creationId xmlns:a16="http://schemas.microsoft.com/office/drawing/2014/main" id="{11195F3B-A65B-4B41-B883-46247C8BD264}"/>
+              </a:ext>
+            </a:extLst>
+          </p:cNvPr>
+          <p:cNvPicPr>
+            <a:picLocks noChangeAspect="1"/>
+          </p:cNvPicPr>
+          <p:nvPr/>
+        </p:nvPicPr>
+        <p:blipFill>
+          <a:blip r:embed="rId7"/>
+          <a:stretch>
+            <a:fillRect/>
+          </a:stretch>
+        </p:blipFill>
+        <p:spPr>
+          <a:xfrm>
+            <a:off x="20826249" y="10680903"/>
+            <a:ext cx="8328133" cy="3108479"/>
+          </a:xfrm>
+          <a:prstGeom prst="rect">
+            <a:avLst/>
+          </a:prstGeom>
+        </p:spPr>
+      </p:pic>
       <p:grpSp>
         <p:nvGrpSpPr>
-          <p:cNvPr id="35" name="Group 34">
+          <p:cNvPr id="62" name="Group 61">
             <a:extLst>
               <a:ext uri="{FF2B5EF4-FFF2-40B4-BE49-F238E27FC236}">
-                <a16:creationId xmlns:a16="http://schemas.microsoft.com/office/drawing/2014/main" id="{DA86399B-069B-4B18-81DE-3DE670252329}"/>
+                <a16:creationId xmlns:a16="http://schemas.microsoft.com/office/drawing/2014/main" id="{0C1AEB7B-AB40-4DE1-981D-D043E852B690}"/>
               </a:ext>
             </a:extLst>
           </p:cNvPr>
@@ -31166,9 +31196,9 @@
         <p:grpSpPr>
           <a:xfrm>
             <a:off x="11087829" y="14184643"/>
-            <a:ext cx="8049076" cy="5581765"/>
-            <a:chOff x="11087829" y="14400667"/>
-            <a:chExt cx="8049076" cy="5581765"/>
+            <a:ext cx="8069816" cy="6009759"/>
+            <a:chOff x="11087829" y="14184643"/>
+            <a:chExt cx="8069816" cy="6009759"/>
           </a:xfrm>
         </p:grpSpPr>
         <p:grpSp>
@@ -31185,10 +31215,10 @@
           </p:nvGrpSpPr>
           <p:grpSpPr>
             <a:xfrm>
-              <a:off x="11087829" y="14400667"/>
-              <a:ext cx="8049076" cy="5581765"/>
+              <a:off x="11087829" y="14184643"/>
+              <a:ext cx="8069816" cy="5909721"/>
               <a:chOff x="11087829" y="15301912"/>
-              <a:chExt cx="8049076" cy="5581765"/>
+              <a:chExt cx="8069816" cy="5909721"/>
             </a:xfrm>
           </p:grpSpPr>
           <mc:AlternateContent xmlns:mc="http://schemas.openxmlformats.org/markup-compatibility/2006">
@@ -31207,8 +31237,8 @@
                 </p:nvSpPr>
                 <p:spPr>
                   <a:xfrm>
-                    <a:off x="12043642" y="15301912"/>
-                    <a:ext cx="7093263" cy="5548378"/>
+                    <a:off x="12043643" y="15301912"/>
+                    <a:ext cx="7114002" cy="5867888"/>
                   </a:xfrm>
                   <a:prstGeom prst="rect">
                     <a:avLst/>
@@ -32758,7 +32788,16 @@
                               </a:solidFill>
                               <a:latin typeface="Cambria Math" panose="02040503050406030204" pitchFamily="18" charset="0"/>
                             </a:rPr>
-                            <m:t>    , </m:t>
+                            <m:t>    </m:t>
+                          </m:r>
+                          <m:r>
+                            <a:rPr lang="en-GB" sz="2200" i="1" smtClean="0">
+                              <a:solidFill>
+                                <a:prstClr val="black"/>
+                              </a:solidFill>
+                              <a:latin typeface="Cambria Math" panose="02040503050406030204" pitchFamily="18" charset="0"/>
+                            </a:rPr>
+                            <m:t>,</m:t>
                           </m:r>
                           <m:r>
                             <a:rPr lang="en-GB" sz="2200" i="1">
@@ -32768,7 +32807,7 @@
                               <a:latin typeface="Cambria Math" panose="02040503050406030204" pitchFamily="18" charset="0"/>
                               <a:ea typeface="Cambria Math" panose="02040503050406030204" pitchFamily="18" charset="0"/>
                             </a:rPr>
-                            <m:t>∀  </m:t>
+                            <m:t> </m:t>
                           </m:r>
                           <m:r>
                             <a:rPr lang="en-GB" sz="2200" i="1">
@@ -33301,7 +33340,16 @@
                               </a:solidFill>
                               <a:latin typeface="Cambria Math" panose="02040503050406030204" pitchFamily="18" charset="0"/>
                             </a:rPr>
-                            <m:t>    , </m:t>
+                            <m:t>    ,</m:t>
+                          </m:r>
+                          <m:r>
+                            <a:rPr lang="en-GB" sz="2200" b="0" i="1" smtClean="0">
+                              <a:solidFill>
+                                <a:prstClr val="black"/>
+                              </a:solidFill>
+                              <a:latin typeface="Cambria Math" panose="02040503050406030204" pitchFamily="18" charset="0"/>
+                            </a:rPr>
+                            <m:t> </m:t>
                           </m:r>
                           <m:r>
                             <a:rPr lang="en-GB" sz="2200" i="1">
@@ -33311,11 +33359,22 @@
                               <a:latin typeface="Cambria Math" panose="02040503050406030204" pitchFamily="18" charset="0"/>
                               <a:ea typeface="Cambria Math" panose="02040503050406030204" pitchFamily="18" charset="0"/>
                             </a:rPr>
-                            <m:t>∀  </m:t>
+                            <m:t>𝑖</m:t>
                           </m:r>
-                          <m:acc>
-                            <m:accPr>
-                              <m:chr m:val="⃗"/>
+                          <m:r>
+                            <a:rPr lang="en-GB" sz="2200" i="1">
+                              <a:solidFill>
+                                <a:prstClr val="black"/>
+                              </a:solidFill>
+                              <a:latin typeface="Cambria Math" panose="02040503050406030204" pitchFamily="18" charset="0"/>
+                              <a:ea typeface="Cambria Math" panose="02040503050406030204" pitchFamily="18" charset="0"/>
+                            </a:rPr>
+                            <m:t>∈</m:t>
+                          </m:r>
+                          <m:d>
+                            <m:dPr>
+                              <m:begChr m:val="["/>
+                              <m:endChr m:val="]"/>
                               <m:ctrlPr>
                                 <a:rPr lang="en-GB" sz="2200" i="1">
                                   <a:solidFill>
@@ -33325,7 +33384,7 @@
                                   <a:ea typeface="Cambria Math" panose="02040503050406030204" pitchFamily="18" charset="0"/>
                                 </a:rPr>
                               </m:ctrlPr>
-                            </m:accPr>
+                            </m:dPr>
                             <m:e>
                               <m:r>
                                 <a:rPr lang="en-GB" sz="2200" i="1">
@@ -33335,10 +33394,60 @@
                                   <a:latin typeface="Cambria Math" panose="02040503050406030204" pitchFamily="18" charset="0"/>
                                   <a:ea typeface="Cambria Math" panose="02040503050406030204" pitchFamily="18" charset="0"/>
                                 </a:rPr>
-                                <m:t>𝑤</m:t>
+                                <m:t>1,</m:t>
+                              </m:r>
+                              <m:r>
+                                <a:rPr lang="en-GB" sz="2200" i="1">
+                                  <a:solidFill>
+                                    <a:prstClr val="black"/>
+                                  </a:solidFill>
+                                  <a:latin typeface="Cambria Math" panose="02040503050406030204" pitchFamily="18" charset="0"/>
+                                  <a:ea typeface="Cambria Math" panose="02040503050406030204" pitchFamily="18" charset="0"/>
+                                </a:rPr>
+                                <m:t>𝑚</m:t>
                               </m:r>
                             </m:e>
-                          </m:acc>
+                          </m:d>
+                          <m:r>
+                            <a:rPr lang="en-GB" sz="2200" b="0" i="1" smtClean="0">
+                              <a:solidFill>
+                                <a:prstClr val="black"/>
+                              </a:solidFill>
+                              <a:latin typeface="Cambria Math" panose="02040503050406030204" pitchFamily="18" charset="0"/>
+                              <a:ea typeface="Cambria Math" panose="02040503050406030204" pitchFamily="18" charset="0"/>
+                            </a:rPr>
+                            <m:t>, </m:t>
+                          </m:r>
+                          <m:r>
+                            <a:rPr lang="en-GB" sz="2200" i="1">
+                              <a:solidFill>
+                                <a:prstClr val="black"/>
+                              </a:solidFill>
+                              <a:latin typeface="Cambria Math" panose="02040503050406030204" pitchFamily="18" charset="0"/>
+                              <a:ea typeface="Cambria Math" panose="02040503050406030204" pitchFamily="18" charset="0"/>
+                            </a:rPr>
+                            <m:t>∀</m:t>
+                          </m:r>
+                          <m:r>
+                            <a:rPr lang="en-GB" sz="2200" b="0" i="1" smtClean="0">
+                              <a:solidFill>
+                                <a:prstClr val="black"/>
+                              </a:solidFill>
+                              <a:latin typeface="Cambria Math" panose="02040503050406030204" pitchFamily="18" charset="0"/>
+                              <a:ea typeface="Cambria Math" panose="02040503050406030204" pitchFamily="18" charset="0"/>
+                            </a:rPr>
+                            <m:t> </m:t>
+                          </m:r>
+                          <m:r>
+                            <a:rPr lang="en-GB" sz="2200" b="0" i="1" smtClean="0">
+                              <a:solidFill>
+                                <a:prstClr val="black"/>
+                              </a:solidFill>
+                              <a:latin typeface="Cambria Math" panose="02040503050406030204" pitchFamily="18" charset="0"/>
+                              <a:ea typeface="Cambria Math" panose="02040503050406030204" pitchFamily="18" charset="0"/>
+                            </a:rPr>
+                            <m:t>𝑤</m:t>
+                          </m:r>
                           <m:r>
                             <a:rPr lang="en-GB" sz="2200" i="1">
                               <a:solidFill>
@@ -33386,60 +33495,23 @@
                               </m:r>
                             </m:sub>
                           </m:sSub>
-                          <m:r>
-                            <a:rPr lang="en-GB" sz="2200" i="1">
-                              <a:solidFill>
-                                <a:prstClr val="black"/>
-                              </a:solidFill>
-                              <a:latin typeface="Cambria Math" panose="02040503050406030204" pitchFamily="18" charset="0"/>
-                              <a:ea typeface="Cambria Math" panose="02040503050406030204" pitchFamily="18" charset="0"/>
-                            </a:rPr>
-                            <m:t>  , </m:t>
-                          </m:r>
-                          <m:r>
-                            <a:rPr lang="en-GB" sz="2200" i="1">
-                              <a:solidFill>
-                                <a:prstClr val="black"/>
-                              </a:solidFill>
-                              <a:latin typeface="Cambria Math" panose="02040503050406030204" pitchFamily="18" charset="0"/>
-                              <a:ea typeface="Cambria Math" panose="02040503050406030204" pitchFamily="18" charset="0"/>
-                            </a:rPr>
-                            <m:t>𝑖</m:t>
-                          </m:r>
-                          <m:r>
-                            <a:rPr lang="en-GB" sz="2200" i="1">
-                              <a:solidFill>
-                                <a:prstClr val="black"/>
-                              </a:solidFill>
-                              <a:latin typeface="Cambria Math" panose="02040503050406030204" pitchFamily="18" charset="0"/>
-                              <a:ea typeface="Cambria Math" panose="02040503050406030204" pitchFamily="18" charset="0"/>
-                            </a:rPr>
-                            <m:t>∈[1,</m:t>
-                          </m:r>
-                          <m:r>
-                            <a:rPr lang="en-GB" sz="2200" i="1">
-                              <a:solidFill>
-                                <a:prstClr val="black"/>
-                              </a:solidFill>
-                              <a:latin typeface="Cambria Math" panose="02040503050406030204" pitchFamily="18" charset="0"/>
-                              <a:ea typeface="Cambria Math" panose="02040503050406030204" pitchFamily="18" charset="0"/>
-                            </a:rPr>
-                            <m:t>𝑚</m:t>
-                          </m:r>
-                          <m:r>
-                            <a:rPr lang="en-GB" sz="2200" i="1">
-                              <a:solidFill>
-                                <a:prstClr val="black"/>
-                              </a:solidFill>
-                              <a:latin typeface="Cambria Math" panose="02040503050406030204" pitchFamily="18" charset="0"/>
-                              <a:ea typeface="Cambria Math" panose="02040503050406030204" pitchFamily="18" charset="0"/>
-                            </a:rPr>
-                            <m:t>]</m:t>
-                          </m:r>
                         </m:oMath>
                       </m:oMathPara>
                     </a14:m>
                     <a:endParaRPr lang="de-DE" sz="2200" i="1" dirty="0">
+                      <a:solidFill>
+                        <a:prstClr val="black"/>
+                      </a:solidFill>
+                      <a:latin typeface="Cambria Math" panose="02040503050406030204" pitchFamily="18" charset="0"/>
+                    </a:endParaRPr>
+                  </a:p>
+                  <a:p>
+                    <a:pPr lvl="0" algn="just">
+                      <a:spcAft>
+                        <a:spcPts val="300"/>
+                      </a:spcAft>
+                    </a:pPr>
+                    <a:endParaRPr lang="en-GB" sz="2200" i="1" dirty="0">
                       <a:solidFill>
                         <a:prstClr val="black"/>
                       </a:solidFill>
@@ -33830,7 +33902,17 @@
                                                   <a:latin typeface="Cambria Math" panose="02040503050406030204" pitchFamily="18" charset="0"/>
                                                   <a:ea typeface="Cambria Math" panose="02040503050406030204" pitchFamily="18" charset="0"/>
                                                 </a:rPr>
-                                                <m:t>𝑇𝐵</m:t>
+                                                <m:t>𝑇</m:t>
+                                              </m:r>
+                                              <m:r>
+                                                <a:rPr lang="en-GB" sz="2200" b="0" i="1" smtClean="0">
+                                                  <a:solidFill>
+                                                    <a:prstClr val="black"/>
+                                                  </a:solidFill>
+                                                  <a:latin typeface="Cambria Math" panose="02040503050406030204" pitchFamily="18" charset="0"/>
+                                                  <a:ea typeface="Cambria Math" panose="02040503050406030204" pitchFamily="18" charset="0"/>
+                                                </a:rPr>
+                                                <m:t>𝑁</m:t>
                                               </m:r>
                                             </m:e>
                                           </m:d>
@@ -34216,14 +34298,14 @@
                 </p:nvSpPr>
                 <p:spPr>
                   <a:xfrm>
-                    <a:off x="12043642" y="15301912"/>
-                    <a:ext cx="7093263" cy="5548378"/>
+                    <a:off x="12043643" y="15301912"/>
+                    <a:ext cx="7114002" cy="5867888"/>
                   </a:xfrm>
                   <a:prstGeom prst="rect">
                     <a:avLst/>
                   </a:prstGeom>
                   <a:blipFill>
-                    <a:blip r:embed="rId7"/>
+                    <a:blip r:embed="rId8"/>
                     <a:stretch>
                       <a:fillRect l="-86"/>
                     </a:stretch>
@@ -34259,9 +34341,9 @@
             <p:grpSpPr>
               <a:xfrm>
                 <a:off x="11087829" y="15517936"/>
-                <a:ext cx="883806" cy="5365741"/>
+                <a:ext cx="883806" cy="5693697"/>
                 <a:chOff x="11087829" y="15517936"/>
-                <a:chExt cx="883806" cy="5365741"/>
+                <a:chExt cx="883806" cy="5693697"/>
               </a:xfrm>
             </p:grpSpPr>
             <p:grpSp>
@@ -34279,9 +34361,9 @@
               <p:grpSpPr>
                 <a:xfrm>
                   <a:off x="11676979" y="15517936"/>
-                  <a:ext cx="294656" cy="5284747"/>
+                  <a:ext cx="294656" cy="5612703"/>
                   <a:chOff x="11676979" y="15517936"/>
-                  <a:chExt cx="294656" cy="5284747"/>
+                  <a:chExt cx="294656" cy="5612703"/>
                 </a:xfrm>
               </p:grpSpPr>
               <p:sp>
@@ -34472,7 +34554,7 @@
                 </p:nvSpPr>
                 <p:spPr>
                   <a:xfrm>
-                    <a:off x="11676979" y="19813396"/>
+                    <a:off x="11676979" y="20141352"/>
                     <a:ext cx="294656" cy="989287"/>
                   </a:xfrm>
                   <a:prstGeom prst="leftBrace">
@@ -34532,9 +34614,9 @@
               <p:grpSpPr>
                 <a:xfrm>
                   <a:off x="11087829" y="15677895"/>
-                  <a:ext cx="652094" cy="5205782"/>
+                  <a:ext cx="652094" cy="5533738"/>
                   <a:chOff x="11087829" y="15677895"/>
-                  <a:chExt cx="652094" cy="5205782"/>
+                  <a:chExt cx="652094" cy="5533738"/>
                 </a:xfrm>
               </p:grpSpPr>
               <p:sp>
@@ -34594,7 +34676,7 @@
                 </p:nvSpPr>
                 <p:spPr>
                   <a:xfrm rot="16200000">
-                    <a:off x="10841119" y="19984873"/>
+                    <a:off x="10841119" y="20312829"/>
                     <a:ext cx="1151277" cy="646331"/>
                   </a:xfrm>
                   <a:prstGeom prst="rect">
@@ -34683,7 +34765,7 @@
           </p:nvGrpSpPr>
           <p:grpSpPr>
             <a:xfrm>
-              <a:off x="12979747" y="16382032"/>
+              <a:off x="12979747" y="16166008"/>
               <a:ext cx="4680520" cy="2304256"/>
               <a:chOff x="12979747" y="16382032"/>
               <a:chExt cx="4680520" cy="2304256"/>
@@ -34772,37 +34854,697 @@
             </p:style>
           </p:cxnSp>
         </p:grpSp>
+        <p:grpSp>
+          <p:nvGrpSpPr>
+            <p:cNvPr id="61" name="Group 60">
+              <a:extLst>
+                <a:ext uri="{FF2B5EF4-FFF2-40B4-BE49-F238E27FC236}">
+                  <a16:creationId xmlns:a16="http://schemas.microsoft.com/office/drawing/2014/main" id="{27DFAE3A-282B-4235-9D7F-DF482C9F8682}"/>
+                </a:ext>
+              </a:extLst>
+            </p:cNvPr>
+            <p:cNvGrpSpPr/>
+            <p:nvPr/>
+          </p:nvGrpSpPr>
+          <p:grpSpPr>
+            <a:xfrm>
+              <a:off x="12513031" y="18470264"/>
+              <a:ext cx="6299363" cy="1724138"/>
+              <a:chOff x="12513031" y="18470264"/>
+              <a:chExt cx="6299363" cy="1724138"/>
+            </a:xfrm>
+          </p:grpSpPr>
+          <p:grpSp>
+            <p:nvGrpSpPr>
+              <p:cNvPr id="58" name="Group 57">
+                <a:extLst>
+                  <a:ext uri="{FF2B5EF4-FFF2-40B4-BE49-F238E27FC236}">
+                    <a16:creationId xmlns:a16="http://schemas.microsoft.com/office/drawing/2014/main" id="{EBDC5E78-EC13-4A51-9838-41AAB4ECFA2E}"/>
+                  </a:ext>
+                </a:extLst>
+              </p:cNvPr>
+              <p:cNvGrpSpPr/>
+              <p:nvPr/>
+            </p:nvGrpSpPr>
+            <p:grpSpPr>
+              <a:xfrm>
+                <a:off x="12513031" y="18470264"/>
+                <a:ext cx="2931042" cy="618523"/>
+                <a:chOff x="12513031" y="18470264"/>
+                <a:chExt cx="2931042" cy="618523"/>
+              </a:xfrm>
+            </p:grpSpPr>
+            <p:grpSp>
+              <p:nvGrpSpPr>
+                <p:cNvPr id="54" name="Group 53">
+                  <a:extLst>
+                    <a:ext uri="{FF2B5EF4-FFF2-40B4-BE49-F238E27FC236}">
+                      <a16:creationId xmlns:a16="http://schemas.microsoft.com/office/drawing/2014/main" id="{A56A7186-3787-4737-82DB-0D139B2D28CA}"/>
+                    </a:ext>
+                  </a:extLst>
+                </p:cNvPr>
+                <p:cNvGrpSpPr/>
+                <p:nvPr/>
+              </p:nvGrpSpPr>
+              <p:grpSpPr>
+                <a:xfrm>
+                  <a:off x="13843843" y="18754008"/>
+                  <a:ext cx="1600230" cy="334779"/>
+                  <a:chOff x="13843843" y="18754008"/>
+                  <a:chExt cx="1600230" cy="334779"/>
+                </a:xfrm>
+              </p:grpSpPr>
+              <p:sp>
+                <p:nvSpPr>
+                  <p:cNvPr id="8" name="Left Bracket 7">
+                    <a:extLst>
+                      <a:ext uri="{FF2B5EF4-FFF2-40B4-BE49-F238E27FC236}">
+                        <a16:creationId xmlns:a16="http://schemas.microsoft.com/office/drawing/2014/main" id="{2C1C915F-44C1-4700-A0FB-72CD23CBCD55}"/>
+                      </a:ext>
+                    </a:extLst>
+                  </p:cNvPr>
+                  <p:cNvSpPr/>
+                  <p:nvPr/>
+                </p:nvSpPr>
+                <p:spPr>
+                  <a:xfrm rot="5400000">
+                    <a:off x="14641731" y="18286445"/>
+                    <a:ext cx="145699" cy="1458985"/>
+                  </a:xfrm>
+                  <a:prstGeom prst="leftBracket">
+                    <a:avLst/>
+                  </a:prstGeom>
+                  <a:ln>
+                    <a:solidFill>
+                      <a:srgbClr val="C00000"/>
+                    </a:solidFill>
+                  </a:ln>
+                </p:spPr>
+                <p:style>
+                  <a:lnRef idx="1">
+                    <a:schemeClr val="dk1"/>
+                  </a:lnRef>
+                  <a:fillRef idx="0">
+                    <a:schemeClr val="dk1"/>
+                  </a:fillRef>
+                  <a:effectRef idx="0">
+                    <a:schemeClr val="dk1"/>
+                  </a:effectRef>
+                  <a:fontRef idx="minor">
+                    <a:schemeClr val="tx1"/>
+                  </a:fontRef>
+                </p:style>
+                <p:txBody>
+                  <a:bodyPr rtlCol="0" anchor="ctr"/>
+                  <a:lstStyle/>
+                  <a:p>
+                    <a:pPr algn="ctr"/>
+                    <a:endParaRPr lang="en-GB"/>
+                  </a:p>
+                </p:txBody>
+              </p:sp>
+              <p:cxnSp>
+                <p:nvCxnSpPr>
+                  <p:cNvPr id="47" name="Straight Connector 46">
+                    <a:extLst>
+                      <a:ext uri="{FF2B5EF4-FFF2-40B4-BE49-F238E27FC236}">
+                        <a16:creationId xmlns:a16="http://schemas.microsoft.com/office/drawing/2014/main" id="{C0B1B259-6AC6-4A0F-8963-B1174CE7F39D}"/>
+                      </a:ext>
+                    </a:extLst>
+                  </p:cNvPr>
+                  <p:cNvCxnSpPr>
+                    <a:cxnSpLocks/>
+                  </p:cNvCxnSpPr>
+                  <p:nvPr/>
+                </p:nvCxnSpPr>
+                <p:spPr>
+                  <a:xfrm flipV="1">
+                    <a:off x="14707939" y="18754008"/>
+                    <a:ext cx="0" cy="184793"/>
+                  </a:xfrm>
+                  <a:prstGeom prst="line">
+                    <a:avLst/>
+                  </a:prstGeom>
+                  <a:ln>
+                    <a:solidFill>
+                      <a:srgbClr val="C00000"/>
+                    </a:solidFill>
+                  </a:ln>
+                </p:spPr>
+                <p:style>
+                  <a:lnRef idx="1">
+                    <a:schemeClr val="dk1"/>
+                  </a:lnRef>
+                  <a:fillRef idx="0">
+                    <a:schemeClr val="dk1"/>
+                  </a:fillRef>
+                  <a:effectRef idx="0">
+                    <a:schemeClr val="dk1"/>
+                  </a:effectRef>
+                  <a:fontRef idx="minor">
+                    <a:schemeClr val="tx1"/>
+                  </a:fontRef>
+                </p:style>
+              </p:cxnSp>
+              <p:cxnSp>
+                <p:nvCxnSpPr>
+                  <p:cNvPr id="48" name="Straight Connector 47">
+                    <a:extLst>
+                      <a:ext uri="{FF2B5EF4-FFF2-40B4-BE49-F238E27FC236}">
+                        <a16:creationId xmlns:a16="http://schemas.microsoft.com/office/drawing/2014/main" id="{CF280315-E1C7-4B8C-BF00-E294D4250452}"/>
+                      </a:ext>
+                    </a:extLst>
+                  </p:cNvPr>
+                  <p:cNvCxnSpPr>
+                    <a:cxnSpLocks/>
+                  </p:cNvCxnSpPr>
+                  <p:nvPr/>
+                </p:nvCxnSpPr>
+                <p:spPr>
+                  <a:xfrm>
+                    <a:off x="13843843" y="18754008"/>
+                    <a:ext cx="866539" cy="0"/>
+                  </a:xfrm>
+                  <a:prstGeom prst="line">
+                    <a:avLst/>
+                  </a:prstGeom>
+                  <a:ln>
+                    <a:solidFill>
+                      <a:srgbClr val="C00000"/>
+                    </a:solidFill>
+                  </a:ln>
+                </p:spPr>
+                <p:style>
+                  <a:lnRef idx="1">
+                    <a:schemeClr val="dk1"/>
+                  </a:lnRef>
+                  <a:fillRef idx="0">
+                    <a:schemeClr val="dk1"/>
+                  </a:fillRef>
+                  <a:effectRef idx="0">
+                    <a:schemeClr val="dk1"/>
+                  </a:effectRef>
+                  <a:fontRef idx="minor">
+                    <a:schemeClr val="tx1"/>
+                  </a:fontRef>
+                </p:style>
+              </p:cxnSp>
+            </p:grpSp>
+            <p:sp>
+              <p:nvSpPr>
+                <p:cNvPr id="55" name="TextBox 54">
+                  <a:extLst>
+                    <a:ext uri="{FF2B5EF4-FFF2-40B4-BE49-F238E27FC236}">
+                      <a16:creationId xmlns:a16="http://schemas.microsoft.com/office/drawing/2014/main" id="{2EC44839-9317-41B4-B34D-FBC4012BF538}"/>
+                    </a:ext>
+                  </a:extLst>
+                </p:cNvPr>
+                <p:cNvSpPr txBox="1"/>
+                <p:nvPr/>
+              </p:nvSpPr>
+              <p:spPr>
+                <a:xfrm>
+                  <a:off x="12513031" y="18470264"/>
+                  <a:ext cx="1402820" cy="584775"/>
+                </a:xfrm>
+                <a:prstGeom prst="rect">
+                  <a:avLst/>
+                </a:prstGeom>
+                <a:noFill/>
+              </p:spPr>
+              <p:txBody>
+                <a:bodyPr wrap="none" rtlCol="0">
+                  <a:spAutoFit/>
+                </a:bodyPr>
+                <a:lstStyle/>
+                <a:p>
+                  <a:pPr algn="ctr"/>
+                  <a:r>
+                    <a:rPr lang="en-GB" sz="1600" dirty="0">
+                      <a:solidFill>
+                        <a:srgbClr val="C00000"/>
+                      </a:solidFill>
+                    </a:rPr>
+                    <a:t>new par-wise</a:t>
+                  </a:r>
+                  <a:br>
+                    <a:rPr lang="en-GB" sz="1600" dirty="0">
+                      <a:solidFill>
+                        <a:srgbClr val="C00000"/>
+                      </a:solidFill>
+                    </a:rPr>
+                  </a:br>
+                  <a:r>
+                    <a:rPr lang="en-GB" sz="1600" dirty="0">
+                      <a:solidFill>
+                        <a:srgbClr val="C00000"/>
+                      </a:solidFill>
+                    </a:rPr>
+                    <a:t>inner products</a:t>
+                  </a:r>
+                </a:p>
+              </p:txBody>
+            </p:sp>
+          </p:grpSp>
+          <p:grpSp>
+            <p:nvGrpSpPr>
+              <p:cNvPr id="59" name="Group 58">
+                <a:extLst>
+                  <a:ext uri="{FF2B5EF4-FFF2-40B4-BE49-F238E27FC236}">
+                    <a16:creationId xmlns:a16="http://schemas.microsoft.com/office/drawing/2014/main" id="{951166C5-759F-4C1A-ADB5-5CA77869F105}"/>
+                  </a:ext>
+                </a:extLst>
+              </p:cNvPr>
+              <p:cNvGrpSpPr/>
+              <p:nvPr/>
+            </p:nvGrpSpPr>
+            <p:grpSpPr>
+              <a:xfrm>
+                <a:off x="15757171" y="18470264"/>
+                <a:ext cx="2297804" cy="618523"/>
+                <a:chOff x="15757171" y="18470264"/>
+                <a:chExt cx="2297804" cy="618523"/>
+              </a:xfrm>
+            </p:grpSpPr>
+            <p:grpSp>
+              <p:nvGrpSpPr>
+                <p:cNvPr id="46" name="Group 45">
+                  <a:extLst>
+                    <a:ext uri="{FF2B5EF4-FFF2-40B4-BE49-F238E27FC236}">
+                      <a16:creationId xmlns:a16="http://schemas.microsoft.com/office/drawing/2014/main" id="{4870B7F9-E992-4D47-A166-F7FBD91BD63A}"/>
+                    </a:ext>
+                  </a:extLst>
+                </p:cNvPr>
+                <p:cNvGrpSpPr/>
+                <p:nvPr/>
+              </p:nvGrpSpPr>
+              <p:grpSpPr>
+                <a:xfrm>
+                  <a:off x="15757171" y="18758296"/>
+                  <a:ext cx="966992" cy="330491"/>
+                  <a:chOff x="15757171" y="18758296"/>
+                  <a:chExt cx="966992" cy="330491"/>
+                </a:xfrm>
+              </p:grpSpPr>
+              <p:sp>
+                <p:nvSpPr>
+                  <p:cNvPr id="36" name="Left Bracket 35">
+                    <a:extLst>
+                      <a:ext uri="{FF2B5EF4-FFF2-40B4-BE49-F238E27FC236}">
+                        <a16:creationId xmlns:a16="http://schemas.microsoft.com/office/drawing/2014/main" id="{27B4CDDF-38E5-413A-BD3B-D07EFBCA8654}"/>
+                      </a:ext>
+                    </a:extLst>
+                  </p:cNvPr>
+                  <p:cNvSpPr/>
+                  <p:nvPr/>
+                </p:nvSpPr>
+                <p:spPr>
+                  <a:xfrm rot="5400000">
+                    <a:off x="16064494" y="18635765"/>
+                    <a:ext cx="145699" cy="760346"/>
+                  </a:xfrm>
+                  <a:prstGeom prst="leftBracket">
+                    <a:avLst/>
+                  </a:prstGeom>
+                  <a:ln>
+                    <a:solidFill>
+                      <a:srgbClr val="C00000"/>
+                    </a:solidFill>
+                  </a:ln>
+                </p:spPr>
+                <p:style>
+                  <a:lnRef idx="1">
+                    <a:schemeClr val="dk1"/>
+                  </a:lnRef>
+                  <a:fillRef idx="0">
+                    <a:schemeClr val="dk1"/>
+                  </a:fillRef>
+                  <a:effectRef idx="0">
+                    <a:schemeClr val="dk1"/>
+                  </a:effectRef>
+                  <a:fontRef idx="minor">
+                    <a:schemeClr val="tx1"/>
+                  </a:fontRef>
+                </p:style>
+                <p:txBody>
+                  <a:bodyPr rtlCol="0" anchor="ctr"/>
+                  <a:lstStyle/>
+                  <a:p>
+                    <a:pPr algn="ctr"/>
+                    <a:endParaRPr lang="en-GB"/>
+                  </a:p>
+                </p:txBody>
+              </p:sp>
+              <p:cxnSp>
+                <p:nvCxnSpPr>
+                  <p:cNvPr id="41" name="Straight Connector 40">
+                    <a:extLst>
+                      <a:ext uri="{FF2B5EF4-FFF2-40B4-BE49-F238E27FC236}">
+                        <a16:creationId xmlns:a16="http://schemas.microsoft.com/office/drawing/2014/main" id="{6CA0BA0F-FD3B-4F69-9AC5-5F70CA725115}"/>
+                      </a:ext>
+                    </a:extLst>
+                  </p:cNvPr>
+                  <p:cNvCxnSpPr>
+                    <a:cxnSpLocks/>
+                    <a:stCxn id="36" idx="1"/>
+                  </p:cNvCxnSpPr>
+                  <p:nvPr/>
+                </p:nvCxnSpPr>
+                <p:spPr>
+                  <a:xfrm flipV="1">
+                    <a:off x="16137344" y="18758296"/>
+                    <a:ext cx="0" cy="184793"/>
+                  </a:xfrm>
+                  <a:prstGeom prst="line">
+                    <a:avLst/>
+                  </a:prstGeom>
+                  <a:ln>
+                    <a:solidFill>
+                      <a:srgbClr val="C00000"/>
+                    </a:solidFill>
+                  </a:ln>
+                </p:spPr>
+                <p:style>
+                  <a:lnRef idx="1">
+                    <a:schemeClr val="dk1"/>
+                  </a:lnRef>
+                  <a:fillRef idx="0">
+                    <a:schemeClr val="dk1"/>
+                  </a:fillRef>
+                  <a:effectRef idx="0">
+                    <a:schemeClr val="dk1"/>
+                  </a:effectRef>
+                  <a:fontRef idx="minor">
+                    <a:schemeClr val="tx1"/>
+                  </a:fontRef>
+                </p:style>
+              </p:cxnSp>
+              <p:cxnSp>
+                <p:nvCxnSpPr>
+                  <p:cNvPr id="44" name="Straight Connector 43">
+                    <a:extLst>
+                      <a:ext uri="{FF2B5EF4-FFF2-40B4-BE49-F238E27FC236}">
+                        <a16:creationId xmlns:a16="http://schemas.microsoft.com/office/drawing/2014/main" id="{29654598-CFE5-4768-B634-23C54A87CA3D}"/>
+                      </a:ext>
+                    </a:extLst>
+                  </p:cNvPr>
+                  <p:cNvCxnSpPr>
+                    <a:cxnSpLocks/>
+                  </p:cNvCxnSpPr>
+                  <p:nvPr/>
+                </p:nvCxnSpPr>
+                <p:spPr>
+                  <a:xfrm>
+                    <a:off x="16137344" y="18758296"/>
+                    <a:ext cx="586819" cy="0"/>
+                  </a:xfrm>
+                  <a:prstGeom prst="line">
+                    <a:avLst/>
+                  </a:prstGeom>
+                  <a:ln>
+                    <a:solidFill>
+                      <a:srgbClr val="C00000"/>
+                    </a:solidFill>
+                  </a:ln>
+                </p:spPr>
+                <p:style>
+                  <a:lnRef idx="1">
+                    <a:schemeClr val="dk1"/>
+                  </a:lnRef>
+                  <a:fillRef idx="0">
+                    <a:schemeClr val="dk1"/>
+                  </a:fillRef>
+                  <a:effectRef idx="0">
+                    <a:schemeClr val="dk1"/>
+                  </a:effectRef>
+                  <a:fontRef idx="minor">
+                    <a:schemeClr val="tx1"/>
+                  </a:fontRef>
+                </p:style>
+              </p:cxnSp>
+            </p:grpSp>
+            <p:sp>
+              <p:nvSpPr>
+                <p:cNvPr id="56" name="TextBox 55">
+                  <a:extLst>
+                    <a:ext uri="{FF2B5EF4-FFF2-40B4-BE49-F238E27FC236}">
+                      <a16:creationId xmlns:a16="http://schemas.microsoft.com/office/drawing/2014/main" id="{0FDCAACF-9B02-4205-A85C-C178F360A0D2}"/>
+                    </a:ext>
+                  </a:extLst>
+                </p:cNvPr>
+                <p:cNvSpPr txBox="1"/>
+                <p:nvPr/>
+              </p:nvSpPr>
+              <p:spPr>
+                <a:xfrm>
+                  <a:off x="16652155" y="18470264"/>
+                  <a:ext cx="1402820" cy="584775"/>
+                </a:xfrm>
+                <a:prstGeom prst="rect">
+                  <a:avLst/>
+                </a:prstGeom>
+                <a:noFill/>
+              </p:spPr>
+              <p:txBody>
+                <a:bodyPr wrap="none" rtlCol="0">
+                  <a:spAutoFit/>
+                </a:bodyPr>
+                <a:lstStyle/>
+                <a:p>
+                  <a:pPr algn="ctr"/>
+                  <a:r>
+                    <a:rPr lang="en-GB" sz="1600" dirty="0">
+                      <a:solidFill>
+                        <a:srgbClr val="C00000"/>
+                      </a:solidFill>
+                    </a:rPr>
+                    <a:t>old par-wise</a:t>
+                  </a:r>
+                  <a:br>
+                    <a:rPr lang="en-GB" sz="1600" dirty="0">
+                      <a:solidFill>
+                        <a:srgbClr val="C00000"/>
+                      </a:solidFill>
+                    </a:rPr>
+                  </a:br>
+                  <a:r>
+                    <a:rPr lang="en-GB" sz="1600" dirty="0">
+                      <a:solidFill>
+                        <a:srgbClr val="C00000"/>
+                      </a:solidFill>
+                    </a:rPr>
+                    <a:t>inner products</a:t>
+                  </a:r>
+                </a:p>
+              </p:txBody>
+            </p:sp>
+          </p:grpSp>
+          <p:grpSp>
+            <p:nvGrpSpPr>
+              <p:cNvPr id="60" name="Group 59">
+                <a:extLst>
+                  <a:ext uri="{FF2B5EF4-FFF2-40B4-BE49-F238E27FC236}">
+                    <a16:creationId xmlns:a16="http://schemas.microsoft.com/office/drawing/2014/main" id="{082C396C-6261-4EF5-8535-3D9920BB8DF2}"/>
+                  </a:ext>
+                </a:extLst>
+              </p:cNvPr>
+              <p:cNvGrpSpPr/>
+              <p:nvPr/>
+            </p:nvGrpSpPr>
+            <p:grpSpPr>
+              <a:xfrm>
+                <a:off x="17372235" y="19478377"/>
+                <a:ext cx="1440159" cy="716025"/>
+                <a:chOff x="17372235" y="19478377"/>
+                <a:chExt cx="1440159" cy="716025"/>
+              </a:xfrm>
+            </p:grpSpPr>
+            <p:sp>
+              <p:nvSpPr>
+                <p:cNvPr id="38" name="Left Bracket 37">
+                  <a:extLst>
+                    <a:ext uri="{FF2B5EF4-FFF2-40B4-BE49-F238E27FC236}">
+                      <a16:creationId xmlns:a16="http://schemas.microsoft.com/office/drawing/2014/main" id="{4BF4C37D-E9CC-4F22-A5CF-3D575E507F10}"/>
+                    </a:ext>
+                  </a:extLst>
+                </p:cNvPr>
+                <p:cNvSpPr/>
+                <p:nvPr/>
+              </p:nvSpPr>
+              <p:spPr>
+                <a:xfrm rot="16200000">
+                  <a:off x="18023537" y="18827075"/>
+                  <a:ext cx="137555" cy="1440159"/>
+                </a:xfrm>
+                <a:prstGeom prst="leftBracket">
+                  <a:avLst/>
+                </a:prstGeom>
+                <a:ln>
+                  <a:solidFill>
+                    <a:srgbClr val="C00000"/>
+                  </a:solidFill>
+                </a:ln>
+              </p:spPr>
+              <p:style>
+                <a:lnRef idx="1">
+                  <a:schemeClr val="dk1"/>
+                </a:lnRef>
+                <a:fillRef idx="0">
+                  <a:schemeClr val="dk1"/>
+                </a:fillRef>
+                <a:effectRef idx="0">
+                  <a:schemeClr val="dk1"/>
+                </a:effectRef>
+                <a:fontRef idx="minor">
+                  <a:schemeClr val="tx1"/>
+                </a:fontRef>
+              </p:style>
+              <p:txBody>
+                <a:bodyPr rtlCol="0" anchor="ctr"/>
+                <a:lstStyle/>
+                <a:p>
+                  <a:pPr algn="ctr"/>
+                  <a:endParaRPr lang="en-GB"/>
+                </a:p>
+              </p:txBody>
+            </p:sp>
+            <mc:AlternateContent xmlns:mc="http://schemas.openxmlformats.org/markup-compatibility/2006">
+              <mc:Choice xmlns:a14="http://schemas.microsoft.com/office/drawing/2010/main" Requires="a14">
+                <p:sp>
+                  <p:nvSpPr>
+                    <p:cNvPr id="57" name="TextBox 56">
+                      <a:extLst>
+                        <a:ext uri="{FF2B5EF4-FFF2-40B4-BE49-F238E27FC236}">
+                          <a16:creationId xmlns:a16="http://schemas.microsoft.com/office/drawing/2014/main" id="{39E698D0-F2BF-4030-BE1C-C072830A0CBE}"/>
+                        </a:ext>
+                      </a:extLst>
+                    </p:cNvPr>
+                    <p:cNvSpPr txBox="1"/>
+                    <p:nvPr/>
+                  </p:nvSpPr>
+                  <p:spPr>
+                    <a:xfrm>
+                      <a:off x="17463844" y="19609627"/>
+                      <a:ext cx="1256946" cy="584775"/>
+                    </a:xfrm>
+                    <a:prstGeom prst="rect">
+                      <a:avLst/>
+                    </a:prstGeom>
+                    <a:noFill/>
+                  </p:spPr>
+                  <p:txBody>
+                    <a:bodyPr wrap="none" rtlCol="0">
+                      <a:spAutoFit/>
+                    </a:bodyPr>
+                    <a:lstStyle/>
+                    <a:p>
+                      <a:pPr algn="ctr"/>
+                      <a:r>
+                        <a:rPr lang="en-GB" sz="1600" dirty="0">
+                          <a:solidFill>
+                            <a:srgbClr val="C00000"/>
+                          </a:solidFill>
+                        </a:rPr>
+                        <a:t>Projection of</a:t>
+                      </a:r>
+                      <a:br>
+                        <a:rPr lang="en-GB" sz="1600" dirty="0">
+                          <a:solidFill>
+                            <a:srgbClr val="C00000"/>
+                          </a:solidFill>
+                        </a:rPr>
+                      </a:br>
+                      <a14:m>
+                        <m:oMath xmlns:m="http://schemas.openxmlformats.org/officeDocument/2006/math">
+                          <m:r>
+                            <a:rPr lang="en-GB" sz="1600" i="1" dirty="0" smtClean="0">
+                              <a:solidFill>
+                                <a:srgbClr val="C00000"/>
+                              </a:solidFill>
+                              <a:latin typeface="Cambria Math" panose="02040503050406030204" pitchFamily="18" charset="0"/>
+                            </a:rPr>
+                            <m:t>𝑁</m:t>
+                          </m:r>
+                        </m:oMath>
+                      </a14:m>
+                      <a:r>
+                        <a:rPr lang="en-GB" sz="1600" dirty="0">
+                          <a:solidFill>
+                            <a:srgbClr val="C00000"/>
+                          </a:solidFill>
+                        </a:rPr>
+                        <a:t> onto </a:t>
+                      </a:r>
+                      <a14:m>
+                        <m:oMath xmlns:m="http://schemas.openxmlformats.org/officeDocument/2006/math">
+                          <m:r>
+                            <a:rPr lang="en-GB" sz="1600" i="1" dirty="0" smtClean="0">
+                              <a:solidFill>
+                                <a:srgbClr val="C00000"/>
+                              </a:solidFill>
+                              <a:latin typeface="Cambria Math" panose="02040503050406030204" pitchFamily="18" charset="0"/>
+                            </a:rPr>
+                            <m:t>𝐵</m:t>
+                          </m:r>
+                        </m:oMath>
+                      </a14:m>
+                      <a:endParaRPr lang="en-GB" sz="1600" dirty="0">
+                        <a:solidFill>
+                          <a:srgbClr val="C00000"/>
+                        </a:solidFill>
+                      </a:endParaRPr>
+                    </a:p>
+                  </p:txBody>
+                </p:sp>
+              </mc:Choice>
+              <mc:Fallback>
+                <p:sp>
+                  <p:nvSpPr>
+                    <p:cNvPr id="57" name="TextBox 56">
+                      <a:extLst>
+                        <a:ext uri="{FF2B5EF4-FFF2-40B4-BE49-F238E27FC236}">
+                          <a16:creationId xmlns:a16="http://schemas.microsoft.com/office/drawing/2014/main" id="{39E698D0-F2BF-4030-BE1C-C072830A0CBE}"/>
+                        </a:ext>
+                      </a:extLst>
+                    </p:cNvPr>
+                    <p:cNvSpPr txBox="1">
+                      <a:spLocks noRot="1" noChangeAspect="1" noMove="1" noResize="1" noEditPoints="1" noAdjustHandles="1" noChangeArrowheads="1" noChangeShapeType="1" noTextEdit="1"/>
+                    </p:cNvSpPr>
+                    <p:nvPr/>
+                  </p:nvSpPr>
+                  <p:spPr>
+                    <a:xfrm>
+                      <a:off x="17463844" y="19609627"/>
+                      <a:ext cx="1256946" cy="584775"/>
+                    </a:xfrm>
+                    <a:prstGeom prst="rect">
+                      <a:avLst/>
+                    </a:prstGeom>
+                    <a:blipFill>
+                      <a:blip r:embed="rId9"/>
+                      <a:stretch>
+                        <a:fillRect l="-2427" t="-3125" r="-1456" b="-12500"/>
+                      </a:stretch>
+                    </a:blipFill>
+                  </p:spPr>
+                  <p:txBody>
+                    <a:bodyPr/>
+                    <a:lstStyle/>
+                    <a:p>
+                      <a:r>
+                        <a:rPr lang="en-GB">
+                          <a:noFill/>
+                        </a:rPr>
+                        <a:t> </a:t>
+                      </a:r>
+                    </a:p>
+                  </p:txBody>
+                </p:sp>
+              </mc:Fallback>
+            </mc:AlternateContent>
+          </p:grpSp>
+        </p:grpSp>
       </p:grpSp>
-      <p:pic>
-        <p:nvPicPr>
-          <p:cNvPr id="37" name="Picture 36">
-            <a:extLst>
-              <a:ext uri="{FF2B5EF4-FFF2-40B4-BE49-F238E27FC236}">
-                <a16:creationId xmlns:a16="http://schemas.microsoft.com/office/drawing/2014/main" id="{11195F3B-A65B-4B41-B883-46247C8BD264}"/>
-              </a:ext>
-            </a:extLst>
-          </p:cNvPr>
-          <p:cNvPicPr>
-            <a:picLocks noChangeAspect="1"/>
-          </p:cNvPicPr>
-          <p:nvPr/>
-        </p:nvPicPr>
-        <p:blipFill>
-          <a:blip r:embed="rId8"/>
-          <a:stretch>
-            <a:fillRect/>
-          </a:stretch>
-        </p:blipFill>
-        <p:spPr>
-          <a:xfrm>
-            <a:off x="20826249" y="10680903"/>
-            <a:ext cx="8328133" cy="3108479"/>
-          </a:xfrm>
-          <a:prstGeom prst="rect">
-            <a:avLst/>
-          </a:prstGeom>
-        </p:spPr>
-      </p:pic>
     </p:spTree>
     <p:extLst>
       <p:ext uri="{BB962C8B-B14F-4D97-AF65-F5344CB8AC3E}">

</xml_diff>

<commit_message>
Correct formatting and notations.
</commit_message>
<xml_diff>
--- a/Information Retrieval - Poster Session/presentation_template.pptx
+++ b/Information Retrieval - Poster Session/presentation_template.pptx
@@ -29146,8 +29146,8 @@
           </a:xfrm>
         </p:spPr>
       </p:pic>
-      <mc:AlternateContent xmlns:mc="http://schemas.openxmlformats.org/markup-compatibility/2006" xmlns:a14="http://schemas.microsoft.com/office/drawing/2010/main">
-        <mc:Choice Requires="a14">
+      <mc:AlternateContent xmlns:mc="http://schemas.openxmlformats.org/markup-compatibility/2006">
+        <mc:Choice xmlns:a14="http://schemas.microsoft.com/office/drawing/2010/main" Requires="a14">
           <p:sp>
             <p:nvSpPr>
               <p:cNvPr id="5" name="Text Placeholder 4">
@@ -29184,7 +29184,7 @@
                 <a:pPr algn="just"/>
                 <a:r>
                   <a:rPr lang="de-DE" dirty="0"/>
-                  <a:t>By learning from real-world data, machine learning is doomed to adopt social bias such as sexism. This paper analyzes gender bias in the context of the natrual language processing technique word embedding. The paper proposes a method to determine the underlying bias in a dataset and an algorithm to eliminate this bias while preserving the ability to cluster words. This is shown using a public dataset of news articles to reduce gender stereotypes in analogy tasks.</a:t>
+                  <a:t>By learning from real-world data, machine learning is doomed to adopt social bias such as sexism. This paper analyzes gender bias in the context of the natrual language processing technique, word embeddings. The paper proposes a method to determine the underlying bias in a dataset and an algorithm to eliminate this bias while preserving the ability to cluster words. This is shown using a public dataset of news articles to reduce gender stereotypes in analogy tasks.</a:t>
                 </a:r>
               </a:p>
               <a:p>
@@ -29198,7 +29198,15 @@
                 <a:pPr algn="just"/>
                 <a:r>
                   <a:rPr lang="de-DE" dirty="0"/>
-                  <a:t>A word embedding represents each word </a:t>
+                  <a:t>A </a:t>
+                </a:r>
+                <a:r>
+                  <a:rPr lang="de-DE" i="1" dirty="0"/>
+                  <a:t>word embedding</a:t>
+                </a:r>
+                <a:r>
+                  <a:rPr lang="de-DE" dirty="0"/>
+                  <a:t> represents each word </a:t>
                 </a:r>
                 <a14:m>
                   <m:oMath xmlns:m="http://schemas.openxmlformats.org/officeDocument/2006/math">
@@ -29212,7 +29220,7 @@
                 </a14:m>
                 <a:r>
                   <a:rPr lang="de-DE" dirty="0"/>
-                  <a:t> as a d-dimensional </a:t>
+                  <a:t> as a </a:t>
                 </a:r>
                 <a14:m>
                   <m:oMath xmlns:m="http://schemas.openxmlformats.org/officeDocument/2006/math">
@@ -29220,34 +29228,34 @@
                       <a:rPr lang="de-DE" i="1" dirty="0" smtClean="0">
                         <a:latin typeface="Cambria Math" panose="02040503050406030204" pitchFamily="18" charset="0"/>
                       </a:rPr>
-                      <m:t>𝑤𝑜𝑟𝑑</m:t>
-                    </m:r>
-                    <m:r>
-                      <a:rPr lang="de-DE" i="1" dirty="0" smtClean="0">
-                        <a:latin typeface="Cambria Math" panose="02040503050406030204" pitchFamily="18" charset="0"/>
-                      </a:rPr>
-                      <m:t> </m:t>
-                    </m:r>
-                    <m:r>
-                      <a:rPr lang="de-DE" i="1" dirty="0" smtClean="0">
-                        <a:latin typeface="Cambria Math" panose="02040503050406030204" pitchFamily="18" charset="0"/>
-                      </a:rPr>
-                      <m:t>𝑣𝑒𝑐𝑡𝑜𝑟</m:t>
+                      <m:t>𝑑</m:t>
                     </m:r>
                   </m:oMath>
                 </a14:m>
                 <a:r>
                   <a:rPr lang="de-DE" dirty="0"/>
-                  <a:t> </a:t>
+                  <a:t>-dimensional word vector </a:t>
                 </a:r>
                 <a14:m>
                   <m:oMath xmlns:m="http://schemas.openxmlformats.org/officeDocument/2006/math">
-                    <m:r>
-                      <a:rPr lang="de-DE" i="1">
-                        <a:latin typeface="Cambria Math" panose="02040503050406030204" pitchFamily="18" charset="0"/>
-                      </a:rPr>
-                      <m:t>𝑤</m:t>
-                    </m:r>
+                    <m:acc>
+                      <m:accPr>
+                        <m:chr m:val="⃗"/>
+                        <m:ctrlPr>
+                          <a:rPr lang="de-DE" i="1" smtClean="0">
+                            <a:latin typeface="Cambria Math" panose="02040503050406030204" pitchFamily="18" charset="0"/>
+                          </a:rPr>
+                        </m:ctrlPr>
+                      </m:accPr>
+                      <m:e>
+                        <m:r>
+                          <a:rPr lang="en-GB" b="0" i="1" smtClean="0">
+                            <a:latin typeface="Cambria Math" panose="02040503050406030204" pitchFamily="18" charset="0"/>
+                          </a:rPr>
+                          <m:t>𝑤</m:t>
+                        </m:r>
+                      </m:e>
+                    </m:acc>
                     <m:r>
                       <a:rPr lang="de-DE" i="1">
                         <a:latin typeface="Cambria Math" panose="02040503050406030204" pitchFamily="18" charset="0"/>
@@ -29286,78 +29294,83 @@
                 </a14:m>
                 <a:r>
                   <a:rPr lang="de-DE" dirty="0"/>
-                  <a:t> with two imortant properties: similar words have similar vectors, and the difference between two word vectors has been shown to represent the difference between the corresponding words. This arithmetic properties can be used to solve analogy tasks, like ‚man is to brother as woman is to X?‘. The difference between the word vectors of ‚man‘ and ‚woman‘ should be similar to ‚brother‘ and X (e.g. ‚sister‘):                 </a:t>
+                  <a:t> with two imortant properties: similar words have similar vectors, and the difference between two word vectors has been shown to represent the difference between the corresponding words. These arithmetic properties can be used to solve analogy tasks, for example, ‘man is to brother as woman is to </a:t>
                 </a:r>
                 <a14:m>
                   <m:oMath xmlns:m="http://schemas.openxmlformats.org/officeDocument/2006/math">
-                    <m:sSub>
-                      <m:sSubPr>
+                    <m:r>
+                      <a:rPr lang="de-DE" i="1" dirty="0" smtClean="0">
+                        <a:latin typeface="Cambria Math" panose="02040503050406030204" pitchFamily="18" charset="0"/>
+                      </a:rPr>
+                      <m:t>𝑋</m:t>
+                    </m:r>
+                  </m:oMath>
+                </a14:m>
+                <a:r>
+                  <a:rPr lang="de-DE" dirty="0"/>
+                  <a:t>?‘. The difference between the word vectors of ‘man‘ and ‘woman‘ should be similar to ‘brother‘ and </a:t>
+                </a:r>
+                <a14:m>
+                  <m:oMath xmlns:m="http://schemas.openxmlformats.org/officeDocument/2006/math">
+                    <m:r>
+                      <a:rPr lang="de-DE" i="1" dirty="0" smtClean="0">
+                        <a:latin typeface="Cambria Math" panose="02040503050406030204" pitchFamily="18" charset="0"/>
+                      </a:rPr>
+                      <m:t>𝑋</m:t>
+                    </m:r>
+                  </m:oMath>
+                </a14:m>
+                <a:r>
+                  <a:rPr lang="de-DE" dirty="0"/>
+                  <a:t> (e.g. ‘sister‘):</a:t>
+                </a:r>
+                <a:br>
+                  <a:rPr lang="de-DE" dirty="0"/>
+                </a:br>
+                <a14:m>
+                  <m:oMath xmlns:m="http://schemas.openxmlformats.org/officeDocument/2006/math">
+                    <m:acc>
+                      <m:accPr>
+                        <m:chr m:val="⃗"/>
                         <m:ctrlPr>
-                          <a:rPr lang="de-DE" i="1" smtClean="0">
+                          <a:rPr lang="de-DE" b="0" i="1" smtClean="0">
                             <a:latin typeface="Cambria Math" panose="02040503050406030204" pitchFamily="18" charset="0"/>
                           </a:rPr>
                         </m:ctrlPr>
-                      </m:sSubPr>
+                      </m:accPr>
                       <m:e>
                         <m:r>
-                          <a:rPr lang="de-DE" b="0" i="1" smtClean="0">
-                            <a:latin typeface="Cambria Math" panose="02040503050406030204" pitchFamily="18" charset="0"/>
-                          </a:rPr>
-                          <m:t>𝑤</m:t>
-                        </m:r>
-                      </m:e>
-                      <m:sub>
-                        <m:r>
-                          <a:rPr lang="de-DE" b="0" i="1" smtClean="0">
+                          <a:rPr lang="en-GB" b="0" i="1" smtClean="0">
                             <a:latin typeface="Cambria Math" panose="02040503050406030204" pitchFamily="18" charset="0"/>
                           </a:rPr>
                           <m:t>𝑚𝑎𝑛</m:t>
                         </m:r>
-                      </m:sub>
-                    </m:sSub>
+                      </m:e>
+                    </m:acc>
                     <m:r>
                       <a:rPr lang="de-DE" b="0" i="1" smtClean="0">
                         <a:latin typeface="Cambria Math" panose="02040503050406030204" pitchFamily="18" charset="0"/>
                       </a:rPr>
                       <m:t>−</m:t>
                     </m:r>
-                    <m:sSub>
-                      <m:sSubPr>
+                    <m:acc>
+                      <m:accPr>
+                        <m:chr m:val="⃗"/>
                         <m:ctrlPr>
-                          <a:rPr lang="de-DE" i="1">
+                          <a:rPr lang="de-DE" b="0" i="1" smtClean="0">
                             <a:latin typeface="Cambria Math" panose="02040503050406030204" pitchFamily="18" charset="0"/>
                           </a:rPr>
                         </m:ctrlPr>
-                      </m:sSubPr>
+                      </m:accPr>
                       <m:e>
                         <m:r>
-                          <a:rPr lang="de-DE" i="1">
+                          <a:rPr lang="en-GB" b="0" i="1" smtClean="0">
                             <a:latin typeface="Cambria Math" panose="02040503050406030204" pitchFamily="18" charset="0"/>
                           </a:rPr>
-                          <m:t>𝑤</m:t>
+                          <m:t>𝑤𝑜𝑚𝑎𝑛</m:t>
                         </m:r>
                       </m:e>
-                      <m:sub>
-                        <m:r>
-                          <a:rPr lang="de-DE" b="0" i="1" smtClean="0">
-                            <a:latin typeface="Cambria Math" panose="02040503050406030204" pitchFamily="18" charset="0"/>
-                          </a:rPr>
-                          <m:t>𝑤𝑜</m:t>
-                        </m:r>
-                        <m:r>
-                          <a:rPr lang="de-DE" i="1">
-                            <a:latin typeface="Cambria Math" panose="02040503050406030204" pitchFamily="18" charset="0"/>
-                          </a:rPr>
-                          <m:t>𝑚𝑎𝑛</m:t>
-                        </m:r>
-                        <m:r>
-                          <a:rPr lang="de-DE" b="0" i="1" smtClean="0">
-                            <a:latin typeface="Cambria Math" panose="02040503050406030204" pitchFamily="18" charset="0"/>
-                          </a:rPr>
-                          <m:t> </m:t>
-                        </m:r>
-                      </m:sub>
-                    </m:sSub>
+                    </m:acc>
                     <m:r>
                       <a:rPr lang="de-DE" i="1" smtClean="0">
                         <a:latin typeface="Cambria Math" panose="02040503050406030204" pitchFamily="18" charset="0"/>
@@ -29365,62 +29378,50 @@
                       </a:rPr>
                       <m:t>≈</m:t>
                     </m:r>
-                    <m:sSub>
-                      <m:sSubPr>
+                    <m:acc>
+                      <m:accPr>
+                        <m:chr m:val="⃗"/>
                         <m:ctrlPr>
-                          <a:rPr lang="de-DE" i="1">
+                          <a:rPr lang="de-DE" b="0" i="1" smtClean="0">
                             <a:latin typeface="Cambria Math" panose="02040503050406030204" pitchFamily="18" charset="0"/>
+                            <a:ea typeface="Cambria Math" panose="02040503050406030204" pitchFamily="18" charset="0"/>
                           </a:rPr>
                         </m:ctrlPr>
-                      </m:sSubPr>
+                      </m:accPr>
                       <m:e>
                         <m:r>
-                          <a:rPr lang="de-DE" i="1">
+                          <a:rPr lang="en-GB" b="0" i="1" smtClean="0">
                             <a:latin typeface="Cambria Math" panose="02040503050406030204" pitchFamily="18" charset="0"/>
-                          </a:rPr>
-                          <m:t>𝑤</m:t>
-                        </m:r>
-                      </m:e>
-                      <m:sub>
-                        <m:r>
-                          <a:rPr lang="de-DE" b="0" i="1" smtClean="0">
-                            <a:latin typeface="Cambria Math" panose="02040503050406030204" pitchFamily="18" charset="0"/>
+                            <a:ea typeface="Cambria Math" panose="02040503050406030204" pitchFamily="18" charset="0"/>
                           </a:rPr>
                           <m:t>𝑏𝑟𝑜𝑡h𝑒𝑟</m:t>
                         </m:r>
-                      </m:sub>
-                    </m:sSub>
+                      </m:e>
+                    </m:acc>
                     <m:r>
                       <a:rPr lang="de-DE" b="0" i="1" smtClean="0">
                         <a:latin typeface="Cambria Math" panose="02040503050406030204" pitchFamily="18" charset="0"/>
                       </a:rPr>
                       <m:t> −</m:t>
                     </m:r>
-                    <m:sSub>
-                      <m:sSubPr>
+                    <m:acc>
+                      <m:accPr>
+                        <m:chr m:val="⃗"/>
                         <m:ctrlPr>
-                          <a:rPr lang="de-DE" i="1">
+                          <a:rPr lang="de-DE" b="0" i="1" smtClean="0">
                             <a:latin typeface="Cambria Math" panose="02040503050406030204" pitchFamily="18" charset="0"/>
                           </a:rPr>
                         </m:ctrlPr>
-                      </m:sSubPr>
+                      </m:accPr>
                       <m:e>
                         <m:r>
-                          <a:rPr lang="de-DE" i="1">
-                            <a:latin typeface="Cambria Math" panose="02040503050406030204" pitchFamily="18" charset="0"/>
-                          </a:rPr>
-                          <m:t>𝑤</m:t>
-                        </m:r>
-                      </m:e>
-                      <m:sub>
-                        <m:r>
-                          <a:rPr lang="de-DE" b="0" i="1" smtClean="0">
+                          <a:rPr lang="en-GB" b="0" i="1" smtClean="0">
                             <a:latin typeface="Cambria Math" panose="02040503050406030204" pitchFamily="18" charset="0"/>
                           </a:rPr>
                           <m:t>𝑠𝑖𝑠𝑡𝑒𝑟</m:t>
                         </m:r>
-                      </m:sub>
-                    </m:sSub>
+                      </m:e>
+                    </m:acc>
                   </m:oMath>
                 </a14:m>
                 <a:r>
@@ -29432,13 +29433,41 @@
                 <a:pPr algn="just"/>
                 <a:r>
                   <a:rPr lang="de-DE" dirty="0"/>
-                  <a:t>To measure bias, a gender-neutral word like ‚nurse‘ is compared to two gender-specific words like ‚man‘ and ‚woman‘. If the distance between the neutral word and one specific word is smaller than between the other, this suggests bias. Figure 1 shows a sample of words ordered by their distance to ‚he‘ and ‚she‘ (x-Axis) and their bias (y-Axis). For this paper, the public word2vec embedding is used, trained on a set of Google News Articles, cosisting of 3 million english words.</a:t>
+                  <a:t>To measure bias, a gender-neutral word like ‘nurse‘ is compared to two gender-specific words like ‘man‘ and ‘woman‘. If the distance between the neutral word and one specific word is smaller than between the other, this suggests bias. Figure 1 shows a sample of words ordered by their distance to ‘he‘ and ‘she‘ (</a:t>
+                </a:r>
+                <a14:m>
+                  <m:oMath xmlns:m="http://schemas.openxmlformats.org/officeDocument/2006/math">
+                    <m:r>
+                      <a:rPr lang="de-DE" i="1" dirty="0" smtClean="0">
+                        <a:latin typeface="Cambria Math" panose="02040503050406030204" pitchFamily="18" charset="0"/>
+                      </a:rPr>
+                      <m:t>𝑥</m:t>
+                    </m:r>
+                  </m:oMath>
+                </a14:m>
+                <a:r>
+                  <a:rPr lang="de-DE" dirty="0"/>
+                  <a:t>-axis) and their bias (</a:t>
+                </a:r>
+                <a14:m>
+                  <m:oMath xmlns:m="http://schemas.openxmlformats.org/officeDocument/2006/math">
+                    <m:r>
+                      <a:rPr lang="de-DE" i="1" dirty="0" smtClean="0">
+                        <a:latin typeface="Cambria Math" panose="02040503050406030204" pitchFamily="18" charset="0"/>
+                      </a:rPr>
+                      <m:t>𝑦</m:t>
+                    </m:r>
+                  </m:oMath>
+                </a14:m>
+                <a:r>
+                  <a:rPr lang="de-DE" dirty="0"/>
+                  <a:t>-axis). For this paper, the public word2vec embedding is used, trained on a set of Google News Articles, cosisting of 3 million english words.</a:t>
                 </a:r>
               </a:p>
             </p:txBody>
           </p:sp>
         </mc:Choice>
-        <mc:Fallback xmlns="">
+        <mc:Fallback>
           <p:sp>
             <p:nvSpPr>
               <p:cNvPr id="5" name="Text Placeholder 4">
@@ -29461,7 +29490,7 @@
                 <a:ext cx="8047339" cy="10440854"/>
               </a:xfrm>
               <a:blipFill>
-                <a:blip r:embed="rId5"/>
+                <a:blip r:embed="rId4"/>
                 <a:stretch>
                   <a:fillRect l="-2727" t="-1752" r="-2121" b="-234"/>
                 </a:stretch>
@@ -30258,7 +30287,7 @@
                 <a:avLst/>
               </a:prstGeom>
               <a:blipFill>
-                <a:blip r:embed="rId6"/>
+                <a:blip r:embed="rId5"/>
                 <a:stretch>
                   <a:fillRect l="-2652" r="-2121"/>
                 </a:stretch>
@@ -30279,317 +30308,417 @@
           </p:sp>
         </mc:Fallback>
       </mc:AlternateContent>
-      <p:sp>
-        <p:nvSpPr>
-          <p:cNvPr id="17" name="Text Placeholder 4">
-            <a:extLst>
-              <a:ext uri="{FF2B5EF4-FFF2-40B4-BE49-F238E27FC236}">
-                <a16:creationId xmlns:a16="http://schemas.microsoft.com/office/drawing/2014/main" id="{80208A8B-70FF-4729-AA3D-10A2E92A566C}"/>
-              </a:ext>
-            </a:extLst>
-          </p:cNvPr>
-          <p:cNvSpPr txBox="1">
-            <a:spLocks/>
-          </p:cNvSpPr>
-          <p:nvPr/>
-        </p:nvSpPr>
-        <p:spPr>
-          <a:xfrm>
-            <a:off x="20968660" y="3636616"/>
-            <a:ext cx="8047339" cy="14761334"/>
-          </a:xfrm>
-          <a:prstGeom prst="rect">
-            <a:avLst/>
-          </a:prstGeom>
-        </p:spPr>
-        <p:txBody>
-          <a:bodyPr lIns="0" tIns="0" rIns="0" bIns="0"/>
-          <a:lstStyle>
-            <a:lvl1pPr marL="0" indent="0" algn="l" defTabSz="2952319" rtl="0" eaLnBrk="1" latinLnBrk="0" hangingPunct="1">
-              <a:lnSpc>
-                <a:spcPts val="2800"/>
-              </a:lnSpc>
-              <a:spcBef>
-                <a:spcPts val="0"/>
-              </a:spcBef>
-              <a:spcAft>
-                <a:spcPts val="2800"/>
-              </a:spcAft>
-              <a:buFont typeface="Arial" pitchFamily="34" charset="0"/>
-              <a:buNone/>
-              <a:defRPr sz="2200" kern="1200">
-                <a:solidFill>
-                  <a:schemeClr val="tx1"/>
-                </a:solidFill>
-                <a:latin typeface="Arial" pitchFamily="34" charset="0"/>
-                <a:ea typeface="+mn-ea"/>
-                <a:cs typeface="Arial" pitchFamily="34" charset="0"/>
-              </a:defRPr>
-            </a:lvl1pPr>
-            <a:lvl2pPr marL="0" indent="0" algn="l" defTabSz="2952319" rtl="0" eaLnBrk="1" latinLnBrk="0" hangingPunct="1">
-              <a:lnSpc>
-                <a:spcPts val="2800"/>
-              </a:lnSpc>
-              <a:spcBef>
-                <a:spcPts val="0"/>
-              </a:spcBef>
-              <a:spcAft>
-                <a:spcPts val="0"/>
-              </a:spcAft>
-              <a:buFont typeface="Arial" pitchFamily="34" charset="0"/>
-              <a:buNone/>
-              <a:defRPr sz="2200" b="1" i="0" kern="1200" baseline="0">
-                <a:solidFill>
-                  <a:schemeClr val="tx1"/>
-                </a:solidFill>
-                <a:latin typeface="Arial" pitchFamily="34" charset="0"/>
-                <a:ea typeface="+mn-ea"/>
-                <a:cs typeface="Arial" pitchFamily="34" charset="0"/>
-              </a:defRPr>
-            </a:lvl2pPr>
-            <a:lvl3pPr marL="180000" indent="-180000" algn="l" defTabSz="2952319" rtl="0" eaLnBrk="1" latinLnBrk="0" hangingPunct="1">
-              <a:lnSpc>
-                <a:spcPts val="2800"/>
-              </a:lnSpc>
-              <a:spcBef>
-                <a:spcPts val="0"/>
-              </a:spcBef>
-              <a:spcAft>
-                <a:spcPts val="2800"/>
-              </a:spcAft>
-              <a:buFont typeface="Arial" panose="020B0604020202020204" pitchFamily="34" charset="0"/>
-              <a:buChar char="•"/>
-              <a:defRPr sz="2200" kern="1200">
-                <a:solidFill>
-                  <a:schemeClr val="tx1"/>
-                </a:solidFill>
-                <a:latin typeface="Arial" pitchFamily="34" charset="0"/>
-                <a:ea typeface="+mn-ea"/>
-                <a:cs typeface="Arial" pitchFamily="34" charset="0"/>
-              </a:defRPr>
-            </a:lvl3pPr>
-            <a:lvl4pPr marL="5166557" indent="-738080" algn="l" defTabSz="2952319" rtl="0" eaLnBrk="1" latinLnBrk="0" hangingPunct="1">
-              <a:spcBef>
-                <a:spcPct val="20000"/>
-              </a:spcBef>
-              <a:buFont typeface="Arial" pitchFamily="34" charset="0"/>
-              <a:buChar char="–"/>
-              <a:defRPr sz="1800" kern="1200">
-                <a:solidFill>
-                  <a:schemeClr val="tx1"/>
-                </a:solidFill>
-                <a:latin typeface="Arial" pitchFamily="34" charset="0"/>
-                <a:ea typeface="+mn-ea"/>
-                <a:cs typeface="Arial" pitchFamily="34" charset="0"/>
-              </a:defRPr>
-            </a:lvl4pPr>
-            <a:lvl5pPr marL="6642717" indent="-738080" algn="l" defTabSz="2952319" rtl="0" eaLnBrk="1" latinLnBrk="0" hangingPunct="1">
-              <a:spcBef>
-                <a:spcPct val="20000"/>
-              </a:spcBef>
-              <a:buFont typeface="Arial" pitchFamily="34" charset="0"/>
-              <a:buChar char="»"/>
-              <a:defRPr sz="1800" kern="1200">
-                <a:solidFill>
-                  <a:schemeClr val="tx1"/>
-                </a:solidFill>
-                <a:latin typeface="Arial" pitchFamily="34" charset="0"/>
-                <a:ea typeface="+mn-ea"/>
-                <a:cs typeface="Arial" pitchFamily="34" charset="0"/>
-              </a:defRPr>
-            </a:lvl5pPr>
-            <a:lvl6pPr marL="8118877" indent="-738080" algn="l" defTabSz="2952319" rtl="0" eaLnBrk="1" latinLnBrk="0" hangingPunct="1">
-              <a:spcBef>
-                <a:spcPct val="20000"/>
-              </a:spcBef>
-              <a:buFont typeface="Arial" pitchFamily="34" charset="0"/>
-              <a:buChar char="•"/>
-              <a:defRPr sz="6400" kern="1200">
-                <a:solidFill>
-                  <a:schemeClr val="tx1"/>
-                </a:solidFill>
-                <a:latin typeface="+mn-lt"/>
-                <a:ea typeface="+mn-ea"/>
-                <a:cs typeface="+mn-cs"/>
-              </a:defRPr>
-            </a:lvl6pPr>
-            <a:lvl7pPr marL="9595036" indent="-738080" algn="l" defTabSz="2952319" rtl="0" eaLnBrk="1" latinLnBrk="0" hangingPunct="1">
-              <a:spcBef>
-                <a:spcPct val="20000"/>
-              </a:spcBef>
-              <a:buFont typeface="Arial" pitchFamily="34" charset="0"/>
-              <a:buChar char="•"/>
-              <a:defRPr sz="6400" kern="1200">
-                <a:solidFill>
-                  <a:schemeClr val="tx1"/>
-                </a:solidFill>
-                <a:latin typeface="+mn-lt"/>
-                <a:ea typeface="+mn-ea"/>
-                <a:cs typeface="+mn-cs"/>
-              </a:defRPr>
-            </a:lvl7pPr>
-            <a:lvl8pPr marL="11071196" indent="-738080" algn="l" defTabSz="2952319" rtl="0" eaLnBrk="1" latinLnBrk="0" hangingPunct="1">
-              <a:spcBef>
-                <a:spcPct val="20000"/>
-              </a:spcBef>
-              <a:buFont typeface="Arial" pitchFamily="34" charset="0"/>
-              <a:buChar char="•"/>
-              <a:defRPr sz="6400" kern="1200">
-                <a:solidFill>
-                  <a:schemeClr val="tx1"/>
-                </a:solidFill>
-                <a:latin typeface="+mn-lt"/>
-                <a:ea typeface="+mn-ea"/>
-                <a:cs typeface="+mn-cs"/>
-              </a:defRPr>
-            </a:lvl8pPr>
-            <a:lvl9pPr marL="12547355" indent="-738080" algn="l" defTabSz="2952319" rtl="0" eaLnBrk="1" latinLnBrk="0" hangingPunct="1">
-              <a:spcBef>
-                <a:spcPct val="20000"/>
-              </a:spcBef>
-              <a:buFont typeface="Arial" pitchFamily="34" charset="0"/>
-              <a:buChar char="•"/>
-              <a:defRPr sz="6400" kern="1200">
-                <a:solidFill>
-                  <a:schemeClr val="tx1"/>
-                </a:solidFill>
-                <a:latin typeface="+mn-lt"/>
-                <a:ea typeface="+mn-ea"/>
-                <a:cs typeface="+mn-cs"/>
-              </a:defRPr>
-            </a:lvl9pPr>
-          </a:lstStyle>
-          <a:p>
-            <a:pPr lvl="1" algn="just"/>
-            <a:r>
-              <a:rPr lang="de-DE" sz="2800" dirty="0"/>
-              <a:t>Debiasing Results</a:t>
-            </a:r>
-          </a:p>
-          <a:p>
-            <a:pPr algn="just"/>
-            <a:r>
-              <a:rPr lang="en-US" dirty="0"/>
-              <a:t>An SVM classifier was trained on a subset of the Google News data called w2vNEWS to identify gender-neutral words, then generalized to the rest of the dataset</a:t>
-            </a:r>
-            <a:r>
-              <a:rPr lang="en-AU" dirty="0"/>
-              <a:t>. 10-fold cross validation resulted in an F-Score of 0.627. Debiasing was also measured by having a crowd evaluate whether analogies generated from the embedding are appropriate or reflect gender stereotypes, with the hard debiased embedding having least stereotypical analogies and most approved analogies (Figure 4).</a:t>
-            </a:r>
-            <a:endParaRPr lang="de-DE" sz="2800" dirty="0"/>
-          </a:p>
-          <a:p>
-            <a:pPr lvl="1" algn="just"/>
-            <a:endParaRPr lang="de-DE" sz="2800" dirty="0"/>
-          </a:p>
-          <a:p>
-            <a:pPr lvl="1" algn="just"/>
-            <a:endParaRPr lang="de-DE" sz="2800" dirty="0"/>
-          </a:p>
-          <a:p>
-            <a:pPr lvl="1" algn="just"/>
-            <a:endParaRPr lang="de-DE" sz="2800" dirty="0"/>
-          </a:p>
-          <a:p>
-            <a:pPr lvl="1" algn="just"/>
-            <a:endParaRPr lang="de-DE" sz="2800" dirty="0"/>
-          </a:p>
-          <a:p>
-            <a:pPr lvl="1" algn="just"/>
-            <a:endParaRPr lang="de-DE" sz="2800" dirty="0"/>
-          </a:p>
-          <a:p>
-            <a:pPr lvl="1" algn="just"/>
-            <a:endParaRPr lang="de-DE" sz="2800" dirty="0"/>
-          </a:p>
-          <a:p>
-            <a:pPr lvl="1" algn="just"/>
-            <a:endParaRPr lang="de-DE" sz="2800" dirty="0"/>
-          </a:p>
-          <a:p>
-            <a:pPr lvl="1" algn="just"/>
-            <a:endParaRPr lang="de-DE" sz="2800" dirty="0"/>
-          </a:p>
-          <a:p>
-            <a:pPr lvl="1" algn="just"/>
-            <a:endParaRPr lang="de-DE" sz="2800" dirty="0"/>
-          </a:p>
-          <a:p>
-            <a:pPr lvl="1" algn="just"/>
-            <a:endParaRPr lang="de-DE" sz="2800" dirty="0"/>
-          </a:p>
-          <a:p>
-            <a:pPr lvl="1" algn="just"/>
-            <a:endParaRPr lang="de-DE" sz="2800" dirty="0"/>
-          </a:p>
-          <a:p>
-            <a:pPr lvl="1" algn="just"/>
-            <a:endParaRPr lang="de-DE" sz="2800" dirty="0"/>
-          </a:p>
-          <a:p>
-            <a:pPr lvl="1" algn="just"/>
-            <a:endParaRPr lang="de-DE" sz="2800" dirty="0"/>
-          </a:p>
-          <a:p>
-            <a:pPr lvl="1" algn="just"/>
-            <a:endParaRPr lang="de-DE" sz="2800" dirty="0"/>
-          </a:p>
-          <a:p>
-            <a:pPr lvl="1" algn="just"/>
-            <a:endParaRPr lang="de-DE" sz="2800" dirty="0"/>
-          </a:p>
-          <a:p>
-            <a:pPr lvl="1" algn="just"/>
-            <a:endParaRPr lang="de-DE" sz="2800" dirty="0"/>
-          </a:p>
-          <a:p>
-            <a:pPr lvl="1" algn="just"/>
-            <a:endParaRPr lang="de-DE" sz="2800" dirty="0"/>
-          </a:p>
-          <a:p>
-            <a:pPr lvl="1" algn="just"/>
-            <a:endParaRPr lang="de-DE" sz="2800" dirty="0"/>
-          </a:p>
-          <a:p>
-            <a:pPr lvl="1" algn="just"/>
-            <a:endParaRPr lang="de-DE" sz="2800" dirty="0"/>
-          </a:p>
-          <a:p>
-            <a:pPr lvl="1" algn="just"/>
-            <a:endParaRPr lang="de-DE" sz="2800" dirty="0"/>
-          </a:p>
-          <a:p>
-            <a:pPr lvl="1" algn="just"/>
-            <a:endParaRPr lang="de-DE" sz="2800" dirty="0"/>
-          </a:p>
-          <a:p>
-            <a:pPr lvl="1" algn="just"/>
-            <a:endParaRPr lang="de-DE" sz="2800" dirty="0"/>
-          </a:p>
-          <a:p>
-            <a:pPr lvl="1" algn="just"/>
-            <a:endParaRPr lang="de-DE" sz="2800" dirty="0"/>
-          </a:p>
-          <a:p>
-            <a:pPr lvl="1" algn="just"/>
-            <a:r>
-              <a:rPr lang="de-DE" sz="2800" dirty="0"/>
-              <a:t>Discussion</a:t>
-            </a:r>
-          </a:p>
-          <a:p>
-            <a:pPr algn="just"/>
-            <a:r>
-              <a:rPr lang="en-AU" dirty="0"/>
-              <a:t>Overall, a single direction was able to capture gender information. Hard debiasing was the most effective on the embedding, where placing neutral words orthogonal to the gender direction and paired word sets equidistant from neutralised words resulting in reduction of gender bias whilst still capturing appropriate analogies.</a:t>
-            </a:r>
-          </a:p>
-          <a:p>
-            <a:pPr algn="just"/>
-            <a:endParaRPr lang="de-DE" dirty="0"/>
-          </a:p>
-        </p:txBody>
-      </p:sp>
+      <mc:AlternateContent xmlns:mc="http://schemas.openxmlformats.org/markup-compatibility/2006">
+        <mc:Choice xmlns:a14="http://schemas.microsoft.com/office/drawing/2010/main" Requires="a14">
+          <p:sp>
+            <p:nvSpPr>
+              <p:cNvPr id="17" name="Text Placeholder 4">
+                <a:extLst>
+                  <a:ext uri="{FF2B5EF4-FFF2-40B4-BE49-F238E27FC236}">
+                    <a16:creationId xmlns:a16="http://schemas.microsoft.com/office/drawing/2014/main" id="{80208A8B-70FF-4729-AA3D-10A2E92A566C}"/>
+                  </a:ext>
+                </a:extLst>
+              </p:cNvPr>
+              <p:cNvSpPr txBox="1">
+                <a:spLocks/>
+              </p:cNvSpPr>
+              <p:nvPr/>
+            </p:nvSpPr>
+            <p:spPr>
+              <a:xfrm>
+                <a:off x="20968660" y="3636616"/>
+                <a:ext cx="8047339" cy="14761334"/>
+              </a:xfrm>
+              <a:prstGeom prst="rect">
+                <a:avLst/>
+              </a:prstGeom>
+            </p:spPr>
+            <p:txBody>
+              <a:bodyPr lIns="0" tIns="0" rIns="0" bIns="0"/>
+              <a:lstStyle>
+                <a:lvl1pPr marL="0" indent="0" algn="l" defTabSz="2952319" rtl="0" eaLnBrk="1" latinLnBrk="0" hangingPunct="1">
+                  <a:lnSpc>
+                    <a:spcPts val="2800"/>
+                  </a:lnSpc>
+                  <a:spcBef>
+                    <a:spcPts val="0"/>
+                  </a:spcBef>
+                  <a:spcAft>
+                    <a:spcPts val="2800"/>
+                  </a:spcAft>
+                  <a:buFont typeface="Arial" pitchFamily="34" charset="0"/>
+                  <a:buNone/>
+                  <a:defRPr sz="2200" kern="1200">
+                    <a:solidFill>
+                      <a:schemeClr val="tx1"/>
+                    </a:solidFill>
+                    <a:latin typeface="Arial" pitchFamily="34" charset="0"/>
+                    <a:ea typeface="+mn-ea"/>
+                    <a:cs typeface="Arial" pitchFamily="34" charset="0"/>
+                  </a:defRPr>
+                </a:lvl1pPr>
+                <a:lvl2pPr marL="0" indent="0" algn="l" defTabSz="2952319" rtl="0" eaLnBrk="1" latinLnBrk="0" hangingPunct="1">
+                  <a:lnSpc>
+                    <a:spcPts val="2800"/>
+                  </a:lnSpc>
+                  <a:spcBef>
+                    <a:spcPts val="0"/>
+                  </a:spcBef>
+                  <a:spcAft>
+                    <a:spcPts val="0"/>
+                  </a:spcAft>
+                  <a:buFont typeface="Arial" pitchFamily="34" charset="0"/>
+                  <a:buNone/>
+                  <a:defRPr sz="2200" b="1" i="0" kern="1200" baseline="0">
+                    <a:solidFill>
+                      <a:schemeClr val="tx1"/>
+                    </a:solidFill>
+                    <a:latin typeface="Arial" pitchFamily="34" charset="0"/>
+                    <a:ea typeface="+mn-ea"/>
+                    <a:cs typeface="Arial" pitchFamily="34" charset="0"/>
+                  </a:defRPr>
+                </a:lvl2pPr>
+                <a:lvl3pPr marL="180000" indent="-180000" algn="l" defTabSz="2952319" rtl="0" eaLnBrk="1" latinLnBrk="0" hangingPunct="1">
+                  <a:lnSpc>
+                    <a:spcPts val="2800"/>
+                  </a:lnSpc>
+                  <a:spcBef>
+                    <a:spcPts val="0"/>
+                  </a:spcBef>
+                  <a:spcAft>
+                    <a:spcPts val="2800"/>
+                  </a:spcAft>
+                  <a:buFont typeface="Arial" panose="020B0604020202020204" pitchFamily="34" charset="0"/>
+                  <a:buChar char="•"/>
+                  <a:defRPr sz="2200" kern="1200">
+                    <a:solidFill>
+                      <a:schemeClr val="tx1"/>
+                    </a:solidFill>
+                    <a:latin typeface="Arial" pitchFamily="34" charset="0"/>
+                    <a:ea typeface="+mn-ea"/>
+                    <a:cs typeface="Arial" pitchFamily="34" charset="0"/>
+                  </a:defRPr>
+                </a:lvl3pPr>
+                <a:lvl4pPr marL="5166557" indent="-738080" algn="l" defTabSz="2952319" rtl="0" eaLnBrk="1" latinLnBrk="0" hangingPunct="1">
+                  <a:spcBef>
+                    <a:spcPct val="20000"/>
+                  </a:spcBef>
+                  <a:buFont typeface="Arial" pitchFamily="34" charset="0"/>
+                  <a:buChar char="–"/>
+                  <a:defRPr sz="1800" kern="1200">
+                    <a:solidFill>
+                      <a:schemeClr val="tx1"/>
+                    </a:solidFill>
+                    <a:latin typeface="Arial" pitchFamily="34" charset="0"/>
+                    <a:ea typeface="+mn-ea"/>
+                    <a:cs typeface="Arial" pitchFamily="34" charset="0"/>
+                  </a:defRPr>
+                </a:lvl4pPr>
+                <a:lvl5pPr marL="6642717" indent="-738080" algn="l" defTabSz="2952319" rtl="0" eaLnBrk="1" latinLnBrk="0" hangingPunct="1">
+                  <a:spcBef>
+                    <a:spcPct val="20000"/>
+                  </a:spcBef>
+                  <a:buFont typeface="Arial" pitchFamily="34" charset="0"/>
+                  <a:buChar char="»"/>
+                  <a:defRPr sz="1800" kern="1200">
+                    <a:solidFill>
+                      <a:schemeClr val="tx1"/>
+                    </a:solidFill>
+                    <a:latin typeface="Arial" pitchFamily="34" charset="0"/>
+                    <a:ea typeface="+mn-ea"/>
+                    <a:cs typeface="Arial" pitchFamily="34" charset="0"/>
+                  </a:defRPr>
+                </a:lvl5pPr>
+                <a:lvl6pPr marL="8118877" indent="-738080" algn="l" defTabSz="2952319" rtl="0" eaLnBrk="1" latinLnBrk="0" hangingPunct="1">
+                  <a:spcBef>
+                    <a:spcPct val="20000"/>
+                  </a:spcBef>
+                  <a:buFont typeface="Arial" pitchFamily="34" charset="0"/>
+                  <a:buChar char="•"/>
+                  <a:defRPr sz="6400" kern="1200">
+                    <a:solidFill>
+                      <a:schemeClr val="tx1"/>
+                    </a:solidFill>
+                    <a:latin typeface="+mn-lt"/>
+                    <a:ea typeface="+mn-ea"/>
+                    <a:cs typeface="+mn-cs"/>
+                  </a:defRPr>
+                </a:lvl6pPr>
+                <a:lvl7pPr marL="9595036" indent="-738080" algn="l" defTabSz="2952319" rtl="0" eaLnBrk="1" latinLnBrk="0" hangingPunct="1">
+                  <a:spcBef>
+                    <a:spcPct val="20000"/>
+                  </a:spcBef>
+                  <a:buFont typeface="Arial" pitchFamily="34" charset="0"/>
+                  <a:buChar char="•"/>
+                  <a:defRPr sz="6400" kern="1200">
+                    <a:solidFill>
+                      <a:schemeClr val="tx1"/>
+                    </a:solidFill>
+                    <a:latin typeface="+mn-lt"/>
+                    <a:ea typeface="+mn-ea"/>
+                    <a:cs typeface="+mn-cs"/>
+                  </a:defRPr>
+                </a:lvl7pPr>
+                <a:lvl8pPr marL="11071196" indent="-738080" algn="l" defTabSz="2952319" rtl="0" eaLnBrk="1" latinLnBrk="0" hangingPunct="1">
+                  <a:spcBef>
+                    <a:spcPct val="20000"/>
+                  </a:spcBef>
+                  <a:buFont typeface="Arial" pitchFamily="34" charset="0"/>
+                  <a:buChar char="•"/>
+                  <a:defRPr sz="6400" kern="1200">
+                    <a:solidFill>
+                      <a:schemeClr val="tx1"/>
+                    </a:solidFill>
+                    <a:latin typeface="+mn-lt"/>
+                    <a:ea typeface="+mn-ea"/>
+                    <a:cs typeface="+mn-cs"/>
+                  </a:defRPr>
+                </a:lvl8pPr>
+                <a:lvl9pPr marL="12547355" indent="-738080" algn="l" defTabSz="2952319" rtl="0" eaLnBrk="1" latinLnBrk="0" hangingPunct="1">
+                  <a:spcBef>
+                    <a:spcPct val="20000"/>
+                  </a:spcBef>
+                  <a:buFont typeface="Arial" pitchFamily="34" charset="0"/>
+                  <a:buChar char="•"/>
+                  <a:defRPr sz="6400" kern="1200">
+                    <a:solidFill>
+                      <a:schemeClr val="tx1"/>
+                    </a:solidFill>
+                    <a:latin typeface="+mn-lt"/>
+                    <a:ea typeface="+mn-ea"/>
+                    <a:cs typeface="+mn-cs"/>
+                  </a:defRPr>
+                </a:lvl9pPr>
+              </a:lstStyle>
+              <a:p>
+                <a:pPr lvl="1" algn="just"/>
+                <a:r>
+                  <a:rPr lang="de-DE" sz="2800" dirty="0"/>
+                  <a:t>Debiasing Results</a:t>
+                </a:r>
+              </a:p>
+              <a:p>
+                <a:pPr algn="just"/>
+                <a:r>
+                  <a:rPr lang="en-US" dirty="0"/>
+                  <a:t>An </a:t>
+                </a:r>
+                <a:r>
+                  <a:rPr lang="en-US" i="1" dirty="0"/>
+                  <a:t>SVM</a:t>
+                </a:r>
+                <a:r>
+                  <a:rPr lang="en-US" dirty="0"/>
+                  <a:t> classifier was trained on a subset of the Google News data called </a:t>
+                </a:r>
+                <a:r>
+                  <a:rPr lang="en-US" i="1" dirty="0"/>
+                  <a:t>w2vNEWS</a:t>
+                </a:r>
+                <a:r>
+                  <a:rPr lang="en-US" dirty="0"/>
+                  <a:t> to identify gender-neutral words, then generalized to the rest of the dataset</a:t>
+                </a:r>
+                <a:r>
+                  <a:rPr lang="en-AU" dirty="0"/>
+                  <a:t>. </a:t>
+                </a:r>
+                <a14:m>
+                  <m:oMath xmlns:m="http://schemas.openxmlformats.org/officeDocument/2006/math">
+                    <m:r>
+                      <a:rPr lang="en-AU" i="1" dirty="0" smtClean="0">
+                        <a:latin typeface="Cambria Math" panose="02040503050406030204" pitchFamily="18" charset="0"/>
+                      </a:rPr>
+                      <m:t>10</m:t>
+                    </m:r>
+                  </m:oMath>
+                </a14:m>
+                <a:r>
+                  <a:rPr lang="en-AU" dirty="0"/>
+                  <a:t>-fold cross validation resulted in an </a:t>
+                </a:r>
+                <a:r>
+                  <a:rPr lang="en-AU" i="1" dirty="0"/>
+                  <a:t>F-Score</a:t>
+                </a:r>
+                <a:r>
+                  <a:rPr lang="en-AU" dirty="0"/>
+                  <a:t> of </a:t>
+                </a:r>
+                <a14:m>
+                  <m:oMath xmlns:m="http://schemas.openxmlformats.org/officeDocument/2006/math">
+                    <m:r>
+                      <a:rPr lang="en-GB" b="0" i="1" smtClean="0">
+                        <a:latin typeface="Cambria Math" panose="02040503050406030204" pitchFamily="18" charset="0"/>
+                      </a:rPr>
+                      <m:t>0.627</m:t>
+                    </m:r>
+                  </m:oMath>
+                </a14:m>
+                <a:r>
+                  <a:rPr lang="en-AU" dirty="0"/>
+                  <a:t>. Debiasing was also measured by having a crowd evaluate whether analogies generated from the embedding are appropriate or reflect gender stereotypes, with the hard debiased embedding having least stereotypical analogies and most approved analogies (Figure 4).</a:t>
+                </a:r>
+                <a:endParaRPr lang="de-DE" sz="2800" dirty="0"/>
+              </a:p>
+              <a:p>
+                <a:pPr lvl="1" algn="just"/>
+                <a:endParaRPr lang="de-DE" sz="2800" dirty="0"/>
+              </a:p>
+              <a:p>
+                <a:pPr lvl="1" algn="just"/>
+                <a:endParaRPr lang="de-DE" sz="2800" dirty="0"/>
+              </a:p>
+              <a:p>
+                <a:pPr lvl="1" algn="just"/>
+                <a:endParaRPr lang="de-DE" sz="2800" dirty="0"/>
+              </a:p>
+              <a:p>
+                <a:pPr lvl="1" algn="just"/>
+                <a:endParaRPr lang="de-DE" sz="2800" dirty="0"/>
+              </a:p>
+              <a:p>
+                <a:pPr lvl="1" algn="just"/>
+                <a:endParaRPr lang="de-DE" sz="2800" dirty="0"/>
+              </a:p>
+              <a:p>
+                <a:pPr lvl="1" algn="just"/>
+                <a:endParaRPr lang="de-DE" sz="2800" dirty="0"/>
+              </a:p>
+              <a:p>
+                <a:pPr lvl="1" algn="just"/>
+                <a:endParaRPr lang="de-DE" sz="2800" dirty="0"/>
+              </a:p>
+              <a:p>
+                <a:pPr lvl="1" algn="just"/>
+                <a:endParaRPr lang="de-DE" sz="2800" dirty="0"/>
+              </a:p>
+              <a:p>
+                <a:pPr lvl="1" algn="just"/>
+                <a:endParaRPr lang="de-DE" sz="2800" dirty="0"/>
+              </a:p>
+              <a:p>
+                <a:pPr lvl="1" algn="just"/>
+                <a:endParaRPr lang="de-DE" sz="2800" dirty="0"/>
+              </a:p>
+              <a:p>
+                <a:pPr lvl="1" algn="just"/>
+                <a:endParaRPr lang="de-DE" sz="2800" dirty="0"/>
+              </a:p>
+              <a:p>
+                <a:pPr lvl="1" algn="just"/>
+                <a:endParaRPr lang="de-DE" sz="2800" dirty="0"/>
+              </a:p>
+              <a:p>
+                <a:pPr lvl="1" algn="just"/>
+                <a:endParaRPr lang="de-DE" sz="2800" dirty="0"/>
+              </a:p>
+              <a:p>
+                <a:pPr lvl="1" algn="just"/>
+                <a:endParaRPr lang="de-DE" sz="2800" dirty="0"/>
+              </a:p>
+              <a:p>
+                <a:pPr lvl="1" algn="just"/>
+                <a:endParaRPr lang="de-DE" sz="2800" dirty="0"/>
+              </a:p>
+              <a:p>
+                <a:pPr lvl="1" algn="just"/>
+                <a:endParaRPr lang="de-DE" sz="2800" dirty="0"/>
+              </a:p>
+              <a:p>
+                <a:pPr lvl="1" algn="just"/>
+                <a:endParaRPr lang="de-DE" sz="2800" dirty="0"/>
+              </a:p>
+              <a:p>
+                <a:pPr lvl="1" algn="just"/>
+                <a:endParaRPr lang="de-DE" sz="2800" dirty="0"/>
+              </a:p>
+              <a:p>
+                <a:pPr lvl="1" algn="just"/>
+                <a:endParaRPr lang="de-DE" sz="2800" dirty="0"/>
+              </a:p>
+              <a:p>
+                <a:pPr lvl="1" algn="just"/>
+                <a:endParaRPr lang="de-DE" sz="2800" dirty="0"/>
+              </a:p>
+              <a:p>
+                <a:pPr lvl="1" algn="just"/>
+                <a:endParaRPr lang="de-DE" sz="2800" dirty="0"/>
+              </a:p>
+              <a:p>
+                <a:pPr lvl="1" algn="just"/>
+                <a:endParaRPr lang="de-DE" sz="2800" dirty="0"/>
+              </a:p>
+              <a:p>
+                <a:pPr lvl="1" algn="just"/>
+                <a:endParaRPr lang="de-DE" sz="2800" dirty="0"/>
+              </a:p>
+              <a:p>
+                <a:pPr lvl="1" algn="just"/>
+                <a:r>
+                  <a:rPr lang="de-DE" sz="2800" dirty="0"/>
+                  <a:t>Discussion</a:t>
+                </a:r>
+              </a:p>
+              <a:p>
+                <a:pPr algn="just"/>
+                <a:r>
+                  <a:rPr lang="en-AU" dirty="0"/>
+                  <a:t>Overall, a single direction was able to capture gender information. Hard debiasing was the most effective on the embedding, where placing neutral words orthogonal to the gender direction and paired word sets equidistant from neutralised words resulting in reduction of gender bias whilst still capturing appropriate analogies.</a:t>
+                </a:r>
+              </a:p>
+              <a:p>
+                <a:pPr algn="just"/>
+                <a:endParaRPr lang="de-DE" dirty="0"/>
+              </a:p>
+            </p:txBody>
+          </p:sp>
+        </mc:Choice>
+        <mc:Fallback>
+          <p:sp>
+            <p:nvSpPr>
+              <p:cNvPr id="17" name="Text Placeholder 4">
+                <a:extLst>
+                  <a:ext uri="{FF2B5EF4-FFF2-40B4-BE49-F238E27FC236}">
+                    <a16:creationId xmlns:a16="http://schemas.microsoft.com/office/drawing/2014/main" id="{80208A8B-70FF-4729-AA3D-10A2E92A566C}"/>
+                  </a:ext>
+                </a:extLst>
+              </p:cNvPr>
+              <p:cNvSpPr txBox="1">
+                <a:spLocks noRot="1" noChangeAspect="1" noMove="1" noResize="1" noEditPoints="1" noAdjustHandles="1" noChangeArrowheads="1" noChangeShapeType="1" noTextEdit="1"/>
+              </p:cNvSpPr>
+              <p:nvPr/>
+            </p:nvSpPr>
+            <p:spPr>
+              <a:xfrm>
+                <a:off x="20968660" y="3636616"/>
+                <a:ext cx="8047339" cy="14761334"/>
+              </a:xfrm>
+              <a:prstGeom prst="rect">
+                <a:avLst/>
+              </a:prstGeom>
+              <a:blipFill>
+                <a:blip r:embed="rId6"/>
+                <a:stretch>
+                  <a:fillRect l="-2727" t="-1239" r="-2121"/>
+                </a:stretch>
+              </a:blipFill>
+            </p:spPr>
+            <p:txBody>
+              <a:bodyPr/>
+              <a:lstStyle/>
+              <a:p>
+                <a:r>
+                  <a:rPr lang="en-GB">
+                    <a:noFill/>
+                  </a:rPr>
+                  <a:t> </a:t>
+                </a:r>
+              </a:p>
+            </p:txBody>
+          </p:sp>
+        </mc:Fallback>
+      </mc:AlternateContent>
       <p:sp>
         <p:nvSpPr>
           <p:cNvPr id="21" name="Text Placeholder 2">

</xml_diff>

<commit_message>
Add section 4 definitions
</commit_message>
<xml_diff>
--- a/Information Retrieval - Poster Session/presentation_template.pptx
+++ b/Information Retrieval - Poster Session/presentation_template.pptx
@@ -29146,8 +29146,8 @@
           </a:xfrm>
         </p:spPr>
       </p:pic>
-      <mc:AlternateContent xmlns:mc="http://schemas.openxmlformats.org/markup-compatibility/2006">
-        <mc:Choice xmlns:a14="http://schemas.microsoft.com/office/drawing/2010/main" Requires="a14">
+      <mc:AlternateContent xmlns:mc="http://schemas.openxmlformats.org/markup-compatibility/2006" xmlns:a14="http://schemas.microsoft.com/office/drawing/2010/main">
+        <mc:Choice Requires="a14">
           <p:sp>
             <p:nvSpPr>
               <p:cNvPr id="5" name="Text Placeholder 4">
@@ -29467,7 +29467,7 @@
             </p:txBody>
           </p:sp>
         </mc:Choice>
-        <mc:Fallback>
+        <mc:Fallback xmlns="">
           <p:sp>
             <p:nvSpPr>
               <p:cNvPr id="5" name="Text Placeholder 4">
@@ -29693,10 +29693,6 @@
                   </a:defRPr>
                 </a:lvl9pPr>
               </a:lstStyle>
-              <a:p>
-                <a:pPr lvl="1" algn="just"/>
-                <a:endParaRPr lang="de-DE" sz="2800" dirty="0"/>
-              </a:p>
               <a:p>
                 <a:pPr lvl="1" algn="just"/>
                 <a:endParaRPr lang="de-DE" sz="2800" dirty="0"/>
@@ -30250,15 +30246,606 @@
                 </a:r>
               </a:p>
               <a:p>
-                <a:pPr lvl="1" algn="just"/>
+                <a:pPr>
+                  <a:lnSpc>
+                    <a:spcPct val="100000"/>
+                  </a:lnSpc>
+                  <a:spcAft>
+                    <a:spcPts val="0"/>
+                  </a:spcAft>
+                </a:pPr>
                 <a:r>
-                  <a:rPr lang="de-DE" b="0" dirty="0"/>
-                  <a:t>Lorem ipsum dolor sit amet, consectetur adipiscing elit, sed do eiusmod tempor incididunt ut labore et dolore magna aliqua. Ut enim ad minim veniam, quis nostrud exercitation ullamco laboris nisi ut aliquip ex ea commodo consequat.</a:t>
+                  <a:rPr lang="de-DE" dirty="0"/>
+                  <a:t>Some definitions:</a:t>
+                </a:r>
+                <a:endParaRPr lang="de-DE" spc="-150" dirty="0"/>
+              </a:p>
+              <a:p>
+                <a:pPr marL="342900" indent="-342900">
+                  <a:lnSpc>
+                    <a:spcPct val="100000"/>
+                  </a:lnSpc>
+                  <a:spcAft>
+                    <a:spcPts val="0"/>
+                  </a:spcAft>
+                  <a:buFont typeface="Arial" panose="020B0604020202020204" pitchFamily="34" charset="0"/>
+                  <a:buChar char="•"/>
+                </a:pPr>
+                <a:r>
+                  <a:rPr lang="de-DE" spc="-150" dirty="0"/>
+                  <a:t>Word set </a:t>
+                </a:r>
+                <a14:m>
+                  <m:oMath xmlns:m="http://schemas.openxmlformats.org/officeDocument/2006/math">
+                    <m:r>
+                      <a:rPr lang="en-GB" b="0" i="1" spc="-150" smtClean="0">
+                        <a:latin typeface="Cambria Math" panose="02040503050406030204" pitchFamily="18" charset="0"/>
+                      </a:rPr>
+                      <m:t>𝑊</m:t>
+                    </m:r>
+                    <m:r>
+                      <a:rPr lang="en-GB" b="0" i="1" spc="-150" smtClean="0">
+                        <a:latin typeface="Cambria Math" panose="02040503050406030204" pitchFamily="18" charset="0"/>
+                      </a:rPr>
+                      <m:t>=</m:t>
+                    </m:r>
+                    <m:r>
+                      <a:rPr lang="en-GB" b="0" i="1" spc="-150" smtClean="0">
+                        <a:latin typeface="Cambria Math" panose="02040503050406030204" pitchFamily="18" charset="0"/>
+                      </a:rPr>
+                      <m:t>𝑁</m:t>
+                    </m:r>
+                    <m:r>
+                      <a:rPr lang="en-GB" b="0" i="1" spc="-150" smtClean="0">
+                        <a:latin typeface="Cambria Math" panose="02040503050406030204" pitchFamily="18" charset="0"/>
+                        <a:ea typeface="Cambria Math" panose="02040503050406030204" pitchFamily="18" charset="0"/>
+                      </a:rPr>
+                      <m:t>∪</m:t>
+                    </m:r>
+                    <m:r>
+                      <a:rPr lang="en-GB" b="0" i="1" spc="-150" smtClean="0">
+                        <a:latin typeface="Cambria Math" panose="02040503050406030204" pitchFamily="18" charset="0"/>
+                        <a:ea typeface="Cambria Math" panose="02040503050406030204" pitchFamily="18" charset="0"/>
+                      </a:rPr>
+                      <m:t>𝑆</m:t>
+                    </m:r>
+                  </m:oMath>
+                </a14:m>
+                <a:r>
+                  <a:rPr lang="de-DE" spc="-150" dirty="0"/>
+                  <a:t>, </a:t>
+                </a:r>
+                <a14:m>
+                  <m:oMath xmlns:m="http://schemas.openxmlformats.org/officeDocument/2006/math">
+                    <m:r>
+                      <a:rPr lang="de-DE" i="1" spc="-150" dirty="0" smtClean="0">
+                        <a:latin typeface="Cambria Math" panose="02040503050406030204" pitchFamily="18" charset="0"/>
+                      </a:rPr>
+                      <m:t>𝑁</m:t>
+                    </m:r>
+                  </m:oMath>
+                </a14:m>
+                <a:r>
+                  <a:rPr lang="de-DE" spc="-150" dirty="0"/>
+                  <a:t> is gender neutral, </a:t>
+                </a:r>
+                <a14:m>
+                  <m:oMath xmlns:m="http://schemas.openxmlformats.org/officeDocument/2006/math">
+                    <m:r>
+                      <a:rPr lang="de-DE" i="1" spc="-150" dirty="0" smtClean="0">
+                        <a:latin typeface="Cambria Math" panose="02040503050406030204" pitchFamily="18" charset="0"/>
+                      </a:rPr>
+                      <m:t>𝑆</m:t>
+                    </m:r>
+                  </m:oMath>
+                </a14:m>
+                <a:r>
+                  <a:rPr lang="de-DE" spc="-150" dirty="0"/>
+                  <a:t> is gender specific set.</a:t>
+                </a:r>
+                <a:endParaRPr lang="de-DE" dirty="0"/>
+              </a:p>
+              <a:p>
+                <a:pPr marL="342900" indent="-342900">
+                  <a:lnSpc>
+                    <a:spcPct val="100000"/>
+                  </a:lnSpc>
+                  <a:spcAft>
+                    <a:spcPts val="0"/>
+                  </a:spcAft>
+                  <a:buFont typeface="Arial" panose="020B0604020202020204" pitchFamily="34" charset="0"/>
+                  <a:buChar char="•"/>
+                </a:pPr>
+                <a:r>
+                  <a:rPr lang="de-DE" dirty="0"/>
+                  <a:t>Bias subspace </a:t>
+                </a:r>
+                <a14:m>
+                  <m:oMath xmlns:m="http://schemas.openxmlformats.org/officeDocument/2006/math">
+                    <m:r>
+                      <a:rPr lang="en-GB" b="0" i="1" smtClean="0">
+                        <a:latin typeface="Cambria Math" panose="02040503050406030204" pitchFamily="18" charset="0"/>
+                      </a:rPr>
+                      <m:t>𝐵</m:t>
+                    </m:r>
+                    <m:r>
+                      <a:rPr lang="en-GB" b="0" i="1" smtClean="0">
+                        <a:latin typeface="Cambria Math" panose="02040503050406030204" pitchFamily="18" charset="0"/>
+                        <a:ea typeface="Cambria Math" panose="02040503050406030204" pitchFamily="18" charset="0"/>
+                      </a:rPr>
+                      <m:t>⊂</m:t>
+                    </m:r>
+                    <m:sSup>
+                      <m:sSupPr>
+                        <m:ctrlPr>
+                          <a:rPr lang="en-GB" b="0" i="1" smtClean="0">
+                            <a:latin typeface="Cambria Math" panose="02040503050406030204" pitchFamily="18" charset="0"/>
+                            <a:ea typeface="Cambria Math" panose="02040503050406030204" pitchFamily="18" charset="0"/>
+                          </a:rPr>
+                        </m:ctrlPr>
+                      </m:sSupPr>
+                      <m:e>
+                        <m:r>
+                          <a:rPr lang="en-GB" b="0" i="1" smtClean="0">
+                            <a:latin typeface="Cambria Math" panose="02040503050406030204" pitchFamily="18" charset="0"/>
+                            <a:ea typeface="Cambria Math" panose="02040503050406030204" pitchFamily="18" charset="0"/>
+                          </a:rPr>
+                          <m:t>ℝ</m:t>
+                        </m:r>
+                      </m:e>
+                      <m:sup>
+                        <m:r>
+                          <a:rPr lang="en-GB" b="0" i="1" smtClean="0">
+                            <a:latin typeface="Cambria Math" panose="02040503050406030204" pitchFamily="18" charset="0"/>
+                            <a:ea typeface="Cambria Math" panose="02040503050406030204" pitchFamily="18" charset="0"/>
+                          </a:rPr>
+                          <m:t>𝑑</m:t>
+                        </m:r>
+                      </m:sup>
+                    </m:sSup>
+                  </m:oMath>
+                </a14:m>
+                <a:r>
+                  <a:rPr lang="de-DE" dirty="0"/>
+                  <a:t> with </a:t>
+                </a:r>
+                <a14:m>
+                  <m:oMath xmlns:m="http://schemas.openxmlformats.org/officeDocument/2006/math">
+                    <m:r>
+                      <a:rPr lang="en-GB" b="0" i="1" smtClean="0">
+                        <a:latin typeface="Cambria Math" panose="02040503050406030204" pitchFamily="18" charset="0"/>
+                      </a:rPr>
+                      <m:t>𝑘</m:t>
+                    </m:r>
+                  </m:oMath>
+                </a14:m>
+                <a:r>
+                  <a:rPr lang="de-DE" dirty="0"/>
+                  <a:t> basis </a:t>
+                </a:r>
+                <a14:m>
+                  <m:oMath xmlns:m="http://schemas.openxmlformats.org/officeDocument/2006/math">
+                    <m:sSub>
+                      <m:sSubPr>
+                        <m:ctrlPr>
+                          <a:rPr lang="en-GB" i="1">
+                            <a:latin typeface="Cambria Math" panose="02040503050406030204" pitchFamily="18" charset="0"/>
+                          </a:rPr>
+                        </m:ctrlPr>
+                      </m:sSubPr>
+                      <m:e>
+                        <m:r>
+                          <a:rPr lang="en-GB" i="1">
+                            <a:latin typeface="Cambria Math" panose="02040503050406030204" pitchFamily="18" charset="0"/>
+                          </a:rPr>
+                          <m:t>𝑏</m:t>
+                        </m:r>
+                      </m:e>
+                      <m:sub>
+                        <m:r>
+                          <a:rPr lang="en-GB" i="1">
+                            <a:latin typeface="Cambria Math" panose="02040503050406030204" pitchFamily="18" charset="0"/>
+                          </a:rPr>
+                          <m:t>1</m:t>
+                        </m:r>
+                      </m:sub>
+                    </m:sSub>
+                    <m:r>
+                      <a:rPr lang="en-GB" i="1">
+                        <a:latin typeface="Cambria Math" panose="02040503050406030204" pitchFamily="18" charset="0"/>
+                      </a:rPr>
+                      <m:t>,</m:t>
+                    </m:r>
+                    <m:r>
+                      <a:rPr lang="en-GB" i="1">
+                        <a:latin typeface="Cambria Math" panose="02040503050406030204" pitchFamily="18" charset="0"/>
+                        <a:ea typeface="Cambria Math" panose="02040503050406030204" pitchFamily="18" charset="0"/>
+                      </a:rPr>
+                      <m:t>⋯</m:t>
+                    </m:r>
+                    <m:r>
+                      <a:rPr lang="en-GB" i="1">
+                        <a:latin typeface="Cambria Math" panose="02040503050406030204" pitchFamily="18" charset="0"/>
+                      </a:rPr>
+                      <m:t>,</m:t>
+                    </m:r>
+                    <m:sSub>
+                      <m:sSubPr>
+                        <m:ctrlPr>
+                          <a:rPr lang="en-GB" i="1">
+                            <a:latin typeface="Cambria Math" panose="02040503050406030204" pitchFamily="18" charset="0"/>
+                          </a:rPr>
+                        </m:ctrlPr>
+                      </m:sSubPr>
+                      <m:e>
+                        <m:r>
+                          <a:rPr lang="en-GB" i="1">
+                            <a:latin typeface="Cambria Math" panose="02040503050406030204" pitchFamily="18" charset="0"/>
+                          </a:rPr>
+                          <m:t>𝑏</m:t>
+                        </m:r>
+                      </m:e>
+                      <m:sub>
+                        <m:r>
+                          <a:rPr lang="en-GB" i="1">
+                            <a:latin typeface="Cambria Math" panose="02040503050406030204" pitchFamily="18" charset="0"/>
+                          </a:rPr>
+                          <m:t>𝑘</m:t>
+                        </m:r>
+                      </m:sub>
+                    </m:sSub>
+                  </m:oMath>
+                </a14:m>
+                <a:r>
+                  <a:rPr lang="de-DE" dirty="0"/>
+                  <a:t>.</a:t>
                 </a:r>
               </a:p>
               <a:p>
-                <a:pPr algn="just"/>
+                <a:pPr marL="342900" indent="-342900">
+                  <a:lnSpc>
+                    <a:spcPct val="100000"/>
+                  </a:lnSpc>
+                  <a:spcAft>
+                    <a:spcPts val="0"/>
+                  </a:spcAft>
+                  <a:buFont typeface="Arial" panose="020B0604020202020204" pitchFamily="34" charset="0"/>
+                  <a:buChar char="•"/>
+                </a:pPr>
+                <a:r>
+                  <a:rPr lang="de-DE" dirty="0"/>
+                  <a:t>Projection </a:t>
+                </a:r>
+                <a14:m>
+                  <m:oMath xmlns:m="http://schemas.openxmlformats.org/officeDocument/2006/math">
+                    <m:sSub>
+                      <m:sSubPr>
+                        <m:ctrlPr>
+                          <a:rPr lang="de-DE" i="1" smtClean="0">
+                            <a:latin typeface="Cambria Math" panose="02040503050406030204" pitchFamily="18" charset="0"/>
+                          </a:rPr>
+                        </m:ctrlPr>
+                      </m:sSubPr>
+                      <m:e>
+                        <m:r>
+                          <a:rPr lang="en-GB" b="0" i="1" smtClean="0">
+                            <a:latin typeface="Cambria Math" panose="02040503050406030204" pitchFamily="18" charset="0"/>
+                          </a:rPr>
+                          <m:t>𝑣</m:t>
+                        </m:r>
+                      </m:e>
+                      <m:sub>
+                        <m:r>
+                          <a:rPr lang="en-GB" b="0" i="1" smtClean="0">
+                            <a:latin typeface="Cambria Math" panose="02040503050406030204" pitchFamily="18" charset="0"/>
+                          </a:rPr>
+                          <m:t>𝐵</m:t>
+                        </m:r>
+                      </m:sub>
+                    </m:sSub>
+                  </m:oMath>
+                </a14:m>
+                <a:r>
+                  <a:rPr lang="de-DE" dirty="0"/>
+                  <a:t> of vector </a:t>
+                </a:r>
+                <a14:m>
+                  <m:oMath xmlns:m="http://schemas.openxmlformats.org/officeDocument/2006/math">
+                    <m:r>
+                      <a:rPr lang="en-GB" b="0" i="1" smtClean="0">
+                        <a:latin typeface="Cambria Math" panose="02040503050406030204" pitchFamily="18" charset="0"/>
+                      </a:rPr>
+                      <m:t>𝑣</m:t>
+                    </m:r>
+                  </m:oMath>
+                </a14:m>
+                <a:r>
+                  <a:rPr lang="de-DE" dirty="0"/>
+                  <a:t> onto </a:t>
+                </a:r>
+                <a14:m>
+                  <m:oMath xmlns:m="http://schemas.openxmlformats.org/officeDocument/2006/math">
+                    <m:r>
+                      <a:rPr lang="en-GB" b="0" i="1" smtClean="0">
+                        <a:latin typeface="Cambria Math" panose="02040503050406030204" pitchFamily="18" charset="0"/>
+                      </a:rPr>
+                      <m:t>𝐵</m:t>
+                    </m:r>
+                  </m:oMath>
+                </a14:m>
+                <a:r>
+                  <a:rPr lang="de-DE" dirty="0"/>
+                  <a:t>.</a:t>
+                </a:r>
+              </a:p>
+              <a:p>
+                <a:pPr marL="342900" indent="-342900">
+                  <a:lnSpc>
+                    <a:spcPct val="100000"/>
+                  </a:lnSpc>
+                  <a:spcAft>
+                    <a:spcPts val="0"/>
+                  </a:spcAft>
+                  <a:buFont typeface="Arial" panose="020B0604020202020204" pitchFamily="34" charset="0"/>
+                  <a:buChar char="•"/>
+                </a:pPr>
+                <a:r>
+                  <a:rPr lang="de-DE" dirty="0"/>
+                  <a:t>Bias subspace defining sets </a:t>
+                </a:r>
+                <a14:m>
+                  <m:oMath xmlns:m="http://schemas.openxmlformats.org/officeDocument/2006/math">
+                    <m:sSub>
+                      <m:sSubPr>
+                        <m:ctrlPr>
+                          <a:rPr lang="en-GB" i="1">
+                            <a:latin typeface="Cambria Math" panose="02040503050406030204" pitchFamily="18" charset="0"/>
+                          </a:rPr>
+                        </m:ctrlPr>
+                      </m:sSubPr>
+                      <m:e>
+                        <m:r>
+                          <a:rPr lang="en-GB" b="0" i="1" smtClean="0">
+                            <a:latin typeface="Cambria Math" panose="02040503050406030204" pitchFamily="18" charset="0"/>
+                          </a:rPr>
+                          <m:t>𝐷</m:t>
+                        </m:r>
+                      </m:e>
+                      <m:sub>
+                        <m:r>
+                          <a:rPr lang="en-GB" i="1">
+                            <a:latin typeface="Cambria Math" panose="02040503050406030204" pitchFamily="18" charset="0"/>
+                          </a:rPr>
+                          <m:t>1</m:t>
+                        </m:r>
+                      </m:sub>
+                    </m:sSub>
+                    <m:r>
+                      <a:rPr lang="en-GB" i="1">
+                        <a:latin typeface="Cambria Math" panose="02040503050406030204" pitchFamily="18" charset="0"/>
+                      </a:rPr>
+                      <m:t>,</m:t>
+                    </m:r>
+                    <m:r>
+                      <a:rPr lang="en-GB" i="1">
+                        <a:latin typeface="Cambria Math" panose="02040503050406030204" pitchFamily="18" charset="0"/>
+                        <a:ea typeface="Cambria Math" panose="02040503050406030204" pitchFamily="18" charset="0"/>
+                      </a:rPr>
+                      <m:t>⋯</m:t>
+                    </m:r>
+                    <m:r>
+                      <a:rPr lang="en-GB" i="1">
+                        <a:latin typeface="Cambria Math" panose="02040503050406030204" pitchFamily="18" charset="0"/>
+                      </a:rPr>
+                      <m:t>,</m:t>
+                    </m:r>
+                    <m:sSub>
+                      <m:sSubPr>
+                        <m:ctrlPr>
+                          <a:rPr lang="en-GB" i="1">
+                            <a:latin typeface="Cambria Math" panose="02040503050406030204" pitchFamily="18" charset="0"/>
+                          </a:rPr>
+                        </m:ctrlPr>
+                      </m:sSubPr>
+                      <m:e>
+                        <m:r>
+                          <a:rPr lang="en-GB" b="0" i="1" smtClean="0">
+                            <a:latin typeface="Cambria Math" panose="02040503050406030204" pitchFamily="18" charset="0"/>
+                          </a:rPr>
+                          <m:t>𝐷</m:t>
+                        </m:r>
+                      </m:e>
+                      <m:sub>
+                        <m:r>
+                          <a:rPr lang="en-GB" b="0" i="1" smtClean="0">
+                            <a:latin typeface="Cambria Math" panose="02040503050406030204" pitchFamily="18" charset="0"/>
+                          </a:rPr>
+                          <m:t>𝑛</m:t>
+                        </m:r>
+                      </m:sub>
+                    </m:sSub>
+                    <m:r>
+                      <a:rPr lang="en-GB" i="1" smtClean="0">
+                        <a:latin typeface="Cambria Math" panose="02040503050406030204" pitchFamily="18" charset="0"/>
+                        <a:ea typeface="Cambria Math" panose="02040503050406030204" pitchFamily="18" charset="0"/>
+                      </a:rPr>
+                      <m:t>⊂</m:t>
+                    </m:r>
+                    <m:r>
+                      <a:rPr lang="en-GB" b="0" i="1" smtClean="0">
+                        <a:latin typeface="Cambria Math" panose="02040503050406030204" pitchFamily="18" charset="0"/>
+                        <a:ea typeface="Cambria Math" panose="02040503050406030204" pitchFamily="18" charset="0"/>
+                      </a:rPr>
+                      <m:t>𝑆</m:t>
+                    </m:r>
+                  </m:oMath>
+                </a14:m>
+                <a:r>
+                  <a:rPr lang="de-DE" dirty="0"/>
+                  <a:t>.</a:t>
+                </a:r>
+              </a:p>
+              <a:p>
+                <a:pPr marL="342900" indent="-342900">
+                  <a:lnSpc>
+                    <a:spcPct val="100000"/>
+                  </a:lnSpc>
+                  <a:spcAft>
+                    <a:spcPts val="0"/>
+                  </a:spcAft>
+                  <a:buFont typeface="Arial" panose="020B0604020202020204" pitchFamily="34" charset="0"/>
+                  <a:buChar char="•"/>
+                </a:pPr>
+                <a:r>
+                  <a:rPr lang="de-DE" dirty="0"/>
+                  <a:t>Equality sets </a:t>
+                </a:r>
+                <a14:m>
+                  <m:oMath xmlns:m="http://schemas.openxmlformats.org/officeDocument/2006/math">
+                    <m:sSub>
+                      <m:sSubPr>
+                        <m:ctrlPr>
+                          <a:rPr lang="en-GB" i="1">
+                            <a:latin typeface="Cambria Math" panose="02040503050406030204" pitchFamily="18" charset="0"/>
+                          </a:rPr>
+                        </m:ctrlPr>
+                      </m:sSubPr>
+                      <m:e>
+                        <m:r>
+                          <a:rPr lang="en-GB" b="0" i="1" smtClean="0">
+                            <a:latin typeface="Cambria Math" panose="02040503050406030204" pitchFamily="18" charset="0"/>
+                          </a:rPr>
+                          <m:t>𝐸</m:t>
+                        </m:r>
+                      </m:e>
+                      <m:sub>
+                        <m:r>
+                          <a:rPr lang="en-GB" i="1">
+                            <a:latin typeface="Cambria Math" panose="02040503050406030204" pitchFamily="18" charset="0"/>
+                          </a:rPr>
+                          <m:t>1</m:t>
+                        </m:r>
+                      </m:sub>
+                    </m:sSub>
+                    <m:r>
+                      <a:rPr lang="en-GB" i="1">
+                        <a:latin typeface="Cambria Math" panose="02040503050406030204" pitchFamily="18" charset="0"/>
+                      </a:rPr>
+                      <m:t>,</m:t>
+                    </m:r>
+                    <m:r>
+                      <a:rPr lang="en-GB" i="1">
+                        <a:latin typeface="Cambria Math" panose="02040503050406030204" pitchFamily="18" charset="0"/>
+                        <a:ea typeface="Cambria Math" panose="02040503050406030204" pitchFamily="18" charset="0"/>
+                      </a:rPr>
+                      <m:t>⋯</m:t>
+                    </m:r>
+                    <m:r>
+                      <a:rPr lang="en-GB" i="1">
+                        <a:latin typeface="Cambria Math" panose="02040503050406030204" pitchFamily="18" charset="0"/>
+                      </a:rPr>
+                      <m:t>,</m:t>
+                    </m:r>
+                    <m:sSub>
+                      <m:sSubPr>
+                        <m:ctrlPr>
+                          <a:rPr lang="en-GB" i="1">
+                            <a:latin typeface="Cambria Math" panose="02040503050406030204" pitchFamily="18" charset="0"/>
+                          </a:rPr>
+                        </m:ctrlPr>
+                      </m:sSubPr>
+                      <m:e>
+                        <m:r>
+                          <a:rPr lang="en-GB" b="0" i="1" smtClean="0">
+                            <a:latin typeface="Cambria Math" panose="02040503050406030204" pitchFamily="18" charset="0"/>
+                          </a:rPr>
+                          <m:t>𝐸</m:t>
+                        </m:r>
+                      </m:e>
+                      <m:sub>
+                        <m:r>
+                          <a:rPr lang="en-GB" b="0" i="1" smtClean="0">
+                            <a:latin typeface="Cambria Math" panose="02040503050406030204" pitchFamily="18" charset="0"/>
+                          </a:rPr>
+                          <m:t>𝑚</m:t>
+                        </m:r>
+                      </m:sub>
+                    </m:sSub>
+                    <m:r>
+                      <a:rPr lang="en-GB" i="1" smtClean="0">
+                        <a:latin typeface="Cambria Math" panose="02040503050406030204" pitchFamily="18" charset="0"/>
+                        <a:ea typeface="Cambria Math" panose="02040503050406030204" pitchFamily="18" charset="0"/>
+                      </a:rPr>
+                      <m:t>⊂</m:t>
+                    </m:r>
+                    <m:r>
+                      <a:rPr lang="en-GB" b="0" i="1" smtClean="0">
+                        <a:latin typeface="Cambria Math" panose="02040503050406030204" pitchFamily="18" charset="0"/>
+                        <a:ea typeface="Cambria Math" panose="02040503050406030204" pitchFamily="18" charset="0"/>
+                      </a:rPr>
+                      <m:t>𝑆</m:t>
+                    </m:r>
+                  </m:oMath>
+                </a14:m>
+                <a:r>
+                  <a:rPr lang="de-DE" dirty="0"/>
+                  <a:t>.</a:t>
+                </a:r>
+              </a:p>
+              <a:p>
+                <a:pPr marL="342900" indent="-342900">
+                  <a:lnSpc>
+                    <a:spcPct val="100000"/>
+                  </a:lnSpc>
+                  <a:spcAft>
+                    <a:spcPts val="0"/>
+                  </a:spcAft>
+                  <a:buFont typeface="Arial" panose="020B0604020202020204" pitchFamily="34" charset="0"/>
+                  <a:buChar char="•"/>
+                </a:pPr>
+                <a:r>
+                  <a:rPr lang="de-DE" dirty="0"/>
+                  <a:t>Soft de-biasing transformation </a:t>
+                </a:r>
+                <a14:m>
+                  <m:oMath xmlns:m="http://schemas.openxmlformats.org/officeDocument/2006/math">
+                    <m:r>
+                      <a:rPr lang="de-DE" i="1" dirty="0" smtClean="0">
+                        <a:latin typeface="Cambria Math" panose="02040503050406030204" pitchFamily="18" charset="0"/>
+                      </a:rPr>
+                      <m:t>𝑇</m:t>
+                    </m:r>
+                  </m:oMath>
+                </a14:m>
+                <a:r>
+                  <a:rPr lang="de-DE" dirty="0"/>
+                  <a:t>.</a:t>
+                </a:r>
+              </a:p>
+              <a:p>
+                <a:pPr>
+                  <a:lnSpc>
+                    <a:spcPct val="100000"/>
+                  </a:lnSpc>
+                  <a:spcAft>
+                    <a:spcPts val="0"/>
+                  </a:spcAft>
+                </a:pPr>
                 <a:endParaRPr lang="de-DE" dirty="0"/>
+              </a:p>
+              <a:p>
+                <a:pPr>
+                  <a:lnSpc>
+                    <a:spcPct val="100000"/>
+                  </a:lnSpc>
+                  <a:spcAft>
+                    <a:spcPts val="0"/>
+                  </a:spcAft>
+                </a:pPr>
+                <a:r>
+                  <a:rPr lang="de-DE" dirty="0"/>
+                  <a:t>The algorithm:</a:t>
+                </a:r>
               </a:p>
             </p:txBody>
           </p:sp>
@@ -30308,8 +30895,8 @@
           </p:sp>
         </mc:Fallback>
       </mc:AlternateContent>
-      <mc:AlternateContent xmlns:mc="http://schemas.openxmlformats.org/markup-compatibility/2006">
-        <mc:Choice xmlns:a14="http://schemas.microsoft.com/office/drawing/2010/main" Requires="a14">
+      <mc:AlternateContent xmlns:mc="http://schemas.openxmlformats.org/markup-compatibility/2006" xmlns:a14="http://schemas.microsoft.com/office/drawing/2010/main">
+        <mc:Choice Requires="a14">
           <p:sp>
             <p:nvSpPr>
               <p:cNvPr id="17" name="Text Placeholder 4">
@@ -30674,7 +31261,7 @@
             </p:txBody>
           </p:sp>
         </mc:Choice>
-        <mc:Fallback>
+        <mc:Fallback xmlns="">
           <p:sp>
             <p:nvSpPr>
               <p:cNvPr id="17" name="Text Placeholder 4">
@@ -31058,7 +31645,7 @@
         </p:nvGrpSpPr>
         <p:grpSpPr>
           <a:xfrm>
-            <a:off x="11087829" y="13392249"/>
+            <a:off x="11087829" y="14365808"/>
             <a:ext cx="8069816" cy="6009759"/>
             <a:chOff x="11087829" y="14184643"/>
             <a:chExt cx="8069816" cy="6009759"/>

</xml_diff>